<commit_message>
Added segment on spacy
</commit_message>
<xml_diff>
--- a/Documentation/100505349.pptx
+++ b/Documentation/100505349.pptx
@@ -5,19 +5,21 @@
     <p:sldMasterId id="2147483684" r:id="rId1"/>
   </p:sldMasterIdLst>
   <p:notesMasterIdLst>
-    <p:notesMasterId r:id="rId9"/>
+    <p:notesMasterId r:id="rId11"/>
   </p:notesMasterIdLst>
   <p:handoutMasterIdLst>
-    <p:handoutMasterId r:id="rId10"/>
+    <p:handoutMasterId r:id="rId12"/>
   </p:handoutMasterIdLst>
   <p:sldIdLst>
     <p:sldId id="256" r:id="rId2"/>
-    <p:sldId id="257" r:id="rId3"/>
-    <p:sldId id="258" r:id="rId4"/>
-    <p:sldId id="259" r:id="rId5"/>
-    <p:sldId id="260" r:id="rId6"/>
-    <p:sldId id="261" r:id="rId7"/>
-    <p:sldId id="262" r:id="rId8"/>
+    <p:sldId id="258" r:id="rId3"/>
+    <p:sldId id="259" r:id="rId4"/>
+    <p:sldId id="260" r:id="rId5"/>
+    <p:sldId id="261" r:id="rId6"/>
+    <p:sldId id="262" r:id="rId7"/>
+    <p:sldId id="263" r:id="rId8"/>
+    <p:sldId id="264" r:id="rId9"/>
+    <p:sldId id="265" r:id="rId10"/>
   </p:sldIdLst>
   <p:sldSz cx="12192000" cy="6858000"/>
   <p:notesSz cx="6858000" cy="9144000"/>
@@ -119,27 +121,22 @@
   <p:extLst>
     <p:ext uri="{521415D9-36F7-43E2-AB2F-B90AF26B5E84}">
       <p14:sectionLst xmlns:p14="http://schemas.microsoft.com/office/powerpoint/2010/main">
-        <p14:section name="Default Section" id="{DE521B38-8723-4196-A8DD-77631EFC73C8}">
+        <p14:section name="Default Section" id="{70B2110D-93E5-46C3-A97C-3F0A8EAA1A7B}">
           <p14:sldIdLst>
             <p14:sldId id="256"/>
-            <p14:sldId id="257"/>
-          </p14:sldIdLst>
-        </p14:section>
-        <p14:section name="1.0 EDA" id="{314FC2C2-76EC-488E-8FCE-82EC4425624B}">
-          <p14:sldIdLst>
             <p14:sldId id="258"/>
           </p14:sldIdLst>
         </p14:section>
-        <p14:section name="1.1 EDA - Literature Review" id="{937A352B-0DE9-40AD-8AEC-518A4B8B1B1B}">
+        <p14:section name="Spacy Tests" id="{E31FEFFE-FA6F-4FAA-BC1A-8AA77E67B93B}">
           <p14:sldIdLst>
             <p14:sldId id="259"/>
             <p14:sldId id="260"/>
             <p14:sldId id="261"/>
             <p14:sldId id="262"/>
+            <p14:sldId id="263"/>
+            <p14:sldId id="264"/>
+            <p14:sldId id="265"/>
           </p14:sldIdLst>
-        </p14:section>
-        <p14:section name="1.2 EDA - ABCD Corpus" id="{603F8F76-5341-4AD1-AFDD-B69D4DEAF8E6}">
-          <p14:sldIdLst/>
         </p14:section>
       </p14:sectionLst>
     </p:ext>
@@ -244,7 +241,7 @@
           <a:p>
             <a:fld id="{7DDF2B0D-01F9-40A6-83B8-CA688E599BFE}" type="datetimeFigureOut">
               <a:rPr lang="en-GB" smtClean="0"/>
-              <a:t>14/04/2022</a:t>
+              <a:t>02/05/2022</a:t>
             </a:fld>
             <a:endParaRPr lang="en-GB"/>
           </a:p>
@@ -422,7 +419,7 @@
           <a:p>
             <a:fld id="{5F411E22-B9AA-407B-9F29-B3EBA7D89382}" type="datetimeFigureOut">
               <a:rPr lang="en-GB" smtClean="0"/>
-              <a:t>14/04/2022</a:t>
+              <a:t>02/05/2022</a:t>
             </a:fld>
             <a:endParaRPr lang="en-GB"/>
           </a:p>
@@ -821,311 +818,8 @@
           <a:p>
             <a:r>
               <a:rPr lang="en-GB" dirty="0"/>
-              <a:t>Literature Review – Chatbot libraries</a:t>
-            </a:r>
-          </a:p>
-          <a:p>
-            <a:r>
-              <a:rPr lang="en-GB" dirty="0"/>
-              <a:t>EDA – Dataset</a:t>
-            </a:r>
-          </a:p>
-          <a:p>
-            <a:r>
-              <a:rPr lang="en-GB" dirty="0" err="1"/>
-              <a:t>Preprocessing</a:t>
-            </a:r>
-            <a:r>
-              <a:rPr lang="en-GB" dirty="0"/>
-              <a:t> – Fixing Dataset</a:t>
-            </a:r>
-          </a:p>
-          <a:p>
-            <a:r>
-              <a:rPr lang="en-GB" dirty="0"/>
-              <a:t>Training – Training on data and progress</a:t>
-            </a:r>
-          </a:p>
-          <a:p>
-            <a:r>
-              <a:rPr lang="en-GB" dirty="0"/>
-              <a:t>Results – comparison to results</a:t>
-            </a:r>
-          </a:p>
-        </p:txBody>
-      </p:sp>
-      <p:sp>
-        <p:nvSpPr>
-          <p:cNvPr id="4" name="Slide Number Placeholder 3"/>
-          <p:cNvSpPr>
-            <a:spLocks noGrp="1"/>
-          </p:cNvSpPr>
-          <p:nvPr>
-            <p:ph type="sldNum" sz="quarter" idx="5"/>
-          </p:nvPr>
-        </p:nvSpPr>
-        <p:spPr/>
-        <p:txBody>
-          <a:bodyPr/>
-          <a:lstStyle/>
-          <a:p>
-            <a:fld id="{6A9D5347-B203-4D7E-8C0C-C0F523BBFB73}" type="slidenum">
-              <a:rPr lang="en-GB" smtClean="0"/>
-              <a:t>2</a:t>
-            </a:fld>
-            <a:endParaRPr lang="en-GB"/>
-          </a:p>
-        </p:txBody>
-      </p:sp>
-    </p:spTree>
-    <p:extLst>
-      <p:ext uri="{BB962C8B-B14F-4D97-AF65-F5344CB8AC3E}">
-        <p14:creationId xmlns:p14="http://schemas.microsoft.com/office/powerpoint/2010/main" val="4174173977"/>
-      </p:ext>
-    </p:extLst>
-  </p:cSld>
-  <p:clrMapOvr>
-    <a:masterClrMapping/>
-  </p:clrMapOvr>
-</p:notes>
-</file>
-
-<file path=ppt/notesSlides/notesSlide3.xml><?xml version="1.0" encoding="utf-8"?>
-<p:notes xmlns:a="http://schemas.openxmlformats.org/drawingml/2006/main" xmlns:r="http://schemas.openxmlformats.org/officeDocument/2006/relationships" xmlns:p="http://schemas.openxmlformats.org/presentationml/2006/main">
-  <p:cSld>
-    <p:spTree>
-      <p:nvGrpSpPr>
-        <p:cNvPr id="1" name=""/>
-        <p:cNvGrpSpPr/>
-        <p:nvPr/>
-      </p:nvGrpSpPr>
-      <p:grpSpPr>
-        <a:xfrm>
-          <a:off x="0" y="0"/>
-          <a:ext cx="0" cy="0"/>
-          <a:chOff x="0" y="0"/>
-          <a:chExt cx="0" cy="0"/>
-        </a:xfrm>
-      </p:grpSpPr>
-      <p:sp>
-        <p:nvSpPr>
-          <p:cNvPr id="2" name="Slide Image Placeholder 1"/>
-          <p:cNvSpPr>
-            <a:spLocks noGrp="1" noRot="1" noChangeAspect="1"/>
-          </p:cNvSpPr>
-          <p:nvPr>
-            <p:ph type="sldImg"/>
-          </p:nvPr>
-        </p:nvSpPr>
-        <p:spPr/>
-      </p:sp>
-      <p:sp>
-        <p:nvSpPr>
-          <p:cNvPr id="3" name="Notes Placeholder 2"/>
-          <p:cNvSpPr>
-            <a:spLocks noGrp="1"/>
-          </p:cNvSpPr>
-          <p:nvPr>
-            <p:ph type="body" idx="1"/>
-          </p:nvPr>
-        </p:nvSpPr>
-        <p:spPr/>
-        <p:txBody>
-          <a:bodyPr/>
-          <a:lstStyle/>
-          <a:p>
-            <a:r>
-              <a:rPr lang="en-GB" dirty="0"/>
-              <a:t>Chatterbot is a library specifically built to generate chatbots – using a simple listed training data it trains a bot to recognise inputs and outputs.</a:t>
-            </a:r>
-          </a:p>
-        </p:txBody>
-      </p:sp>
-      <p:sp>
-        <p:nvSpPr>
-          <p:cNvPr id="4" name="Slide Number Placeholder 3"/>
-          <p:cNvSpPr>
-            <a:spLocks noGrp="1"/>
-          </p:cNvSpPr>
-          <p:nvPr>
-            <p:ph type="sldNum" sz="quarter" idx="5"/>
-          </p:nvPr>
-        </p:nvSpPr>
-        <p:spPr/>
-        <p:txBody>
-          <a:bodyPr/>
-          <a:lstStyle/>
-          <a:p>
-            <a:fld id="{6A9D5347-B203-4D7E-8C0C-C0F523BBFB73}" type="slidenum">
-              <a:rPr lang="en-GB" smtClean="0"/>
-              <a:t>4</a:t>
-            </a:fld>
-            <a:endParaRPr lang="en-GB"/>
-          </a:p>
-        </p:txBody>
-      </p:sp>
-    </p:spTree>
-    <p:extLst>
-      <p:ext uri="{BB962C8B-B14F-4D97-AF65-F5344CB8AC3E}">
-        <p14:creationId xmlns:p14="http://schemas.microsoft.com/office/powerpoint/2010/main" val="575153981"/>
-      </p:ext>
-    </p:extLst>
-  </p:cSld>
-  <p:clrMapOvr>
-    <a:masterClrMapping/>
-  </p:clrMapOvr>
-</p:notes>
-</file>
-
-<file path=ppt/notesSlides/notesSlide4.xml><?xml version="1.0" encoding="utf-8"?>
-<p:notes xmlns:a="http://schemas.openxmlformats.org/drawingml/2006/main" xmlns:r="http://schemas.openxmlformats.org/officeDocument/2006/relationships" xmlns:p="http://schemas.openxmlformats.org/presentationml/2006/main">
-  <p:cSld>
-    <p:spTree>
-      <p:nvGrpSpPr>
-        <p:cNvPr id="1" name=""/>
-        <p:cNvGrpSpPr/>
-        <p:nvPr/>
-      </p:nvGrpSpPr>
-      <p:grpSpPr>
-        <a:xfrm>
-          <a:off x="0" y="0"/>
-          <a:ext cx="0" cy="0"/>
-          <a:chOff x="0" y="0"/>
-          <a:chExt cx="0" cy="0"/>
-        </a:xfrm>
-      </p:grpSpPr>
-      <p:sp>
-        <p:nvSpPr>
-          <p:cNvPr id="2" name="Slide Image Placeholder 1"/>
-          <p:cNvSpPr>
-            <a:spLocks noGrp="1" noRot="1" noChangeAspect="1"/>
-          </p:cNvSpPr>
-          <p:nvPr>
-            <p:ph type="sldImg"/>
-          </p:nvPr>
-        </p:nvSpPr>
-        <p:spPr/>
-      </p:sp>
-      <p:sp>
-        <p:nvSpPr>
-          <p:cNvPr id="3" name="Notes Placeholder 2"/>
-          <p:cNvSpPr>
-            <a:spLocks noGrp="1"/>
-          </p:cNvSpPr>
-          <p:nvPr>
-            <p:ph type="body" idx="1"/>
-          </p:nvPr>
-        </p:nvSpPr>
-        <p:spPr/>
-        <p:txBody>
-          <a:bodyPr/>
-          <a:lstStyle/>
-          <a:p>
-            <a:r>
-              <a:rPr lang="en-GB" dirty="0"/>
-              <a:t>To test out the library, I first attempted to train the bot using a 200MB twitter conversation database, consisting of various human inputs and human responses. This was done for the sole purpose of testing the bot, and so only simple </a:t>
-            </a:r>
-            <a:r>
-              <a:rPr lang="en-GB" dirty="0" err="1"/>
-              <a:t>preprocessing</a:t>
-            </a:r>
-            <a:r>
-              <a:rPr lang="en-GB" dirty="0"/>
-              <a:t> was conducted. First of all, the dataset was shortened to only include the direction of a message and its text, and “chunks” of data were determined as an inbound request followed by an outbound response, limiting the model to simple questions for this stage. Additionally, some identifying data was removed from the dataset before training, most notably twitter @ handles. Responses and questions incorporating items with @ in them had the specific text removed.</a:t>
-            </a:r>
-          </a:p>
-          <a:p>
-            <a:endParaRPr lang="en-GB" dirty="0"/>
-          </a:p>
-          <a:p>
-            <a:r>
-              <a:rPr lang="en-GB" dirty="0"/>
-              <a:t>After training the model on the data for a period of 2 hours, flaws with the system and the dataset started to show. While inputting similar data to that in the dataset produced favourable results, the bot was often unable to correctly match some inputs, and questions about unknown topics caused matching to similar data. In the final example listed, the word “car” has caused a question to be interpreted as one referring to credit cards, due to the word similarity</a:t>
-            </a:r>
-          </a:p>
-        </p:txBody>
-      </p:sp>
-      <p:sp>
-        <p:nvSpPr>
-          <p:cNvPr id="4" name="Slide Number Placeholder 3"/>
-          <p:cNvSpPr>
-            <a:spLocks noGrp="1"/>
-          </p:cNvSpPr>
-          <p:nvPr>
-            <p:ph type="sldNum" sz="quarter" idx="5"/>
-          </p:nvPr>
-        </p:nvSpPr>
-        <p:spPr/>
-        <p:txBody>
-          <a:bodyPr/>
-          <a:lstStyle/>
-          <a:p>
-            <a:fld id="{6A9D5347-B203-4D7E-8C0C-C0F523BBFB73}" type="slidenum">
-              <a:rPr lang="en-GB" smtClean="0"/>
-              <a:t>6</a:t>
-            </a:fld>
-            <a:endParaRPr lang="en-GB"/>
-          </a:p>
-        </p:txBody>
-      </p:sp>
-    </p:spTree>
-    <p:extLst>
-      <p:ext uri="{BB962C8B-B14F-4D97-AF65-F5344CB8AC3E}">
-        <p14:creationId xmlns:p14="http://schemas.microsoft.com/office/powerpoint/2010/main" val="889597719"/>
-      </p:ext>
-    </p:extLst>
-  </p:cSld>
-  <p:clrMapOvr>
-    <a:masterClrMapping/>
-  </p:clrMapOvr>
-</p:notes>
-</file>
-
-<file path=ppt/notesSlides/notesSlide5.xml><?xml version="1.0" encoding="utf-8"?>
-<p:notes xmlns:a="http://schemas.openxmlformats.org/drawingml/2006/main" xmlns:r="http://schemas.openxmlformats.org/officeDocument/2006/relationships" xmlns:p="http://schemas.openxmlformats.org/presentationml/2006/main">
-  <p:cSld>
-    <p:spTree>
-      <p:nvGrpSpPr>
-        <p:cNvPr id="1" name=""/>
-        <p:cNvGrpSpPr/>
-        <p:nvPr/>
-      </p:nvGrpSpPr>
-      <p:grpSpPr>
-        <a:xfrm>
-          <a:off x="0" y="0"/>
-          <a:ext cx="0" cy="0"/>
-          <a:chOff x="0" y="0"/>
-          <a:chExt cx="0" cy="0"/>
-        </a:xfrm>
-      </p:grpSpPr>
-      <p:sp>
-        <p:nvSpPr>
-          <p:cNvPr id="2" name="Slide Image Placeholder 1"/>
-          <p:cNvSpPr>
-            <a:spLocks noGrp="1" noRot="1" noChangeAspect="1"/>
-          </p:cNvSpPr>
-          <p:nvPr>
-            <p:ph type="sldImg"/>
-          </p:nvPr>
-        </p:nvSpPr>
-        <p:spPr/>
-      </p:sp>
-      <p:sp>
-        <p:nvSpPr>
-          <p:cNvPr id="3" name="Notes Placeholder 2"/>
-          <p:cNvSpPr>
-            <a:spLocks noGrp="1"/>
-          </p:cNvSpPr>
-          <p:nvPr>
-            <p:ph type="body" idx="1"/>
-          </p:nvPr>
-        </p:nvSpPr>
-        <p:spPr/>
-        <p:txBody>
-          <a:bodyPr/>
-          <a:lstStyle/>
-          <a:p>
-            <a:endParaRPr lang="en-GB" dirty="0"/>
+              <a:t>(Note that only 10 inputs were specified per topic)</a:t>
+            </a:r>
           </a:p>
         </p:txBody>
       </p:sp>
@@ -1155,7 +849,7 @@
     </p:spTree>
     <p:extLst>
       <p:ext uri="{BB962C8B-B14F-4D97-AF65-F5344CB8AC3E}">
-        <p14:creationId xmlns:p14="http://schemas.microsoft.com/office/powerpoint/2010/main" val="1946892120"/>
+        <p14:creationId xmlns:p14="http://schemas.microsoft.com/office/powerpoint/2010/main" val="3701822498"/>
       </p:ext>
     </p:extLst>
   </p:cSld>
@@ -1314,7 +1008,7 @@
           <a:p>
             <a:fld id="{AE0F6D4B-2242-4C15-9B1F-EB67BC7C3CD1}" type="datetime1">
               <a:rPr lang="en-GB" smtClean="0"/>
-              <a:t>14/04/2022</a:t>
+              <a:t>02/05/2022</a:t>
             </a:fld>
             <a:endParaRPr lang="en-GB"/>
           </a:p>
@@ -1517,7 +1211,7 @@
           <a:p>
             <a:fld id="{148F44C1-1DF0-4D73-AB6D-E462219C56CA}" type="datetime1">
               <a:rPr lang="en-GB" smtClean="0"/>
-              <a:t>14/04/2022</a:t>
+              <a:t>02/05/2022</a:t>
             </a:fld>
             <a:endParaRPr lang="en-GB"/>
           </a:p>
@@ -1730,7 +1424,7 @@
           <a:p>
             <a:fld id="{C3A31CC1-D2D6-4B4E-B0F3-499814EE3B58}" type="datetime1">
               <a:rPr lang="en-GB" smtClean="0"/>
-              <a:t>14/04/2022</a:t>
+              <a:t>02/05/2022</a:t>
             </a:fld>
             <a:endParaRPr lang="en-GB"/>
           </a:p>
@@ -1933,7 +1627,7 @@
           <a:p>
             <a:fld id="{A3FF5B57-79BA-4336-9C8C-134BE5A097AD}" type="datetime1">
               <a:rPr lang="en-GB" smtClean="0"/>
-              <a:t>14/04/2022</a:t>
+              <a:t>02/05/2022</a:t>
             </a:fld>
             <a:endParaRPr lang="en-GB"/>
           </a:p>
@@ -2212,7 +1906,7 @@
           <a:p>
             <a:fld id="{EB67FD68-3457-44CE-AA52-F874EEC85611}" type="datetime1">
               <a:rPr lang="en-GB" smtClean="0"/>
-              <a:t>14/04/2022</a:t>
+              <a:t>02/05/2022</a:t>
             </a:fld>
             <a:endParaRPr lang="en-GB"/>
           </a:p>
@@ -2483,7 +2177,7 @@
           <a:p>
             <a:fld id="{4BA8742A-D1B6-4DBA-A73E-40DBF03C5B42}" type="datetime1">
               <a:rPr lang="en-GB" smtClean="0"/>
-              <a:t>14/04/2022</a:t>
+              <a:t>02/05/2022</a:t>
             </a:fld>
             <a:endParaRPr lang="en-GB"/>
           </a:p>
@@ -2901,7 +2595,7 @@
           <a:p>
             <a:fld id="{63FD0926-F3B9-455D-8AA5-A7B7B6009E87}" type="datetime1">
               <a:rPr lang="en-GB" smtClean="0"/>
-              <a:t>14/04/2022</a:t>
+              <a:t>02/05/2022</a:t>
             </a:fld>
             <a:endParaRPr lang="en-GB"/>
           </a:p>
@@ -3046,7 +2740,7 @@
           <a:p>
             <a:fld id="{4B70B3C0-2F19-4721-874E-D7681BE64C84}" type="datetime1">
               <a:rPr lang="en-GB" smtClean="0"/>
-              <a:t>14/04/2022</a:t>
+              <a:t>02/05/2022</a:t>
             </a:fld>
             <a:endParaRPr lang="en-GB"/>
           </a:p>
@@ -3162,7 +2856,7 @@
           <a:p>
             <a:fld id="{F65B3172-13F0-475E-AEE3-58D82DD42C69}" type="datetime1">
               <a:rPr lang="en-GB" smtClean="0"/>
-              <a:t>14/04/2022</a:t>
+              <a:t>02/05/2022</a:t>
             </a:fld>
             <a:endParaRPr lang="en-GB"/>
           </a:p>
@@ -3478,7 +3172,7 @@
           <a:p>
             <a:fld id="{6C3F1D32-7E7A-4E80-AF0D-6E255F242C09}" type="datetime1">
               <a:rPr lang="en-GB" smtClean="0"/>
-              <a:t>14/04/2022</a:t>
+              <a:t>02/05/2022</a:t>
             </a:fld>
             <a:endParaRPr lang="en-GB"/>
           </a:p>
@@ -3770,7 +3464,7 @@
           <a:p>
             <a:fld id="{AD7C149D-3981-4CD0-8858-4DC0837EA971}" type="datetime1">
               <a:rPr lang="en-GB" smtClean="0"/>
-              <a:t>14/04/2022</a:t>
+              <a:t>02/05/2022</a:t>
             </a:fld>
             <a:endParaRPr lang="en-GB"/>
           </a:p>
@@ -4016,7 +3710,7 @@
           <a:p>
             <a:fld id="{974CD72A-BED1-4076-8EB6-0C606103999B}" type="datetime1">
               <a:rPr lang="en-GB" smtClean="0"/>
-              <a:t>14/04/2022</a:t>
+              <a:t>02/05/2022</a:t>
             </a:fld>
             <a:endParaRPr lang="en-GB"/>
           </a:p>
@@ -4571,24 +4265,24 @@
       </p:grpSpPr>
       <p:sp>
         <p:nvSpPr>
-          <p:cNvPr id="3" name="Content Placeholder 2">
-            <a:extLst>
-              <a:ext uri="{FF2B5EF4-FFF2-40B4-BE49-F238E27FC236}">
-                <a16:creationId xmlns:a16="http://schemas.microsoft.com/office/drawing/2014/main" id="{21AAAF24-888B-4DC9-90EE-84FBBCC40C4C}"/>
-              </a:ext>
-            </a:extLst>
-          </p:cNvPr>
-          <p:cNvSpPr>
-            <a:spLocks noGrp="1"/>
-          </p:cNvSpPr>
-          <p:nvPr>
-            <p:ph idx="1"/>
+          <p:cNvPr id="2" name="Title 1">
+            <a:extLst>
+              <a:ext uri="{FF2B5EF4-FFF2-40B4-BE49-F238E27FC236}">
+                <a16:creationId xmlns:a16="http://schemas.microsoft.com/office/drawing/2014/main" id="{770E6EE7-B050-46D5-B12B-FF8B9068E4C3}"/>
+              </a:ext>
+            </a:extLst>
+          </p:cNvPr>
+          <p:cNvSpPr>
+            <a:spLocks noGrp="1"/>
+          </p:cNvSpPr>
+          <p:nvPr>
+            <p:ph type="title"/>
           </p:nvPr>
         </p:nvSpPr>
         <p:spPr>
           <a:xfrm>
-            <a:off x="838200" y="1676400"/>
-            <a:ext cx="10515600" cy="4500563"/>
+            <a:off x="838200" y="2691765"/>
+            <a:ext cx="10515600" cy="1325563"/>
           </a:xfrm>
         </p:spPr>
         <p:txBody>
@@ -4597,97 +4291,23 @@
           </a:bodyPr>
           <a:lstStyle/>
           <a:p>
+            <a:pPr algn="ctr"/>
             <a:r>
               <a:rPr lang="en-GB" dirty="0">
                 <a:latin typeface="Times New Roman" panose="02020603050405020304" pitchFamily="18" charset="0"/>
                 <a:cs typeface="Times New Roman" panose="02020603050405020304" pitchFamily="18" charset="0"/>
               </a:rPr>
-              <a:t>Exploratory Data Analysis</a:t>
-            </a:r>
-          </a:p>
-          <a:p>
-            <a:pPr lvl="1"/>
-            <a:r>
-              <a:rPr lang="en-GB" dirty="0">
-                <a:latin typeface="Times New Roman" panose="02020603050405020304" pitchFamily="18" charset="0"/>
-                <a:cs typeface="Times New Roman" panose="02020603050405020304" pitchFamily="18" charset="0"/>
-              </a:rPr>
-              <a:t>Literature Review</a:t>
-            </a:r>
-          </a:p>
-          <a:p>
-            <a:r>
-              <a:rPr lang="en-GB" dirty="0">
-                <a:latin typeface="Times New Roman" panose="02020603050405020304" pitchFamily="18" charset="0"/>
-                <a:cs typeface="Times New Roman" panose="02020603050405020304" pitchFamily="18" charset="0"/>
-              </a:rPr>
-              <a:t>Pre Processing</a:t>
-            </a:r>
-          </a:p>
-          <a:p>
-            <a:r>
-              <a:rPr lang="en-GB" dirty="0">
-                <a:latin typeface="Times New Roman" panose="02020603050405020304" pitchFamily="18" charset="0"/>
-                <a:cs typeface="Times New Roman" panose="02020603050405020304" pitchFamily="18" charset="0"/>
-              </a:rPr>
-              <a:t>Training</a:t>
-            </a:r>
-          </a:p>
-          <a:p>
-            <a:r>
-              <a:rPr lang="en-GB" dirty="0">
-                <a:latin typeface="Times New Roman" panose="02020603050405020304" pitchFamily="18" charset="0"/>
-                <a:cs typeface="Times New Roman" panose="02020603050405020304" pitchFamily="18" charset="0"/>
-              </a:rPr>
-              <a:t>Results</a:t>
-            </a:r>
-          </a:p>
-        </p:txBody>
-      </p:sp>
-      <p:sp>
-        <p:nvSpPr>
-          <p:cNvPr id="6" name="TextBox 5">
-            <a:extLst>
-              <a:ext uri="{FF2B5EF4-FFF2-40B4-BE49-F238E27FC236}">
-                <a16:creationId xmlns:a16="http://schemas.microsoft.com/office/drawing/2014/main" id="{52958125-2E6E-4299-A4DA-1F36F7AAFB92}"/>
-              </a:ext>
-            </a:extLst>
-          </p:cNvPr>
-          <p:cNvSpPr txBox="1"/>
-          <p:nvPr/>
-        </p:nvSpPr>
-        <p:spPr>
-          <a:xfrm flipH="1">
-            <a:off x="838200" y="609600"/>
-            <a:ext cx="5938521" cy="646331"/>
-          </a:xfrm>
-          <a:prstGeom prst="rect">
-            <a:avLst/>
-          </a:prstGeom>
-          <a:noFill/>
-        </p:spPr>
-        <p:txBody>
-          <a:bodyPr wrap="square" rtlCol="0">
-            <a:spAutoFit/>
-          </a:bodyPr>
-          <a:lstStyle/>
-          <a:p>
-            <a:r>
-              <a:rPr lang="en-GB" sz="3600" dirty="0">
-                <a:latin typeface="Times New Roman" panose="02020603050405020304" pitchFamily="18" charset="0"/>
-                <a:cs typeface="Times New Roman" panose="02020603050405020304" pitchFamily="18" charset="0"/>
-              </a:rPr>
-              <a:t>Contents</a:t>
-            </a:r>
-          </a:p>
-        </p:txBody>
-      </p:sp>
-      <p:sp>
-        <p:nvSpPr>
-          <p:cNvPr id="9" name="Footer Placeholder 8">
-            <a:extLst>
-              <a:ext uri="{FF2B5EF4-FFF2-40B4-BE49-F238E27FC236}">
-                <a16:creationId xmlns:a16="http://schemas.microsoft.com/office/drawing/2014/main" id="{12AFB215-58DF-4DBA-9771-95F36BEA3A7D}"/>
+              <a:t>EDA – Literature Review</a:t>
+            </a:r>
+          </a:p>
+        </p:txBody>
+      </p:sp>
+      <p:sp>
+        <p:nvSpPr>
+          <p:cNvPr id="7" name="Footer Placeholder 6">
+            <a:extLst>
+              <a:ext uri="{FF2B5EF4-FFF2-40B4-BE49-F238E27FC236}">
+                <a16:creationId xmlns:a16="http://schemas.microsoft.com/office/drawing/2014/main" id="{BFBBBD93-BE28-4EB0-AD63-C26CC96E7E2B}"/>
               </a:ext>
             </a:extLst>
           </p:cNvPr>
@@ -4710,7 +4330,7 @@
     </p:spTree>
     <p:extLst>
       <p:ext uri="{BB962C8B-B14F-4D97-AF65-F5344CB8AC3E}">
-        <p14:creationId xmlns:p14="http://schemas.microsoft.com/office/powerpoint/2010/main" val="1268643792"/>
+        <p14:creationId xmlns:p14="http://schemas.microsoft.com/office/powerpoint/2010/main" val="844879002"/>
       </p:ext>
     </p:extLst>
   </p:cSld>
@@ -4771,7 +4391,7 @@
                 <a:latin typeface="Times New Roman" panose="02020603050405020304" pitchFamily="18" charset="0"/>
                 <a:cs typeface="Times New Roman" panose="02020603050405020304" pitchFamily="18" charset="0"/>
               </a:rPr>
-              <a:t>EDA – Literature Review</a:t>
+              <a:t>Spacy Library Testing</a:t>
             </a:r>
           </a:p>
         </p:txBody>
@@ -4797,17 +4417,14 @@
           <a:bodyPr/>
           <a:lstStyle/>
           <a:p>
-            <a:r>
-              <a:rPr lang="en-GB" dirty="0"/>
-              <a:t>1.1 EDA – Literature Review</a:t>
-            </a:r>
+            <a:endParaRPr lang="en-GB" dirty="0"/>
           </a:p>
         </p:txBody>
       </p:sp>
     </p:spTree>
     <p:extLst>
       <p:ext uri="{BB962C8B-B14F-4D97-AF65-F5344CB8AC3E}">
-        <p14:creationId xmlns:p14="http://schemas.microsoft.com/office/powerpoint/2010/main" val="844879002"/>
+        <p14:creationId xmlns:p14="http://schemas.microsoft.com/office/powerpoint/2010/main" val="2682881850"/>
       </p:ext>
     </p:extLst>
   </p:cSld>
@@ -4839,7 +4456,7 @@
           <p:cNvPr id="2" name="Title 1">
             <a:extLst>
               <a:ext uri="{FF2B5EF4-FFF2-40B4-BE49-F238E27FC236}">
-                <a16:creationId xmlns:a16="http://schemas.microsoft.com/office/drawing/2014/main" id="{D4BCA6B2-CCD8-4661-ADFE-8E0A25473CCF}"/>
+                <a16:creationId xmlns:a16="http://schemas.microsoft.com/office/drawing/2014/main" id="{771BB030-117A-49E4-9801-43301420CF6D}"/>
               </a:ext>
             </a:extLst>
           </p:cNvPr>
@@ -4860,7 +4477,7 @@
                 <a:latin typeface="Times New Roman" panose="02020603050405020304" pitchFamily="18" charset="0"/>
                 <a:cs typeface="Times New Roman" panose="02020603050405020304" pitchFamily="18" charset="0"/>
               </a:rPr>
-              <a:t>Library - Chatterbot</a:t>
+              <a:t>Spacy</a:t>
             </a:r>
           </a:p>
         </p:txBody>
@@ -4870,7 +4487,7 @@
           <p:cNvPr id="3" name="Content Placeholder 2">
             <a:extLst>
               <a:ext uri="{FF2B5EF4-FFF2-40B4-BE49-F238E27FC236}">
-                <a16:creationId xmlns:a16="http://schemas.microsoft.com/office/drawing/2014/main" id="{65B8DBDD-77E8-43FE-A1B7-17F5CA5FB5DF}"/>
+                <a16:creationId xmlns:a16="http://schemas.microsoft.com/office/drawing/2014/main" id="{33821CF8-1A7E-4E75-9437-DCC2F014FF38}"/>
               </a:ext>
             </a:extLst>
           </p:cNvPr>
@@ -4881,12 +4498,7 @@
             <p:ph idx="1"/>
           </p:nvPr>
         </p:nvSpPr>
-        <p:spPr>
-          <a:xfrm>
-            <a:off x="838200" y="1901952"/>
-            <a:ext cx="7228840" cy="4198684"/>
-          </a:xfrm>
-        </p:spPr>
+        <p:spPr/>
         <p:txBody>
           <a:bodyPr>
             <a:normAutofit/>
@@ -4894,96 +4506,39 @@
           <a:lstStyle/>
           <a:p>
             <a:r>
-              <a:rPr lang="en-GB" sz="2000" dirty="0">
+              <a:rPr lang="en-GB" sz="2400" dirty="0">
                 <a:latin typeface="Times New Roman" panose="02020603050405020304" pitchFamily="18" charset="0"/>
                 <a:cs typeface="Times New Roman" panose="02020603050405020304" pitchFamily="18" charset="0"/>
               </a:rPr>
-              <a:t>Conversation based chatbot – able to train data based on listed input and output conversation data</a:t>
-            </a:r>
-          </a:p>
-          <a:p>
-            <a:r>
-              <a:rPr lang="en-GB" sz="2000" dirty="0">
+              <a:t>Natural Language Processing library</a:t>
+            </a:r>
+          </a:p>
+          <a:p>
+            <a:r>
+              <a:rPr lang="en-GB" sz="2400" dirty="0">
                 <a:latin typeface="Times New Roman" panose="02020603050405020304" pitchFamily="18" charset="0"/>
                 <a:cs typeface="Times New Roman" panose="02020603050405020304" pitchFamily="18" charset="0"/>
               </a:rPr>
-              <a:t>Very customisable – has support for corpus training data and custom logic adapters</a:t>
-            </a:r>
-          </a:p>
-          <a:p>
-            <a:r>
-              <a:rPr lang="en-GB" sz="2000" dirty="0">
+              <a:t>Able to split text into tokens and recognise the “type” of a token – splitting them into nouns, adjectives etc.</a:t>
+            </a:r>
+          </a:p>
+          <a:p>
+            <a:r>
+              <a:rPr lang="en-GB" sz="2400" dirty="0">
                 <a:latin typeface="Times New Roman" panose="02020603050405020304" pitchFamily="18" charset="0"/>
                 <a:cs typeface="Times New Roman" panose="02020603050405020304" pitchFamily="18" charset="0"/>
               </a:rPr>
-              <a:t>Open source with detailed documentation – allows for better development and debugging procedures</a:t>
-            </a:r>
-          </a:p>
-          <a:p>
-            <a:r>
-              <a:rPr lang="en-GB" sz="2000" dirty="0">
-                <a:latin typeface="Times New Roman" panose="02020603050405020304" pitchFamily="18" charset="0"/>
-                <a:cs typeface="Times New Roman" panose="02020603050405020304" pitchFamily="18" charset="0"/>
-              </a:rPr>
-              <a:t>Stores trained bot to SQL file – allowing reuse without retraining the bot</a:t>
-            </a:r>
-          </a:p>
-          <a:p>
-            <a:endParaRPr lang="en-GB" sz="2400" dirty="0"/>
-          </a:p>
-        </p:txBody>
-      </p:sp>
-      <p:pic>
-        <p:nvPicPr>
-          <p:cNvPr id="1026" name="Picture 2">
-            <a:extLst>
-              <a:ext uri="{FF2B5EF4-FFF2-40B4-BE49-F238E27FC236}">
-                <a16:creationId xmlns:a16="http://schemas.microsoft.com/office/drawing/2014/main" id="{0BC76D90-5DB6-4BEB-8EA2-943406A665A6}"/>
-              </a:ext>
-            </a:extLst>
-          </p:cNvPr>
-          <p:cNvPicPr>
-            <a:picLocks noChangeAspect="1" noChangeArrowheads="1"/>
-          </p:cNvPicPr>
-          <p:nvPr/>
-        </p:nvPicPr>
-        <p:blipFill rotWithShape="1">
-          <a:blip r:embed="rId3">
-            <a:extLst>
-              <a:ext uri="{28A0092B-C50C-407E-A947-70E740481C1C}">
-                <a14:useLocalDpi xmlns:a14="http://schemas.microsoft.com/office/drawing/2010/main" val="0"/>
-              </a:ext>
-            </a:extLst>
-          </a:blip>
-          <a:srcRect r="80667"/>
-          <a:stretch/>
-        </p:blipFill>
-        <p:spPr bwMode="auto">
-          <a:xfrm>
-            <a:off x="8666480" y="1901952"/>
-            <a:ext cx="3159760" cy="4198684"/>
-          </a:xfrm>
-          <a:prstGeom prst="rect">
-            <a:avLst/>
-          </a:prstGeom>
-          <a:noFill/>
-          <a:extLst>
-            <a:ext uri="{909E8E84-426E-40DD-AFC4-6F175D3DCCD1}">
-              <a14:hiddenFill xmlns:a14="http://schemas.microsoft.com/office/drawing/2010/main">
-                <a:solidFill>
-                  <a:srgbClr val="FFFFFF"/>
-                </a:solidFill>
-              </a14:hiddenFill>
-            </a:ext>
-          </a:extLst>
-        </p:spPr>
-      </p:pic>
-      <p:sp>
-        <p:nvSpPr>
-          <p:cNvPr id="6" name="Footer Placeholder 5">
-            <a:extLst>
-              <a:ext uri="{FF2B5EF4-FFF2-40B4-BE49-F238E27FC236}">
-                <a16:creationId xmlns:a16="http://schemas.microsoft.com/office/drawing/2014/main" id="{731BD022-3E6F-43B0-8712-9F2671068BE0}"/>
+              <a:t>Distinctly not a prebuilt chatbot library. Spacy only intends to be a framework for NLP centric projects (such as chatbots) to build from</a:t>
+            </a:r>
+          </a:p>
+        </p:txBody>
+      </p:sp>
+      <p:sp>
+        <p:nvSpPr>
+          <p:cNvPr id="4" name="Footer Placeholder 3">
+            <a:extLst>
+              <a:ext uri="{FF2B5EF4-FFF2-40B4-BE49-F238E27FC236}">
+                <a16:creationId xmlns:a16="http://schemas.microsoft.com/office/drawing/2014/main" id="{77F46C0D-DDBF-421C-9254-A9E5042D5514}"/>
               </a:ext>
             </a:extLst>
           </p:cNvPr>
@@ -5000,8 +4555,8 @@
           <a:lstStyle/>
           <a:p>
             <a:r>
-              <a:rPr lang="en-GB" dirty="0"/>
-              <a:t>1.1 EDA – Literature Review</a:t>
+              <a:rPr lang="en-GB"/>
+              <a:t>SEC</a:t>
             </a:r>
           </a:p>
         </p:txBody>
@@ -5009,7 +4564,7 @@
     </p:spTree>
     <p:extLst>
       <p:ext uri="{BB962C8B-B14F-4D97-AF65-F5344CB8AC3E}">
-        <p14:creationId xmlns:p14="http://schemas.microsoft.com/office/powerpoint/2010/main" val="1350991770"/>
+        <p14:creationId xmlns:p14="http://schemas.microsoft.com/office/powerpoint/2010/main" val="1871911699"/>
       </p:ext>
     </p:extLst>
   </p:cSld>
@@ -5041,7 +4596,337 @@
           <p:cNvPr id="2" name="Title 1">
             <a:extLst>
               <a:ext uri="{FF2B5EF4-FFF2-40B4-BE49-F238E27FC236}">
-                <a16:creationId xmlns:a16="http://schemas.microsoft.com/office/drawing/2014/main" id="{9315FF6F-FA5F-4085-BF5F-9E123D25BC0B}"/>
+                <a16:creationId xmlns:a16="http://schemas.microsoft.com/office/drawing/2014/main" id="{771BB030-117A-49E4-9801-43301420CF6D}"/>
+              </a:ext>
+            </a:extLst>
+          </p:cNvPr>
+          <p:cNvSpPr>
+            <a:spLocks noGrp="1"/>
+          </p:cNvSpPr>
+          <p:nvPr>
+            <p:ph type="title"/>
+          </p:nvPr>
+        </p:nvSpPr>
+        <p:spPr/>
+        <p:txBody>
+          <a:bodyPr>
+            <a:normAutofit/>
+          </a:bodyPr>
+          <a:lstStyle/>
+          <a:p>
+            <a:r>
+              <a:rPr lang="en-GB" sz="4000" dirty="0">
+                <a:latin typeface="Times New Roman" panose="02020603050405020304" pitchFamily="18" charset="0"/>
+                <a:cs typeface="Times New Roman" panose="02020603050405020304" pitchFamily="18" charset="0"/>
+              </a:rPr>
+              <a:t>“Doc” Objects</a:t>
+            </a:r>
+          </a:p>
+        </p:txBody>
+      </p:sp>
+      <p:sp>
+        <p:nvSpPr>
+          <p:cNvPr id="3" name="Content Placeholder 2">
+            <a:extLst>
+              <a:ext uri="{FF2B5EF4-FFF2-40B4-BE49-F238E27FC236}">
+                <a16:creationId xmlns:a16="http://schemas.microsoft.com/office/drawing/2014/main" id="{33821CF8-1A7E-4E75-9437-DCC2F014FF38}"/>
+              </a:ext>
+            </a:extLst>
+          </p:cNvPr>
+          <p:cNvSpPr>
+            <a:spLocks noGrp="1"/>
+          </p:cNvSpPr>
+          <p:nvPr>
+            <p:ph idx="1"/>
+          </p:nvPr>
+        </p:nvSpPr>
+        <p:spPr>
+          <a:xfrm>
+            <a:off x="838200" y="1825625"/>
+            <a:ext cx="9687560" cy="4351338"/>
+          </a:xfrm>
+        </p:spPr>
+        <p:txBody>
+          <a:bodyPr>
+            <a:normAutofit/>
+          </a:bodyPr>
+          <a:lstStyle/>
+          <a:p>
+            <a:r>
+              <a:rPr lang="en-GB" sz="2400" dirty="0">
+                <a:latin typeface="Times New Roman" panose="02020603050405020304" pitchFamily="18" charset="0"/>
+                <a:cs typeface="Times New Roman" panose="02020603050405020304" pitchFamily="18" charset="0"/>
+              </a:rPr>
+              <a:t>When parsing a string, Spacy will generate a “Doc” – a sequence of tokens</a:t>
+            </a:r>
+          </a:p>
+          <a:p>
+            <a:r>
+              <a:rPr lang="en-GB" sz="2400" dirty="0">
+                <a:latin typeface="Times New Roman" panose="02020603050405020304" pitchFamily="18" charset="0"/>
+                <a:cs typeface="Times New Roman" panose="02020603050405020304" pitchFamily="18" charset="0"/>
+              </a:rPr>
+              <a:t>These Doc objects store a large amount of data pertaining to the contents of a token</a:t>
+            </a:r>
+          </a:p>
+          <a:p>
+            <a:r>
+              <a:rPr lang="en-GB" sz="2400" dirty="0">
+                <a:latin typeface="Times New Roman" panose="02020603050405020304" pitchFamily="18" charset="0"/>
+                <a:cs typeface="Times New Roman" panose="02020603050405020304" pitchFamily="18" charset="0"/>
+              </a:rPr>
+              <a:t>The Doc file implements a similarity function – converting the token array into a vector format based on its properties</a:t>
+            </a:r>
+          </a:p>
+          <a:p>
+            <a:r>
+              <a:rPr lang="en-GB" sz="2400" dirty="0">
+                <a:latin typeface="Times New Roman" panose="02020603050405020304" pitchFamily="18" charset="0"/>
+                <a:cs typeface="Times New Roman" panose="02020603050405020304" pitchFamily="18" charset="0"/>
+              </a:rPr>
+              <a:t>The library includes a similarity function – comparing an input to the Doc and returning a similarity score</a:t>
+            </a:r>
+          </a:p>
+        </p:txBody>
+      </p:sp>
+      <p:sp>
+        <p:nvSpPr>
+          <p:cNvPr id="4" name="Footer Placeholder 3">
+            <a:extLst>
+              <a:ext uri="{FF2B5EF4-FFF2-40B4-BE49-F238E27FC236}">
+                <a16:creationId xmlns:a16="http://schemas.microsoft.com/office/drawing/2014/main" id="{77F46C0D-DDBF-421C-9254-A9E5042D5514}"/>
+              </a:ext>
+            </a:extLst>
+          </p:cNvPr>
+          <p:cNvSpPr>
+            <a:spLocks noGrp="1"/>
+          </p:cNvSpPr>
+          <p:nvPr>
+            <p:ph type="ftr" sz="quarter" idx="11"/>
+          </p:nvPr>
+        </p:nvSpPr>
+        <p:spPr/>
+        <p:txBody>
+          <a:bodyPr/>
+          <a:lstStyle/>
+          <a:p>
+            <a:r>
+              <a:rPr lang="en-GB" dirty="0"/>
+              <a:t>SEC</a:t>
+            </a:r>
+          </a:p>
+        </p:txBody>
+      </p:sp>
+    </p:spTree>
+    <p:extLst>
+      <p:ext uri="{BB962C8B-B14F-4D97-AF65-F5344CB8AC3E}">
+        <p14:creationId xmlns:p14="http://schemas.microsoft.com/office/powerpoint/2010/main" val="3140336722"/>
+      </p:ext>
+    </p:extLst>
+  </p:cSld>
+  <p:clrMapOvr>
+    <a:masterClrMapping/>
+  </p:clrMapOvr>
+</p:sld>
+</file>
+
+<file path=ppt/slides/slide6.xml><?xml version="1.0" encoding="utf-8"?>
+<p:sld xmlns:a="http://schemas.openxmlformats.org/drawingml/2006/main" xmlns:r="http://schemas.openxmlformats.org/officeDocument/2006/relationships" xmlns:p="http://schemas.openxmlformats.org/presentationml/2006/main">
+  <p:cSld>
+    <p:spTree>
+      <p:nvGrpSpPr>
+        <p:cNvPr id="1" name=""/>
+        <p:cNvGrpSpPr/>
+        <p:nvPr/>
+      </p:nvGrpSpPr>
+      <p:grpSpPr>
+        <a:xfrm>
+          <a:off x="0" y="0"/>
+          <a:ext cx="0" cy="0"/>
+          <a:chOff x="0" y="0"/>
+          <a:chExt cx="0" cy="0"/>
+        </a:xfrm>
+      </p:grpSpPr>
+      <p:sp>
+        <p:nvSpPr>
+          <p:cNvPr id="2" name="Title 1">
+            <a:extLst>
+              <a:ext uri="{FF2B5EF4-FFF2-40B4-BE49-F238E27FC236}">
+                <a16:creationId xmlns:a16="http://schemas.microsoft.com/office/drawing/2014/main" id="{771BB030-117A-49E4-9801-43301420CF6D}"/>
+              </a:ext>
+            </a:extLst>
+          </p:cNvPr>
+          <p:cNvSpPr>
+            <a:spLocks noGrp="1"/>
+          </p:cNvSpPr>
+          <p:nvPr>
+            <p:ph type="title"/>
+          </p:nvPr>
+        </p:nvSpPr>
+        <p:spPr/>
+        <p:txBody>
+          <a:bodyPr>
+            <a:normAutofit/>
+          </a:bodyPr>
+          <a:lstStyle/>
+          <a:p>
+            <a:r>
+              <a:rPr lang="en-GB" sz="4000" dirty="0">
+                <a:latin typeface="Times New Roman" panose="02020603050405020304" pitchFamily="18" charset="0"/>
+                <a:cs typeface="Times New Roman" panose="02020603050405020304" pitchFamily="18" charset="0"/>
+              </a:rPr>
+              <a:t>Building a Simple Question Classifier in Spacy</a:t>
+            </a:r>
+          </a:p>
+        </p:txBody>
+      </p:sp>
+      <p:sp>
+        <p:nvSpPr>
+          <p:cNvPr id="3" name="Content Placeholder 2">
+            <a:extLst>
+              <a:ext uri="{FF2B5EF4-FFF2-40B4-BE49-F238E27FC236}">
+                <a16:creationId xmlns:a16="http://schemas.microsoft.com/office/drawing/2014/main" id="{33821CF8-1A7E-4E75-9437-DCC2F014FF38}"/>
+              </a:ext>
+            </a:extLst>
+          </p:cNvPr>
+          <p:cNvSpPr>
+            <a:spLocks noGrp="1"/>
+          </p:cNvSpPr>
+          <p:nvPr>
+            <p:ph idx="1"/>
+          </p:nvPr>
+        </p:nvSpPr>
+        <p:spPr>
+          <a:xfrm>
+            <a:off x="838200" y="1690688"/>
+            <a:ext cx="9890760" cy="4351338"/>
+          </a:xfrm>
+        </p:spPr>
+        <p:txBody>
+          <a:bodyPr>
+            <a:normAutofit/>
+          </a:bodyPr>
+          <a:lstStyle/>
+          <a:p>
+            <a:r>
+              <a:rPr lang="en-GB" sz="2000" dirty="0">
+                <a:latin typeface="Times New Roman" panose="02020603050405020304" pitchFamily="18" charset="0"/>
+                <a:cs typeface="Times New Roman" panose="02020603050405020304" pitchFamily="18" charset="0"/>
+              </a:rPr>
+              <a:t>By creating multiple doc files – each with its own topic area – and then training said file with questions relating to its assigned topic, a simple topic comparison can be created</a:t>
+            </a:r>
+          </a:p>
+          <a:p>
+            <a:r>
+              <a:rPr lang="en-GB" sz="2000" dirty="0">
+                <a:latin typeface="Times New Roman" panose="02020603050405020304" pitchFamily="18" charset="0"/>
+                <a:cs typeface="Times New Roman" panose="02020603050405020304" pitchFamily="18" charset="0"/>
+              </a:rPr>
+              <a:t>When receiving an input, each model can be polled for its similarity score. The highest similarity score can then be interpreted as the expected topic area</a:t>
+            </a:r>
+          </a:p>
+        </p:txBody>
+      </p:sp>
+      <p:sp>
+        <p:nvSpPr>
+          <p:cNvPr id="4" name="Footer Placeholder 3">
+            <a:extLst>
+              <a:ext uri="{FF2B5EF4-FFF2-40B4-BE49-F238E27FC236}">
+                <a16:creationId xmlns:a16="http://schemas.microsoft.com/office/drawing/2014/main" id="{77F46C0D-DDBF-421C-9254-A9E5042D5514}"/>
+              </a:ext>
+            </a:extLst>
+          </p:cNvPr>
+          <p:cNvSpPr>
+            <a:spLocks noGrp="1"/>
+          </p:cNvSpPr>
+          <p:nvPr>
+            <p:ph type="ftr" sz="quarter" idx="11"/>
+          </p:nvPr>
+        </p:nvSpPr>
+        <p:spPr/>
+        <p:txBody>
+          <a:bodyPr/>
+          <a:lstStyle/>
+          <a:p>
+            <a:r>
+              <a:rPr lang="en-GB" dirty="0"/>
+              <a:t>SEC</a:t>
+            </a:r>
+          </a:p>
+        </p:txBody>
+      </p:sp>
+      <p:pic>
+        <p:nvPicPr>
+          <p:cNvPr id="8" name="Picture 7" descr="Diagram&#10;&#10;Description automatically generated">
+            <a:extLst>
+              <a:ext uri="{FF2B5EF4-FFF2-40B4-BE49-F238E27FC236}">
+                <a16:creationId xmlns:a16="http://schemas.microsoft.com/office/drawing/2014/main" id="{E5D1E160-27C3-419D-8F09-969C2A3213E4}"/>
+              </a:ext>
+            </a:extLst>
+          </p:cNvPr>
+          <p:cNvPicPr>
+            <a:picLocks noChangeAspect="1"/>
+          </p:cNvPicPr>
+          <p:nvPr/>
+        </p:nvPicPr>
+        <p:blipFill>
+          <a:blip r:embed="rId2">
+            <a:extLst>
+              <a:ext uri="{28A0092B-C50C-407E-A947-70E740481C1C}">
+                <a14:useLocalDpi xmlns:a14="http://schemas.microsoft.com/office/drawing/2010/main" val="0"/>
+              </a:ext>
+            </a:extLst>
+          </a:blip>
+          <a:stretch>
+            <a:fillRect/>
+          </a:stretch>
+        </p:blipFill>
+        <p:spPr>
+          <a:xfrm>
+            <a:off x="2659380" y="3194184"/>
+            <a:ext cx="6248400" cy="3219996"/>
+          </a:xfrm>
+          <a:prstGeom prst="rect">
+            <a:avLst/>
+          </a:prstGeom>
+        </p:spPr>
+      </p:pic>
+    </p:spTree>
+    <p:extLst>
+      <p:ext uri="{BB962C8B-B14F-4D97-AF65-F5344CB8AC3E}">
+        <p14:creationId xmlns:p14="http://schemas.microsoft.com/office/powerpoint/2010/main" val="4116481599"/>
+      </p:ext>
+    </p:extLst>
+  </p:cSld>
+  <p:clrMapOvr>
+    <a:masterClrMapping/>
+  </p:clrMapOvr>
+</p:sld>
+</file>
+
+<file path=ppt/slides/slide7.xml><?xml version="1.0" encoding="utf-8"?>
+<p:sld xmlns:a="http://schemas.openxmlformats.org/drawingml/2006/main" xmlns:r="http://schemas.openxmlformats.org/officeDocument/2006/relationships" xmlns:p="http://schemas.openxmlformats.org/presentationml/2006/main">
+  <p:cSld>
+    <p:spTree>
+      <p:nvGrpSpPr>
+        <p:cNvPr id="1" name=""/>
+        <p:cNvGrpSpPr/>
+        <p:nvPr/>
+      </p:nvGrpSpPr>
+      <p:grpSpPr>
+        <a:xfrm>
+          <a:off x="0" y="0"/>
+          <a:ext cx="0" cy="0"/>
+          <a:chOff x="0" y="0"/>
+          <a:chExt cx="0" cy="0"/>
+        </a:xfrm>
+      </p:grpSpPr>
+      <p:sp>
+        <p:nvSpPr>
+          <p:cNvPr id="2" name="Title 1">
+            <a:extLst>
+              <a:ext uri="{FF2B5EF4-FFF2-40B4-BE49-F238E27FC236}">
+                <a16:creationId xmlns:a16="http://schemas.microsoft.com/office/drawing/2014/main" id="{78C28E79-1E9E-424C-A6B7-3E3A1814FAA0}"/>
               </a:ext>
             </a:extLst>
           </p:cNvPr>
@@ -5062,7 +4947,276 @@
                 <a:latin typeface="Times New Roman" panose="02020603050405020304" pitchFamily="18" charset="0"/>
                 <a:cs typeface="Times New Roman" panose="02020603050405020304" pitchFamily="18" charset="0"/>
               </a:rPr>
-              <a:t>Chatterbot Flaws &amp; Solutions</a:t>
+              <a:t>Spacy Model</a:t>
+            </a:r>
+          </a:p>
+        </p:txBody>
+      </p:sp>
+      <p:sp>
+        <p:nvSpPr>
+          <p:cNvPr id="4" name="Footer Placeholder 3">
+            <a:extLst>
+              <a:ext uri="{FF2B5EF4-FFF2-40B4-BE49-F238E27FC236}">
+                <a16:creationId xmlns:a16="http://schemas.microsoft.com/office/drawing/2014/main" id="{161C8FD0-3C47-42BD-AAEA-0D666D8F1A16}"/>
+              </a:ext>
+            </a:extLst>
+          </p:cNvPr>
+          <p:cNvSpPr>
+            <a:spLocks noGrp="1"/>
+          </p:cNvSpPr>
+          <p:nvPr>
+            <p:ph type="ftr" sz="quarter" idx="11"/>
+          </p:nvPr>
+        </p:nvSpPr>
+        <p:spPr/>
+        <p:txBody>
+          <a:bodyPr/>
+          <a:lstStyle/>
+          <a:p>
+            <a:r>
+              <a:rPr lang="en-GB"/>
+              <a:t>SEC</a:t>
+            </a:r>
+          </a:p>
+        </p:txBody>
+      </p:sp>
+      <p:pic>
+        <p:nvPicPr>
+          <p:cNvPr id="6" name="Picture 5">
+            <a:extLst>
+              <a:ext uri="{FF2B5EF4-FFF2-40B4-BE49-F238E27FC236}">
+                <a16:creationId xmlns:a16="http://schemas.microsoft.com/office/drawing/2014/main" id="{541BFD7C-4583-4596-938A-BF98284287A4}"/>
+              </a:ext>
+            </a:extLst>
+          </p:cNvPr>
+          <p:cNvPicPr>
+            <a:picLocks noChangeAspect="1"/>
+          </p:cNvPicPr>
+          <p:nvPr/>
+        </p:nvPicPr>
+        <p:blipFill>
+          <a:blip r:embed="rId3"/>
+          <a:stretch>
+            <a:fillRect/>
+          </a:stretch>
+        </p:blipFill>
+        <p:spPr>
+          <a:xfrm>
+            <a:off x="838200" y="1744981"/>
+            <a:ext cx="3717154" cy="463232"/>
+          </a:xfrm>
+          <a:prstGeom prst="rect">
+            <a:avLst/>
+          </a:prstGeom>
+        </p:spPr>
+      </p:pic>
+      <p:pic>
+        <p:nvPicPr>
+          <p:cNvPr id="8" name="Picture 7">
+            <a:extLst>
+              <a:ext uri="{FF2B5EF4-FFF2-40B4-BE49-F238E27FC236}">
+                <a16:creationId xmlns:a16="http://schemas.microsoft.com/office/drawing/2014/main" id="{FF886EE7-364F-4B82-A745-21C5E6A6EB9E}"/>
+              </a:ext>
+            </a:extLst>
+          </p:cNvPr>
+          <p:cNvPicPr>
+            <a:picLocks noChangeAspect="1"/>
+          </p:cNvPicPr>
+          <p:nvPr/>
+        </p:nvPicPr>
+        <p:blipFill>
+          <a:blip r:embed="rId4"/>
+          <a:stretch>
+            <a:fillRect/>
+          </a:stretch>
+        </p:blipFill>
+        <p:spPr>
+          <a:xfrm>
+            <a:off x="838200" y="2544127"/>
+            <a:ext cx="3815080" cy="463996"/>
+          </a:xfrm>
+          <a:prstGeom prst="rect">
+            <a:avLst/>
+          </a:prstGeom>
+        </p:spPr>
+      </p:pic>
+      <p:pic>
+        <p:nvPicPr>
+          <p:cNvPr id="10" name="Picture 9">
+            <a:extLst>
+              <a:ext uri="{FF2B5EF4-FFF2-40B4-BE49-F238E27FC236}">
+                <a16:creationId xmlns:a16="http://schemas.microsoft.com/office/drawing/2014/main" id="{B15F14E3-1221-4FB7-8992-3277E55E301F}"/>
+              </a:ext>
+            </a:extLst>
+          </p:cNvPr>
+          <p:cNvPicPr>
+            <a:picLocks noChangeAspect="1"/>
+          </p:cNvPicPr>
+          <p:nvPr/>
+        </p:nvPicPr>
+        <p:blipFill>
+          <a:blip r:embed="rId5"/>
+          <a:stretch>
+            <a:fillRect/>
+          </a:stretch>
+        </p:blipFill>
+        <p:spPr>
+          <a:xfrm>
+            <a:off x="8153400" y="1691642"/>
+            <a:ext cx="3152775" cy="504825"/>
+          </a:xfrm>
+          <a:prstGeom prst="rect">
+            <a:avLst/>
+          </a:prstGeom>
+        </p:spPr>
+      </p:pic>
+      <p:pic>
+        <p:nvPicPr>
+          <p:cNvPr id="12" name="Picture 11">
+            <a:extLst>
+              <a:ext uri="{FF2B5EF4-FFF2-40B4-BE49-F238E27FC236}">
+                <a16:creationId xmlns:a16="http://schemas.microsoft.com/office/drawing/2014/main" id="{899C8CCF-9B52-439F-BF9D-864C70F41360}"/>
+              </a:ext>
+            </a:extLst>
+          </p:cNvPr>
+          <p:cNvPicPr>
+            <a:picLocks noChangeAspect="1"/>
+          </p:cNvPicPr>
+          <p:nvPr/>
+        </p:nvPicPr>
+        <p:blipFill>
+          <a:blip r:embed="rId6"/>
+          <a:stretch>
+            <a:fillRect/>
+          </a:stretch>
+        </p:blipFill>
+        <p:spPr>
+          <a:xfrm>
+            <a:off x="838200" y="3355181"/>
+            <a:ext cx="3969346" cy="530068"/>
+          </a:xfrm>
+          <a:prstGeom prst="rect">
+            <a:avLst/>
+          </a:prstGeom>
+        </p:spPr>
+      </p:pic>
+      <p:pic>
+        <p:nvPicPr>
+          <p:cNvPr id="14" name="Picture 13">
+            <a:extLst>
+              <a:ext uri="{FF2B5EF4-FFF2-40B4-BE49-F238E27FC236}">
+                <a16:creationId xmlns:a16="http://schemas.microsoft.com/office/drawing/2014/main" id="{407FDE1D-42DC-457A-A336-C1196488B04E}"/>
+              </a:ext>
+            </a:extLst>
+          </p:cNvPr>
+          <p:cNvPicPr>
+            <a:picLocks noChangeAspect="1"/>
+          </p:cNvPicPr>
+          <p:nvPr/>
+        </p:nvPicPr>
+        <p:blipFill>
+          <a:blip r:embed="rId7"/>
+          <a:stretch>
+            <a:fillRect/>
+          </a:stretch>
+        </p:blipFill>
+        <p:spPr>
+          <a:xfrm>
+            <a:off x="8153400" y="2445623"/>
+            <a:ext cx="3152775" cy="400050"/>
+          </a:xfrm>
+          <a:prstGeom prst="rect">
+            <a:avLst/>
+          </a:prstGeom>
+        </p:spPr>
+      </p:pic>
+      <p:pic>
+        <p:nvPicPr>
+          <p:cNvPr id="16" name="Picture 15">
+            <a:extLst>
+              <a:ext uri="{FF2B5EF4-FFF2-40B4-BE49-F238E27FC236}">
+                <a16:creationId xmlns:a16="http://schemas.microsoft.com/office/drawing/2014/main" id="{F17EF3CC-AB37-4AD4-83DE-04154ED4265A}"/>
+              </a:ext>
+            </a:extLst>
+          </p:cNvPr>
+          <p:cNvPicPr>
+            <a:picLocks noChangeAspect="1"/>
+          </p:cNvPicPr>
+          <p:nvPr/>
+        </p:nvPicPr>
+        <p:blipFill>
+          <a:blip r:embed="rId8"/>
+          <a:stretch>
+            <a:fillRect/>
+          </a:stretch>
+        </p:blipFill>
+        <p:spPr>
+          <a:xfrm>
+            <a:off x="7353300" y="4172386"/>
+            <a:ext cx="4000500" cy="428625"/>
+          </a:xfrm>
+          <a:prstGeom prst="rect">
+            <a:avLst/>
+          </a:prstGeom>
+        </p:spPr>
+      </p:pic>
+    </p:spTree>
+    <p:extLst>
+      <p:ext uri="{BB962C8B-B14F-4D97-AF65-F5344CB8AC3E}">
+        <p14:creationId xmlns:p14="http://schemas.microsoft.com/office/powerpoint/2010/main" val="3009799540"/>
+      </p:ext>
+    </p:extLst>
+  </p:cSld>
+  <p:clrMapOvr>
+    <a:masterClrMapping/>
+  </p:clrMapOvr>
+</p:sld>
+</file>
+
+<file path=ppt/slides/slide8.xml><?xml version="1.0" encoding="utf-8"?>
+<p:sld xmlns:a="http://schemas.openxmlformats.org/drawingml/2006/main" xmlns:r="http://schemas.openxmlformats.org/officeDocument/2006/relationships" xmlns:p="http://schemas.openxmlformats.org/presentationml/2006/main">
+  <p:cSld>
+    <p:spTree>
+      <p:nvGrpSpPr>
+        <p:cNvPr id="1" name=""/>
+        <p:cNvGrpSpPr/>
+        <p:nvPr/>
+      </p:nvGrpSpPr>
+      <p:grpSpPr>
+        <a:xfrm>
+          <a:off x="0" y="0"/>
+          <a:ext cx="0" cy="0"/>
+          <a:chOff x="0" y="0"/>
+          <a:chExt cx="0" cy="0"/>
+        </a:xfrm>
+      </p:grpSpPr>
+      <p:sp>
+        <p:nvSpPr>
+          <p:cNvPr id="2" name="Title 1">
+            <a:extLst>
+              <a:ext uri="{FF2B5EF4-FFF2-40B4-BE49-F238E27FC236}">
+                <a16:creationId xmlns:a16="http://schemas.microsoft.com/office/drawing/2014/main" id="{4D95785F-56E1-415E-A1D6-9A55B55BFBD1}"/>
+              </a:ext>
+            </a:extLst>
+          </p:cNvPr>
+          <p:cNvSpPr>
+            <a:spLocks noGrp="1"/>
+          </p:cNvSpPr>
+          <p:nvPr>
+            <p:ph type="title"/>
+          </p:nvPr>
+        </p:nvSpPr>
+        <p:spPr/>
+        <p:txBody>
+          <a:bodyPr/>
+          <a:lstStyle/>
+          <a:p>
+            <a:r>
+              <a:rPr lang="en-GB" dirty="0">
+                <a:latin typeface="Times New Roman" panose="02020603050405020304" pitchFamily="18" charset="0"/>
+                <a:cs typeface="Times New Roman" panose="02020603050405020304" pitchFamily="18" charset="0"/>
+              </a:rPr>
+              <a:t>Spacy Advantages &amp; Disadvantages</a:t>
             </a:r>
           </a:p>
         </p:txBody>
@@ -5072,7 +5226,7 @@
           <p:cNvPr id="3" name="Content Placeholder 2">
             <a:extLst>
               <a:ext uri="{FF2B5EF4-FFF2-40B4-BE49-F238E27FC236}">
-                <a16:creationId xmlns:a16="http://schemas.microsoft.com/office/drawing/2014/main" id="{13D64AEF-C17B-449A-B046-EF3FCCA7CBFB}"/>
+                <a16:creationId xmlns:a16="http://schemas.microsoft.com/office/drawing/2014/main" id="{1FEC1AE3-DA85-4D3D-96F7-1E6D76CDCD93}"/>
               </a:ext>
             </a:extLst>
           </p:cNvPr>
@@ -5086,7 +5240,7 @@
         <p:spPr>
           <a:xfrm>
             <a:off x="838200" y="1825625"/>
-            <a:ext cx="10515600" cy="2045335"/>
+            <a:ext cx="4942840" cy="4351338"/>
           </a:xfrm>
         </p:spPr>
         <p:txBody>
@@ -5100,41 +5254,63 @@
                 <a:latin typeface="Times New Roman" panose="02020603050405020304" pitchFamily="18" charset="0"/>
                 <a:cs typeface="Times New Roman" panose="02020603050405020304" pitchFamily="18" charset="0"/>
               </a:rPr>
-              <a:t>By default, chatterbot is built to only match inputs to pre-written outputs and is unable to generate new responses</a:t>
-            </a:r>
-            <a:endParaRPr lang="en-GB" sz="2400" dirty="0">
-              <a:latin typeface="Times New Roman" panose="02020603050405020304" pitchFamily="18" charset="0"/>
-              <a:cs typeface="Times New Roman" panose="02020603050405020304" pitchFamily="18" charset="0"/>
-            </a:endParaRPr>
-          </a:p>
-          <a:p>
-            <a:pPr lvl="1"/>
+              <a:t>Model has the ability to distinguish multiple different topics</a:t>
+            </a:r>
+          </a:p>
+          <a:p>
             <a:r>
               <a:rPr lang="en-GB" sz="2000" dirty="0">
                 <a:latin typeface="Times New Roman" panose="02020603050405020304" pitchFamily="18" charset="0"/>
                 <a:cs typeface="Times New Roman" panose="02020603050405020304" pitchFamily="18" charset="0"/>
               </a:rPr>
-              <a:t>This means that a dataset composed of diverse human-written data would no doubt create flawed outputs</a:t>
-            </a:r>
-          </a:p>
-          <a:p>
-            <a:pPr lvl="1"/>
+              <a:t>Able to be saved – minimizing the need for retraining</a:t>
+            </a:r>
+          </a:p>
+          <a:p>
             <a:r>
               <a:rPr lang="en-GB" sz="2000" dirty="0">
                 <a:latin typeface="Times New Roman" panose="02020603050405020304" pitchFamily="18" charset="0"/>
                 <a:cs typeface="Times New Roman" panose="02020603050405020304" pitchFamily="18" charset="0"/>
               </a:rPr>
-              <a:t>To fix this issue, the dataset in question should consist of categorised responses – allowing the bot to pick the appropriate generic response to a question</a:t>
-            </a:r>
-          </a:p>
-        </p:txBody>
-      </p:sp>
-      <p:sp>
-        <p:nvSpPr>
-          <p:cNvPr id="4" name="Content Placeholder 2">
-            <a:extLst>
-              <a:ext uri="{FF2B5EF4-FFF2-40B4-BE49-F238E27FC236}">
-                <a16:creationId xmlns:a16="http://schemas.microsoft.com/office/drawing/2014/main" id="{9C5DE83F-AD4A-49BA-832D-034ABDAB7140}"/>
+              <a:t>Library has GPU support</a:t>
+            </a:r>
+          </a:p>
+        </p:txBody>
+      </p:sp>
+      <p:sp>
+        <p:nvSpPr>
+          <p:cNvPr id="4" name="Footer Placeholder 3">
+            <a:extLst>
+              <a:ext uri="{FF2B5EF4-FFF2-40B4-BE49-F238E27FC236}">
+                <a16:creationId xmlns:a16="http://schemas.microsoft.com/office/drawing/2014/main" id="{C467B209-66AC-4BD1-8DAA-BDD38379DA26}"/>
+              </a:ext>
+            </a:extLst>
+          </p:cNvPr>
+          <p:cNvSpPr>
+            <a:spLocks noGrp="1"/>
+          </p:cNvSpPr>
+          <p:nvPr>
+            <p:ph type="ftr" sz="quarter" idx="11"/>
+          </p:nvPr>
+        </p:nvSpPr>
+        <p:spPr/>
+        <p:txBody>
+          <a:bodyPr/>
+          <a:lstStyle/>
+          <a:p>
+            <a:r>
+              <a:rPr lang="en-GB"/>
+              <a:t>SEC</a:t>
+            </a:r>
+          </a:p>
+        </p:txBody>
+      </p:sp>
+      <p:sp>
+        <p:nvSpPr>
+          <p:cNvPr id="5" name="Content Placeholder 2">
+            <a:extLst>
+              <a:ext uri="{FF2B5EF4-FFF2-40B4-BE49-F238E27FC236}">
+                <a16:creationId xmlns:a16="http://schemas.microsoft.com/office/drawing/2014/main" id="{B88D3561-DAA2-4D65-BECB-B5945412C329}"/>
               </a:ext>
             </a:extLst>
           </p:cNvPr>
@@ -5145,8 +5321,8 @@
         </p:nvSpPr>
         <p:spPr>
           <a:xfrm>
-            <a:off x="838200" y="3870960"/>
-            <a:ext cx="10515600" cy="2045335"/>
+            <a:off x="6096000" y="1825625"/>
+            <a:ext cx="4942840" cy="4351338"/>
           </a:xfrm>
           <a:prstGeom prst="rect">
             <a:avLst/>
@@ -5326,73 +5502,29 @@
                 <a:latin typeface="Times New Roman" panose="02020603050405020304" pitchFamily="18" charset="0"/>
                 <a:cs typeface="Times New Roman" panose="02020603050405020304" pitchFamily="18" charset="0"/>
               </a:rPr>
-              <a:t>The library is intended to generate </a:t>
-            </a:r>
-            <a:r>
-              <a:rPr lang="en-GB" sz="2000" b="1" dirty="0">
-                <a:latin typeface="Times New Roman" panose="02020603050405020304" pitchFamily="18" charset="0"/>
-                <a:cs typeface="Times New Roman" panose="02020603050405020304" pitchFamily="18" charset="0"/>
-              </a:rPr>
-              <a:t>conversational</a:t>
-            </a:r>
+              <a:t>Training is unfocused – because the similarity score is an averaged score, common words like “and” may have significant weighting</a:t>
+            </a:r>
+          </a:p>
+          <a:p>
             <a:r>
               <a:rPr lang="en-GB" sz="2000" dirty="0">
                 <a:latin typeface="Times New Roman" panose="02020603050405020304" pitchFamily="18" charset="0"/>
                 <a:cs typeface="Times New Roman" panose="02020603050405020304" pitchFamily="18" charset="0"/>
               </a:rPr>
-              <a:t> bots</a:t>
-            </a:r>
-          </a:p>
-          <a:p>
-            <a:pPr lvl="1"/>
+              <a:t>There is no guarantee that more training data may improve performance – in fact, it may lower the performance. Since the scoring is average based, more words may spread the average thinner over time</a:t>
+            </a:r>
+            <a:endParaRPr lang="en-GB" sz="2400" dirty="0">
+              <a:latin typeface="Times New Roman" panose="02020603050405020304" pitchFamily="18" charset="0"/>
+              <a:cs typeface="Times New Roman" panose="02020603050405020304" pitchFamily="18" charset="0"/>
+            </a:endParaRPr>
+          </a:p>
+          <a:p>
             <a:r>
               <a:rPr lang="en-GB" sz="2000" dirty="0">
                 <a:latin typeface="Times New Roman" panose="02020603050405020304" pitchFamily="18" charset="0"/>
                 <a:cs typeface="Times New Roman" panose="02020603050405020304" pitchFamily="18" charset="0"/>
               </a:rPr>
-              <a:t>If provided with inappropriate data, it may be unable to find its “role” in the conversation, and may end up taking a client role – asking questions rather than answering them</a:t>
-            </a:r>
-          </a:p>
-          <a:p>
-            <a:pPr lvl="1"/>
-            <a:r>
-              <a:rPr lang="en-GB" sz="2000" dirty="0">
-                <a:latin typeface="Times New Roman" panose="02020603050405020304" pitchFamily="18" charset="0"/>
-                <a:cs typeface="Times New Roman" panose="02020603050405020304" pitchFamily="18" charset="0"/>
-              </a:rPr>
-              <a:t>To mitigate this, data should be separated into simple input-output chunks, preventing it from assuming the wrong “role” in the conversation</a:t>
-            </a:r>
-            <a:endParaRPr lang="en-GB" sz="1600" dirty="0">
-              <a:latin typeface="Times New Roman" panose="02020603050405020304" pitchFamily="18" charset="0"/>
-              <a:cs typeface="Times New Roman" panose="02020603050405020304" pitchFamily="18" charset="0"/>
-            </a:endParaRPr>
-          </a:p>
-        </p:txBody>
-      </p:sp>
-      <p:sp>
-        <p:nvSpPr>
-          <p:cNvPr id="9" name="Footer Placeholder 8">
-            <a:extLst>
-              <a:ext uri="{FF2B5EF4-FFF2-40B4-BE49-F238E27FC236}">
-                <a16:creationId xmlns:a16="http://schemas.microsoft.com/office/drawing/2014/main" id="{C32A66F9-26E1-4236-9F45-47FC349DF1FE}"/>
-              </a:ext>
-            </a:extLst>
-          </p:cNvPr>
-          <p:cNvSpPr>
-            <a:spLocks noGrp="1"/>
-          </p:cNvSpPr>
-          <p:nvPr>
-            <p:ph type="ftr" sz="quarter" idx="11"/>
-          </p:nvPr>
-        </p:nvSpPr>
-        <p:spPr/>
-        <p:txBody>
-          <a:bodyPr/>
-          <a:lstStyle/>
-          <a:p>
-            <a:r>
-              <a:rPr lang="en-GB" dirty="0"/>
-              <a:t>1.1 EDA – Literature Review</a:t>
+              <a:t>The current method requires manual categorisation of training data</a:t>
             </a:r>
           </a:p>
         </p:txBody>
@@ -5400,7 +5532,7 @@
     </p:spTree>
     <p:extLst>
       <p:ext uri="{BB962C8B-B14F-4D97-AF65-F5344CB8AC3E}">
-        <p14:creationId xmlns:p14="http://schemas.microsoft.com/office/powerpoint/2010/main" val="1399007140"/>
+        <p14:creationId xmlns:p14="http://schemas.microsoft.com/office/powerpoint/2010/main" val="1737537933"/>
       </p:ext>
     </p:extLst>
   </p:cSld>
@@ -5410,7 +5542,7 @@
 </p:sld>
 </file>
 
-<file path=ppt/slides/slide6.xml><?xml version="1.0" encoding="utf-8"?>
+<file path=ppt/slides/slide9.xml><?xml version="1.0" encoding="utf-8"?>
 <p:sld xmlns:a="http://schemas.openxmlformats.org/drawingml/2006/main" xmlns:r="http://schemas.openxmlformats.org/officeDocument/2006/relationships" xmlns:p="http://schemas.openxmlformats.org/presentationml/2006/main">
   <p:cSld>
     <p:spTree>
@@ -5432,7 +5564,7 @@
           <p:cNvPr id="2" name="Title 1">
             <a:extLst>
               <a:ext uri="{FF2B5EF4-FFF2-40B4-BE49-F238E27FC236}">
-                <a16:creationId xmlns:a16="http://schemas.microsoft.com/office/drawing/2014/main" id="{168BAA6D-D597-4E7D-89C8-36B16E6D9F22}"/>
+                <a16:creationId xmlns:a16="http://schemas.microsoft.com/office/drawing/2014/main" id="{4D95785F-56E1-415E-A1D6-9A55B55BFBD1}"/>
               </a:ext>
             </a:extLst>
           </p:cNvPr>
@@ -5445,135 +5577,7 @@
         </p:nvSpPr>
         <p:spPr/>
         <p:txBody>
-          <a:bodyPr>
-            <a:normAutofit/>
-          </a:bodyPr>
-          <a:lstStyle/>
-          <a:p>
-            <a:r>
-              <a:rPr lang="en-GB" sz="4000" dirty="0">
-                <a:latin typeface="Times New Roman" panose="02020603050405020304" pitchFamily="18" charset="0"/>
-                <a:cs typeface="Times New Roman" panose="02020603050405020304" pitchFamily="18" charset="0"/>
-              </a:rPr>
-              <a:t>Unsanitized Chatterbot Training</a:t>
-            </a:r>
-          </a:p>
-        </p:txBody>
-      </p:sp>
-      <p:pic>
-        <p:nvPicPr>
-          <p:cNvPr id="5" name="Picture 4">
-            <a:extLst>
-              <a:ext uri="{FF2B5EF4-FFF2-40B4-BE49-F238E27FC236}">
-                <a16:creationId xmlns:a16="http://schemas.microsoft.com/office/drawing/2014/main" id="{2FC1311B-9763-4B4C-BFF5-0DF675FDDE85}"/>
-              </a:ext>
-            </a:extLst>
-          </p:cNvPr>
-          <p:cNvPicPr>
-            <a:picLocks noChangeAspect="1"/>
-          </p:cNvPicPr>
-          <p:nvPr/>
-        </p:nvPicPr>
-        <p:blipFill rotWithShape="1">
-          <a:blip r:embed="rId3"/>
-          <a:srcRect t="1" b="3432"/>
-          <a:stretch/>
-        </p:blipFill>
-        <p:spPr>
-          <a:xfrm>
-            <a:off x="838199" y="4680491"/>
-            <a:ext cx="10881360" cy="790622"/>
-          </a:xfrm>
-          <a:prstGeom prst="rect">
-            <a:avLst/>
-          </a:prstGeom>
-        </p:spPr>
-      </p:pic>
-      <p:pic>
-        <p:nvPicPr>
-          <p:cNvPr id="7" name="Picture 6">
-            <a:extLst>
-              <a:ext uri="{FF2B5EF4-FFF2-40B4-BE49-F238E27FC236}">
-                <a16:creationId xmlns:a16="http://schemas.microsoft.com/office/drawing/2014/main" id="{4C879623-0C06-4A77-83DF-302D811A6BD3}"/>
-              </a:ext>
-            </a:extLst>
-          </p:cNvPr>
-          <p:cNvPicPr>
-            <a:picLocks noChangeAspect="1"/>
-          </p:cNvPicPr>
-          <p:nvPr/>
-        </p:nvPicPr>
-        <p:blipFill rotWithShape="1">
-          <a:blip r:embed="rId4"/>
-          <a:srcRect b="9619"/>
-          <a:stretch/>
-        </p:blipFill>
-        <p:spPr>
-          <a:xfrm>
-            <a:off x="838200" y="1957228"/>
-            <a:ext cx="6000750" cy="602615"/>
-          </a:xfrm>
-          <a:prstGeom prst="rect">
-            <a:avLst/>
-          </a:prstGeom>
-        </p:spPr>
-      </p:pic>
-      <p:pic>
-        <p:nvPicPr>
-          <p:cNvPr id="9" name="Picture 8">
-            <a:extLst>
-              <a:ext uri="{FF2B5EF4-FFF2-40B4-BE49-F238E27FC236}">
-                <a16:creationId xmlns:a16="http://schemas.microsoft.com/office/drawing/2014/main" id="{C59B5494-D16C-4AD3-8728-C8F617340B1C}"/>
-              </a:ext>
-            </a:extLst>
-          </p:cNvPr>
-          <p:cNvPicPr>
-            <a:picLocks noChangeAspect="1"/>
-          </p:cNvPicPr>
-          <p:nvPr/>
-        </p:nvPicPr>
-        <p:blipFill>
-          <a:blip r:embed="rId5"/>
-          <a:stretch>
-            <a:fillRect/>
-          </a:stretch>
-        </p:blipFill>
-        <p:spPr>
-          <a:xfrm>
-            <a:off x="838200" y="3301103"/>
-            <a:ext cx="8439150" cy="714375"/>
-          </a:xfrm>
-          <a:prstGeom prst="rect">
-            <a:avLst/>
-          </a:prstGeom>
-        </p:spPr>
-      </p:pic>
-      <p:sp>
-        <p:nvSpPr>
-          <p:cNvPr id="10" name="TextBox 9">
-            <a:extLst>
-              <a:ext uri="{FF2B5EF4-FFF2-40B4-BE49-F238E27FC236}">
-                <a16:creationId xmlns:a16="http://schemas.microsoft.com/office/drawing/2014/main" id="{F39DF134-E4D3-460B-847A-4D6D5B595F51}"/>
-              </a:ext>
-            </a:extLst>
-          </p:cNvPr>
-          <p:cNvSpPr txBox="1"/>
-          <p:nvPr/>
-        </p:nvSpPr>
-        <p:spPr>
-          <a:xfrm>
-            <a:off x="838200" y="2561141"/>
-            <a:ext cx="6226641" cy="369332"/>
-          </a:xfrm>
-          <a:prstGeom prst="rect">
-            <a:avLst/>
-          </a:prstGeom>
-          <a:noFill/>
-        </p:spPr>
-        <p:txBody>
-          <a:bodyPr wrap="none" rtlCol="0">
-            <a:spAutoFit/>
-          </a:bodyPr>
+          <a:bodyPr/>
           <a:lstStyle/>
           <a:p>
             <a:r>
@@ -5581,165 +5585,31 @@
                 <a:latin typeface="Times New Roman" panose="02020603050405020304" pitchFamily="18" charset="0"/>
                 <a:cs typeface="Times New Roman" panose="02020603050405020304" pitchFamily="18" charset="0"/>
               </a:rPr>
-              <a:t>Sending in exact-match input data provides the correct response</a:t>
-            </a:r>
-          </a:p>
-        </p:txBody>
-      </p:sp>
-      <p:sp>
-        <p:nvSpPr>
-          <p:cNvPr id="11" name="TextBox 10">
-            <a:extLst>
-              <a:ext uri="{FF2B5EF4-FFF2-40B4-BE49-F238E27FC236}">
-                <a16:creationId xmlns:a16="http://schemas.microsoft.com/office/drawing/2014/main" id="{4B2813D5-1441-4392-8BEA-74BF6AB94A10}"/>
-              </a:ext>
-            </a:extLst>
-          </p:cNvPr>
-          <p:cNvSpPr txBox="1"/>
-          <p:nvPr/>
+              <a:t>Spacy Conclusions</a:t>
+            </a:r>
+          </a:p>
+        </p:txBody>
+      </p:sp>
+      <p:sp>
+        <p:nvSpPr>
+          <p:cNvPr id="3" name="Content Placeholder 2">
+            <a:extLst>
+              <a:ext uri="{FF2B5EF4-FFF2-40B4-BE49-F238E27FC236}">
+                <a16:creationId xmlns:a16="http://schemas.microsoft.com/office/drawing/2014/main" id="{1FEC1AE3-DA85-4D3D-96F7-1E6D76CDCD93}"/>
+              </a:ext>
+            </a:extLst>
+          </p:cNvPr>
+          <p:cNvSpPr>
+            <a:spLocks noGrp="1"/>
+          </p:cNvSpPr>
+          <p:nvPr>
+            <p:ph idx="1"/>
+          </p:nvPr>
         </p:nvSpPr>
         <p:spPr>
           <a:xfrm>
-            <a:off x="838199" y="4016776"/>
-            <a:ext cx="4615366" cy="369332"/>
-          </a:xfrm>
-          <a:prstGeom prst="rect">
-            <a:avLst/>
-          </a:prstGeom>
-          <a:noFill/>
-        </p:spPr>
-        <p:txBody>
-          <a:bodyPr wrap="none" rtlCol="0">
-            <a:spAutoFit/>
-          </a:bodyPr>
-          <a:lstStyle/>
-          <a:p>
-            <a:r>
-              <a:rPr lang="en-GB" dirty="0">
-                <a:latin typeface="Times New Roman" panose="02020603050405020304" pitchFamily="18" charset="0"/>
-                <a:cs typeface="Times New Roman" panose="02020603050405020304" pitchFamily="18" charset="0"/>
-              </a:rPr>
-              <a:t>The bot is able to loosely match based on topics</a:t>
-            </a:r>
-          </a:p>
-        </p:txBody>
-      </p:sp>
-      <p:sp>
-        <p:nvSpPr>
-          <p:cNvPr id="12" name="TextBox 11">
-            <a:extLst>
-              <a:ext uri="{FF2B5EF4-FFF2-40B4-BE49-F238E27FC236}">
-                <a16:creationId xmlns:a16="http://schemas.microsoft.com/office/drawing/2014/main" id="{AC57CFF2-08E9-4A8E-850B-98738B1A0AF7}"/>
-              </a:ext>
-            </a:extLst>
-          </p:cNvPr>
-          <p:cNvSpPr txBox="1"/>
-          <p:nvPr/>
-        </p:nvSpPr>
-        <p:spPr>
-          <a:xfrm>
-            <a:off x="838199" y="5549646"/>
-            <a:ext cx="8417689" cy="369332"/>
-          </a:xfrm>
-          <a:prstGeom prst="rect">
-            <a:avLst/>
-          </a:prstGeom>
-          <a:noFill/>
-        </p:spPr>
-        <p:txBody>
-          <a:bodyPr wrap="none" rtlCol="0">
-            <a:spAutoFit/>
-          </a:bodyPr>
-          <a:lstStyle/>
-          <a:p>
-            <a:r>
-              <a:rPr lang="en-GB" dirty="0">
-                <a:latin typeface="Times New Roman" panose="02020603050405020304" pitchFamily="18" charset="0"/>
-                <a:cs typeface="Times New Roman" panose="02020603050405020304" pitchFamily="18" charset="0"/>
-              </a:rPr>
-              <a:t>Unknown topics may cause generic “unknown” responses and invalid response matching</a:t>
-            </a:r>
-          </a:p>
-        </p:txBody>
-      </p:sp>
-      <p:sp>
-        <p:nvSpPr>
-          <p:cNvPr id="15" name="Footer Placeholder 14">
-            <a:extLst>
-              <a:ext uri="{FF2B5EF4-FFF2-40B4-BE49-F238E27FC236}">
-                <a16:creationId xmlns:a16="http://schemas.microsoft.com/office/drawing/2014/main" id="{C602DDBA-884D-49F2-82AC-D51B881356DF}"/>
-              </a:ext>
-            </a:extLst>
-          </p:cNvPr>
-          <p:cNvSpPr>
-            <a:spLocks noGrp="1"/>
-          </p:cNvSpPr>
-          <p:nvPr>
-            <p:ph type="ftr" sz="quarter" idx="11"/>
-          </p:nvPr>
-        </p:nvSpPr>
-        <p:spPr/>
-        <p:txBody>
-          <a:bodyPr/>
-          <a:lstStyle/>
-          <a:p>
-            <a:r>
-              <a:rPr lang="en-GB" dirty="0"/>
-              <a:t>1.1 EDA – Literature Review</a:t>
-            </a:r>
-          </a:p>
-        </p:txBody>
-      </p:sp>
-    </p:spTree>
-    <p:extLst>
-      <p:ext uri="{BB962C8B-B14F-4D97-AF65-F5344CB8AC3E}">
-        <p14:creationId xmlns:p14="http://schemas.microsoft.com/office/powerpoint/2010/main" val="1129983031"/>
-      </p:ext>
-    </p:extLst>
-  </p:cSld>
-  <p:clrMapOvr>
-    <a:masterClrMapping/>
-  </p:clrMapOvr>
-</p:sld>
-</file>
-
-<file path=ppt/slides/slide7.xml><?xml version="1.0" encoding="utf-8"?>
-<p:sld xmlns:a="http://schemas.openxmlformats.org/drawingml/2006/main" xmlns:r="http://schemas.openxmlformats.org/officeDocument/2006/relationships" xmlns:p="http://schemas.openxmlformats.org/presentationml/2006/main">
-  <p:cSld>
-    <p:spTree>
-      <p:nvGrpSpPr>
-        <p:cNvPr id="1" name=""/>
-        <p:cNvGrpSpPr/>
-        <p:nvPr/>
-      </p:nvGrpSpPr>
-      <p:grpSpPr>
-        <a:xfrm>
-          <a:off x="0" y="0"/>
-          <a:ext cx="0" cy="0"/>
-          <a:chOff x="0" y="0"/>
-          <a:chExt cx="0" cy="0"/>
-        </a:xfrm>
-      </p:grpSpPr>
-      <p:sp>
-        <p:nvSpPr>
-          <p:cNvPr id="3" name="Content Placeholder 2">
-            <a:extLst>
-              <a:ext uri="{FF2B5EF4-FFF2-40B4-BE49-F238E27FC236}">
-                <a16:creationId xmlns:a16="http://schemas.microsoft.com/office/drawing/2014/main" id="{21AAAF24-888B-4DC9-90EE-84FBBCC40C4C}"/>
-              </a:ext>
-            </a:extLst>
-          </p:cNvPr>
-          <p:cNvSpPr>
-            <a:spLocks noGrp="1"/>
-          </p:cNvSpPr>
-          <p:nvPr>
-            <p:ph idx="1"/>
-          </p:nvPr>
-        </p:nvSpPr>
-        <p:spPr>
-          <a:xfrm>
-            <a:off x="838200" y="1676400"/>
-            <a:ext cx="10515600" cy="4500563"/>
+            <a:off x="838200" y="1825625"/>
+            <a:ext cx="10073640" cy="4351338"/>
           </a:xfrm>
         </p:spPr>
         <p:txBody>
@@ -5753,7 +5623,7 @@
                 <a:latin typeface="Times New Roman" panose="02020603050405020304" pitchFamily="18" charset="0"/>
                 <a:cs typeface="Times New Roman" panose="02020603050405020304" pitchFamily="18" charset="0"/>
               </a:rPr>
-              <a:t>Output data must be categorical data – the human-written output responses are too specific to inputs, and frequently do not make sense in context.</a:t>
+              <a:t>The Spacy library can be used to meet the objective, however the approach is flawed and unpredictable </a:t>
             </a:r>
           </a:p>
           <a:p>
@@ -5762,7 +5632,7 @@
                 <a:latin typeface="Times New Roman" panose="02020603050405020304" pitchFamily="18" charset="0"/>
                 <a:cs typeface="Times New Roman" panose="02020603050405020304" pitchFamily="18" charset="0"/>
               </a:rPr>
-              <a:t>The dataset must pertain to a single topic. The previous bot frequently mis-matched responses due to having too wide a knowledge base. By training the bot to only recognise certain types of questions, we can specialise it.</a:t>
+              <a:t>The methods used are more automated pattern matching than artificial intelligence</a:t>
             </a:r>
           </a:p>
           <a:p>
@@ -5771,55 +5641,17 @@
                 <a:latin typeface="Times New Roman" panose="02020603050405020304" pitchFamily="18" charset="0"/>
                 <a:cs typeface="Times New Roman" panose="02020603050405020304" pitchFamily="18" charset="0"/>
               </a:rPr>
-              <a:t>As of yet, the bot cannot hold a conversation. It can only answer simple questions. Research should be done into ways to remove this flaw, allowing for dynamic interactions with the bot</a:t>
-            </a:r>
-          </a:p>
-        </p:txBody>
-      </p:sp>
-      <p:sp>
-        <p:nvSpPr>
-          <p:cNvPr id="6" name="TextBox 5">
-            <a:extLst>
-              <a:ext uri="{FF2B5EF4-FFF2-40B4-BE49-F238E27FC236}">
-                <a16:creationId xmlns:a16="http://schemas.microsoft.com/office/drawing/2014/main" id="{52958125-2E6E-4299-A4DA-1F36F7AAFB92}"/>
-              </a:ext>
-            </a:extLst>
-          </p:cNvPr>
-          <p:cNvSpPr txBox="1"/>
-          <p:nvPr/>
-        </p:nvSpPr>
-        <p:spPr>
-          <a:xfrm flipH="1">
-            <a:off x="838200" y="609600"/>
-            <a:ext cx="5938521" cy="646331"/>
-          </a:xfrm>
-          <a:prstGeom prst="rect">
-            <a:avLst/>
-          </a:prstGeom>
-          <a:noFill/>
-        </p:spPr>
-        <p:txBody>
-          <a:bodyPr wrap="square" rtlCol="0">
-            <a:spAutoFit/>
-          </a:bodyPr>
-          <a:lstStyle/>
-          <a:p>
-            <a:r>
-              <a:rPr lang="en-GB" sz="3600" dirty="0">
-                <a:latin typeface="Times New Roman" panose="02020603050405020304" pitchFamily="18" charset="0"/>
-                <a:cs typeface="Times New Roman" panose="02020603050405020304" pitchFamily="18" charset="0"/>
-              </a:rPr>
-              <a:t>Examination Results</a:t>
-            </a:r>
-          </a:p>
-        </p:txBody>
-      </p:sp>
-      <p:sp>
-        <p:nvSpPr>
-          <p:cNvPr id="8" name="Footer Placeholder 7">
-            <a:extLst>
-              <a:ext uri="{FF2B5EF4-FFF2-40B4-BE49-F238E27FC236}">
-                <a16:creationId xmlns:a16="http://schemas.microsoft.com/office/drawing/2014/main" id="{487BCBAC-EE6F-478A-8C7D-C43DA6C9AA10}"/>
+              <a:t>While Spacy may prove useful as a tool within the chatbot, the results of solely using Spacy as a model show significant issues </a:t>
+            </a:r>
+          </a:p>
+        </p:txBody>
+      </p:sp>
+      <p:sp>
+        <p:nvSpPr>
+          <p:cNvPr id="4" name="Footer Placeholder 3">
+            <a:extLst>
+              <a:ext uri="{FF2B5EF4-FFF2-40B4-BE49-F238E27FC236}">
+                <a16:creationId xmlns:a16="http://schemas.microsoft.com/office/drawing/2014/main" id="{C467B209-66AC-4BD1-8DAA-BDD38379DA26}"/>
               </a:ext>
             </a:extLst>
           </p:cNvPr>
@@ -5836,8 +5668,8 @@
           <a:lstStyle/>
           <a:p>
             <a:r>
-              <a:rPr lang="en-GB" dirty="0"/>
-              <a:t>1.1 EDA – Literature Review</a:t>
+              <a:rPr lang="en-GB"/>
+              <a:t>SEC</a:t>
             </a:r>
           </a:p>
         </p:txBody>
@@ -5845,7 +5677,7 @@
     </p:spTree>
     <p:extLst>
       <p:ext uri="{BB962C8B-B14F-4D97-AF65-F5344CB8AC3E}">
-        <p14:creationId xmlns:p14="http://schemas.microsoft.com/office/powerpoint/2010/main" val="1860055185"/>
+        <p14:creationId xmlns:p14="http://schemas.microsoft.com/office/powerpoint/2010/main" val="1861763402"/>
       </p:ext>
     </p:extLst>
   </p:cSld>

</xml_diff>

<commit_message>
added stack exchange stuff
</commit_message>
<xml_diff>
--- a/Documentation/100505349.pptx
+++ b/Documentation/100505349.pptx
@@ -5,10 +5,10 @@
     <p:sldMasterId id="2147483684" r:id="rId1"/>
   </p:sldMasterIdLst>
   <p:notesMasterIdLst>
-    <p:notesMasterId r:id="rId17"/>
+    <p:notesMasterId r:id="rId18"/>
   </p:notesMasterIdLst>
   <p:handoutMasterIdLst>
-    <p:handoutMasterId r:id="rId18"/>
+    <p:handoutMasterId r:id="rId19"/>
   </p:handoutMasterIdLst>
   <p:sldIdLst>
     <p:sldId id="256" r:id="rId2"/>
@@ -24,8 +24,9 @@
     <p:sldId id="268" r:id="rId12"/>
     <p:sldId id="269" r:id="rId13"/>
     <p:sldId id="273" r:id="rId14"/>
-    <p:sldId id="274" r:id="rId15"/>
-    <p:sldId id="275" r:id="rId16"/>
+    <p:sldId id="276" r:id="rId15"/>
+    <p:sldId id="274" r:id="rId16"/>
+    <p:sldId id="275" r:id="rId17"/>
   </p:sldIdLst>
   <p:sldSz cx="12192000" cy="6858000"/>
   <p:notesSz cx="6858000" cy="9144000"/>
@@ -146,6 +147,7 @@
             <p14:sldId id="268"/>
             <p14:sldId id="269"/>
             <p14:sldId id="273"/>
+            <p14:sldId id="276"/>
             <p14:sldId id="274"/>
             <p14:sldId id="275"/>
           </p14:sldIdLst>
@@ -253,7 +255,7 @@
           <a:p>
             <a:fld id="{7DDF2B0D-01F9-40A6-83B8-CA688E599BFE}" type="datetimeFigureOut">
               <a:rPr lang="en-GB" smtClean="0"/>
-              <a:t>11/05/2022</a:t>
+              <a:t>12/05/2022</a:t>
             </a:fld>
             <a:endParaRPr lang="en-GB"/>
           </a:p>
@@ -431,7 +433,7 @@
           <a:p>
             <a:fld id="{5F411E22-B9AA-407B-9F29-B3EBA7D89382}" type="datetimeFigureOut">
               <a:rPr lang="en-GB" smtClean="0"/>
-              <a:t>11/05/2022</a:t>
+              <a:t>12/05/2022</a:t>
             </a:fld>
             <a:endParaRPr lang="en-GB"/>
           </a:p>
@@ -1675,7 +1677,7 @@
           <a:p>
             <a:fld id="{AE0F6D4B-2242-4C15-9B1F-EB67BC7C3CD1}" type="datetime1">
               <a:rPr lang="en-GB" smtClean="0"/>
-              <a:t>11/05/2022</a:t>
+              <a:t>12/05/2022</a:t>
             </a:fld>
             <a:endParaRPr lang="en-GB"/>
           </a:p>
@@ -1878,7 +1880,7 @@
           <a:p>
             <a:fld id="{148F44C1-1DF0-4D73-AB6D-E462219C56CA}" type="datetime1">
               <a:rPr lang="en-GB" smtClean="0"/>
-              <a:t>11/05/2022</a:t>
+              <a:t>12/05/2022</a:t>
             </a:fld>
             <a:endParaRPr lang="en-GB"/>
           </a:p>
@@ -2091,7 +2093,7 @@
           <a:p>
             <a:fld id="{C3A31CC1-D2D6-4B4E-B0F3-499814EE3B58}" type="datetime1">
               <a:rPr lang="en-GB" smtClean="0"/>
-              <a:t>11/05/2022</a:t>
+              <a:t>12/05/2022</a:t>
             </a:fld>
             <a:endParaRPr lang="en-GB"/>
           </a:p>
@@ -2294,7 +2296,7 @@
           <a:p>
             <a:fld id="{A3FF5B57-79BA-4336-9C8C-134BE5A097AD}" type="datetime1">
               <a:rPr lang="en-GB" smtClean="0"/>
-              <a:t>11/05/2022</a:t>
+              <a:t>12/05/2022</a:t>
             </a:fld>
             <a:endParaRPr lang="en-GB"/>
           </a:p>
@@ -2573,7 +2575,7 @@
           <a:p>
             <a:fld id="{EB67FD68-3457-44CE-AA52-F874EEC85611}" type="datetime1">
               <a:rPr lang="en-GB" smtClean="0"/>
-              <a:t>11/05/2022</a:t>
+              <a:t>12/05/2022</a:t>
             </a:fld>
             <a:endParaRPr lang="en-GB"/>
           </a:p>
@@ -2844,7 +2846,7 @@
           <a:p>
             <a:fld id="{4BA8742A-D1B6-4DBA-A73E-40DBF03C5B42}" type="datetime1">
               <a:rPr lang="en-GB" smtClean="0"/>
-              <a:t>11/05/2022</a:t>
+              <a:t>12/05/2022</a:t>
             </a:fld>
             <a:endParaRPr lang="en-GB"/>
           </a:p>
@@ -3262,7 +3264,7 @@
           <a:p>
             <a:fld id="{63FD0926-F3B9-455D-8AA5-A7B7B6009E87}" type="datetime1">
               <a:rPr lang="en-GB" smtClean="0"/>
-              <a:t>11/05/2022</a:t>
+              <a:t>12/05/2022</a:t>
             </a:fld>
             <a:endParaRPr lang="en-GB"/>
           </a:p>
@@ -3407,7 +3409,7 @@
           <a:p>
             <a:fld id="{4B70B3C0-2F19-4721-874E-D7681BE64C84}" type="datetime1">
               <a:rPr lang="en-GB" smtClean="0"/>
-              <a:t>11/05/2022</a:t>
+              <a:t>12/05/2022</a:t>
             </a:fld>
             <a:endParaRPr lang="en-GB"/>
           </a:p>
@@ -3523,7 +3525,7 @@
           <a:p>
             <a:fld id="{F65B3172-13F0-475E-AEE3-58D82DD42C69}" type="datetime1">
               <a:rPr lang="en-GB" smtClean="0"/>
-              <a:t>11/05/2022</a:t>
+              <a:t>12/05/2022</a:t>
             </a:fld>
             <a:endParaRPr lang="en-GB"/>
           </a:p>
@@ -3839,7 +3841,7 @@
           <a:p>
             <a:fld id="{6C3F1D32-7E7A-4E80-AF0D-6E255F242C09}" type="datetime1">
               <a:rPr lang="en-GB" smtClean="0"/>
-              <a:t>11/05/2022</a:t>
+              <a:t>12/05/2022</a:t>
             </a:fld>
             <a:endParaRPr lang="en-GB"/>
           </a:p>
@@ -4131,7 +4133,7 @@
           <a:p>
             <a:fld id="{AD7C149D-3981-4CD0-8858-4DC0837EA971}" type="datetime1">
               <a:rPr lang="en-GB" smtClean="0"/>
-              <a:t>11/05/2022</a:t>
+              <a:t>12/05/2022</a:t>
             </a:fld>
             <a:endParaRPr lang="en-GB"/>
           </a:p>
@@ -4377,7 +4379,7 @@
           <a:p>
             <a:fld id="{974CD72A-BED1-4076-8EB6-0C606103999B}" type="datetime1">
               <a:rPr lang="en-GB" smtClean="0"/>
-              <a:t>11/05/2022</a:t>
+              <a:t>12/05/2022</a:t>
             </a:fld>
             <a:endParaRPr lang="en-GB"/>
           </a:p>
@@ -6953,6 +6955,120 @@
           <p:cNvPr id="2" name="Title 1">
             <a:extLst>
               <a:ext uri="{FF2B5EF4-FFF2-40B4-BE49-F238E27FC236}">
+                <a16:creationId xmlns:a16="http://schemas.microsoft.com/office/drawing/2014/main" id="{BAF89A68-3BA2-470F-9E49-157E55C01634}"/>
+              </a:ext>
+            </a:extLst>
+          </p:cNvPr>
+          <p:cNvSpPr>
+            <a:spLocks noGrp="1"/>
+          </p:cNvSpPr>
+          <p:nvPr>
+            <p:ph type="title"/>
+          </p:nvPr>
+        </p:nvSpPr>
+        <p:spPr/>
+        <p:txBody>
+          <a:bodyPr/>
+          <a:lstStyle/>
+          <a:p>
+            <a:r>
+              <a:rPr lang="en-GB" dirty="0">
+                <a:latin typeface="Times New Roman" panose="02020603050405020304" pitchFamily="18" charset="0"/>
+                <a:cs typeface="Times New Roman" panose="02020603050405020304" pitchFamily="18" charset="0"/>
+              </a:rPr>
+              <a:t>Finding a Dataset</a:t>
+            </a:r>
+          </a:p>
+        </p:txBody>
+      </p:sp>
+      <p:sp>
+        <p:nvSpPr>
+          <p:cNvPr id="3" name="Content Placeholder 2">
+            <a:extLst>
+              <a:ext uri="{FF2B5EF4-FFF2-40B4-BE49-F238E27FC236}">
+                <a16:creationId xmlns:a16="http://schemas.microsoft.com/office/drawing/2014/main" id="{3CF7E30B-6FAD-46D3-92E4-63B8C2A31982}"/>
+              </a:ext>
+            </a:extLst>
+          </p:cNvPr>
+          <p:cNvSpPr>
+            <a:spLocks noGrp="1"/>
+          </p:cNvSpPr>
+          <p:nvPr>
+            <p:ph idx="1"/>
+          </p:nvPr>
+        </p:nvSpPr>
+        <p:spPr/>
+        <p:txBody>
+          <a:bodyPr/>
+          <a:lstStyle/>
+          <a:p>
+            <a:endParaRPr lang="en-GB"/>
+          </a:p>
+        </p:txBody>
+      </p:sp>
+      <p:sp>
+        <p:nvSpPr>
+          <p:cNvPr id="4" name="Footer Placeholder 3">
+            <a:extLst>
+              <a:ext uri="{FF2B5EF4-FFF2-40B4-BE49-F238E27FC236}">
+                <a16:creationId xmlns:a16="http://schemas.microsoft.com/office/drawing/2014/main" id="{C6133F4D-BAB6-4492-A3BA-BFC433570E64}"/>
+              </a:ext>
+            </a:extLst>
+          </p:cNvPr>
+          <p:cNvSpPr>
+            <a:spLocks noGrp="1"/>
+          </p:cNvSpPr>
+          <p:nvPr>
+            <p:ph type="ftr" sz="quarter" idx="11"/>
+          </p:nvPr>
+        </p:nvSpPr>
+        <p:spPr/>
+        <p:txBody>
+          <a:bodyPr/>
+          <a:lstStyle/>
+          <a:p>
+            <a:r>
+              <a:rPr lang="en-GB"/>
+              <a:t>SEC</a:t>
+            </a:r>
+          </a:p>
+        </p:txBody>
+      </p:sp>
+    </p:spTree>
+    <p:extLst>
+      <p:ext uri="{BB962C8B-B14F-4D97-AF65-F5344CB8AC3E}">
+        <p14:creationId xmlns:p14="http://schemas.microsoft.com/office/powerpoint/2010/main" val="2935168644"/>
+      </p:ext>
+    </p:extLst>
+  </p:cSld>
+  <p:clrMapOvr>
+    <a:masterClrMapping/>
+  </p:clrMapOvr>
+</p:sld>
+</file>
+
+<file path=ppt/slides/slide15.xml><?xml version="1.0" encoding="utf-8"?>
+<p:sld xmlns:a="http://schemas.openxmlformats.org/drawingml/2006/main" xmlns:r="http://schemas.openxmlformats.org/officeDocument/2006/relationships" xmlns:p="http://schemas.openxmlformats.org/presentationml/2006/main">
+  <p:cSld>
+    <p:spTree>
+      <p:nvGrpSpPr>
+        <p:cNvPr id="1" name=""/>
+        <p:cNvGrpSpPr/>
+        <p:nvPr/>
+      </p:nvGrpSpPr>
+      <p:grpSpPr>
+        <a:xfrm>
+          <a:off x="0" y="0"/>
+          <a:ext cx="0" cy="0"/>
+          <a:chOff x="0" y="0"/>
+          <a:chExt cx="0" cy="0"/>
+        </a:xfrm>
+      </p:grpSpPr>
+      <p:sp>
+        <p:nvSpPr>
+          <p:cNvPr id="2" name="Title 1">
+            <a:extLst>
+              <a:ext uri="{FF2B5EF4-FFF2-40B4-BE49-F238E27FC236}">
                 <a16:creationId xmlns:a16="http://schemas.microsoft.com/office/drawing/2014/main" id="{770E6EE7-B050-46D5-B12B-FF8B9068E4C3}"/>
               </a:ext>
             </a:extLst>
@@ -7025,7 +7141,7 @@
 </p:sld>
 </file>
 
-<file path=ppt/slides/slide15.xml><?xml version="1.0" encoding="utf-8"?>
+<file path=ppt/slides/slide16.xml><?xml version="1.0" encoding="utf-8"?>
 <p:sld xmlns:a="http://schemas.openxmlformats.org/drawingml/2006/main" xmlns:r="http://schemas.openxmlformats.org/officeDocument/2006/relationships" xmlns:p="http://schemas.openxmlformats.org/presentationml/2006/main">
   <p:cSld>
     <p:spTree>

</xml_diff>

<commit_message>
Added to the powerpoint
</commit_message>
<xml_diff>
--- a/Documentation/100505349.pptx
+++ b/Documentation/100505349.pptx
@@ -5,10 +5,10 @@
     <p:sldMasterId id="2147483684" r:id="rId1"/>
   </p:sldMasterIdLst>
   <p:notesMasterIdLst>
-    <p:notesMasterId r:id="rId18"/>
+    <p:notesMasterId r:id="rId21"/>
   </p:notesMasterIdLst>
   <p:handoutMasterIdLst>
-    <p:handoutMasterId r:id="rId19"/>
+    <p:handoutMasterId r:id="rId22"/>
   </p:handoutMasterIdLst>
   <p:sldIdLst>
     <p:sldId id="256" r:id="rId2"/>
@@ -17,16 +17,19 @@
     <p:sldId id="260" r:id="rId5"/>
     <p:sldId id="261" r:id="rId6"/>
     <p:sldId id="264" r:id="rId7"/>
-    <p:sldId id="262" r:id="rId8"/>
-    <p:sldId id="263" r:id="rId9"/>
-    <p:sldId id="265" r:id="rId10"/>
-    <p:sldId id="266" r:id="rId11"/>
-    <p:sldId id="268" r:id="rId12"/>
-    <p:sldId id="269" r:id="rId13"/>
-    <p:sldId id="273" r:id="rId14"/>
-    <p:sldId id="276" r:id="rId15"/>
-    <p:sldId id="274" r:id="rId16"/>
-    <p:sldId id="275" r:id="rId17"/>
+    <p:sldId id="281" r:id="rId8"/>
+    <p:sldId id="262" r:id="rId9"/>
+    <p:sldId id="263" r:id="rId10"/>
+    <p:sldId id="265" r:id="rId11"/>
+    <p:sldId id="266" r:id="rId12"/>
+    <p:sldId id="268" r:id="rId13"/>
+    <p:sldId id="269" r:id="rId14"/>
+    <p:sldId id="273" r:id="rId15"/>
+    <p:sldId id="276" r:id="rId16"/>
+    <p:sldId id="277" r:id="rId17"/>
+    <p:sldId id="278" r:id="rId18"/>
+    <p:sldId id="280" r:id="rId19"/>
+    <p:sldId id="275" r:id="rId20"/>
   </p:sldIdLst>
   <p:sldSz cx="12192000" cy="6858000"/>
   <p:notesSz cx="6858000" cy="9144000"/>
@@ -133,13 +136,10 @@
             <p14:sldId id="256"/>
             <p14:sldId id="271"/>
             <p14:sldId id="272"/>
-          </p14:sldIdLst>
-        </p14:section>
-        <p14:section name="Spacy Tests" id="{E31FEFFE-FA6F-4FAA-BC1A-8AA77E67B93B}">
-          <p14:sldIdLst>
             <p14:sldId id="260"/>
             <p14:sldId id="261"/>
             <p14:sldId id="264"/>
+            <p14:sldId id="281"/>
             <p14:sldId id="262"/>
             <p14:sldId id="263"/>
             <p14:sldId id="265"/>
@@ -148,7 +148,9 @@
             <p14:sldId id="269"/>
             <p14:sldId id="273"/>
             <p14:sldId id="276"/>
-            <p14:sldId id="274"/>
+            <p14:sldId id="277"/>
+            <p14:sldId id="278"/>
+            <p14:sldId id="280"/>
             <p14:sldId id="275"/>
           </p14:sldIdLst>
         </p14:section>
@@ -746,7 +748,39 @@
           <a:bodyPr/>
           <a:lstStyle/>
           <a:p>
+            <a:r>
+              <a:rPr lang="en-GB" dirty="0"/>
+              <a:t>Went about this project in a strange order:</a:t>
+            </a:r>
+          </a:p>
+          <a:p>
+            <a:r>
+              <a:rPr lang="en-GB" dirty="0"/>
+              <a:t>Problem Analysis &amp; Libraries</a:t>
+            </a:r>
+          </a:p>
+          <a:p>
+            <a:r>
+              <a:rPr lang="en-GB" dirty="0"/>
+              <a:t>Solution Development</a:t>
+            </a:r>
+          </a:p>
+          <a:p>
+            <a:r>
+              <a:rPr lang="en-GB" dirty="0"/>
+              <a:t>EDA &amp; </a:t>
+            </a:r>
+            <a:r>
+              <a:rPr lang="en-GB" dirty="0" err="1"/>
+              <a:t>Preprocessing</a:t>
+            </a:r>
             <a:endParaRPr lang="en-GB" dirty="0"/>
+          </a:p>
+          <a:p>
+            <a:r>
+              <a:rPr lang="en-GB" dirty="0"/>
+              <a:t>Evaluation &amp; Refinement</a:t>
+            </a:r>
           </a:p>
         </p:txBody>
       </p:sp>
@@ -777,6 +811,618 @@
     <p:extLst>
       <p:ext uri="{BB962C8B-B14F-4D97-AF65-F5344CB8AC3E}">
         <p14:creationId xmlns:p14="http://schemas.microsoft.com/office/powerpoint/2010/main" val="2122384684"/>
+      </p:ext>
+    </p:extLst>
+  </p:cSld>
+  <p:clrMapOvr>
+    <a:masterClrMapping/>
+  </p:clrMapOvr>
+</p:notes>
+</file>
+
+<file path=ppt/notesSlides/notesSlide10.xml><?xml version="1.0" encoding="utf-8"?>
+<p:notes xmlns:a="http://schemas.openxmlformats.org/drawingml/2006/main" xmlns:r="http://schemas.openxmlformats.org/officeDocument/2006/relationships" xmlns:p="http://schemas.openxmlformats.org/presentationml/2006/main">
+  <p:cSld>
+    <p:spTree>
+      <p:nvGrpSpPr>
+        <p:cNvPr id="1" name=""/>
+        <p:cNvGrpSpPr/>
+        <p:nvPr/>
+      </p:nvGrpSpPr>
+      <p:grpSpPr>
+        <a:xfrm>
+          <a:off x="0" y="0"/>
+          <a:ext cx="0" cy="0"/>
+          <a:chOff x="0" y="0"/>
+          <a:chExt cx="0" cy="0"/>
+        </a:xfrm>
+      </p:grpSpPr>
+      <p:sp>
+        <p:nvSpPr>
+          <p:cNvPr id="2" name="Slide Image Placeholder 1"/>
+          <p:cNvSpPr>
+            <a:spLocks noGrp="1" noRot="1" noChangeAspect="1"/>
+          </p:cNvSpPr>
+          <p:nvPr>
+            <p:ph type="sldImg"/>
+          </p:nvPr>
+        </p:nvSpPr>
+        <p:spPr/>
+      </p:sp>
+      <p:sp>
+        <p:nvSpPr>
+          <p:cNvPr id="3" name="Notes Placeholder 2"/>
+          <p:cNvSpPr>
+            <a:spLocks noGrp="1"/>
+          </p:cNvSpPr>
+          <p:nvPr>
+            <p:ph type="body" idx="1"/>
+          </p:nvPr>
+        </p:nvSpPr>
+        <p:spPr/>
+        <p:txBody>
+          <a:bodyPr/>
+          <a:lstStyle/>
+          <a:p>
+            <a:r>
+              <a:rPr lang="en-GB" dirty="0"/>
+              <a:t>Introduce problem – since spacy uses averages as its measure of overall similarity, is it possible that the model will become less effective the more training data it receives?</a:t>
+            </a:r>
+          </a:p>
+          <a:p>
+            <a:r>
+              <a:rPr lang="en-GB" dirty="0"/>
+              <a:t>State that this is an example and not how spacy works really</a:t>
+            </a:r>
+          </a:p>
+          <a:p>
+            <a:endParaRPr lang="en-GB" dirty="0"/>
+          </a:p>
+        </p:txBody>
+      </p:sp>
+      <p:sp>
+        <p:nvSpPr>
+          <p:cNvPr id="4" name="Slide Number Placeholder 3"/>
+          <p:cNvSpPr>
+            <a:spLocks noGrp="1"/>
+          </p:cNvSpPr>
+          <p:nvPr>
+            <p:ph type="sldNum" sz="quarter" idx="5"/>
+          </p:nvPr>
+        </p:nvSpPr>
+        <p:spPr/>
+        <p:txBody>
+          <a:bodyPr/>
+          <a:lstStyle/>
+          <a:p>
+            <a:fld id="{6A9D5347-B203-4D7E-8C0C-C0F523BBFB73}" type="slidenum">
+              <a:rPr lang="en-GB" smtClean="0"/>
+              <a:t>12</a:t>
+            </a:fld>
+            <a:endParaRPr lang="en-GB"/>
+          </a:p>
+        </p:txBody>
+      </p:sp>
+    </p:spTree>
+    <p:extLst>
+      <p:ext uri="{BB962C8B-B14F-4D97-AF65-F5344CB8AC3E}">
+        <p14:creationId xmlns:p14="http://schemas.microsoft.com/office/powerpoint/2010/main" val="2292058825"/>
+      </p:ext>
+    </p:extLst>
+  </p:cSld>
+  <p:clrMapOvr>
+    <a:masterClrMapping/>
+  </p:clrMapOvr>
+</p:notes>
+</file>
+
+<file path=ppt/notesSlides/notesSlide11.xml><?xml version="1.0" encoding="utf-8"?>
+<p:notes xmlns:a="http://schemas.openxmlformats.org/drawingml/2006/main" xmlns:r="http://schemas.openxmlformats.org/officeDocument/2006/relationships" xmlns:p="http://schemas.openxmlformats.org/presentationml/2006/main">
+  <p:cSld>
+    <p:spTree>
+      <p:nvGrpSpPr>
+        <p:cNvPr id="1" name=""/>
+        <p:cNvGrpSpPr/>
+        <p:nvPr/>
+      </p:nvGrpSpPr>
+      <p:grpSpPr>
+        <a:xfrm>
+          <a:off x="0" y="0"/>
+          <a:ext cx="0" cy="0"/>
+          <a:chOff x="0" y="0"/>
+          <a:chExt cx="0" cy="0"/>
+        </a:xfrm>
+      </p:grpSpPr>
+      <p:sp>
+        <p:nvSpPr>
+          <p:cNvPr id="2" name="Slide Image Placeholder 1"/>
+          <p:cNvSpPr>
+            <a:spLocks noGrp="1" noRot="1" noChangeAspect="1"/>
+          </p:cNvSpPr>
+          <p:nvPr>
+            <p:ph type="sldImg"/>
+          </p:nvPr>
+        </p:nvSpPr>
+        <p:spPr/>
+      </p:sp>
+      <p:sp>
+        <p:nvSpPr>
+          <p:cNvPr id="3" name="Notes Placeholder 2"/>
+          <p:cNvSpPr>
+            <a:spLocks noGrp="1"/>
+          </p:cNvSpPr>
+          <p:nvPr>
+            <p:ph type="body" idx="1"/>
+          </p:nvPr>
+        </p:nvSpPr>
+        <p:spPr/>
+        <p:txBody>
+          <a:bodyPr/>
+          <a:lstStyle/>
+          <a:p>
+            <a:r>
+              <a:rPr lang="en-GB" dirty="0"/>
+              <a:t>X is the proportion of training data (20% to 70%). Y is the accuracy score in percentage</a:t>
+            </a:r>
+          </a:p>
+        </p:txBody>
+      </p:sp>
+      <p:sp>
+        <p:nvSpPr>
+          <p:cNvPr id="4" name="Slide Number Placeholder 3"/>
+          <p:cNvSpPr>
+            <a:spLocks noGrp="1"/>
+          </p:cNvSpPr>
+          <p:nvPr>
+            <p:ph type="sldNum" sz="quarter" idx="5"/>
+          </p:nvPr>
+        </p:nvSpPr>
+        <p:spPr/>
+        <p:txBody>
+          <a:bodyPr/>
+          <a:lstStyle/>
+          <a:p>
+            <a:fld id="{6A9D5347-B203-4D7E-8C0C-C0F523BBFB73}" type="slidenum">
+              <a:rPr lang="en-GB" smtClean="0"/>
+              <a:t>13</a:t>
+            </a:fld>
+            <a:endParaRPr lang="en-GB"/>
+          </a:p>
+        </p:txBody>
+      </p:sp>
+    </p:spTree>
+    <p:extLst>
+      <p:ext uri="{BB962C8B-B14F-4D97-AF65-F5344CB8AC3E}">
+        <p14:creationId xmlns:p14="http://schemas.microsoft.com/office/powerpoint/2010/main" val="2246351110"/>
+      </p:ext>
+    </p:extLst>
+  </p:cSld>
+  <p:clrMapOvr>
+    <a:masterClrMapping/>
+  </p:clrMapOvr>
+</p:notes>
+</file>
+
+<file path=ppt/notesSlides/notesSlide12.xml><?xml version="1.0" encoding="utf-8"?>
+<p:notes xmlns:a="http://schemas.openxmlformats.org/drawingml/2006/main" xmlns:r="http://schemas.openxmlformats.org/officeDocument/2006/relationships" xmlns:p="http://schemas.openxmlformats.org/presentationml/2006/main">
+  <p:cSld>
+    <p:spTree>
+      <p:nvGrpSpPr>
+        <p:cNvPr id="1" name=""/>
+        <p:cNvGrpSpPr/>
+        <p:nvPr/>
+      </p:nvGrpSpPr>
+      <p:grpSpPr>
+        <a:xfrm>
+          <a:off x="0" y="0"/>
+          <a:ext cx="0" cy="0"/>
+          <a:chOff x="0" y="0"/>
+          <a:chExt cx="0" cy="0"/>
+        </a:xfrm>
+      </p:grpSpPr>
+      <p:sp>
+        <p:nvSpPr>
+          <p:cNvPr id="2" name="Slide Image Placeholder 1"/>
+          <p:cNvSpPr>
+            <a:spLocks noGrp="1" noRot="1" noChangeAspect="1"/>
+          </p:cNvSpPr>
+          <p:nvPr>
+            <p:ph type="sldImg"/>
+          </p:nvPr>
+        </p:nvSpPr>
+        <p:spPr/>
+      </p:sp>
+      <p:sp>
+        <p:nvSpPr>
+          <p:cNvPr id="3" name="Notes Placeholder 2"/>
+          <p:cNvSpPr>
+            <a:spLocks noGrp="1"/>
+          </p:cNvSpPr>
+          <p:nvPr>
+            <p:ph type="body" idx="1"/>
+          </p:nvPr>
+        </p:nvSpPr>
+        <p:spPr/>
+        <p:txBody>
+          <a:bodyPr/>
+          <a:lstStyle/>
+          <a:p>
+            <a:r>
+              <a:rPr lang="en-GB" dirty="0"/>
+              <a:t>The solution developed previously has proven sufficient to build a model from, but requires a more suitable dataset to work from.</a:t>
+            </a:r>
+          </a:p>
+        </p:txBody>
+      </p:sp>
+      <p:sp>
+        <p:nvSpPr>
+          <p:cNvPr id="4" name="Slide Number Placeholder 3"/>
+          <p:cNvSpPr>
+            <a:spLocks noGrp="1"/>
+          </p:cNvSpPr>
+          <p:nvPr>
+            <p:ph type="sldNum" sz="quarter" idx="5"/>
+          </p:nvPr>
+        </p:nvSpPr>
+        <p:spPr/>
+        <p:txBody>
+          <a:bodyPr/>
+          <a:lstStyle/>
+          <a:p>
+            <a:fld id="{6A9D5347-B203-4D7E-8C0C-C0F523BBFB73}" type="slidenum">
+              <a:rPr lang="en-GB" smtClean="0"/>
+              <a:t>14</a:t>
+            </a:fld>
+            <a:endParaRPr lang="en-GB"/>
+          </a:p>
+        </p:txBody>
+      </p:sp>
+    </p:spTree>
+    <p:extLst>
+      <p:ext uri="{BB962C8B-B14F-4D97-AF65-F5344CB8AC3E}">
+        <p14:creationId xmlns:p14="http://schemas.microsoft.com/office/powerpoint/2010/main" val="1246231920"/>
+      </p:ext>
+    </p:extLst>
+  </p:cSld>
+  <p:clrMapOvr>
+    <a:masterClrMapping/>
+  </p:clrMapOvr>
+</p:notes>
+</file>
+
+<file path=ppt/notesSlides/notesSlide13.xml><?xml version="1.0" encoding="utf-8"?>
+<p:notes xmlns:a="http://schemas.openxmlformats.org/drawingml/2006/main" xmlns:r="http://schemas.openxmlformats.org/officeDocument/2006/relationships" xmlns:p="http://schemas.openxmlformats.org/presentationml/2006/main">
+  <p:cSld>
+    <p:spTree>
+      <p:nvGrpSpPr>
+        <p:cNvPr id="1" name=""/>
+        <p:cNvGrpSpPr/>
+        <p:nvPr/>
+      </p:nvGrpSpPr>
+      <p:grpSpPr>
+        <a:xfrm>
+          <a:off x="0" y="0"/>
+          <a:ext cx="0" cy="0"/>
+          <a:chOff x="0" y="0"/>
+          <a:chExt cx="0" cy="0"/>
+        </a:xfrm>
+      </p:grpSpPr>
+      <p:sp>
+        <p:nvSpPr>
+          <p:cNvPr id="2" name="Slide Image Placeholder 1"/>
+          <p:cNvSpPr>
+            <a:spLocks noGrp="1" noRot="1" noChangeAspect="1"/>
+          </p:cNvSpPr>
+          <p:nvPr>
+            <p:ph type="sldImg"/>
+          </p:nvPr>
+        </p:nvSpPr>
+        <p:spPr/>
+      </p:sp>
+      <p:sp>
+        <p:nvSpPr>
+          <p:cNvPr id="3" name="Notes Placeholder 2"/>
+          <p:cNvSpPr>
+            <a:spLocks noGrp="1"/>
+          </p:cNvSpPr>
+          <p:nvPr>
+            <p:ph type="body" idx="1"/>
+          </p:nvPr>
+        </p:nvSpPr>
+        <p:spPr/>
+        <p:txBody>
+          <a:bodyPr/>
+          <a:lstStyle/>
+          <a:p>
+            <a:r>
+              <a:rPr lang="en-GB" dirty="0"/>
+              <a:t>Talk about the datasets in use and how they were flawed</a:t>
+            </a:r>
+          </a:p>
+        </p:txBody>
+      </p:sp>
+      <p:sp>
+        <p:nvSpPr>
+          <p:cNvPr id="4" name="Slide Number Placeholder 3"/>
+          <p:cNvSpPr>
+            <a:spLocks noGrp="1"/>
+          </p:cNvSpPr>
+          <p:nvPr>
+            <p:ph type="sldNum" sz="quarter" idx="5"/>
+          </p:nvPr>
+        </p:nvSpPr>
+        <p:spPr/>
+        <p:txBody>
+          <a:bodyPr/>
+          <a:lstStyle/>
+          <a:p>
+            <a:fld id="{6A9D5347-B203-4D7E-8C0C-C0F523BBFB73}" type="slidenum">
+              <a:rPr lang="en-GB" smtClean="0"/>
+              <a:t>15</a:t>
+            </a:fld>
+            <a:endParaRPr lang="en-GB"/>
+          </a:p>
+        </p:txBody>
+      </p:sp>
+    </p:spTree>
+    <p:extLst>
+      <p:ext uri="{BB962C8B-B14F-4D97-AF65-F5344CB8AC3E}">
+        <p14:creationId xmlns:p14="http://schemas.microsoft.com/office/powerpoint/2010/main" val="4167444186"/>
+      </p:ext>
+    </p:extLst>
+  </p:cSld>
+  <p:clrMapOvr>
+    <a:masterClrMapping/>
+  </p:clrMapOvr>
+</p:notes>
+</file>
+
+<file path=ppt/notesSlides/notesSlide14.xml><?xml version="1.0" encoding="utf-8"?>
+<p:notes xmlns:a="http://schemas.openxmlformats.org/drawingml/2006/main" xmlns:r="http://schemas.openxmlformats.org/officeDocument/2006/relationships" xmlns:p="http://schemas.openxmlformats.org/presentationml/2006/main">
+  <p:cSld>
+    <p:spTree>
+      <p:nvGrpSpPr>
+        <p:cNvPr id="1" name=""/>
+        <p:cNvGrpSpPr/>
+        <p:nvPr/>
+      </p:nvGrpSpPr>
+      <p:grpSpPr>
+        <a:xfrm>
+          <a:off x="0" y="0"/>
+          <a:ext cx="0" cy="0"/>
+          <a:chOff x="0" y="0"/>
+          <a:chExt cx="0" cy="0"/>
+        </a:xfrm>
+      </p:grpSpPr>
+      <p:sp>
+        <p:nvSpPr>
+          <p:cNvPr id="2" name="Slide Image Placeholder 1"/>
+          <p:cNvSpPr>
+            <a:spLocks noGrp="1" noRot="1" noChangeAspect="1"/>
+          </p:cNvSpPr>
+          <p:nvPr>
+            <p:ph type="sldImg"/>
+          </p:nvPr>
+        </p:nvSpPr>
+        <p:spPr/>
+      </p:sp>
+      <p:sp>
+        <p:nvSpPr>
+          <p:cNvPr id="3" name="Notes Placeholder 2"/>
+          <p:cNvSpPr>
+            <a:spLocks noGrp="1"/>
+          </p:cNvSpPr>
+          <p:nvPr>
+            <p:ph type="body" idx="1"/>
+          </p:nvPr>
+        </p:nvSpPr>
+        <p:spPr/>
+        <p:txBody>
+          <a:bodyPr/>
+          <a:lstStyle/>
+          <a:p>
+            <a:endParaRPr lang="en-GB" dirty="0"/>
+          </a:p>
+        </p:txBody>
+      </p:sp>
+      <p:sp>
+        <p:nvSpPr>
+          <p:cNvPr id="4" name="Slide Number Placeholder 3"/>
+          <p:cNvSpPr>
+            <a:spLocks noGrp="1"/>
+          </p:cNvSpPr>
+          <p:nvPr>
+            <p:ph type="sldNum" sz="quarter" idx="5"/>
+          </p:nvPr>
+        </p:nvSpPr>
+        <p:spPr/>
+        <p:txBody>
+          <a:bodyPr/>
+          <a:lstStyle/>
+          <a:p>
+            <a:fld id="{6A9D5347-B203-4D7E-8C0C-C0F523BBFB73}" type="slidenum">
+              <a:rPr lang="en-GB" smtClean="0"/>
+              <a:t>16</a:t>
+            </a:fld>
+            <a:endParaRPr lang="en-GB"/>
+          </a:p>
+        </p:txBody>
+      </p:sp>
+    </p:spTree>
+    <p:extLst>
+      <p:ext uri="{BB962C8B-B14F-4D97-AF65-F5344CB8AC3E}">
+        <p14:creationId xmlns:p14="http://schemas.microsoft.com/office/powerpoint/2010/main" val="538851505"/>
+      </p:ext>
+    </p:extLst>
+  </p:cSld>
+  <p:clrMapOvr>
+    <a:masterClrMapping/>
+  </p:clrMapOvr>
+</p:notes>
+</file>
+
+<file path=ppt/notesSlides/notesSlide15.xml><?xml version="1.0" encoding="utf-8"?>
+<p:notes xmlns:a="http://schemas.openxmlformats.org/drawingml/2006/main" xmlns:r="http://schemas.openxmlformats.org/officeDocument/2006/relationships" xmlns:p="http://schemas.openxmlformats.org/presentationml/2006/main">
+  <p:cSld>
+    <p:spTree>
+      <p:nvGrpSpPr>
+        <p:cNvPr id="1" name=""/>
+        <p:cNvGrpSpPr/>
+        <p:nvPr/>
+      </p:nvGrpSpPr>
+      <p:grpSpPr>
+        <a:xfrm>
+          <a:off x="0" y="0"/>
+          <a:ext cx="0" cy="0"/>
+          <a:chOff x="0" y="0"/>
+          <a:chExt cx="0" cy="0"/>
+        </a:xfrm>
+      </p:grpSpPr>
+      <p:sp>
+        <p:nvSpPr>
+          <p:cNvPr id="2" name="Slide Image Placeholder 1"/>
+          <p:cNvSpPr>
+            <a:spLocks noGrp="1" noRot="1" noChangeAspect="1"/>
+          </p:cNvSpPr>
+          <p:nvPr>
+            <p:ph type="sldImg"/>
+          </p:nvPr>
+        </p:nvSpPr>
+        <p:spPr/>
+      </p:sp>
+      <p:sp>
+        <p:nvSpPr>
+          <p:cNvPr id="3" name="Notes Placeholder 2"/>
+          <p:cNvSpPr>
+            <a:spLocks noGrp="1"/>
+          </p:cNvSpPr>
+          <p:nvPr>
+            <p:ph type="body" idx="1"/>
+          </p:nvPr>
+        </p:nvSpPr>
+        <p:spPr/>
+        <p:txBody>
+          <a:bodyPr/>
+          <a:lstStyle/>
+          <a:p>
+            <a:endParaRPr lang="en-GB" dirty="0"/>
+          </a:p>
+        </p:txBody>
+      </p:sp>
+      <p:sp>
+        <p:nvSpPr>
+          <p:cNvPr id="4" name="Slide Number Placeholder 3"/>
+          <p:cNvSpPr>
+            <a:spLocks noGrp="1"/>
+          </p:cNvSpPr>
+          <p:nvPr>
+            <p:ph type="sldNum" sz="quarter" idx="5"/>
+          </p:nvPr>
+        </p:nvSpPr>
+        <p:spPr/>
+        <p:txBody>
+          <a:bodyPr/>
+          <a:lstStyle/>
+          <a:p>
+            <a:fld id="{6A9D5347-B203-4D7E-8C0C-C0F523BBFB73}" type="slidenum">
+              <a:rPr lang="en-GB" smtClean="0"/>
+              <a:t>17</a:t>
+            </a:fld>
+            <a:endParaRPr lang="en-GB"/>
+          </a:p>
+        </p:txBody>
+      </p:sp>
+    </p:spTree>
+    <p:extLst>
+      <p:ext uri="{BB962C8B-B14F-4D97-AF65-F5344CB8AC3E}">
+        <p14:creationId xmlns:p14="http://schemas.microsoft.com/office/powerpoint/2010/main" val="677946409"/>
+      </p:ext>
+    </p:extLst>
+  </p:cSld>
+  <p:clrMapOvr>
+    <a:masterClrMapping/>
+  </p:clrMapOvr>
+</p:notes>
+</file>
+
+<file path=ppt/notesSlides/notesSlide16.xml><?xml version="1.0" encoding="utf-8"?>
+<p:notes xmlns:a="http://schemas.openxmlformats.org/drawingml/2006/main" xmlns:r="http://schemas.openxmlformats.org/officeDocument/2006/relationships" xmlns:p="http://schemas.openxmlformats.org/presentationml/2006/main">
+  <p:cSld>
+    <p:spTree>
+      <p:nvGrpSpPr>
+        <p:cNvPr id="1" name=""/>
+        <p:cNvGrpSpPr/>
+        <p:nvPr/>
+      </p:nvGrpSpPr>
+      <p:grpSpPr>
+        <a:xfrm>
+          <a:off x="0" y="0"/>
+          <a:ext cx="0" cy="0"/>
+          <a:chOff x="0" y="0"/>
+          <a:chExt cx="0" cy="0"/>
+        </a:xfrm>
+      </p:grpSpPr>
+      <p:sp>
+        <p:nvSpPr>
+          <p:cNvPr id="2" name="Slide Image Placeholder 1"/>
+          <p:cNvSpPr>
+            <a:spLocks noGrp="1" noRot="1" noChangeAspect="1"/>
+          </p:cNvSpPr>
+          <p:nvPr>
+            <p:ph type="sldImg"/>
+          </p:nvPr>
+        </p:nvSpPr>
+        <p:spPr/>
+      </p:sp>
+      <p:sp>
+        <p:nvSpPr>
+          <p:cNvPr id="3" name="Notes Placeholder 2"/>
+          <p:cNvSpPr>
+            <a:spLocks noGrp="1"/>
+          </p:cNvSpPr>
+          <p:nvPr>
+            <p:ph type="body" idx="1"/>
+          </p:nvPr>
+        </p:nvSpPr>
+        <p:spPr/>
+        <p:txBody>
+          <a:bodyPr/>
+          <a:lstStyle/>
+          <a:p>
+            <a:r>
+              <a:rPr lang="en-GB" dirty="0"/>
+              <a:t>Y = percent accuracy for this test</a:t>
+            </a:r>
+          </a:p>
+        </p:txBody>
+      </p:sp>
+      <p:sp>
+        <p:nvSpPr>
+          <p:cNvPr id="4" name="Slide Number Placeholder 3"/>
+          <p:cNvSpPr>
+            <a:spLocks noGrp="1"/>
+          </p:cNvSpPr>
+          <p:nvPr>
+            <p:ph type="sldNum" sz="quarter" idx="5"/>
+          </p:nvPr>
+        </p:nvSpPr>
+        <p:spPr/>
+        <p:txBody>
+          <a:bodyPr/>
+          <a:lstStyle/>
+          <a:p>
+            <a:fld id="{6A9D5347-B203-4D7E-8C0C-C0F523BBFB73}" type="slidenum">
+              <a:rPr lang="en-GB" smtClean="0"/>
+              <a:t>18</a:t>
+            </a:fld>
+            <a:endParaRPr lang="en-GB"/>
+          </a:p>
+        </p:txBody>
+      </p:sp>
+    </p:spTree>
+    <p:extLst>
+      <p:ext uri="{BB962C8B-B14F-4D97-AF65-F5344CB8AC3E}">
+        <p14:creationId xmlns:p14="http://schemas.microsoft.com/office/powerpoint/2010/main" val="2941328240"/>
       </p:ext>
     </p:extLst>
   </p:cSld>
@@ -928,7 +1574,7 @@
           <a:p>
             <a:r>
               <a:rPr lang="en-GB" dirty="0"/>
-              <a:t>https://spacy.io/usage/visualizers</a:t>
+              <a:t>Combine this and DOC?</a:t>
             </a:r>
           </a:p>
         </p:txBody>
@@ -950,7 +1596,7 @@
           <a:p>
             <a:fld id="{6A9D5347-B203-4D7E-8C0C-C0F523BBFB73}" type="slidenum">
               <a:rPr lang="en-GB" smtClean="0"/>
-              <a:t>5</a:t>
+              <a:t>4</a:t>
             </a:fld>
             <a:endParaRPr lang="en-GB"/>
           </a:p>
@@ -959,7 +1605,7 @@
     </p:spTree>
     <p:extLst>
       <p:ext uri="{BB962C8B-B14F-4D97-AF65-F5344CB8AC3E}">
-        <p14:creationId xmlns:p14="http://schemas.microsoft.com/office/powerpoint/2010/main" val="3159665431"/>
+        <p14:creationId xmlns:p14="http://schemas.microsoft.com/office/powerpoint/2010/main" val="3673281314"/>
       </p:ext>
     </p:extLst>
   </p:cSld>
@@ -1015,13 +1661,7 @@
           <a:p>
             <a:r>
               <a:rPr lang="en-GB" dirty="0"/>
-              <a:t>https://en.wikipedia.org/wiki/Cosine_similarity</a:t>
-            </a:r>
-          </a:p>
-          <a:p>
-            <a:r>
-              <a:rPr lang="en-GB" dirty="0"/>
-              <a:t>https://datascience-enthusiast.com/DL/Operations_on_word_vectors.html</a:t>
+              <a:t>https://spacy.io/usage/visualizers</a:t>
             </a:r>
           </a:p>
         </p:txBody>
@@ -1043,7 +1683,7 @@
           <a:p>
             <a:fld id="{6A9D5347-B203-4D7E-8C0C-C0F523BBFB73}" type="slidenum">
               <a:rPr lang="en-GB" smtClean="0"/>
-              <a:t>6</a:t>
+              <a:t>5</a:t>
             </a:fld>
             <a:endParaRPr lang="en-GB"/>
           </a:p>
@@ -1052,7 +1692,7 @@
     </p:spTree>
     <p:extLst>
       <p:ext uri="{BB962C8B-B14F-4D97-AF65-F5344CB8AC3E}">
-        <p14:creationId xmlns:p14="http://schemas.microsoft.com/office/powerpoint/2010/main" val="3687427350"/>
+        <p14:creationId xmlns:p14="http://schemas.microsoft.com/office/powerpoint/2010/main" val="3159665431"/>
       </p:ext>
     </p:extLst>
   </p:cSld>
@@ -1106,7 +1746,16 @@
           <a:bodyPr/>
           <a:lstStyle/>
           <a:p>
-            <a:endParaRPr lang="en-GB" dirty="0"/>
+            <a:r>
+              <a:rPr lang="en-GB" dirty="0"/>
+              <a:t>https://en.wikipedia.org/wiki/Cosine_similarity</a:t>
+            </a:r>
+          </a:p>
+          <a:p>
+            <a:r>
+              <a:rPr lang="en-GB" dirty="0"/>
+              <a:t>https://datascience-enthusiast.com/DL/Operations_on_word_vectors.html</a:t>
+            </a:r>
           </a:p>
         </p:txBody>
       </p:sp>
@@ -1127,7 +1776,7 @@
           <a:p>
             <a:fld id="{6A9D5347-B203-4D7E-8C0C-C0F523BBFB73}" type="slidenum">
               <a:rPr lang="en-GB" smtClean="0"/>
-              <a:t>8</a:t>
+              <a:t>6</a:t>
             </a:fld>
             <a:endParaRPr lang="en-GB"/>
           </a:p>
@@ -1136,7 +1785,7 @@
     </p:spTree>
     <p:extLst>
       <p:ext uri="{BB962C8B-B14F-4D97-AF65-F5344CB8AC3E}">
-        <p14:creationId xmlns:p14="http://schemas.microsoft.com/office/powerpoint/2010/main" val="3701822498"/>
+        <p14:creationId xmlns:p14="http://schemas.microsoft.com/office/powerpoint/2010/main" val="3687427350"/>
       </p:ext>
     </p:extLst>
   </p:cSld>
@@ -1211,7 +1860,7 @@
           <a:p>
             <a:fld id="{6A9D5347-B203-4D7E-8C0C-C0F523BBFB73}" type="slidenum">
               <a:rPr lang="en-GB" smtClean="0"/>
-              <a:t>9</a:t>
+              <a:t>8</a:t>
             </a:fld>
             <a:endParaRPr lang="en-GB"/>
           </a:p>
@@ -1220,7 +1869,7 @@
     </p:spTree>
     <p:extLst>
       <p:ext uri="{BB962C8B-B14F-4D97-AF65-F5344CB8AC3E}">
-        <p14:creationId xmlns:p14="http://schemas.microsoft.com/office/powerpoint/2010/main" val="68419460"/>
+        <p14:creationId xmlns:p14="http://schemas.microsoft.com/office/powerpoint/2010/main" val="538542326"/>
       </p:ext>
     </p:extLst>
   </p:cSld>
@@ -1274,10 +1923,7 @@
           <a:bodyPr/>
           <a:lstStyle/>
           <a:p>
-            <a:r>
-              <a:rPr lang="en-GB" dirty="0"/>
-              <a:t>(Note that up to this point all items have used the small English dataset, whereas second test used the large English dataset)</a:t>
-            </a:r>
+            <a:endParaRPr lang="en-GB" dirty="0"/>
           </a:p>
         </p:txBody>
       </p:sp>
@@ -1298,7 +1944,7 @@
           <a:p>
             <a:fld id="{6A9D5347-B203-4D7E-8C0C-C0F523BBFB73}" type="slidenum">
               <a:rPr lang="en-GB" smtClean="0"/>
-              <a:t>10</a:t>
+              <a:t>9</a:t>
             </a:fld>
             <a:endParaRPr lang="en-GB"/>
           </a:p>
@@ -1307,7 +1953,7 @@
     </p:spTree>
     <p:extLst>
       <p:ext uri="{BB962C8B-B14F-4D97-AF65-F5344CB8AC3E}">
-        <p14:creationId xmlns:p14="http://schemas.microsoft.com/office/powerpoint/2010/main" val="1001362586"/>
+        <p14:creationId xmlns:p14="http://schemas.microsoft.com/office/powerpoint/2010/main" val="3701822498"/>
       </p:ext>
     </p:extLst>
   </p:cSld>
@@ -1363,44 +2009,7 @@
           <a:p>
             <a:r>
               <a:rPr lang="en-GB" dirty="0"/>
-              <a:t>(0 : introduce problem – specify that this is using only word matches and is meant as an example and does not reflect how spacy actually works)</a:t>
-            </a:r>
-          </a:p>
-          <a:p>
-            <a:r>
-              <a:rPr lang="en-GB" dirty="0"/>
-              <a:t>(1: Train data with phone data question)</a:t>
-            </a:r>
-          </a:p>
-          <a:p>
-            <a:r>
-              <a:rPr lang="en-GB" dirty="0"/>
-              <a:t>(2: Compare against an existing data item)</a:t>
-            </a:r>
-          </a:p>
-          <a:p>
-            <a:r>
-              <a:rPr lang="en-GB" dirty="0"/>
-              <a:t>(3: 100% similarity because it matches the item in the set)</a:t>
-            </a:r>
-          </a:p>
-          <a:p>
-            <a:r>
-              <a:rPr lang="en-GB" dirty="0"/>
-              <a:t>(4: Give more trained data)</a:t>
-            </a:r>
-          </a:p>
-          <a:p>
-            <a:r>
-              <a:rPr lang="en-GB" dirty="0"/>
-              <a:t>(5: attempt to pose the same question)</a:t>
-            </a:r>
-            <a:br>
-              <a:rPr lang="en-GB" dirty="0"/>
-            </a:br>
-            <a:r>
-              <a:rPr lang="en-GB" dirty="0"/>
-              <a:t>(6: average becomes lower overall)</a:t>
+              <a:t>https://www.kaggle.com/thoughtvector/customer-support-on-twitter</a:t>
             </a:r>
           </a:p>
         </p:txBody>
@@ -1422,7 +2031,7 @@
           <a:p>
             <a:fld id="{6A9D5347-B203-4D7E-8C0C-C0F523BBFB73}" type="slidenum">
               <a:rPr lang="en-GB" smtClean="0"/>
-              <a:t>11</a:t>
+              <a:t>10</a:t>
             </a:fld>
             <a:endParaRPr lang="en-GB"/>
           </a:p>
@@ -1431,7 +2040,7 @@
     </p:spTree>
     <p:extLst>
       <p:ext uri="{BB962C8B-B14F-4D97-AF65-F5344CB8AC3E}">
-        <p14:creationId xmlns:p14="http://schemas.microsoft.com/office/powerpoint/2010/main" val="2292058825"/>
+        <p14:creationId xmlns:p14="http://schemas.microsoft.com/office/powerpoint/2010/main" val="68419460"/>
       </p:ext>
     </p:extLst>
   </p:cSld>
@@ -1487,7 +2096,7 @@
           <a:p>
             <a:r>
               <a:rPr lang="en-GB" dirty="0"/>
-              <a:t>X is the proportion of training data (20% to 70%). Y is the accuracy score in percentage</a:t>
+              <a:t>(Note that up to this point all items have used the small English dataset, whereas second test used the large English dataset)</a:t>
             </a:r>
           </a:p>
         </p:txBody>
@@ -1509,7 +2118,7 @@
           <a:p>
             <a:fld id="{6A9D5347-B203-4D7E-8C0C-C0F523BBFB73}" type="slidenum">
               <a:rPr lang="en-GB" smtClean="0"/>
-              <a:t>12</a:t>
+              <a:t>11</a:t>
             </a:fld>
             <a:endParaRPr lang="en-GB"/>
           </a:p>
@@ -1518,7 +2127,7 @@
     </p:spTree>
     <p:extLst>
       <p:ext uri="{BB962C8B-B14F-4D97-AF65-F5344CB8AC3E}">
-        <p14:creationId xmlns:p14="http://schemas.microsoft.com/office/powerpoint/2010/main" val="2246351110"/>
+        <p14:creationId xmlns:p14="http://schemas.microsoft.com/office/powerpoint/2010/main" val="1001362586"/>
       </p:ext>
     </p:extLst>
   </p:cSld>
@@ -4958,6 +5567,151 @@
                 <a:latin typeface="Times New Roman" panose="02020603050405020304" pitchFamily="18" charset="0"/>
                 <a:cs typeface="Times New Roman" panose="02020603050405020304" pitchFamily="18" charset="0"/>
               </a:rPr>
+              <a:t>Extended Implementation</a:t>
+            </a:r>
+          </a:p>
+        </p:txBody>
+      </p:sp>
+      <p:sp>
+        <p:nvSpPr>
+          <p:cNvPr id="4" name="Footer Placeholder 3">
+            <a:extLst>
+              <a:ext uri="{FF2B5EF4-FFF2-40B4-BE49-F238E27FC236}">
+                <a16:creationId xmlns:a16="http://schemas.microsoft.com/office/drawing/2014/main" id="{161C8FD0-3C47-42BD-AAEA-0D666D8F1A16}"/>
+              </a:ext>
+            </a:extLst>
+          </p:cNvPr>
+          <p:cNvSpPr>
+            <a:spLocks noGrp="1"/>
+          </p:cNvSpPr>
+          <p:nvPr>
+            <p:ph type="ftr" sz="quarter" idx="11"/>
+          </p:nvPr>
+        </p:nvSpPr>
+        <p:spPr/>
+        <p:txBody>
+          <a:bodyPr/>
+          <a:lstStyle/>
+          <a:p>
+            <a:r>
+              <a:rPr lang="en-GB" dirty="0"/>
+              <a:t>Solution Development</a:t>
+            </a:r>
+          </a:p>
+        </p:txBody>
+      </p:sp>
+      <p:sp>
+        <p:nvSpPr>
+          <p:cNvPr id="11" name="Content Placeholder 2">
+            <a:extLst>
+              <a:ext uri="{FF2B5EF4-FFF2-40B4-BE49-F238E27FC236}">
+                <a16:creationId xmlns:a16="http://schemas.microsoft.com/office/drawing/2014/main" id="{E94E40E4-D13F-4075-BCD6-7895824B975E}"/>
+              </a:ext>
+            </a:extLst>
+          </p:cNvPr>
+          <p:cNvSpPr>
+            <a:spLocks noGrp="1"/>
+          </p:cNvSpPr>
+          <p:nvPr>
+            <p:ph idx="1"/>
+          </p:nvPr>
+        </p:nvSpPr>
+        <p:spPr>
+          <a:xfrm>
+            <a:off x="838200" y="1690688"/>
+            <a:ext cx="10515600" cy="4351338"/>
+          </a:xfrm>
+        </p:spPr>
+        <p:txBody>
+          <a:bodyPr>
+            <a:normAutofit/>
+          </a:bodyPr>
+          <a:lstStyle/>
+          <a:p>
+            <a:r>
+              <a:rPr lang="en-GB" sz="2000" dirty="0">
+                <a:latin typeface="Times New Roman" panose="02020603050405020304" pitchFamily="18" charset="0"/>
+                <a:cs typeface="Times New Roman" panose="02020603050405020304" pitchFamily="18" charset="0"/>
+              </a:rPr>
+              <a:t>The lack of training data in the previous test provided too little insight into the strength of spacy as a question classification tool</a:t>
+            </a:r>
+          </a:p>
+          <a:p>
+            <a:r>
+              <a:rPr lang="en-GB" sz="2000" dirty="0">
+                <a:latin typeface="Times New Roman" panose="02020603050405020304" pitchFamily="18" charset="0"/>
+                <a:cs typeface="Times New Roman" panose="02020603050405020304" pitchFamily="18" charset="0"/>
+              </a:rPr>
+              <a:t>Using the twitter questions and answers database – trimmed to only include questions directed at @AppleSupport</a:t>
+            </a:r>
+          </a:p>
+          <a:p>
+            <a:r>
+              <a:rPr lang="en-GB" sz="2000" dirty="0">
+                <a:latin typeface="Times New Roman" panose="02020603050405020304" pitchFamily="18" charset="0"/>
+                <a:cs typeface="Times New Roman" panose="02020603050405020304" pitchFamily="18" charset="0"/>
+              </a:rPr>
+              <a:t>1200 questions were manually categorised into 8 categories; questions about apps, complaints, hardware related questions, questions relating to apple accounts and services such as iCloud, operating system issues, network issues, questions about purchasing an apple product and questions that required a human response.</a:t>
+            </a:r>
+          </a:p>
+        </p:txBody>
+      </p:sp>
+    </p:spTree>
+    <p:extLst>
+      <p:ext uri="{BB962C8B-B14F-4D97-AF65-F5344CB8AC3E}">
+        <p14:creationId xmlns:p14="http://schemas.microsoft.com/office/powerpoint/2010/main" val="1754584055"/>
+      </p:ext>
+    </p:extLst>
+  </p:cSld>
+  <p:clrMapOvr>
+    <a:masterClrMapping/>
+  </p:clrMapOvr>
+</p:sld>
+</file>
+
+<file path=ppt/slides/slide11.xml><?xml version="1.0" encoding="utf-8"?>
+<p:sld xmlns:a="http://schemas.openxmlformats.org/drawingml/2006/main" xmlns:r="http://schemas.openxmlformats.org/officeDocument/2006/relationships" xmlns:p="http://schemas.openxmlformats.org/presentationml/2006/main">
+  <p:cSld>
+    <p:spTree>
+      <p:nvGrpSpPr>
+        <p:cNvPr id="1" name=""/>
+        <p:cNvGrpSpPr/>
+        <p:nvPr/>
+      </p:nvGrpSpPr>
+      <p:grpSpPr>
+        <a:xfrm>
+          <a:off x="0" y="0"/>
+          <a:ext cx="0" cy="0"/>
+          <a:chOff x="0" y="0"/>
+          <a:chExt cx="0" cy="0"/>
+        </a:xfrm>
+      </p:grpSpPr>
+      <p:sp>
+        <p:nvSpPr>
+          <p:cNvPr id="2" name="Title 1">
+            <a:extLst>
+              <a:ext uri="{FF2B5EF4-FFF2-40B4-BE49-F238E27FC236}">
+                <a16:creationId xmlns:a16="http://schemas.microsoft.com/office/drawing/2014/main" id="{78C28E79-1E9E-424C-A6B7-3E3A1814FAA0}"/>
+              </a:ext>
+            </a:extLst>
+          </p:cNvPr>
+          <p:cNvSpPr>
+            <a:spLocks noGrp="1"/>
+          </p:cNvSpPr>
+          <p:nvPr>
+            <p:ph type="title"/>
+          </p:nvPr>
+        </p:nvSpPr>
+        <p:spPr/>
+        <p:txBody>
+          <a:bodyPr/>
+          <a:lstStyle/>
+          <a:p>
+            <a:r>
+              <a:rPr lang="en-GB" dirty="0">
+                <a:latin typeface="Times New Roman" panose="02020603050405020304" pitchFamily="18" charset="0"/>
+                <a:cs typeface="Times New Roman" panose="02020603050405020304" pitchFamily="18" charset="0"/>
+              </a:rPr>
               <a:t>Extended Implementation - Results</a:t>
             </a:r>
           </a:p>
@@ -4985,8 +5739,8 @@
           <a:lstStyle/>
           <a:p>
             <a:r>
-              <a:rPr lang="en-GB"/>
-              <a:t>SEC</a:t>
+              <a:rPr lang="en-GB" dirty="0"/>
+              <a:t>Solution Development</a:t>
             </a:r>
           </a:p>
         </p:txBody>
@@ -5530,1122 +6284,6 @@
 </p:sld>
 </file>
 
-<file path=ppt/slides/slide11.xml><?xml version="1.0" encoding="utf-8"?>
-<p:sld xmlns:a="http://schemas.openxmlformats.org/drawingml/2006/main" xmlns:r="http://schemas.openxmlformats.org/officeDocument/2006/relationships" xmlns:p="http://schemas.openxmlformats.org/presentationml/2006/main">
-  <p:cSld>
-    <p:spTree>
-      <p:nvGrpSpPr>
-        <p:cNvPr id="1" name=""/>
-        <p:cNvGrpSpPr/>
-        <p:nvPr/>
-      </p:nvGrpSpPr>
-      <p:grpSpPr>
-        <a:xfrm>
-          <a:off x="0" y="0"/>
-          <a:ext cx="0" cy="0"/>
-          <a:chOff x="0" y="0"/>
-          <a:chExt cx="0" cy="0"/>
-        </a:xfrm>
-      </p:grpSpPr>
-      <p:sp>
-        <p:nvSpPr>
-          <p:cNvPr id="2" name="Title 1">
-            <a:extLst>
-              <a:ext uri="{FF2B5EF4-FFF2-40B4-BE49-F238E27FC236}">
-                <a16:creationId xmlns:a16="http://schemas.microsoft.com/office/drawing/2014/main" id="{78C28E79-1E9E-424C-A6B7-3E3A1814FAA0}"/>
-              </a:ext>
-            </a:extLst>
-          </p:cNvPr>
-          <p:cNvSpPr>
-            <a:spLocks noGrp="1"/>
-          </p:cNvSpPr>
-          <p:nvPr>
-            <p:ph type="title"/>
-          </p:nvPr>
-        </p:nvSpPr>
-        <p:spPr/>
-        <p:txBody>
-          <a:bodyPr/>
-          <a:lstStyle/>
-          <a:p>
-            <a:r>
-              <a:rPr lang="en-GB" dirty="0">
-                <a:latin typeface="Times New Roman" panose="02020603050405020304" pitchFamily="18" charset="0"/>
-                <a:cs typeface="Times New Roman" panose="02020603050405020304" pitchFamily="18" charset="0"/>
-              </a:rPr>
-              <a:t>Critical Analysis – Averages Problem</a:t>
-            </a:r>
-          </a:p>
-        </p:txBody>
-      </p:sp>
-      <p:sp>
-        <p:nvSpPr>
-          <p:cNvPr id="4" name="Footer Placeholder 3">
-            <a:extLst>
-              <a:ext uri="{FF2B5EF4-FFF2-40B4-BE49-F238E27FC236}">
-                <a16:creationId xmlns:a16="http://schemas.microsoft.com/office/drawing/2014/main" id="{161C8FD0-3C47-42BD-AAEA-0D666D8F1A16}"/>
-              </a:ext>
-            </a:extLst>
-          </p:cNvPr>
-          <p:cNvSpPr>
-            <a:spLocks noGrp="1"/>
-          </p:cNvSpPr>
-          <p:nvPr>
-            <p:ph type="ftr" sz="quarter" idx="11"/>
-          </p:nvPr>
-        </p:nvSpPr>
-        <p:spPr/>
-        <p:txBody>
-          <a:bodyPr/>
-          <a:lstStyle/>
-          <a:p>
-            <a:r>
-              <a:rPr lang="en-GB"/>
-              <a:t>SEC</a:t>
-            </a:r>
-          </a:p>
-        </p:txBody>
-      </p:sp>
-      <p:sp>
-        <p:nvSpPr>
-          <p:cNvPr id="13" name="TextBox 12">
-            <a:extLst>
-              <a:ext uri="{FF2B5EF4-FFF2-40B4-BE49-F238E27FC236}">
-                <a16:creationId xmlns:a16="http://schemas.microsoft.com/office/drawing/2014/main" id="{C33B7D73-310D-4719-9D3C-F59A9E9F5D75}"/>
-              </a:ext>
-            </a:extLst>
-          </p:cNvPr>
-          <p:cNvSpPr txBox="1"/>
-          <p:nvPr/>
-        </p:nvSpPr>
-        <p:spPr>
-          <a:xfrm>
-            <a:off x="1082038" y="3307208"/>
-            <a:ext cx="4805682" cy="400110"/>
-          </a:xfrm>
-          <a:prstGeom prst="rect">
-            <a:avLst/>
-          </a:prstGeom>
-          <a:noFill/>
-        </p:spPr>
-        <p:txBody>
-          <a:bodyPr wrap="square" rtlCol="0">
-            <a:spAutoFit/>
-          </a:bodyPr>
-          <a:lstStyle/>
-          <a:p>
-            <a:pPr algn="ctr"/>
-            <a:r>
-              <a:rPr lang="en-GB" sz="2000" u="sng" dirty="0">
-                <a:latin typeface="Times New Roman" panose="02020603050405020304" pitchFamily="18" charset="0"/>
-                <a:cs typeface="Times New Roman" panose="02020603050405020304" pitchFamily="18" charset="0"/>
-              </a:rPr>
-              <a:t>Trained Data</a:t>
-            </a:r>
-          </a:p>
-        </p:txBody>
-      </p:sp>
-      <p:sp>
-        <p:nvSpPr>
-          <p:cNvPr id="14" name="TextBox 13">
-            <a:extLst>
-              <a:ext uri="{FF2B5EF4-FFF2-40B4-BE49-F238E27FC236}">
-                <a16:creationId xmlns:a16="http://schemas.microsoft.com/office/drawing/2014/main" id="{869D7A6D-21C7-4A0C-AC39-73F809F665AD}"/>
-              </a:ext>
-            </a:extLst>
-          </p:cNvPr>
-          <p:cNvSpPr txBox="1"/>
-          <p:nvPr/>
-        </p:nvSpPr>
-        <p:spPr>
-          <a:xfrm>
-            <a:off x="3611879" y="2368143"/>
-            <a:ext cx="4805682" cy="461665"/>
-          </a:xfrm>
-          <a:prstGeom prst="rect">
-            <a:avLst/>
-          </a:prstGeom>
-          <a:noFill/>
-        </p:spPr>
-        <p:txBody>
-          <a:bodyPr wrap="square" rtlCol="0">
-            <a:spAutoFit/>
-          </a:bodyPr>
-          <a:lstStyle/>
-          <a:p>
-            <a:pPr algn="ctr"/>
-            <a:r>
-              <a:rPr lang="en-GB" sz="2400" i="1" dirty="0">
-                <a:latin typeface="Times New Roman" panose="02020603050405020304" pitchFamily="18" charset="0"/>
-                <a:cs typeface="Times New Roman" panose="02020603050405020304" pitchFamily="18" charset="0"/>
-              </a:rPr>
-              <a:t>“How can I buy a phone?”</a:t>
-            </a:r>
-          </a:p>
-        </p:txBody>
-      </p:sp>
-      <p:sp>
-        <p:nvSpPr>
-          <p:cNvPr id="15" name="TextBox 14">
-            <a:extLst>
-              <a:ext uri="{FF2B5EF4-FFF2-40B4-BE49-F238E27FC236}">
-                <a16:creationId xmlns:a16="http://schemas.microsoft.com/office/drawing/2014/main" id="{FC4D3D6D-3694-435C-8455-C6D1744B4D97}"/>
-              </a:ext>
-            </a:extLst>
-          </p:cNvPr>
-          <p:cNvSpPr txBox="1"/>
-          <p:nvPr/>
-        </p:nvSpPr>
-        <p:spPr>
-          <a:xfrm>
-            <a:off x="949958" y="3974417"/>
-            <a:ext cx="4805682" cy="400110"/>
-          </a:xfrm>
-          <a:prstGeom prst="rect">
-            <a:avLst/>
-          </a:prstGeom>
-          <a:noFill/>
-        </p:spPr>
-        <p:txBody>
-          <a:bodyPr wrap="square" rtlCol="0">
-            <a:spAutoFit/>
-          </a:bodyPr>
-          <a:lstStyle/>
-          <a:p>
-            <a:pPr algn="ctr"/>
-            <a:r>
-              <a:rPr lang="en-GB" sz="2000" dirty="0">
-                <a:latin typeface="Times New Roman" panose="02020603050405020304" pitchFamily="18" charset="0"/>
-                <a:cs typeface="Times New Roman" panose="02020603050405020304" pitchFamily="18" charset="0"/>
-              </a:rPr>
-              <a:t>How can I buy a phone?</a:t>
-            </a:r>
-          </a:p>
-        </p:txBody>
-      </p:sp>
-      <p:sp>
-        <p:nvSpPr>
-          <p:cNvPr id="16" name="TextBox 15">
-            <a:extLst>
-              <a:ext uri="{FF2B5EF4-FFF2-40B4-BE49-F238E27FC236}">
-                <a16:creationId xmlns:a16="http://schemas.microsoft.com/office/drawing/2014/main" id="{E7100B0A-7C60-4687-925C-02A34E6EFF89}"/>
-              </a:ext>
-            </a:extLst>
-          </p:cNvPr>
-          <p:cNvSpPr txBox="1"/>
-          <p:nvPr/>
-        </p:nvSpPr>
-        <p:spPr>
-          <a:xfrm>
-            <a:off x="949958" y="4432195"/>
-            <a:ext cx="4805682" cy="400110"/>
-          </a:xfrm>
-          <a:prstGeom prst="rect">
-            <a:avLst/>
-          </a:prstGeom>
-          <a:noFill/>
-        </p:spPr>
-        <p:txBody>
-          <a:bodyPr wrap="square" rtlCol="0">
-            <a:spAutoFit/>
-          </a:bodyPr>
-          <a:lstStyle/>
-          <a:p>
-            <a:pPr algn="ctr"/>
-            <a:r>
-              <a:rPr lang="en-GB" sz="2000" dirty="0">
-                <a:latin typeface="Times New Roman" panose="02020603050405020304" pitchFamily="18" charset="0"/>
-                <a:cs typeface="Times New Roman" panose="02020603050405020304" pitchFamily="18" charset="0"/>
-              </a:rPr>
-              <a:t>Where are phones available for purchase?</a:t>
-            </a:r>
-          </a:p>
-        </p:txBody>
-      </p:sp>
-      <p:sp>
-        <p:nvSpPr>
-          <p:cNvPr id="17" name="TextBox 16">
-            <a:extLst>
-              <a:ext uri="{FF2B5EF4-FFF2-40B4-BE49-F238E27FC236}">
-                <a16:creationId xmlns:a16="http://schemas.microsoft.com/office/drawing/2014/main" id="{4D8397E0-E9DA-45DF-96A8-525495153BF2}"/>
-              </a:ext>
-            </a:extLst>
-          </p:cNvPr>
-          <p:cNvSpPr txBox="1"/>
-          <p:nvPr/>
-        </p:nvSpPr>
-        <p:spPr>
-          <a:xfrm>
-            <a:off x="5750559" y="3307208"/>
-            <a:ext cx="4805682" cy="400110"/>
-          </a:xfrm>
-          <a:prstGeom prst="rect">
-            <a:avLst/>
-          </a:prstGeom>
-          <a:noFill/>
-        </p:spPr>
-        <p:txBody>
-          <a:bodyPr wrap="square" rtlCol="0">
-            <a:spAutoFit/>
-          </a:bodyPr>
-          <a:lstStyle/>
-          <a:p>
-            <a:pPr algn="ctr"/>
-            <a:r>
-              <a:rPr lang="en-GB" sz="2000" u="sng" dirty="0">
-                <a:latin typeface="Times New Roman" panose="02020603050405020304" pitchFamily="18" charset="0"/>
-                <a:cs typeface="Times New Roman" panose="02020603050405020304" pitchFamily="18" charset="0"/>
-              </a:rPr>
-              <a:t>Similarity</a:t>
-            </a:r>
-          </a:p>
-        </p:txBody>
-      </p:sp>
-      <p:sp>
-        <p:nvSpPr>
-          <p:cNvPr id="18" name="TextBox 17">
-            <a:extLst>
-              <a:ext uri="{FF2B5EF4-FFF2-40B4-BE49-F238E27FC236}">
-                <a16:creationId xmlns:a16="http://schemas.microsoft.com/office/drawing/2014/main" id="{48F74CB5-4AD5-478E-824D-D660A32D492D}"/>
-              </a:ext>
-            </a:extLst>
-          </p:cNvPr>
-          <p:cNvSpPr txBox="1"/>
-          <p:nvPr/>
-        </p:nvSpPr>
-        <p:spPr>
-          <a:xfrm>
-            <a:off x="5750559" y="3968930"/>
-            <a:ext cx="4805682" cy="400110"/>
-          </a:xfrm>
-          <a:prstGeom prst="rect">
-            <a:avLst/>
-          </a:prstGeom>
-          <a:noFill/>
-        </p:spPr>
-        <p:txBody>
-          <a:bodyPr wrap="square" rtlCol="0">
-            <a:spAutoFit/>
-          </a:bodyPr>
-          <a:lstStyle/>
-          <a:p>
-            <a:pPr algn="ctr"/>
-            <a:r>
-              <a:rPr lang="en-GB" sz="2000" dirty="0">
-                <a:latin typeface="Times New Roman" panose="02020603050405020304" pitchFamily="18" charset="0"/>
-                <a:cs typeface="Times New Roman" panose="02020603050405020304" pitchFamily="18" charset="0"/>
-              </a:rPr>
-              <a:t>100%</a:t>
-            </a:r>
-          </a:p>
-        </p:txBody>
-      </p:sp>
-      <p:sp>
-        <p:nvSpPr>
-          <p:cNvPr id="19" name="TextBox 18">
-            <a:extLst>
-              <a:ext uri="{FF2B5EF4-FFF2-40B4-BE49-F238E27FC236}">
-                <a16:creationId xmlns:a16="http://schemas.microsoft.com/office/drawing/2014/main" id="{CAF17A5E-A703-4354-A88A-DABBB9D6310C}"/>
-              </a:ext>
-            </a:extLst>
-          </p:cNvPr>
-          <p:cNvSpPr txBox="1"/>
-          <p:nvPr/>
-        </p:nvSpPr>
-        <p:spPr>
-          <a:xfrm>
-            <a:off x="5795009" y="4432195"/>
-            <a:ext cx="4805682" cy="400110"/>
-          </a:xfrm>
-          <a:prstGeom prst="rect">
-            <a:avLst/>
-          </a:prstGeom>
-          <a:noFill/>
-        </p:spPr>
-        <p:txBody>
-          <a:bodyPr wrap="square" rtlCol="0">
-            <a:spAutoFit/>
-          </a:bodyPr>
-          <a:lstStyle/>
-          <a:p>
-            <a:pPr algn="ctr"/>
-            <a:r>
-              <a:rPr lang="en-GB" sz="2000" dirty="0">
-                <a:latin typeface="Times New Roman" panose="02020603050405020304" pitchFamily="18" charset="0"/>
-                <a:cs typeface="Times New Roman" panose="02020603050405020304" pitchFamily="18" charset="0"/>
-              </a:rPr>
-              <a:t>16%</a:t>
-            </a:r>
-          </a:p>
-        </p:txBody>
-      </p:sp>
-      <p:sp>
-        <p:nvSpPr>
-          <p:cNvPr id="20" name="TextBox 19">
-            <a:extLst>
-              <a:ext uri="{FF2B5EF4-FFF2-40B4-BE49-F238E27FC236}">
-                <a16:creationId xmlns:a16="http://schemas.microsoft.com/office/drawing/2014/main" id="{8C813DA1-5414-44A5-B006-9BF1B2BA2C6C}"/>
-              </a:ext>
-            </a:extLst>
-          </p:cNvPr>
-          <p:cNvSpPr txBox="1"/>
-          <p:nvPr/>
-        </p:nvSpPr>
-        <p:spPr>
-          <a:xfrm>
-            <a:off x="5750559" y="4831253"/>
-            <a:ext cx="4805682" cy="400110"/>
-          </a:xfrm>
-          <a:prstGeom prst="rect">
-            <a:avLst/>
-          </a:prstGeom>
-          <a:noFill/>
-        </p:spPr>
-        <p:txBody>
-          <a:bodyPr wrap="square" rtlCol="0">
-            <a:spAutoFit/>
-          </a:bodyPr>
-          <a:lstStyle/>
-          <a:p>
-            <a:pPr algn="ctr"/>
-            <a:r>
-              <a:rPr lang="en-GB" sz="2000" u="sng" dirty="0">
-                <a:latin typeface="Times New Roman" panose="02020603050405020304" pitchFamily="18" charset="0"/>
-                <a:cs typeface="Times New Roman" panose="02020603050405020304" pitchFamily="18" charset="0"/>
-              </a:rPr>
-              <a:t>Average</a:t>
-            </a:r>
-          </a:p>
-        </p:txBody>
-      </p:sp>
-      <p:sp>
-        <p:nvSpPr>
-          <p:cNvPr id="21" name="TextBox 20">
-            <a:extLst>
-              <a:ext uri="{FF2B5EF4-FFF2-40B4-BE49-F238E27FC236}">
-                <a16:creationId xmlns:a16="http://schemas.microsoft.com/office/drawing/2014/main" id="{F96111B1-70E6-439C-8CE8-F5F13614046D}"/>
-              </a:ext>
-            </a:extLst>
-          </p:cNvPr>
-          <p:cNvSpPr txBox="1"/>
-          <p:nvPr/>
-        </p:nvSpPr>
-        <p:spPr>
-          <a:xfrm>
-            <a:off x="5795009" y="5293972"/>
-            <a:ext cx="4805682" cy="400110"/>
-          </a:xfrm>
-          <a:prstGeom prst="rect">
-            <a:avLst/>
-          </a:prstGeom>
-          <a:noFill/>
-        </p:spPr>
-        <p:txBody>
-          <a:bodyPr wrap="square" rtlCol="0">
-            <a:spAutoFit/>
-          </a:bodyPr>
-          <a:lstStyle/>
-          <a:p>
-            <a:pPr algn="ctr"/>
-            <a:r>
-              <a:rPr lang="en-GB" sz="2000" b="1" dirty="0">
-                <a:latin typeface="Times New Roman" panose="02020603050405020304" pitchFamily="18" charset="0"/>
-                <a:cs typeface="Times New Roman" panose="02020603050405020304" pitchFamily="18" charset="0"/>
-              </a:rPr>
-              <a:t>100%</a:t>
-            </a:r>
-          </a:p>
-        </p:txBody>
-      </p:sp>
-      <p:sp>
-        <p:nvSpPr>
-          <p:cNvPr id="22" name="TextBox 21">
-            <a:extLst>
-              <a:ext uri="{FF2B5EF4-FFF2-40B4-BE49-F238E27FC236}">
-                <a16:creationId xmlns:a16="http://schemas.microsoft.com/office/drawing/2014/main" id="{08B6938A-D557-41B1-B114-225C2E1D0FBA}"/>
-              </a:ext>
-            </a:extLst>
-          </p:cNvPr>
-          <p:cNvSpPr txBox="1"/>
-          <p:nvPr/>
-        </p:nvSpPr>
-        <p:spPr>
-          <a:xfrm>
-            <a:off x="5833109" y="5287979"/>
-            <a:ext cx="4805682" cy="400110"/>
-          </a:xfrm>
-          <a:prstGeom prst="rect">
-            <a:avLst/>
-          </a:prstGeom>
-          <a:noFill/>
-        </p:spPr>
-        <p:txBody>
-          <a:bodyPr wrap="square" rtlCol="0">
-            <a:spAutoFit/>
-          </a:bodyPr>
-          <a:lstStyle/>
-          <a:p>
-            <a:pPr algn="ctr"/>
-            <a:r>
-              <a:rPr lang="en-GB" sz="2000" b="1" dirty="0">
-                <a:latin typeface="Times New Roman" panose="02020603050405020304" pitchFamily="18" charset="0"/>
-                <a:cs typeface="Times New Roman" panose="02020603050405020304" pitchFamily="18" charset="0"/>
-              </a:rPr>
-              <a:t>58%</a:t>
-            </a:r>
-          </a:p>
-        </p:txBody>
-      </p:sp>
-    </p:spTree>
-    <p:extLst>
-      <p:ext uri="{BB962C8B-B14F-4D97-AF65-F5344CB8AC3E}">
-        <p14:creationId xmlns:p14="http://schemas.microsoft.com/office/powerpoint/2010/main" val="1265626902"/>
-      </p:ext>
-    </p:extLst>
-  </p:cSld>
-  <p:clrMapOvr>
-    <a:masterClrMapping/>
-  </p:clrMapOvr>
-  <p:timing>
-    <p:tnLst>
-      <p:par>
-        <p:cTn id="1" dur="indefinite" restart="never" nodeType="tmRoot">
-          <p:childTnLst>
-            <p:seq concurrent="1" nextAc="seek">
-              <p:cTn id="2" dur="indefinite" nodeType="mainSeq">
-                <p:childTnLst>
-                  <p:par>
-                    <p:cTn id="3" fill="hold">
-                      <p:stCondLst>
-                        <p:cond delay="indefinite"/>
-                        <p:cond evt="onBegin" delay="0">
-                          <p:tn val="2"/>
-                        </p:cond>
-                      </p:stCondLst>
-                      <p:childTnLst>
-                        <p:par>
-                          <p:cTn id="4" fill="hold">
-                            <p:stCondLst>
-                              <p:cond delay="0"/>
-                            </p:stCondLst>
-                            <p:childTnLst>
-                              <p:par>
-                                <p:cTn id="5" presetID="1" presetClass="exit" presetSubtype="0" fill="hold" grpId="0" nodeType="withEffect">
-                                  <p:stCondLst>
-                                    <p:cond delay="0"/>
-                                  </p:stCondLst>
-                                  <p:childTnLst>
-                                    <p:set>
-                                      <p:cBhvr>
-                                        <p:cTn id="6" dur="1" fill="hold">
-                                          <p:stCondLst>
-                                            <p:cond delay="0"/>
-                                          </p:stCondLst>
-                                        </p:cTn>
-                                        <p:tgtEl>
-                                          <p:spTgt spid="19"/>
-                                        </p:tgtEl>
-                                        <p:attrNameLst>
-                                          <p:attrName>style.visibility</p:attrName>
-                                        </p:attrNameLst>
-                                      </p:cBhvr>
-                                      <p:to>
-                                        <p:strVal val="hidden"/>
-                                      </p:to>
-                                    </p:set>
-                                  </p:childTnLst>
-                                </p:cTn>
-                              </p:par>
-                              <p:par>
-                                <p:cTn id="7" presetID="1" presetClass="exit" presetSubtype="0" fill="hold" grpId="0" nodeType="withEffect">
-                                  <p:stCondLst>
-                                    <p:cond delay="0"/>
-                                  </p:stCondLst>
-                                  <p:childTnLst>
-                                    <p:set>
-                                      <p:cBhvr>
-                                        <p:cTn id="8" dur="1" fill="hold">
-                                          <p:stCondLst>
-                                            <p:cond delay="0"/>
-                                          </p:stCondLst>
-                                        </p:cTn>
-                                        <p:tgtEl>
-                                          <p:spTgt spid="18"/>
-                                        </p:tgtEl>
-                                        <p:attrNameLst>
-                                          <p:attrName>style.visibility</p:attrName>
-                                        </p:attrNameLst>
-                                      </p:cBhvr>
-                                      <p:to>
-                                        <p:strVal val="hidden"/>
-                                      </p:to>
-                                    </p:set>
-                                  </p:childTnLst>
-                                </p:cTn>
-                              </p:par>
-                              <p:par>
-                                <p:cTn id="9" presetID="1" presetClass="exit" presetSubtype="0" fill="hold" grpId="1" nodeType="withEffect">
-                                  <p:stCondLst>
-                                    <p:cond delay="0"/>
-                                  </p:stCondLst>
-                                  <p:childTnLst>
-                                    <p:set>
-                                      <p:cBhvr>
-                                        <p:cTn id="10" dur="1" fill="hold">
-                                          <p:stCondLst>
-                                            <p:cond delay="0"/>
-                                          </p:stCondLst>
-                                        </p:cTn>
-                                        <p:tgtEl>
-                                          <p:spTgt spid="18"/>
-                                        </p:tgtEl>
-                                        <p:attrNameLst>
-                                          <p:attrName>style.visibility</p:attrName>
-                                        </p:attrNameLst>
-                                      </p:cBhvr>
-                                      <p:to>
-                                        <p:strVal val="hidden"/>
-                                      </p:to>
-                                    </p:set>
-                                  </p:childTnLst>
-                                </p:cTn>
-                              </p:par>
-                              <p:par>
-                                <p:cTn id="11" presetID="1" presetClass="exit" presetSubtype="0" fill="hold" grpId="0" nodeType="withEffect">
-                                  <p:stCondLst>
-                                    <p:cond delay="0"/>
-                                  </p:stCondLst>
-                                  <p:childTnLst>
-                                    <p:set>
-                                      <p:cBhvr>
-                                        <p:cTn id="12" dur="1" fill="hold">
-                                          <p:stCondLst>
-                                            <p:cond delay="0"/>
-                                          </p:stCondLst>
-                                        </p:cTn>
-                                        <p:tgtEl>
-                                          <p:spTgt spid="21"/>
-                                        </p:tgtEl>
-                                        <p:attrNameLst>
-                                          <p:attrName>style.visibility</p:attrName>
-                                        </p:attrNameLst>
-                                      </p:cBhvr>
-                                      <p:to>
-                                        <p:strVal val="hidden"/>
-                                      </p:to>
-                                    </p:set>
-                                  </p:childTnLst>
-                                </p:cTn>
-                              </p:par>
-                              <p:par>
-                                <p:cTn id="13" presetID="1" presetClass="exit" presetSubtype="0" fill="hold" grpId="0" nodeType="withEffect">
-                                  <p:stCondLst>
-                                    <p:cond delay="0"/>
-                                  </p:stCondLst>
-                                  <p:childTnLst>
-                                    <p:set>
-                                      <p:cBhvr>
-                                        <p:cTn id="14" dur="1" fill="hold">
-                                          <p:stCondLst>
-                                            <p:cond delay="0"/>
-                                          </p:stCondLst>
-                                        </p:cTn>
-                                        <p:tgtEl>
-                                          <p:spTgt spid="22"/>
-                                        </p:tgtEl>
-                                        <p:attrNameLst>
-                                          <p:attrName>style.visibility</p:attrName>
-                                        </p:attrNameLst>
-                                      </p:cBhvr>
-                                      <p:to>
-                                        <p:strVal val="hidden"/>
-                                      </p:to>
-                                    </p:set>
-                                  </p:childTnLst>
-                                </p:cTn>
-                              </p:par>
-                            </p:childTnLst>
-                          </p:cTn>
-                        </p:par>
-                      </p:childTnLst>
-                    </p:cTn>
-                  </p:par>
-                  <p:par>
-                    <p:cTn id="15" fill="hold">
-                      <p:stCondLst>
-                        <p:cond delay="indefinite"/>
-                      </p:stCondLst>
-                      <p:childTnLst>
-                        <p:par>
-                          <p:cTn id="16" fill="hold">
-                            <p:stCondLst>
-                              <p:cond delay="0"/>
-                            </p:stCondLst>
-                            <p:childTnLst>
-                              <p:par>
-                                <p:cTn id="17" presetID="1" presetClass="entr" presetSubtype="0" fill="hold" grpId="0" nodeType="clickEffect">
-                                  <p:stCondLst>
-                                    <p:cond delay="0"/>
-                                  </p:stCondLst>
-                                  <p:childTnLst>
-                                    <p:set>
-                                      <p:cBhvr>
-                                        <p:cTn id="18" dur="1" fill="hold">
-                                          <p:stCondLst>
-                                            <p:cond delay="0"/>
-                                          </p:stCondLst>
-                                        </p:cTn>
-                                        <p:tgtEl>
-                                          <p:spTgt spid="15"/>
-                                        </p:tgtEl>
-                                        <p:attrNameLst>
-                                          <p:attrName>style.visibility</p:attrName>
-                                        </p:attrNameLst>
-                                      </p:cBhvr>
-                                      <p:to>
-                                        <p:strVal val="visible"/>
-                                      </p:to>
-                                    </p:set>
-                                  </p:childTnLst>
-                                </p:cTn>
-                              </p:par>
-                            </p:childTnLst>
-                          </p:cTn>
-                        </p:par>
-                      </p:childTnLst>
-                    </p:cTn>
-                  </p:par>
-                  <p:par>
-                    <p:cTn id="19" fill="hold">
-                      <p:stCondLst>
-                        <p:cond delay="indefinite"/>
-                      </p:stCondLst>
-                      <p:childTnLst>
-                        <p:par>
-                          <p:cTn id="20" fill="hold">
-                            <p:stCondLst>
-                              <p:cond delay="0"/>
-                            </p:stCondLst>
-                            <p:childTnLst>
-                              <p:par>
-                                <p:cTn id="21" presetID="1" presetClass="entr" presetSubtype="0" fill="hold" grpId="0" nodeType="clickEffect">
-                                  <p:stCondLst>
-                                    <p:cond delay="0"/>
-                                  </p:stCondLst>
-                                  <p:childTnLst>
-                                    <p:set>
-                                      <p:cBhvr>
-                                        <p:cTn id="22" dur="1" fill="hold">
-                                          <p:stCondLst>
-                                            <p:cond delay="0"/>
-                                          </p:stCondLst>
-                                        </p:cTn>
-                                        <p:tgtEl>
-                                          <p:spTgt spid="14"/>
-                                        </p:tgtEl>
-                                        <p:attrNameLst>
-                                          <p:attrName>style.visibility</p:attrName>
-                                        </p:attrNameLst>
-                                      </p:cBhvr>
-                                      <p:to>
-                                        <p:strVal val="visible"/>
-                                      </p:to>
-                                    </p:set>
-                                  </p:childTnLst>
-                                </p:cTn>
-                              </p:par>
-                            </p:childTnLst>
-                          </p:cTn>
-                        </p:par>
-                      </p:childTnLst>
-                    </p:cTn>
-                  </p:par>
-                  <p:par>
-                    <p:cTn id="23" fill="hold">
-                      <p:stCondLst>
-                        <p:cond delay="indefinite"/>
-                      </p:stCondLst>
-                      <p:childTnLst>
-                        <p:par>
-                          <p:cTn id="24" fill="hold">
-                            <p:stCondLst>
-                              <p:cond delay="0"/>
-                            </p:stCondLst>
-                            <p:childTnLst>
-                              <p:par>
-                                <p:cTn id="25" presetID="1" presetClass="entr" presetSubtype="0" fill="hold" grpId="2" nodeType="clickEffect">
-                                  <p:stCondLst>
-                                    <p:cond delay="0"/>
-                                  </p:stCondLst>
-                                  <p:childTnLst>
-                                    <p:set>
-                                      <p:cBhvr>
-                                        <p:cTn id="26" dur="1" fill="hold">
-                                          <p:stCondLst>
-                                            <p:cond delay="0"/>
-                                          </p:stCondLst>
-                                        </p:cTn>
-                                        <p:tgtEl>
-                                          <p:spTgt spid="18"/>
-                                        </p:tgtEl>
-                                        <p:attrNameLst>
-                                          <p:attrName>style.visibility</p:attrName>
-                                        </p:attrNameLst>
-                                      </p:cBhvr>
-                                      <p:to>
-                                        <p:strVal val="visible"/>
-                                      </p:to>
-                                    </p:set>
-                                  </p:childTnLst>
-                                </p:cTn>
-                              </p:par>
-                              <p:par>
-                                <p:cTn id="27" presetID="1" presetClass="entr" presetSubtype="0" fill="hold" grpId="1" nodeType="withEffect">
-                                  <p:stCondLst>
-                                    <p:cond delay="0"/>
-                                  </p:stCondLst>
-                                  <p:childTnLst>
-                                    <p:set>
-                                      <p:cBhvr>
-                                        <p:cTn id="28" dur="1" fill="hold">
-                                          <p:stCondLst>
-                                            <p:cond delay="0"/>
-                                          </p:stCondLst>
-                                        </p:cTn>
-                                        <p:tgtEl>
-                                          <p:spTgt spid="21"/>
-                                        </p:tgtEl>
-                                        <p:attrNameLst>
-                                          <p:attrName>style.visibility</p:attrName>
-                                        </p:attrNameLst>
-                                      </p:cBhvr>
-                                      <p:to>
-                                        <p:strVal val="visible"/>
-                                      </p:to>
-                                    </p:set>
-                                  </p:childTnLst>
-                                </p:cTn>
-                              </p:par>
-                            </p:childTnLst>
-                          </p:cTn>
-                        </p:par>
-                      </p:childTnLst>
-                    </p:cTn>
-                  </p:par>
-                  <p:par>
-                    <p:cTn id="29" fill="hold">
-                      <p:stCondLst>
-                        <p:cond delay="indefinite"/>
-                      </p:stCondLst>
-                      <p:childTnLst>
-                        <p:par>
-                          <p:cTn id="30" fill="hold">
-                            <p:stCondLst>
-                              <p:cond delay="0"/>
-                            </p:stCondLst>
-                            <p:childTnLst>
-                              <p:par>
-                                <p:cTn id="31" presetID="1" presetClass="entr" presetSubtype="0" fill="hold" grpId="0" nodeType="clickEffect">
-                                  <p:stCondLst>
-                                    <p:cond delay="0"/>
-                                  </p:stCondLst>
-                                  <p:childTnLst>
-                                    <p:set>
-                                      <p:cBhvr>
-                                        <p:cTn id="32" dur="1" fill="hold">
-                                          <p:stCondLst>
-                                            <p:cond delay="0"/>
-                                          </p:stCondLst>
-                                        </p:cTn>
-                                        <p:tgtEl>
-                                          <p:spTgt spid="16"/>
-                                        </p:tgtEl>
-                                        <p:attrNameLst>
-                                          <p:attrName>style.visibility</p:attrName>
-                                        </p:attrNameLst>
-                                      </p:cBhvr>
-                                      <p:to>
-                                        <p:strVal val="visible"/>
-                                      </p:to>
-                                    </p:set>
-                                  </p:childTnLst>
-                                </p:cTn>
-                              </p:par>
-                              <p:par>
-                                <p:cTn id="33" presetID="1" presetClass="exit" presetSubtype="0" fill="hold" grpId="1" nodeType="withEffect">
-                                  <p:stCondLst>
-                                    <p:cond delay="0"/>
-                                  </p:stCondLst>
-                                  <p:childTnLst>
-                                    <p:set>
-                                      <p:cBhvr>
-                                        <p:cTn id="34" dur="1" fill="hold">
-                                          <p:stCondLst>
-                                            <p:cond delay="0"/>
-                                          </p:stCondLst>
-                                        </p:cTn>
-                                        <p:tgtEl>
-                                          <p:spTgt spid="14"/>
-                                        </p:tgtEl>
-                                        <p:attrNameLst>
-                                          <p:attrName>style.visibility</p:attrName>
-                                        </p:attrNameLst>
-                                      </p:cBhvr>
-                                      <p:to>
-                                        <p:strVal val="hidden"/>
-                                      </p:to>
-                                    </p:set>
-                                  </p:childTnLst>
-                                </p:cTn>
-                              </p:par>
-                              <p:par>
-                                <p:cTn id="35" presetID="1" presetClass="exit" presetSubtype="0" fill="hold" grpId="3" nodeType="withEffect">
-                                  <p:stCondLst>
-                                    <p:cond delay="0"/>
-                                  </p:stCondLst>
-                                  <p:childTnLst>
-                                    <p:set>
-                                      <p:cBhvr>
-                                        <p:cTn id="36" dur="1" fill="hold">
-                                          <p:stCondLst>
-                                            <p:cond delay="0"/>
-                                          </p:stCondLst>
-                                        </p:cTn>
-                                        <p:tgtEl>
-                                          <p:spTgt spid="18"/>
-                                        </p:tgtEl>
-                                        <p:attrNameLst>
-                                          <p:attrName>style.visibility</p:attrName>
-                                        </p:attrNameLst>
-                                      </p:cBhvr>
-                                      <p:to>
-                                        <p:strVal val="hidden"/>
-                                      </p:to>
-                                    </p:set>
-                                  </p:childTnLst>
-                                </p:cTn>
-                              </p:par>
-                              <p:par>
-                                <p:cTn id="37" presetID="1" presetClass="exit" presetSubtype="0" fill="hold" grpId="2" nodeType="withEffect">
-                                  <p:stCondLst>
-                                    <p:cond delay="0"/>
-                                  </p:stCondLst>
-                                  <p:childTnLst>
-                                    <p:set>
-                                      <p:cBhvr>
-                                        <p:cTn id="38" dur="1" fill="hold">
-                                          <p:stCondLst>
-                                            <p:cond delay="0"/>
-                                          </p:stCondLst>
-                                        </p:cTn>
-                                        <p:tgtEl>
-                                          <p:spTgt spid="21"/>
-                                        </p:tgtEl>
-                                        <p:attrNameLst>
-                                          <p:attrName>style.visibility</p:attrName>
-                                        </p:attrNameLst>
-                                      </p:cBhvr>
-                                      <p:to>
-                                        <p:strVal val="hidden"/>
-                                      </p:to>
-                                    </p:set>
-                                  </p:childTnLst>
-                                </p:cTn>
-                              </p:par>
-                            </p:childTnLst>
-                          </p:cTn>
-                        </p:par>
-                      </p:childTnLst>
-                    </p:cTn>
-                  </p:par>
-                  <p:par>
-                    <p:cTn id="39" fill="hold">
-                      <p:stCondLst>
-                        <p:cond delay="indefinite"/>
-                      </p:stCondLst>
-                      <p:childTnLst>
-                        <p:par>
-                          <p:cTn id="40" fill="hold">
-                            <p:stCondLst>
-                              <p:cond delay="0"/>
-                            </p:stCondLst>
-                            <p:childTnLst>
-                              <p:par>
-                                <p:cTn id="41" presetID="1" presetClass="entr" presetSubtype="0" fill="hold" grpId="2" nodeType="clickEffect">
-                                  <p:stCondLst>
-                                    <p:cond delay="0"/>
-                                  </p:stCondLst>
-                                  <p:childTnLst>
-                                    <p:set>
-                                      <p:cBhvr>
-                                        <p:cTn id="42" dur="1" fill="hold">
-                                          <p:stCondLst>
-                                            <p:cond delay="0"/>
-                                          </p:stCondLst>
-                                        </p:cTn>
-                                        <p:tgtEl>
-                                          <p:spTgt spid="14"/>
-                                        </p:tgtEl>
-                                        <p:attrNameLst>
-                                          <p:attrName>style.visibility</p:attrName>
-                                        </p:attrNameLst>
-                                      </p:cBhvr>
-                                      <p:to>
-                                        <p:strVal val="visible"/>
-                                      </p:to>
-                                    </p:set>
-                                  </p:childTnLst>
-                                </p:cTn>
-                              </p:par>
-                            </p:childTnLst>
-                          </p:cTn>
-                        </p:par>
-                      </p:childTnLst>
-                    </p:cTn>
-                  </p:par>
-                  <p:par>
-                    <p:cTn id="43" fill="hold">
-                      <p:stCondLst>
-                        <p:cond delay="indefinite"/>
-                      </p:stCondLst>
-                      <p:childTnLst>
-                        <p:par>
-                          <p:cTn id="44" fill="hold">
-                            <p:stCondLst>
-                              <p:cond delay="0"/>
-                            </p:stCondLst>
-                            <p:childTnLst>
-                              <p:par>
-                                <p:cTn id="45" presetID="1" presetClass="entr" presetSubtype="0" fill="hold" grpId="4" nodeType="clickEffect">
-                                  <p:stCondLst>
-                                    <p:cond delay="0"/>
-                                  </p:stCondLst>
-                                  <p:childTnLst>
-                                    <p:set>
-                                      <p:cBhvr>
-                                        <p:cTn id="46" dur="1" fill="hold">
-                                          <p:stCondLst>
-                                            <p:cond delay="0"/>
-                                          </p:stCondLst>
-                                        </p:cTn>
-                                        <p:tgtEl>
-                                          <p:spTgt spid="18"/>
-                                        </p:tgtEl>
-                                        <p:attrNameLst>
-                                          <p:attrName>style.visibility</p:attrName>
-                                        </p:attrNameLst>
-                                      </p:cBhvr>
-                                      <p:to>
-                                        <p:strVal val="visible"/>
-                                      </p:to>
-                                    </p:set>
-                                  </p:childTnLst>
-                                </p:cTn>
-                              </p:par>
-                              <p:par>
-                                <p:cTn id="47" presetID="1" presetClass="entr" presetSubtype="0" fill="hold" grpId="1" nodeType="withEffect">
-                                  <p:stCondLst>
-                                    <p:cond delay="0"/>
-                                  </p:stCondLst>
-                                  <p:childTnLst>
-                                    <p:set>
-                                      <p:cBhvr>
-                                        <p:cTn id="48" dur="1" fill="hold">
-                                          <p:stCondLst>
-                                            <p:cond delay="0"/>
-                                          </p:stCondLst>
-                                        </p:cTn>
-                                        <p:tgtEl>
-                                          <p:spTgt spid="19"/>
-                                        </p:tgtEl>
-                                        <p:attrNameLst>
-                                          <p:attrName>style.visibility</p:attrName>
-                                        </p:attrNameLst>
-                                      </p:cBhvr>
-                                      <p:to>
-                                        <p:strVal val="visible"/>
-                                      </p:to>
-                                    </p:set>
-                                  </p:childTnLst>
-                                </p:cTn>
-                              </p:par>
-                              <p:par>
-                                <p:cTn id="49" presetID="1" presetClass="entr" presetSubtype="0" fill="hold" grpId="1" nodeType="withEffect">
-                                  <p:stCondLst>
-                                    <p:cond delay="0"/>
-                                  </p:stCondLst>
-                                  <p:childTnLst>
-                                    <p:set>
-                                      <p:cBhvr>
-                                        <p:cTn id="50" dur="1" fill="hold">
-                                          <p:stCondLst>
-                                            <p:cond delay="0"/>
-                                          </p:stCondLst>
-                                        </p:cTn>
-                                        <p:tgtEl>
-                                          <p:spTgt spid="22"/>
-                                        </p:tgtEl>
-                                        <p:attrNameLst>
-                                          <p:attrName>style.visibility</p:attrName>
-                                        </p:attrNameLst>
-                                      </p:cBhvr>
-                                      <p:to>
-                                        <p:strVal val="visible"/>
-                                      </p:to>
-                                    </p:set>
-                                  </p:childTnLst>
-                                </p:cTn>
-                              </p:par>
-                            </p:childTnLst>
-                          </p:cTn>
-                        </p:par>
-                      </p:childTnLst>
-                    </p:cTn>
-                  </p:par>
-                </p:childTnLst>
-              </p:cTn>
-              <p:prevCondLst>
-                <p:cond evt="onPrev" delay="0">
-                  <p:tgtEl>
-                    <p:sldTgt/>
-                  </p:tgtEl>
-                </p:cond>
-              </p:prevCondLst>
-              <p:nextCondLst>
-                <p:cond evt="onNext" delay="0">
-                  <p:tgtEl>
-                    <p:sldTgt/>
-                  </p:tgtEl>
-                </p:cond>
-              </p:nextCondLst>
-            </p:seq>
-          </p:childTnLst>
-        </p:cTn>
-      </p:par>
-    </p:tnLst>
-    <p:bldLst>
-      <p:bldP spid="14" grpId="0"/>
-      <p:bldP spid="14" grpId="1"/>
-      <p:bldP spid="14" grpId="2"/>
-      <p:bldP spid="15" grpId="0"/>
-      <p:bldP spid="16" grpId="0"/>
-      <p:bldP spid="18" grpId="0"/>
-      <p:bldP spid="18" grpId="1"/>
-      <p:bldP spid="18" grpId="2"/>
-      <p:bldP spid="18" grpId="3"/>
-      <p:bldP spid="18" grpId="4"/>
-      <p:bldP spid="19" grpId="0"/>
-      <p:bldP spid="19" grpId="1"/>
-      <p:bldP spid="21" grpId="0"/>
-      <p:bldP spid="21" grpId="1"/>
-      <p:bldP spid="21" grpId="2"/>
-      <p:bldP spid="22" grpId="0"/>
-      <p:bldP spid="22" grpId="1"/>
-    </p:bldLst>
-  </p:timing>
-</p:sld>
-</file>
-
 <file path=ppt/slides/slide12.xml><?xml version="1.0" encoding="utf-8"?>
 <p:sld xmlns:a="http://schemas.openxmlformats.org/drawingml/2006/main" xmlns:r="http://schemas.openxmlformats.org/officeDocument/2006/relationships" xmlns:p="http://schemas.openxmlformats.org/presentationml/2006/main">
   <p:cSld>
@@ -6679,6 +6317,356 @@
             <p:ph type="title"/>
           </p:nvPr>
         </p:nvSpPr>
+        <p:spPr/>
+        <p:txBody>
+          <a:bodyPr/>
+          <a:lstStyle/>
+          <a:p>
+            <a:r>
+              <a:rPr lang="en-GB" dirty="0">
+                <a:latin typeface="Times New Roman" panose="02020603050405020304" pitchFamily="18" charset="0"/>
+                <a:cs typeface="Times New Roman" panose="02020603050405020304" pitchFamily="18" charset="0"/>
+              </a:rPr>
+              <a:t>Critical Analysis – Averages Problem</a:t>
+            </a:r>
+          </a:p>
+        </p:txBody>
+      </p:sp>
+      <p:sp>
+        <p:nvSpPr>
+          <p:cNvPr id="4" name="Footer Placeholder 3">
+            <a:extLst>
+              <a:ext uri="{FF2B5EF4-FFF2-40B4-BE49-F238E27FC236}">
+                <a16:creationId xmlns:a16="http://schemas.microsoft.com/office/drawing/2014/main" id="{161C8FD0-3C47-42BD-AAEA-0D666D8F1A16}"/>
+              </a:ext>
+            </a:extLst>
+          </p:cNvPr>
+          <p:cNvSpPr>
+            <a:spLocks noGrp="1"/>
+          </p:cNvSpPr>
+          <p:nvPr>
+            <p:ph type="ftr" sz="quarter" idx="11"/>
+          </p:nvPr>
+        </p:nvSpPr>
+        <p:spPr/>
+        <p:txBody>
+          <a:bodyPr/>
+          <a:lstStyle/>
+          <a:p>
+            <a:r>
+              <a:rPr lang="en-GB" dirty="0"/>
+              <a:t>Solution Development</a:t>
+            </a:r>
+          </a:p>
+        </p:txBody>
+      </p:sp>
+      <p:sp>
+        <p:nvSpPr>
+          <p:cNvPr id="14" name="TextBox 13">
+            <a:extLst>
+              <a:ext uri="{FF2B5EF4-FFF2-40B4-BE49-F238E27FC236}">
+                <a16:creationId xmlns:a16="http://schemas.microsoft.com/office/drawing/2014/main" id="{869D7A6D-21C7-4A0C-AC39-73F809F665AD}"/>
+              </a:ext>
+            </a:extLst>
+          </p:cNvPr>
+          <p:cNvSpPr txBox="1"/>
+          <p:nvPr/>
+        </p:nvSpPr>
+        <p:spPr>
+          <a:xfrm>
+            <a:off x="3693159" y="2405862"/>
+            <a:ext cx="4805682" cy="461665"/>
+          </a:xfrm>
+          <a:prstGeom prst="rect">
+            <a:avLst/>
+          </a:prstGeom>
+          <a:noFill/>
+        </p:spPr>
+        <p:txBody>
+          <a:bodyPr wrap="square" rtlCol="0">
+            <a:spAutoFit/>
+          </a:bodyPr>
+          <a:lstStyle/>
+          <a:p>
+            <a:pPr algn="ctr"/>
+            <a:r>
+              <a:rPr lang="en-GB" sz="2400" i="1" dirty="0">
+                <a:latin typeface="Times New Roman" panose="02020603050405020304" pitchFamily="18" charset="0"/>
+                <a:cs typeface="Times New Roman" panose="02020603050405020304" pitchFamily="18" charset="0"/>
+              </a:rPr>
+              <a:t>“How can I buy a phone?”</a:t>
+            </a:r>
+          </a:p>
+        </p:txBody>
+      </p:sp>
+      <p:graphicFrame>
+        <p:nvGraphicFramePr>
+          <p:cNvPr id="6" name="Table 6">
+            <a:extLst>
+              <a:ext uri="{FF2B5EF4-FFF2-40B4-BE49-F238E27FC236}">
+                <a16:creationId xmlns:a16="http://schemas.microsoft.com/office/drawing/2014/main" id="{0891D769-37C6-474E-BC68-65F7F5B6C49C}"/>
+              </a:ext>
+            </a:extLst>
+          </p:cNvPr>
+          <p:cNvGraphicFramePr>
+            <a:graphicFrameLocks noGrp="1"/>
+          </p:cNvGraphicFramePr>
+          <p:nvPr>
+            <p:extLst>
+              <p:ext uri="{D42A27DB-BD31-4B8C-83A1-F6EECF244321}">
+                <p14:modId xmlns:p14="http://schemas.microsoft.com/office/powerpoint/2010/main" val="820158442"/>
+              </p:ext>
+            </p:extLst>
+          </p:nvPr>
+        </p:nvGraphicFramePr>
+        <p:xfrm>
+          <a:off x="2032000" y="3382126"/>
+          <a:ext cx="8128000" cy="1483360"/>
+        </p:xfrm>
+        <a:graphic>
+          <a:graphicData uri="http://schemas.openxmlformats.org/drawingml/2006/table">
+            <a:tbl>
+              <a:tblPr firstRow="1" bandRow="1">
+                <a:tableStyleId>{5C22544A-7EE6-4342-B048-85BDC9FD1C3A}</a:tableStyleId>
+              </a:tblPr>
+              <a:tblGrid>
+                <a:gridCol w="4064000">
+                  <a:extLst>
+                    <a:ext uri="{9D8B030D-6E8A-4147-A177-3AD203B41FA5}">
+                      <a16:colId xmlns:a16="http://schemas.microsoft.com/office/drawing/2014/main" val="501784123"/>
+                    </a:ext>
+                  </a:extLst>
+                </a:gridCol>
+                <a:gridCol w="4064000">
+                  <a:extLst>
+                    <a:ext uri="{9D8B030D-6E8A-4147-A177-3AD203B41FA5}">
+                      <a16:colId xmlns:a16="http://schemas.microsoft.com/office/drawing/2014/main" val="906967301"/>
+                    </a:ext>
+                  </a:extLst>
+                </a:gridCol>
+              </a:tblGrid>
+              <a:tr h="370840">
+                <a:tc>
+                  <a:txBody>
+                    <a:bodyPr/>
+                    <a:lstStyle/>
+                    <a:p>
+                      <a:pPr algn="ctr"/>
+                      <a:r>
+                        <a:rPr lang="en-GB" dirty="0">
+                          <a:latin typeface="Times New Roman" panose="02020603050405020304" pitchFamily="18" charset="0"/>
+                          <a:cs typeface="Times New Roman" panose="02020603050405020304" pitchFamily="18" charset="0"/>
+                        </a:rPr>
+                        <a:t>Trained Data</a:t>
+                      </a:r>
+                    </a:p>
+                  </a:txBody>
+                  <a:tcPr anchor="ctr"/>
+                </a:tc>
+                <a:tc>
+                  <a:txBody>
+                    <a:bodyPr/>
+                    <a:lstStyle/>
+                    <a:p>
+                      <a:pPr algn="ctr"/>
+                      <a:r>
+                        <a:rPr lang="en-GB" dirty="0">
+                          <a:latin typeface="Times New Roman" panose="02020603050405020304" pitchFamily="18" charset="0"/>
+                          <a:cs typeface="Times New Roman" panose="02020603050405020304" pitchFamily="18" charset="0"/>
+                        </a:rPr>
+                        <a:t>Similarity</a:t>
+                      </a:r>
+                    </a:p>
+                  </a:txBody>
+                  <a:tcPr anchor="ctr"/>
+                </a:tc>
+                <a:extLst>
+                  <a:ext uri="{0D108BD9-81ED-4DB2-BD59-A6C34878D82A}">
+                    <a16:rowId xmlns:a16="http://schemas.microsoft.com/office/drawing/2014/main" val="2034949055"/>
+                  </a:ext>
+                </a:extLst>
+              </a:tr>
+              <a:tr h="370840">
+                <a:tc>
+                  <a:txBody>
+                    <a:bodyPr/>
+                    <a:lstStyle/>
+                    <a:p>
+                      <a:pPr algn="ctr"/>
+                      <a:r>
+                        <a:rPr lang="en-US" dirty="0">
+                          <a:latin typeface="Times New Roman" panose="02020603050405020304" pitchFamily="18" charset="0"/>
+                          <a:cs typeface="Times New Roman" panose="02020603050405020304" pitchFamily="18" charset="0"/>
+                        </a:rPr>
+                        <a:t>How can I buy a phone?</a:t>
+                      </a:r>
+                    </a:p>
+                  </a:txBody>
+                  <a:tcPr anchor="ctr"/>
+                </a:tc>
+                <a:tc>
+                  <a:txBody>
+                    <a:bodyPr/>
+                    <a:lstStyle/>
+                    <a:p>
+                      <a:pPr algn="ctr"/>
+                      <a:r>
+                        <a:rPr lang="en-GB" b="1" dirty="0">
+                          <a:latin typeface="Times New Roman" panose="02020603050405020304" pitchFamily="18" charset="0"/>
+                          <a:cs typeface="Times New Roman" panose="02020603050405020304" pitchFamily="18" charset="0"/>
+                        </a:rPr>
+                        <a:t>100%</a:t>
+                      </a:r>
+                    </a:p>
+                  </a:txBody>
+                  <a:tcPr anchor="ctr"/>
+                </a:tc>
+                <a:extLst>
+                  <a:ext uri="{0D108BD9-81ED-4DB2-BD59-A6C34878D82A}">
+                    <a16:rowId xmlns:a16="http://schemas.microsoft.com/office/drawing/2014/main" val="2374398118"/>
+                  </a:ext>
+                </a:extLst>
+              </a:tr>
+              <a:tr h="370840">
+                <a:tc>
+                  <a:txBody>
+                    <a:bodyPr/>
+                    <a:lstStyle/>
+                    <a:p>
+                      <a:pPr algn="ctr"/>
+                      <a:r>
+                        <a:rPr lang="en-US" dirty="0">
+                          <a:latin typeface="Times New Roman" panose="02020603050405020304" pitchFamily="18" charset="0"/>
+                          <a:cs typeface="Times New Roman" panose="02020603050405020304" pitchFamily="18" charset="0"/>
+                        </a:rPr>
+                        <a:t>Where are phones available for purchase?</a:t>
+                      </a:r>
+                    </a:p>
+                  </a:txBody>
+                  <a:tcPr anchor="ctr"/>
+                </a:tc>
+                <a:tc>
+                  <a:txBody>
+                    <a:bodyPr/>
+                    <a:lstStyle/>
+                    <a:p>
+                      <a:pPr algn="ctr"/>
+                      <a:r>
+                        <a:rPr lang="en-GB" b="1" dirty="0">
+                          <a:latin typeface="Times New Roman" panose="02020603050405020304" pitchFamily="18" charset="0"/>
+                          <a:cs typeface="Times New Roman" panose="02020603050405020304" pitchFamily="18" charset="0"/>
+                        </a:rPr>
+                        <a:t>16%</a:t>
+                      </a:r>
+                    </a:p>
+                  </a:txBody>
+                  <a:tcPr anchor="ctr"/>
+                </a:tc>
+                <a:extLst>
+                  <a:ext uri="{0D108BD9-81ED-4DB2-BD59-A6C34878D82A}">
+                    <a16:rowId xmlns:a16="http://schemas.microsoft.com/office/drawing/2014/main" val="239372218"/>
+                  </a:ext>
+                </a:extLst>
+              </a:tr>
+              <a:tr h="370840">
+                <a:tc>
+                  <a:txBody>
+                    <a:bodyPr/>
+                    <a:lstStyle/>
+                    <a:p>
+                      <a:pPr algn="ctr"/>
+                      <a:r>
+                        <a:rPr lang="en-US" b="1" dirty="0">
+                          <a:latin typeface="Times New Roman" panose="02020603050405020304" pitchFamily="18" charset="0"/>
+                          <a:cs typeface="Times New Roman" panose="02020603050405020304" pitchFamily="18" charset="0"/>
+                        </a:rPr>
+                        <a:t>Total:</a:t>
+                      </a:r>
+                    </a:p>
+                  </a:txBody>
+                  <a:tcPr anchor="ctr">
+                    <a:solidFill>
+                      <a:schemeClr val="bg1"/>
+                    </a:solidFill>
+                  </a:tcPr>
+                </a:tc>
+                <a:tc>
+                  <a:txBody>
+                    <a:bodyPr/>
+                    <a:lstStyle/>
+                    <a:p>
+                      <a:pPr algn="ctr"/>
+                      <a:r>
+                        <a:rPr lang="en-GB" b="1" dirty="0">
+                          <a:latin typeface="Times New Roman" panose="02020603050405020304" pitchFamily="18" charset="0"/>
+                          <a:cs typeface="Times New Roman" panose="02020603050405020304" pitchFamily="18" charset="0"/>
+                        </a:rPr>
+                        <a:t>58%</a:t>
+                      </a:r>
+                    </a:p>
+                  </a:txBody>
+                  <a:tcPr anchor="ctr">
+                    <a:solidFill>
+                      <a:schemeClr val="bg1"/>
+                    </a:solidFill>
+                  </a:tcPr>
+                </a:tc>
+                <a:extLst>
+                  <a:ext uri="{0D108BD9-81ED-4DB2-BD59-A6C34878D82A}">
+                    <a16:rowId xmlns:a16="http://schemas.microsoft.com/office/drawing/2014/main" val="2345893076"/>
+                  </a:ext>
+                </a:extLst>
+              </a:tr>
+            </a:tbl>
+          </a:graphicData>
+        </a:graphic>
+      </p:graphicFrame>
+    </p:spTree>
+    <p:extLst>
+      <p:ext uri="{BB962C8B-B14F-4D97-AF65-F5344CB8AC3E}">
+        <p14:creationId xmlns:p14="http://schemas.microsoft.com/office/powerpoint/2010/main" val="1265626902"/>
+      </p:ext>
+    </p:extLst>
+  </p:cSld>
+  <p:clrMapOvr>
+    <a:masterClrMapping/>
+  </p:clrMapOvr>
+</p:sld>
+</file>
+
+<file path=ppt/slides/slide13.xml><?xml version="1.0" encoding="utf-8"?>
+<p:sld xmlns:a="http://schemas.openxmlformats.org/drawingml/2006/main" xmlns:r="http://schemas.openxmlformats.org/officeDocument/2006/relationships" xmlns:p="http://schemas.openxmlformats.org/presentationml/2006/main">
+  <p:cSld>
+    <p:spTree>
+      <p:nvGrpSpPr>
+        <p:cNvPr id="1" name=""/>
+        <p:cNvGrpSpPr/>
+        <p:nvPr/>
+      </p:nvGrpSpPr>
+      <p:grpSpPr>
+        <a:xfrm>
+          <a:off x="0" y="0"/>
+          <a:ext cx="0" cy="0"/>
+          <a:chOff x="0" y="0"/>
+          <a:chExt cx="0" cy="0"/>
+        </a:xfrm>
+      </p:grpSpPr>
+      <p:sp>
+        <p:nvSpPr>
+          <p:cNvPr id="2" name="Title 1">
+            <a:extLst>
+              <a:ext uri="{FF2B5EF4-FFF2-40B4-BE49-F238E27FC236}">
+                <a16:creationId xmlns:a16="http://schemas.microsoft.com/office/drawing/2014/main" id="{78C28E79-1E9E-424C-A6B7-3E3A1814FAA0}"/>
+              </a:ext>
+            </a:extLst>
+          </p:cNvPr>
+          <p:cNvSpPr>
+            <a:spLocks noGrp="1"/>
+          </p:cNvSpPr>
+          <p:nvPr>
+            <p:ph type="title"/>
+          </p:nvPr>
+        </p:nvSpPr>
         <p:spPr>
           <a:xfrm>
             <a:off x="838200" y="320675"/>
@@ -6721,8 +6709,8 @@
           <a:lstStyle/>
           <a:p>
             <a:r>
-              <a:rPr lang="en-GB"/>
-              <a:t>SEC</a:t>
+              <a:rPr lang="en-GB" dirty="0"/>
+              <a:t>Solution Development</a:t>
             </a:r>
           </a:p>
         </p:txBody>
@@ -6839,100 +6827,6 @@
 </p:sld>
 </file>
 
-<file path=ppt/slides/slide13.xml><?xml version="1.0" encoding="utf-8"?>
-<p:sld xmlns:a="http://schemas.openxmlformats.org/drawingml/2006/main" xmlns:r="http://schemas.openxmlformats.org/officeDocument/2006/relationships" xmlns:p="http://schemas.openxmlformats.org/presentationml/2006/main">
-  <p:cSld>
-    <p:spTree>
-      <p:nvGrpSpPr>
-        <p:cNvPr id="1" name=""/>
-        <p:cNvGrpSpPr/>
-        <p:nvPr/>
-      </p:nvGrpSpPr>
-      <p:grpSpPr>
-        <a:xfrm>
-          <a:off x="0" y="0"/>
-          <a:ext cx="0" cy="0"/>
-          <a:chOff x="0" y="0"/>
-          <a:chExt cx="0" cy="0"/>
-        </a:xfrm>
-      </p:grpSpPr>
-      <p:sp>
-        <p:nvSpPr>
-          <p:cNvPr id="2" name="Title 1">
-            <a:extLst>
-              <a:ext uri="{FF2B5EF4-FFF2-40B4-BE49-F238E27FC236}">
-                <a16:creationId xmlns:a16="http://schemas.microsoft.com/office/drawing/2014/main" id="{770E6EE7-B050-46D5-B12B-FF8B9068E4C3}"/>
-              </a:ext>
-            </a:extLst>
-          </p:cNvPr>
-          <p:cNvSpPr>
-            <a:spLocks noGrp="1"/>
-          </p:cNvSpPr>
-          <p:nvPr>
-            <p:ph type="title"/>
-          </p:nvPr>
-        </p:nvSpPr>
-        <p:spPr>
-          <a:xfrm>
-            <a:off x="838200" y="2691765"/>
-            <a:ext cx="10515600" cy="1325563"/>
-          </a:xfrm>
-        </p:spPr>
-        <p:txBody>
-          <a:bodyPr>
-            <a:normAutofit/>
-          </a:bodyPr>
-          <a:lstStyle/>
-          <a:p>
-            <a:pPr algn="ctr"/>
-            <a:r>
-              <a:rPr lang="en-GB" dirty="0">
-                <a:latin typeface="Times New Roman" panose="02020603050405020304" pitchFamily="18" charset="0"/>
-                <a:cs typeface="Times New Roman" panose="02020603050405020304" pitchFamily="18" charset="0"/>
-              </a:rPr>
-              <a:t>Problem Analysis - EDA</a:t>
-            </a:r>
-          </a:p>
-        </p:txBody>
-      </p:sp>
-      <p:sp>
-        <p:nvSpPr>
-          <p:cNvPr id="7" name="Footer Placeholder 6">
-            <a:extLst>
-              <a:ext uri="{FF2B5EF4-FFF2-40B4-BE49-F238E27FC236}">
-                <a16:creationId xmlns:a16="http://schemas.microsoft.com/office/drawing/2014/main" id="{BFBBBD93-BE28-4EB0-AD63-C26CC96E7E2B}"/>
-              </a:ext>
-            </a:extLst>
-          </p:cNvPr>
-          <p:cNvSpPr>
-            <a:spLocks noGrp="1"/>
-          </p:cNvSpPr>
-          <p:nvPr>
-            <p:ph type="ftr" sz="quarter" idx="11"/>
-          </p:nvPr>
-        </p:nvSpPr>
-        <p:spPr/>
-        <p:txBody>
-          <a:bodyPr/>
-          <a:lstStyle/>
-          <a:p>
-            <a:endParaRPr lang="en-GB" dirty="0"/>
-          </a:p>
-        </p:txBody>
-      </p:sp>
-    </p:spTree>
-    <p:extLst>
-      <p:ext uri="{BB962C8B-B14F-4D97-AF65-F5344CB8AC3E}">
-        <p14:creationId xmlns:p14="http://schemas.microsoft.com/office/powerpoint/2010/main" val="1988151640"/>
-      </p:ext>
-    </p:extLst>
-  </p:cSld>
-  <p:clrMapOvr>
-    <a:masterClrMapping/>
-  </p:clrMapOvr>
-</p:sld>
-</file>
-
 <file path=ppt/slides/slide14.xml><?xml version="1.0" encoding="utf-8"?>
 <p:sld xmlns:a="http://schemas.openxmlformats.org/drawingml/2006/main" xmlns:r="http://schemas.openxmlformats.org/officeDocument/2006/relationships" xmlns:p="http://schemas.openxmlformats.org/presentationml/2006/main">
   <p:cSld>
@@ -6955,7 +6849,7 @@
           <p:cNvPr id="2" name="Title 1">
             <a:extLst>
               <a:ext uri="{FF2B5EF4-FFF2-40B4-BE49-F238E27FC236}">
-                <a16:creationId xmlns:a16="http://schemas.microsoft.com/office/drawing/2014/main" id="{BAF89A68-3BA2-470F-9E49-157E55C01634}"/>
+                <a16:creationId xmlns:a16="http://schemas.microsoft.com/office/drawing/2014/main" id="{770E6EE7-B050-46D5-B12B-FF8B9068E4C3}"/>
               </a:ext>
             </a:extLst>
           </p:cNvPr>
@@ -6966,52 +6860,35 @@
             <p:ph type="title"/>
           </p:nvPr>
         </p:nvSpPr>
-        <p:spPr/>
-        <p:txBody>
-          <a:bodyPr/>
-          <a:lstStyle/>
-          <a:p>
+        <p:spPr>
+          <a:xfrm>
+            <a:off x="838200" y="2691765"/>
+            <a:ext cx="10515600" cy="1325563"/>
+          </a:xfrm>
+        </p:spPr>
+        <p:txBody>
+          <a:bodyPr>
+            <a:normAutofit/>
+          </a:bodyPr>
+          <a:lstStyle/>
+          <a:p>
+            <a:pPr algn="ctr"/>
             <a:r>
               <a:rPr lang="en-GB" dirty="0">
                 <a:latin typeface="Times New Roman" panose="02020603050405020304" pitchFamily="18" charset="0"/>
                 <a:cs typeface="Times New Roman" panose="02020603050405020304" pitchFamily="18" charset="0"/>
               </a:rPr>
-              <a:t>Finding a Dataset</a:t>
-            </a:r>
-          </a:p>
-        </p:txBody>
-      </p:sp>
-      <p:sp>
-        <p:nvSpPr>
-          <p:cNvPr id="3" name="Content Placeholder 2">
-            <a:extLst>
-              <a:ext uri="{FF2B5EF4-FFF2-40B4-BE49-F238E27FC236}">
-                <a16:creationId xmlns:a16="http://schemas.microsoft.com/office/drawing/2014/main" id="{3CF7E30B-6FAD-46D3-92E4-63B8C2A31982}"/>
-              </a:ext>
-            </a:extLst>
-          </p:cNvPr>
-          <p:cNvSpPr>
-            <a:spLocks noGrp="1"/>
-          </p:cNvSpPr>
-          <p:nvPr>
-            <p:ph idx="1"/>
-          </p:nvPr>
-        </p:nvSpPr>
-        <p:spPr/>
-        <p:txBody>
-          <a:bodyPr/>
-          <a:lstStyle/>
-          <a:p>
-            <a:endParaRPr lang="en-GB"/>
-          </a:p>
-        </p:txBody>
-      </p:sp>
-      <p:sp>
-        <p:nvSpPr>
-          <p:cNvPr id="4" name="Footer Placeholder 3">
-            <a:extLst>
-              <a:ext uri="{FF2B5EF4-FFF2-40B4-BE49-F238E27FC236}">
-                <a16:creationId xmlns:a16="http://schemas.microsoft.com/office/drawing/2014/main" id="{C6133F4D-BAB6-4492-A3BA-BFC433570E64}"/>
+              <a:t>Exploratory Data Analysis &amp; Pre-processing</a:t>
+            </a:r>
+          </a:p>
+        </p:txBody>
+      </p:sp>
+      <p:sp>
+        <p:nvSpPr>
+          <p:cNvPr id="7" name="Footer Placeholder 6">
+            <a:extLst>
+              <a:ext uri="{FF2B5EF4-FFF2-40B4-BE49-F238E27FC236}">
+                <a16:creationId xmlns:a16="http://schemas.microsoft.com/office/drawing/2014/main" id="{BFBBBD93-BE28-4EB0-AD63-C26CC96E7E2B}"/>
               </a:ext>
             </a:extLst>
           </p:cNvPr>
@@ -7027,17 +6904,14 @@
           <a:bodyPr/>
           <a:lstStyle/>
           <a:p>
-            <a:r>
-              <a:rPr lang="en-GB"/>
-              <a:t>SEC</a:t>
-            </a:r>
+            <a:endParaRPr lang="en-GB" dirty="0"/>
           </a:p>
         </p:txBody>
       </p:sp>
     </p:spTree>
     <p:extLst>
       <p:ext uri="{BB962C8B-B14F-4D97-AF65-F5344CB8AC3E}">
-        <p14:creationId xmlns:p14="http://schemas.microsoft.com/office/powerpoint/2010/main" val="2935168644"/>
+        <p14:creationId xmlns:p14="http://schemas.microsoft.com/office/powerpoint/2010/main" val="1988151640"/>
       </p:ext>
     </p:extLst>
   </p:cSld>
@@ -7069,7 +6943,7 @@
           <p:cNvPr id="2" name="Title 1">
             <a:extLst>
               <a:ext uri="{FF2B5EF4-FFF2-40B4-BE49-F238E27FC236}">
-                <a16:creationId xmlns:a16="http://schemas.microsoft.com/office/drawing/2014/main" id="{770E6EE7-B050-46D5-B12B-FF8B9068E4C3}"/>
+                <a16:creationId xmlns:a16="http://schemas.microsoft.com/office/drawing/2014/main" id="{BAF89A68-3BA2-470F-9E49-157E55C01634}"/>
               </a:ext>
             </a:extLst>
           </p:cNvPr>
@@ -7080,35 +6954,89 @@
             <p:ph type="title"/>
           </p:nvPr>
         </p:nvSpPr>
-        <p:spPr>
-          <a:xfrm>
-            <a:off x="838200" y="2691765"/>
-            <a:ext cx="10515600" cy="1325563"/>
-          </a:xfrm>
-        </p:spPr>
-        <p:txBody>
-          <a:bodyPr>
-            <a:normAutofit/>
-          </a:bodyPr>
-          <a:lstStyle/>
-          <a:p>
-            <a:pPr algn="ctr"/>
+        <p:spPr/>
+        <p:txBody>
+          <a:bodyPr/>
+          <a:lstStyle/>
+          <a:p>
             <a:r>
               <a:rPr lang="en-GB" dirty="0">
                 <a:latin typeface="Times New Roman" panose="02020603050405020304" pitchFamily="18" charset="0"/>
                 <a:cs typeface="Times New Roman" panose="02020603050405020304" pitchFamily="18" charset="0"/>
               </a:rPr>
-              <a:t>Solution Development</a:t>
-            </a:r>
-          </a:p>
-        </p:txBody>
-      </p:sp>
-      <p:sp>
-        <p:nvSpPr>
-          <p:cNvPr id="7" name="Footer Placeholder 6">
-            <a:extLst>
-              <a:ext uri="{FF2B5EF4-FFF2-40B4-BE49-F238E27FC236}">
-                <a16:creationId xmlns:a16="http://schemas.microsoft.com/office/drawing/2014/main" id="{BFBBBD93-BE28-4EB0-AD63-C26CC96E7E2B}"/>
+              <a:t>Finding a Dataset</a:t>
+            </a:r>
+          </a:p>
+        </p:txBody>
+      </p:sp>
+      <p:sp>
+        <p:nvSpPr>
+          <p:cNvPr id="3" name="Content Placeholder 2">
+            <a:extLst>
+              <a:ext uri="{FF2B5EF4-FFF2-40B4-BE49-F238E27FC236}">
+                <a16:creationId xmlns:a16="http://schemas.microsoft.com/office/drawing/2014/main" id="{3CF7E30B-6FAD-46D3-92E4-63B8C2A31982}"/>
+              </a:ext>
+            </a:extLst>
+          </p:cNvPr>
+          <p:cNvSpPr>
+            <a:spLocks noGrp="1"/>
+          </p:cNvSpPr>
+          <p:nvPr>
+            <p:ph idx="1"/>
+          </p:nvPr>
+        </p:nvSpPr>
+        <p:spPr>
+          <a:xfrm>
+            <a:off x="838200" y="1825625"/>
+            <a:ext cx="10515600" cy="3884295"/>
+          </a:xfrm>
+        </p:spPr>
+        <p:txBody>
+          <a:bodyPr>
+            <a:normAutofit/>
+          </a:bodyPr>
+          <a:lstStyle/>
+          <a:p>
+            <a:r>
+              <a:rPr lang="en-GB" sz="2400" dirty="0">
+                <a:latin typeface="Times New Roman" panose="02020603050405020304" pitchFamily="18" charset="0"/>
+                <a:cs typeface="Times New Roman" panose="02020603050405020304" pitchFamily="18" charset="0"/>
+              </a:rPr>
+              <a:t>Up until now all datasets used have been manually categorised – and thus are subject to personal bias.</a:t>
+            </a:r>
+          </a:p>
+          <a:p>
+            <a:r>
+              <a:rPr lang="en-GB" sz="2400" dirty="0">
+                <a:latin typeface="Times New Roman" panose="02020603050405020304" pitchFamily="18" charset="0"/>
+                <a:cs typeface="Times New Roman" panose="02020603050405020304" pitchFamily="18" charset="0"/>
+              </a:rPr>
+              <a:t>Manual categorisation requires extensive work in order to produce a sizeable dataset. The perfect dataset should be easy to extend.</a:t>
+            </a:r>
+          </a:p>
+          <a:p>
+            <a:endParaRPr lang="en-GB" sz="2400" dirty="0">
+              <a:latin typeface="Times New Roman" panose="02020603050405020304" pitchFamily="18" charset="0"/>
+              <a:cs typeface="Times New Roman" panose="02020603050405020304" pitchFamily="18" charset="0"/>
+            </a:endParaRPr>
+          </a:p>
+          <a:p>
+            <a:r>
+              <a:rPr lang="en-GB" sz="2400" dirty="0">
+                <a:latin typeface="Times New Roman" panose="02020603050405020304" pitchFamily="18" charset="0"/>
+                <a:cs typeface="Times New Roman" panose="02020603050405020304" pitchFamily="18" charset="0"/>
+              </a:rPr>
+              <a:t>Dataset must consist of two things – A topic and a question. Any dataset that includes these two items, or has a way to derive these two items is be suitable.</a:t>
+            </a:r>
+          </a:p>
+        </p:txBody>
+      </p:sp>
+      <p:sp>
+        <p:nvSpPr>
+          <p:cNvPr id="4" name="Footer Placeholder 3">
+            <a:extLst>
+              <a:ext uri="{FF2B5EF4-FFF2-40B4-BE49-F238E27FC236}">
+                <a16:creationId xmlns:a16="http://schemas.microsoft.com/office/drawing/2014/main" id="{C6133F4D-BAB6-4492-A3BA-BFC433570E64}"/>
               </a:ext>
             </a:extLst>
           </p:cNvPr>
@@ -7124,14 +7052,17 @@
           <a:bodyPr/>
           <a:lstStyle/>
           <a:p>
-            <a:endParaRPr lang="en-GB" dirty="0"/>
+            <a:r>
+              <a:rPr lang="en-GB" dirty="0"/>
+              <a:t>Exploratory Data Analysis &amp; Pre-processing</a:t>
+            </a:r>
           </a:p>
         </p:txBody>
       </p:sp>
     </p:spTree>
     <p:extLst>
       <p:ext uri="{BB962C8B-B14F-4D97-AF65-F5344CB8AC3E}">
-        <p14:creationId xmlns:p14="http://schemas.microsoft.com/office/powerpoint/2010/main" val="2765570028"/>
+        <p14:creationId xmlns:p14="http://schemas.microsoft.com/office/powerpoint/2010/main" val="2935168644"/>
       </p:ext>
     </p:extLst>
   </p:cSld>
@@ -7163,6 +7094,837 @@
           <p:cNvPr id="2" name="Title 1">
             <a:extLst>
               <a:ext uri="{FF2B5EF4-FFF2-40B4-BE49-F238E27FC236}">
+                <a16:creationId xmlns:a16="http://schemas.microsoft.com/office/drawing/2014/main" id="{BAF89A68-3BA2-470F-9E49-157E55C01634}"/>
+              </a:ext>
+            </a:extLst>
+          </p:cNvPr>
+          <p:cNvSpPr>
+            <a:spLocks noGrp="1"/>
+          </p:cNvSpPr>
+          <p:nvPr>
+            <p:ph type="title"/>
+          </p:nvPr>
+        </p:nvSpPr>
+        <p:spPr/>
+        <p:txBody>
+          <a:bodyPr/>
+          <a:lstStyle/>
+          <a:p>
+            <a:r>
+              <a:rPr lang="en-GB" dirty="0">
+                <a:latin typeface="Times New Roman" panose="02020603050405020304" pitchFamily="18" charset="0"/>
+                <a:cs typeface="Times New Roman" panose="02020603050405020304" pitchFamily="18" charset="0"/>
+              </a:rPr>
+              <a:t>Stack Exchange API</a:t>
+            </a:r>
+          </a:p>
+        </p:txBody>
+      </p:sp>
+      <p:sp>
+        <p:nvSpPr>
+          <p:cNvPr id="3" name="Content Placeholder 2">
+            <a:extLst>
+              <a:ext uri="{FF2B5EF4-FFF2-40B4-BE49-F238E27FC236}">
+                <a16:creationId xmlns:a16="http://schemas.microsoft.com/office/drawing/2014/main" id="{3CF7E30B-6FAD-46D3-92E4-63B8C2A31982}"/>
+              </a:ext>
+            </a:extLst>
+          </p:cNvPr>
+          <p:cNvSpPr>
+            <a:spLocks noGrp="1"/>
+          </p:cNvSpPr>
+          <p:nvPr>
+            <p:ph idx="1"/>
+          </p:nvPr>
+        </p:nvSpPr>
+        <p:spPr>
+          <a:xfrm>
+            <a:off x="838200" y="1825625"/>
+            <a:ext cx="10297160" cy="4351338"/>
+          </a:xfrm>
+        </p:spPr>
+        <p:txBody>
+          <a:bodyPr>
+            <a:normAutofit/>
+          </a:bodyPr>
+          <a:lstStyle/>
+          <a:p>
+            <a:pPr marL="0" indent="0">
+              <a:buNone/>
+            </a:pPr>
+            <a:r>
+              <a:rPr lang="en-GB" sz="2000" dirty="0">
+                <a:latin typeface="Times New Roman" panose="02020603050405020304" pitchFamily="18" charset="0"/>
+                <a:cs typeface="Times New Roman" panose="02020603050405020304" pitchFamily="18" charset="0"/>
+              </a:rPr>
+              <a:t>Stack Exchange is a group of websites that allow users to pose questions and receive user-submitted answers. There are a number of stack overflow websites, each specialised to a specific topic, and even within the topics, questions are required to be given tags that narrow down their field even further.</a:t>
+            </a:r>
+          </a:p>
+          <a:p>
+            <a:pPr marL="0" indent="0">
+              <a:buNone/>
+            </a:pPr>
+            <a:endParaRPr lang="en-GB" sz="2000" dirty="0">
+              <a:latin typeface="Times New Roman" panose="02020603050405020304" pitchFamily="18" charset="0"/>
+              <a:cs typeface="Times New Roman" panose="02020603050405020304" pitchFamily="18" charset="0"/>
+            </a:endParaRPr>
+          </a:p>
+          <a:p>
+            <a:pPr marL="0" indent="0">
+              <a:buNone/>
+            </a:pPr>
+            <a:r>
+              <a:rPr lang="en-GB" sz="2000" dirty="0">
+                <a:latin typeface="Times New Roman" panose="02020603050405020304" pitchFamily="18" charset="0"/>
+                <a:cs typeface="Times New Roman" panose="02020603050405020304" pitchFamily="18" charset="0"/>
+              </a:rPr>
+              <a:t>Stack Exchange offers API support – allowing developers to query their questions and return masses of results. Notably, the API functionality allows tags to be specified.</a:t>
+            </a:r>
+          </a:p>
+          <a:p>
+            <a:pPr marL="0" indent="0">
+              <a:buNone/>
+            </a:pPr>
+            <a:endParaRPr lang="en-GB" sz="2000" dirty="0">
+              <a:latin typeface="Times New Roman" panose="02020603050405020304" pitchFamily="18" charset="0"/>
+              <a:cs typeface="Times New Roman" panose="02020603050405020304" pitchFamily="18" charset="0"/>
+            </a:endParaRPr>
+          </a:p>
+          <a:p>
+            <a:pPr marL="0" indent="0">
+              <a:buNone/>
+            </a:pPr>
+            <a:r>
+              <a:rPr lang="en-GB" sz="2000" dirty="0">
+                <a:latin typeface="Times New Roman" panose="02020603050405020304" pitchFamily="18" charset="0"/>
+                <a:cs typeface="Times New Roman" panose="02020603050405020304" pitchFamily="18" charset="0"/>
+              </a:rPr>
+              <a:t>By making API requests for a specific tag, a list of questions relating to that tag can be returned. If this is done for multiple tags and with a big enough volume of questions, a dataset can be compiled linking the topic and the question.</a:t>
+            </a:r>
+          </a:p>
+        </p:txBody>
+      </p:sp>
+      <p:sp>
+        <p:nvSpPr>
+          <p:cNvPr id="4" name="Footer Placeholder 3">
+            <a:extLst>
+              <a:ext uri="{FF2B5EF4-FFF2-40B4-BE49-F238E27FC236}">
+                <a16:creationId xmlns:a16="http://schemas.microsoft.com/office/drawing/2014/main" id="{C6133F4D-BAB6-4492-A3BA-BFC433570E64}"/>
+              </a:ext>
+            </a:extLst>
+          </p:cNvPr>
+          <p:cNvSpPr>
+            <a:spLocks noGrp="1"/>
+          </p:cNvSpPr>
+          <p:nvPr>
+            <p:ph type="ftr" sz="quarter" idx="11"/>
+          </p:nvPr>
+        </p:nvSpPr>
+        <p:spPr/>
+        <p:txBody>
+          <a:bodyPr/>
+          <a:lstStyle/>
+          <a:p>
+            <a:r>
+              <a:rPr lang="en-GB" dirty="0"/>
+              <a:t>Exploratory Data Analysis &amp; Pre-processing</a:t>
+            </a:r>
+          </a:p>
+        </p:txBody>
+      </p:sp>
+      <p:pic>
+        <p:nvPicPr>
+          <p:cNvPr id="1026" name="Picture 2" descr="Stack Exchange (@StackExchange) / Twitter">
+            <a:extLst>
+              <a:ext uri="{FF2B5EF4-FFF2-40B4-BE49-F238E27FC236}">
+                <a16:creationId xmlns:a16="http://schemas.microsoft.com/office/drawing/2014/main" id="{9DF15D1F-29FB-404F-A9B3-91D7F6FB1FFE}"/>
+              </a:ext>
+            </a:extLst>
+          </p:cNvPr>
+          <p:cNvPicPr>
+            <a:picLocks noChangeAspect="1" noChangeArrowheads="1"/>
+          </p:cNvPicPr>
+          <p:nvPr/>
+        </p:nvPicPr>
+        <p:blipFill>
+          <a:blip r:embed="rId3">
+            <a:extLst>
+              <a:ext uri="{28A0092B-C50C-407E-A947-70E740481C1C}">
+                <a14:useLocalDpi xmlns:a14="http://schemas.microsoft.com/office/drawing/2010/main" val="0"/>
+              </a:ext>
+            </a:extLst>
+          </a:blip>
+          <a:srcRect/>
+          <a:stretch>
+            <a:fillRect/>
+          </a:stretch>
+        </p:blipFill>
+        <p:spPr bwMode="auto">
+          <a:xfrm>
+            <a:off x="10256678" y="149224"/>
+            <a:ext cx="1757363" cy="1757363"/>
+          </a:xfrm>
+          <a:prstGeom prst="rect">
+            <a:avLst/>
+          </a:prstGeom>
+          <a:noFill/>
+          <a:extLst>
+            <a:ext uri="{909E8E84-426E-40DD-AFC4-6F175D3DCCD1}">
+              <a14:hiddenFill xmlns:a14="http://schemas.microsoft.com/office/drawing/2010/main">
+                <a:solidFill>
+                  <a:srgbClr val="FFFFFF"/>
+                </a:solidFill>
+              </a14:hiddenFill>
+            </a:ext>
+          </a:extLst>
+        </p:spPr>
+      </p:pic>
+    </p:spTree>
+    <p:extLst>
+      <p:ext uri="{BB962C8B-B14F-4D97-AF65-F5344CB8AC3E}">
+        <p14:creationId xmlns:p14="http://schemas.microsoft.com/office/powerpoint/2010/main" val="2365649792"/>
+      </p:ext>
+    </p:extLst>
+  </p:cSld>
+  <p:clrMapOvr>
+    <a:masterClrMapping/>
+  </p:clrMapOvr>
+</p:sld>
+</file>
+
+<file path=ppt/slides/slide17.xml><?xml version="1.0" encoding="utf-8"?>
+<p:sld xmlns:a="http://schemas.openxmlformats.org/drawingml/2006/main" xmlns:r="http://schemas.openxmlformats.org/officeDocument/2006/relationships" xmlns:p="http://schemas.openxmlformats.org/presentationml/2006/main">
+  <p:cSld>
+    <p:spTree>
+      <p:nvGrpSpPr>
+        <p:cNvPr id="1" name=""/>
+        <p:cNvGrpSpPr/>
+        <p:nvPr/>
+      </p:nvGrpSpPr>
+      <p:grpSpPr>
+        <a:xfrm>
+          <a:off x="0" y="0"/>
+          <a:ext cx="0" cy="0"/>
+          <a:chOff x="0" y="0"/>
+          <a:chExt cx="0" cy="0"/>
+        </a:xfrm>
+      </p:grpSpPr>
+      <p:sp>
+        <p:nvSpPr>
+          <p:cNvPr id="2" name="Title 1">
+            <a:extLst>
+              <a:ext uri="{FF2B5EF4-FFF2-40B4-BE49-F238E27FC236}">
+                <a16:creationId xmlns:a16="http://schemas.microsoft.com/office/drawing/2014/main" id="{BAF89A68-3BA2-470F-9E49-157E55C01634}"/>
+              </a:ext>
+            </a:extLst>
+          </p:cNvPr>
+          <p:cNvSpPr>
+            <a:spLocks noGrp="1"/>
+          </p:cNvSpPr>
+          <p:nvPr>
+            <p:ph type="title"/>
+          </p:nvPr>
+        </p:nvSpPr>
+        <p:spPr/>
+        <p:txBody>
+          <a:bodyPr/>
+          <a:lstStyle/>
+          <a:p>
+            <a:r>
+              <a:rPr lang="en-GB" dirty="0">
+                <a:latin typeface="Times New Roman" panose="02020603050405020304" pitchFamily="18" charset="0"/>
+                <a:cs typeface="Times New Roman" panose="02020603050405020304" pitchFamily="18" charset="0"/>
+              </a:rPr>
+              <a:t>Stack Exchange API</a:t>
+            </a:r>
+          </a:p>
+        </p:txBody>
+      </p:sp>
+      <p:sp>
+        <p:nvSpPr>
+          <p:cNvPr id="3" name="Content Placeholder 2">
+            <a:extLst>
+              <a:ext uri="{FF2B5EF4-FFF2-40B4-BE49-F238E27FC236}">
+                <a16:creationId xmlns:a16="http://schemas.microsoft.com/office/drawing/2014/main" id="{3CF7E30B-6FAD-46D3-92E4-63B8C2A31982}"/>
+              </a:ext>
+            </a:extLst>
+          </p:cNvPr>
+          <p:cNvSpPr>
+            <a:spLocks noGrp="1"/>
+          </p:cNvSpPr>
+          <p:nvPr>
+            <p:ph idx="1"/>
+          </p:nvPr>
+        </p:nvSpPr>
+        <p:spPr>
+          <a:xfrm>
+            <a:off x="838200" y="1690688"/>
+            <a:ext cx="6720840" cy="3673792"/>
+          </a:xfrm>
+        </p:spPr>
+        <p:txBody>
+          <a:bodyPr>
+            <a:normAutofit/>
+          </a:bodyPr>
+          <a:lstStyle/>
+          <a:p>
+            <a:r>
+              <a:rPr lang="en-GB" sz="2000" dirty="0">
+                <a:latin typeface="Times New Roman" panose="02020603050405020304" pitchFamily="18" charset="0"/>
+                <a:cs typeface="Times New Roman" panose="02020603050405020304" pitchFamily="18" charset="0"/>
+              </a:rPr>
+              <a:t>Limited the scope of the task to just finance and money – effectively making the AI a banking customer service chatbot.</a:t>
+            </a:r>
+          </a:p>
+          <a:p>
+            <a:r>
+              <a:rPr lang="en-GB" sz="2000" dirty="0">
+                <a:latin typeface="Times New Roman" panose="02020603050405020304" pitchFamily="18" charset="0"/>
+                <a:cs typeface="Times New Roman" panose="02020603050405020304" pitchFamily="18" charset="0"/>
+              </a:rPr>
+              <a:t>Used the website </a:t>
+            </a:r>
+            <a:r>
+              <a:rPr lang="en-GB" sz="2000" i="1" dirty="0">
+                <a:latin typeface="Times New Roman" panose="02020603050405020304" pitchFamily="18" charset="0"/>
+                <a:cs typeface="Times New Roman" panose="02020603050405020304" pitchFamily="18" charset="0"/>
+                <a:hlinkClick r:id="rId3"/>
+              </a:rPr>
+              <a:t>https://money.stackexchange.com/</a:t>
+            </a:r>
+            <a:r>
+              <a:rPr lang="en-GB" sz="2000" i="1" dirty="0">
+                <a:latin typeface="Times New Roman" panose="02020603050405020304" pitchFamily="18" charset="0"/>
+                <a:cs typeface="Times New Roman" panose="02020603050405020304" pitchFamily="18" charset="0"/>
+              </a:rPr>
+              <a:t> </a:t>
+            </a:r>
+            <a:r>
+              <a:rPr lang="en-GB" sz="2000" dirty="0">
+                <a:latin typeface="Times New Roman" panose="02020603050405020304" pitchFamily="18" charset="0"/>
+                <a:cs typeface="Times New Roman" panose="02020603050405020304" pitchFamily="18" charset="0"/>
+              </a:rPr>
+              <a:t>as the target for the API.</a:t>
+            </a:r>
+          </a:p>
+          <a:p>
+            <a:r>
+              <a:rPr lang="en-GB" sz="2000" dirty="0">
+                <a:latin typeface="Times New Roman" panose="02020603050405020304" pitchFamily="18" charset="0"/>
+                <a:cs typeface="Times New Roman" panose="02020603050405020304" pitchFamily="18" charset="0"/>
+              </a:rPr>
+              <a:t>Pulled 500 questions relating to eight topics - bankruptcy, taxes, stocks, loans, scams, pensions, real estate and 401k.</a:t>
+            </a:r>
+          </a:p>
+          <a:p>
+            <a:r>
+              <a:rPr lang="en-GB" sz="2000" dirty="0">
+                <a:latin typeface="Times New Roman" panose="02020603050405020304" pitchFamily="18" charset="0"/>
+                <a:cs typeface="Times New Roman" panose="02020603050405020304" pitchFamily="18" charset="0"/>
+              </a:rPr>
+              <a:t>If a topic didn’t have enough questions, only pulled the available questions</a:t>
+            </a:r>
+          </a:p>
+          <a:p>
+            <a:r>
+              <a:rPr lang="en-GB" sz="2000" dirty="0">
+                <a:latin typeface="Times New Roman" panose="02020603050405020304" pitchFamily="18" charset="0"/>
+                <a:cs typeface="Times New Roman" panose="02020603050405020304" pitchFamily="18" charset="0"/>
+              </a:rPr>
+              <a:t>This produced roughly 3000 questions with their associated topics – with the potential to request more if needed</a:t>
+            </a:r>
+          </a:p>
+        </p:txBody>
+      </p:sp>
+      <p:sp>
+        <p:nvSpPr>
+          <p:cNvPr id="4" name="Footer Placeholder 3">
+            <a:extLst>
+              <a:ext uri="{FF2B5EF4-FFF2-40B4-BE49-F238E27FC236}">
+                <a16:creationId xmlns:a16="http://schemas.microsoft.com/office/drawing/2014/main" id="{C6133F4D-BAB6-4492-A3BA-BFC433570E64}"/>
+              </a:ext>
+            </a:extLst>
+          </p:cNvPr>
+          <p:cNvSpPr>
+            <a:spLocks noGrp="1"/>
+          </p:cNvSpPr>
+          <p:nvPr>
+            <p:ph type="ftr" sz="quarter" idx="11"/>
+          </p:nvPr>
+        </p:nvSpPr>
+        <p:spPr/>
+        <p:txBody>
+          <a:bodyPr/>
+          <a:lstStyle/>
+          <a:p>
+            <a:r>
+              <a:rPr lang="en-GB" dirty="0"/>
+              <a:t>Exploratory Data Analysis &amp; Pre-processing</a:t>
+            </a:r>
+          </a:p>
+        </p:txBody>
+      </p:sp>
+      <p:sp>
+        <p:nvSpPr>
+          <p:cNvPr id="6" name="TextBox 5">
+            <a:extLst>
+              <a:ext uri="{FF2B5EF4-FFF2-40B4-BE49-F238E27FC236}">
+                <a16:creationId xmlns:a16="http://schemas.microsoft.com/office/drawing/2014/main" id="{687FA484-6FC0-40F8-AD80-BFC194D3764B}"/>
+              </a:ext>
+            </a:extLst>
+          </p:cNvPr>
+          <p:cNvSpPr txBox="1"/>
+          <p:nvPr/>
+        </p:nvSpPr>
+        <p:spPr>
+          <a:xfrm>
+            <a:off x="838200" y="5583415"/>
+            <a:ext cx="10515600" cy="276999"/>
+          </a:xfrm>
+          <a:prstGeom prst="rect">
+            <a:avLst/>
+          </a:prstGeom>
+          <a:noFill/>
+        </p:spPr>
+        <p:txBody>
+          <a:bodyPr wrap="square">
+            <a:spAutoFit/>
+          </a:bodyPr>
+          <a:lstStyle/>
+          <a:p>
+            <a:r>
+              <a:rPr lang="en-GB" sz="1200" dirty="0">
+                <a:latin typeface="Consolas" panose="020B0609020204030204" pitchFamily="49" charset="0"/>
+              </a:rPr>
+              <a:t>https://api.stackexchange.com/2.3/questions?site=money&amp;key=</a:t>
+            </a:r>
+            <a:r>
+              <a:rPr lang="en-GB" sz="1200" b="1" dirty="0">
+                <a:latin typeface="Consolas" panose="020B0609020204030204" pitchFamily="49" charset="0"/>
+              </a:rPr>
+              <a:t>[REDACTED]</a:t>
+            </a:r>
+            <a:r>
+              <a:rPr lang="en-GB" sz="1200" dirty="0">
+                <a:latin typeface="Consolas" panose="020B0609020204030204" pitchFamily="49" charset="0"/>
+              </a:rPr>
+              <a:t>&amp;tagged=bankruptcy&amp;sort=activity&amp;pagesize=100&amp;page=1</a:t>
+            </a:r>
+          </a:p>
+        </p:txBody>
+      </p:sp>
+      <p:pic>
+        <p:nvPicPr>
+          <p:cNvPr id="8" name="Picture 7">
+            <a:extLst>
+              <a:ext uri="{FF2B5EF4-FFF2-40B4-BE49-F238E27FC236}">
+                <a16:creationId xmlns:a16="http://schemas.microsoft.com/office/drawing/2014/main" id="{C2736E28-07C9-4174-BF1C-5BE409BBCD8E}"/>
+              </a:ext>
+            </a:extLst>
+          </p:cNvPr>
+          <p:cNvPicPr>
+            <a:picLocks noChangeAspect="1"/>
+          </p:cNvPicPr>
+          <p:nvPr/>
+        </p:nvPicPr>
+        <p:blipFill>
+          <a:blip r:embed="rId4"/>
+          <a:stretch>
+            <a:fillRect/>
+          </a:stretch>
+        </p:blipFill>
+        <p:spPr>
+          <a:xfrm>
+            <a:off x="7559040" y="1761842"/>
+            <a:ext cx="4085100" cy="2993708"/>
+          </a:xfrm>
+          <a:prstGeom prst="rect">
+            <a:avLst/>
+          </a:prstGeom>
+        </p:spPr>
+      </p:pic>
+    </p:spTree>
+    <p:extLst>
+      <p:ext uri="{BB962C8B-B14F-4D97-AF65-F5344CB8AC3E}">
+        <p14:creationId xmlns:p14="http://schemas.microsoft.com/office/powerpoint/2010/main" val="3544150351"/>
+      </p:ext>
+    </p:extLst>
+  </p:cSld>
+  <p:clrMapOvr>
+    <a:masterClrMapping/>
+  </p:clrMapOvr>
+</p:sld>
+</file>
+
+<file path=ppt/slides/slide18.xml><?xml version="1.0" encoding="utf-8"?>
+<p:sld xmlns:a="http://schemas.openxmlformats.org/drawingml/2006/main" xmlns:r="http://schemas.openxmlformats.org/officeDocument/2006/relationships" xmlns:p="http://schemas.openxmlformats.org/presentationml/2006/main">
+  <p:cSld>
+    <p:spTree>
+      <p:nvGrpSpPr>
+        <p:cNvPr id="1" name=""/>
+        <p:cNvGrpSpPr/>
+        <p:nvPr/>
+      </p:nvGrpSpPr>
+      <p:grpSpPr>
+        <a:xfrm>
+          <a:off x="0" y="0"/>
+          <a:ext cx="0" cy="0"/>
+          <a:chOff x="0" y="0"/>
+          <a:chExt cx="0" cy="0"/>
+        </a:xfrm>
+      </p:grpSpPr>
+      <p:sp>
+        <p:nvSpPr>
+          <p:cNvPr id="2" name="Title 1">
+            <a:extLst>
+              <a:ext uri="{FF2B5EF4-FFF2-40B4-BE49-F238E27FC236}">
+                <a16:creationId xmlns:a16="http://schemas.microsoft.com/office/drawing/2014/main" id="{78C28E79-1E9E-424C-A6B7-3E3A1814FAA0}"/>
+              </a:ext>
+            </a:extLst>
+          </p:cNvPr>
+          <p:cNvSpPr>
+            <a:spLocks noGrp="1"/>
+          </p:cNvSpPr>
+          <p:nvPr>
+            <p:ph type="title"/>
+          </p:nvPr>
+        </p:nvSpPr>
+        <p:spPr/>
+        <p:txBody>
+          <a:bodyPr/>
+          <a:lstStyle/>
+          <a:p>
+            <a:r>
+              <a:rPr lang="en-GB" dirty="0">
+                <a:latin typeface="Times New Roman" panose="02020603050405020304" pitchFamily="18" charset="0"/>
+                <a:cs typeface="Times New Roman" panose="02020603050405020304" pitchFamily="18" charset="0"/>
+              </a:rPr>
+              <a:t>Unsanitized Testing</a:t>
+            </a:r>
+          </a:p>
+        </p:txBody>
+      </p:sp>
+      <p:sp>
+        <p:nvSpPr>
+          <p:cNvPr id="4" name="Footer Placeholder 3">
+            <a:extLst>
+              <a:ext uri="{FF2B5EF4-FFF2-40B4-BE49-F238E27FC236}">
+                <a16:creationId xmlns:a16="http://schemas.microsoft.com/office/drawing/2014/main" id="{161C8FD0-3C47-42BD-AAEA-0D666D8F1A16}"/>
+              </a:ext>
+            </a:extLst>
+          </p:cNvPr>
+          <p:cNvSpPr>
+            <a:spLocks noGrp="1"/>
+          </p:cNvSpPr>
+          <p:nvPr>
+            <p:ph type="ftr" sz="quarter" idx="11"/>
+          </p:nvPr>
+        </p:nvSpPr>
+        <p:spPr/>
+        <p:txBody>
+          <a:bodyPr/>
+          <a:lstStyle/>
+          <a:p>
+            <a:r>
+              <a:rPr lang="en-GB" dirty="0"/>
+              <a:t>Exploratory Data Analysis &amp; Pre-processing</a:t>
+            </a:r>
+          </a:p>
+        </p:txBody>
+      </p:sp>
+      <p:sp>
+        <p:nvSpPr>
+          <p:cNvPr id="9" name="Content Placeholder 2">
+            <a:extLst>
+              <a:ext uri="{FF2B5EF4-FFF2-40B4-BE49-F238E27FC236}">
+                <a16:creationId xmlns:a16="http://schemas.microsoft.com/office/drawing/2014/main" id="{D099458A-BDF7-4D85-983B-6973AEF17098}"/>
+              </a:ext>
+            </a:extLst>
+          </p:cNvPr>
+          <p:cNvSpPr txBox="1">
+            <a:spLocks/>
+          </p:cNvSpPr>
+          <p:nvPr/>
+        </p:nvSpPr>
+        <p:spPr>
+          <a:xfrm>
+            <a:off x="838200" y="1690688"/>
+            <a:ext cx="7035800" cy="4135120"/>
+          </a:xfrm>
+          <a:prstGeom prst="rect">
+            <a:avLst/>
+          </a:prstGeom>
+        </p:spPr>
+        <p:txBody>
+          <a:bodyPr vert="horz" lIns="91440" tIns="45720" rIns="91440" bIns="45720" rtlCol="0">
+            <a:normAutofit/>
+          </a:bodyPr>
+          <a:lstStyle>
+            <a:lvl1pPr marL="228600" indent="-228600" algn="l" defTabSz="914400" rtl="0" eaLnBrk="1" latinLnBrk="0" hangingPunct="1">
+              <a:lnSpc>
+                <a:spcPct val="90000"/>
+              </a:lnSpc>
+              <a:spcBef>
+                <a:spcPts val="1000"/>
+              </a:spcBef>
+              <a:buFont typeface="Arial" panose="020B0604020202020204" pitchFamily="34" charset="0"/>
+              <a:buChar char="•"/>
+              <a:defRPr sz="2800" kern="1200">
+                <a:solidFill>
+                  <a:schemeClr val="tx1"/>
+                </a:solidFill>
+                <a:latin typeface="+mn-lt"/>
+                <a:ea typeface="+mn-ea"/>
+                <a:cs typeface="+mn-cs"/>
+              </a:defRPr>
+            </a:lvl1pPr>
+            <a:lvl2pPr marL="685800" indent="-228600" algn="l" defTabSz="914400" rtl="0" eaLnBrk="1" latinLnBrk="0" hangingPunct="1">
+              <a:lnSpc>
+                <a:spcPct val="90000"/>
+              </a:lnSpc>
+              <a:spcBef>
+                <a:spcPts val="500"/>
+              </a:spcBef>
+              <a:buFont typeface="Arial" panose="020B0604020202020204" pitchFamily="34" charset="0"/>
+              <a:buChar char="•"/>
+              <a:defRPr sz="2400" kern="1200">
+                <a:solidFill>
+                  <a:schemeClr val="tx1"/>
+                </a:solidFill>
+                <a:latin typeface="+mn-lt"/>
+                <a:ea typeface="+mn-ea"/>
+                <a:cs typeface="+mn-cs"/>
+              </a:defRPr>
+            </a:lvl2pPr>
+            <a:lvl3pPr marL="1143000" indent="-228600" algn="l" defTabSz="914400" rtl="0" eaLnBrk="1" latinLnBrk="0" hangingPunct="1">
+              <a:lnSpc>
+                <a:spcPct val="90000"/>
+              </a:lnSpc>
+              <a:spcBef>
+                <a:spcPts val="500"/>
+              </a:spcBef>
+              <a:buFont typeface="Arial" panose="020B0604020202020204" pitchFamily="34" charset="0"/>
+              <a:buChar char="•"/>
+              <a:defRPr sz="2000" kern="1200">
+                <a:solidFill>
+                  <a:schemeClr val="tx1"/>
+                </a:solidFill>
+                <a:latin typeface="+mn-lt"/>
+                <a:ea typeface="+mn-ea"/>
+                <a:cs typeface="+mn-cs"/>
+              </a:defRPr>
+            </a:lvl3pPr>
+            <a:lvl4pPr marL="1600200" indent="-228600" algn="l" defTabSz="914400" rtl="0" eaLnBrk="1" latinLnBrk="0" hangingPunct="1">
+              <a:lnSpc>
+                <a:spcPct val="90000"/>
+              </a:lnSpc>
+              <a:spcBef>
+                <a:spcPts val="500"/>
+              </a:spcBef>
+              <a:buFont typeface="Arial" panose="020B0604020202020204" pitchFamily="34" charset="0"/>
+              <a:buChar char="•"/>
+              <a:defRPr sz="1800" kern="1200">
+                <a:solidFill>
+                  <a:schemeClr val="tx1"/>
+                </a:solidFill>
+                <a:latin typeface="+mn-lt"/>
+                <a:ea typeface="+mn-ea"/>
+                <a:cs typeface="+mn-cs"/>
+              </a:defRPr>
+            </a:lvl4pPr>
+            <a:lvl5pPr marL="2057400" indent="-228600" algn="l" defTabSz="914400" rtl="0" eaLnBrk="1" latinLnBrk="0" hangingPunct="1">
+              <a:lnSpc>
+                <a:spcPct val="90000"/>
+              </a:lnSpc>
+              <a:spcBef>
+                <a:spcPts val="500"/>
+              </a:spcBef>
+              <a:buFont typeface="Arial" panose="020B0604020202020204" pitchFamily="34" charset="0"/>
+              <a:buChar char="•"/>
+              <a:defRPr sz="1800" kern="1200">
+                <a:solidFill>
+                  <a:schemeClr val="tx1"/>
+                </a:solidFill>
+                <a:latin typeface="+mn-lt"/>
+                <a:ea typeface="+mn-ea"/>
+                <a:cs typeface="+mn-cs"/>
+              </a:defRPr>
+            </a:lvl5pPr>
+            <a:lvl6pPr marL="2514600" indent="-228600" algn="l" defTabSz="914400" rtl="0" eaLnBrk="1" latinLnBrk="0" hangingPunct="1">
+              <a:lnSpc>
+                <a:spcPct val="90000"/>
+              </a:lnSpc>
+              <a:spcBef>
+                <a:spcPts val="500"/>
+              </a:spcBef>
+              <a:buFont typeface="Arial" panose="020B0604020202020204" pitchFamily="34" charset="0"/>
+              <a:buChar char="•"/>
+              <a:defRPr sz="1800" kern="1200">
+                <a:solidFill>
+                  <a:schemeClr val="tx1"/>
+                </a:solidFill>
+                <a:latin typeface="+mn-lt"/>
+                <a:ea typeface="+mn-ea"/>
+                <a:cs typeface="+mn-cs"/>
+              </a:defRPr>
+            </a:lvl6pPr>
+            <a:lvl7pPr marL="2971800" indent="-228600" algn="l" defTabSz="914400" rtl="0" eaLnBrk="1" latinLnBrk="0" hangingPunct="1">
+              <a:lnSpc>
+                <a:spcPct val="90000"/>
+              </a:lnSpc>
+              <a:spcBef>
+                <a:spcPts val="500"/>
+              </a:spcBef>
+              <a:buFont typeface="Arial" panose="020B0604020202020204" pitchFamily="34" charset="0"/>
+              <a:buChar char="•"/>
+              <a:defRPr sz="1800" kern="1200">
+                <a:solidFill>
+                  <a:schemeClr val="tx1"/>
+                </a:solidFill>
+                <a:latin typeface="+mn-lt"/>
+                <a:ea typeface="+mn-ea"/>
+                <a:cs typeface="+mn-cs"/>
+              </a:defRPr>
+            </a:lvl7pPr>
+            <a:lvl8pPr marL="3429000" indent="-228600" algn="l" defTabSz="914400" rtl="0" eaLnBrk="1" latinLnBrk="0" hangingPunct="1">
+              <a:lnSpc>
+                <a:spcPct val="90000"/>
+              </a:lnSpc>
+              <a:spcBef>
+                <a:spcPts val="500"/>
+              </a:spcBef>
+              <a:buFont typeface="Arial" panose="020B0604020202020204" pitchFamily="34" charset="0"/>
+              <a:buChar char="•"/>
+              <a:defRPr sz="1800" kern="1200">
+                <a:solidFill>
+                  <a:schemeClr val="tx1"/>
+                </a:solidFill>
+                <a:latin typeface="+mn-lt"/>
+                <a:ea typeface="+mn-ea"/>
+                <a:cs typeface="+mn-cs"/>
+              </a:defRPr>
+            </a:lvl8pPr>
+            <a:lvl9pPr marL="3886200" indent="-228600" algn="l" defTabSz="914400" rtl="0" eaLnBrk="1" latinLnBrk="0" hangingPunct="1">
+              <a:lnSpc>
+                <a:spcPct val="90000"/>
+              </a:lnSpc>
+              <a:spcBef>
+                <a:spcPts val="500"/>
+              </a:spcBef>
+              <a:buFont typeface="Arial" panose="020B0604020202020204" pitchFamily="34" charset="0"/>
+              <a:buChar char="•"/>
+              <a:defRPr sz="1800" kern="1200">
+                <a:solidFill>
+                  <a:schemeClr val="tx1"/>
+                </a:solidFill>
+                <a:latin typeface="+mn-lt"/>
+                <a:ea typeface="+mn-ea"/>
+                <a:cs typeface="+mn-cs"/>
+              </a:defRPr>
+            </a:lvl9pPr>
+          </a:lstStyle>
+          <a:p>
+            <a:r>
+              <a:rPr lang="en-GB" sz="2000" dirty="0">
+                <a:latin typeface="Times New Roman" panose="02020603050405020304" pitchFamily="18" charset="0"/>
+                <a:cs typeface="Times New Roman" panose="02020603050405020304" pitchFamily="18" charset="0"/>
+              </a:rPr>
+              <a:t>To evaluate the suitability of the dataset towards the model, the model was tested with the uncleaned data to provide an indication of the minimum expected results when using this dataset</a:t>
+            </a:r>
+          </a:p>
+          <a:p>
+            <a:r>
+              <a:rPr lang="en-GB" sz="2000" dirty="0">
+                <a:latin typeface="Times New Roman" panose="02020603050405020304" pitchFamily="18" charset="0"/>
+                <a:cs typeface="Times New Roman" panose="02020603050405020304" pitchFamily="18" charset="0"/>
+              </a:rPr>
+              <a:t>Provided with a 70/30 training/test split and tested with 30 different permutations</a:t>
+            </a:r>
+          </a:p>
+          <a:p>
+            <a:r>
+              <a:rPr lang="en-GB" sz="2000" dirty="0">
+                <a:latin typeface="Times New Roman" panose="02020603050405020304" pitchFamily="18" charset="0"/>
+                <a:cs typeface="Times New Roman" panose="02020603050405020304" pitchFamily="18" charset="0"/>
+              </a:rPr>
+              <a:t>Results consistently ranged from 67-73% accuracy</a:t>
+            </a:r>
+          </a:p>
+          <a:p>
+            <a:r>
+              <a:rPr lang="en-GB" sz="2000" dirty="0">
+                <a:latin typeface="Times New Roman" panose="02020603050405020304" pitchFamily="18" charset="0"/>
+                <a:cs typeface="Times New Roman" panose="02020603050405020304" pitchFamily="18" charset="0"/>
+              </a:rPr>
+              <a:t>When inputting manual data, there were very few incorrect predictions. However, irrelevant or nonsensical inputs would often still receive a high similarity score to a topic.</a:t>
+            </a:r>
+          </a:p>
+        </p:txBody>
+      </p:sp>
+      <p:pic>
+        <p:nvPicPr>
+          <p:cNvPr id="11" name="Picture 10">
+            <a:extLst>
+              <a:ext uri="{FF2B5EF4-FFF2-40B4-BE49-F238E27FC236}">
+                <a16:creationId xmlns:a16="http://schemas.microsoft.com/office/drawing/2014/main" id="{2AA48E21-FC7F-4525-9167-90C95989B617}"/>
+              </a:ext>
+            </a:extLst>
+          </p:cNvPr>
+          <p:cNvPicPr>
+            <a:picLocks noChangeAspect="1"/>
+          </p:cNvPicPr>
+          <p:nvPr/>
+        </p:nvPicPr>
+        <p:blipFill>
+          <a:blip r:embed="rId3"/>
+          <a:stretch>
+            <a:fillRect/>
+          </a:stretch>
+        </p:blipFill>
+        <p:spPr>
+          <a:xfrm>
+            <a:off x="8153400" y="1506855"/>
+            <a:ext cx="3705225" cy="3295650"/>
+          </a:xfrm>
+          <a:prstGeom prst="rect">
+            <a:avLst/>
+          </a:prstGeom>
+        </p:spPr>
+      </p:pic>
+    </p:spTree>
+    <p:extLst>
+      <p:ext uri="{BB962C8B-B14F-4D97-AF65-F5344CB8AC3E}">
+        <p14:creationId xmlns:p14="http://schemas.microsoft.com/office/powerpoint/2010/main" val="4146135374"/>
+      </p:ext>
+    </p:extLst>
+  </p:cSld>
+  <p:clrMapOvr>
+    <a:masterClrMapping/>
+  </p:clrMapOvr>
+</p:sld>
+</file>
+
+<file path=ppt/slides/slide19.xml><?xml version="1.0" encoding="utf-8"?>
+<p:sld xmlns:a="http://schemas.openxmlformats.org/drawingml/2006/main" xmlns:r="http://schemas.openxmlformats.org/officeDocument/2006/relationships" xmlns:p="http://schemas.openxmlformats.org/presentationml/2006/main">
+  <p:cSld>
+    <p:spTree>
+      <p:nvGrpSpPr>
+        <p:cNvPr id="1" name=""/>
+        <p:cNvGrpSpPr/>
+        <p:nvPr/>
+      </p:nvGrpSpPr>
+      <p:grpSpPr>
+        <a:xfrm>
+          <a:off x="0" y="0"/>
+          <a:ext cx="0" cy="0"/>
+          <a:chOff x="0" y="0"/>
+          <a:chExt cx="0" cy="0"/>
+        </a:xfrm>
+      </p:grpSpPr>
+      <p:sp>
+        <p:nvSpPr>
+          <p:cNvPr id="2" name="Title 1">
+            <a:extLst>
+              <a:ext uri="{FF2B5EF4-FFF2-40B4-BE49-F238E27FC236}">
                 <a16:creationId xmlns:a16="http://schemas.microsoft.com/office/drawing/2014/main" id="{770E6EE7-B050-46D5-B12B-FF8B9068E4C3}"/>
               </a:ext>
             </a:extLst>
@@ -7192,7 +7954,7 @@
                 <a:latin typeface="Times New Roman" panose="02020603050405020304" pitchFamily="18" charset="0"/>
                 <a:cs typeface="Times New Roman" panose="02020603050405020304" pitchFamily="18" charset="0"/>
               </a:rPr>
-              <a:t>Evaluation</a:t>
+              <a:t>Evaluation &amp; Refinement</a:t>
             </a:r>
           </a:p>
         </p:txBody>
@@ -7286,7 +8048,7 @@
                 <a:latin typeface="Times New Roman" panose="02020603050405020304" pitchFamily="18" charset="0"/>
                 <a:cs typeface="Times New Roman" panose="02020603050405020304" pitchFamily="18" charset="0"/>
               </a:rPr>
-              <a:t>Problem Analysis - Task &amp; Library Analysis</a:t>
+              <a:t>Problem Analysis</a:t>
             </a:r>
           </a:p>
         </p:txBody>
@@ -7468,8 +8230,8 @@
           <a:lstStyle/>
           <a:p>
             <a:r>
-              <a:rPr lang="en-GB"/>
-              <a:t>SEC</a:t>
+              <a:rPr lang="en-GB" dirty="0"/>
+              <a:t>Problem Analysis</a:t>
             </a:r>
           </a:p>
         </p:txBody>
@@ -7584,6 +8346,15 @@
               <a:t>Distinctly not a prebuilt chatbot library. Spacy only intends to be a framework for NLP centric projects (such as chatbots) to build from</a:t>
             </a:r>
           </a:p>
+          <a:p>
+            <a:pPr marL="0" indent="0">
+              <a:buNone/>
+            </a:pPr>
+            <a:endParaRPr lang="en-GB" sz="2000" dirty="0">
+              <a:latin typeface="Times New Roman" panose="02020603050405020304" pitchFamily="18" charset="0"/>
+              <a:cs typeface="Times New Roman" panose="02020603050405020304" pitchFamily="18" charset="0"/>
+            </a:endParaRPr>
+          </a:p>
         </p:txBody>
       </p:sp>
       <p:sp>
@@ -7608,8 +8379,8 @@
           <a:lstStyle/>
           <a:p>
             <a:r>
-              <a:rPr lang="en-GB"/>
-              <a:t>SEC</a:t>
+              <a:rPr lang="en-GB" dirty="0"/>
+              <a:t>Problem Analysis – Library Review</a:t>
             </a:r>
           </a:p>
         </p:txBody>
@@ -7795,7 +8566,7 @@
           <a:p>
             <a:r>
               <a:rPr lang="en-GB" dirty="0"/>
-              <a:t>SEC</a:t>
+              <a:t>Problem Analysis – Library Review</a:t>
             </a:r>
           </a:p>
         </p:txBody>
@@ -7948,7 +8719,7 @@
           <a:p>
             <a:r>
               <a:rPr lang="en-GB" dirty="0"/>
-              <a:t>SEC</a:t>
+              <a:t>Problem Analysis – Library Review</a:t>
             </a:r>
           </a:p>
         </p:txBody>
@@ -8048,7 +8819,7 @@
           <p:cNvPr id="2" name="Title 1">
             <a:extLst>
               <a:ext uri="{FF2B5EF4-FFF2-40B4-BE49-F238E27FC236}">
-                <a16:creationId xmlns:a16="http://schemas.microsoft.com/office/drawing/2014/main" id="{771BB030-117A-49E4-9801-43301420CF6D}"/>
+                <a16:creationId xmlns:a16="http://schemas.microsoft.com/office/drawing/2014/main" id="{770E6EE7-B050-46D5-B12B-FF8B9068E4C3}"/>
               </a:ext>
             </a:extLst>
           </p:cNvPr>
@@ -8059,76 +8830,35 @@
             <p:ph type="title"/>
           </p:nvPr>
         </p:nvSpPr>
-        <p:spPr/>
+        <p:spPr>
+          <a:xfrm>
+            <a:off x="838200" y="2691765"/>
+            <a:ext cx="10515600" cy="1325563"/>
+          </a:xfrm>
+        </p:spPr>
         <p:txBody>
           <a:bodyPr>
             <a:normAutofit/>
           </a:bodyPr>
           <a:lstStyle/>
           <a:p>
-            <a:r>
-              <a:rPr lang="en-GB" sz="4000" dirty="0">
+            <a:pPr algn="ctr"/>
+            <a:r>
+              <a:rPr lang="en-GB" dirty="0">
                 <a:latin typeface="Times New Roman" panose="02020603050405020304" pitchFamily="18" charset="0"/>
                 <a:cs typeface="Times New Roman" panose="02020603050405020304" pitchFamily="18" charset="0"/>
               </a:rPr>
-              <a:t>Building a Simple Question Classifier in Spacy</a:t>
-            </a:r>
-          </a:p>
-        </p:txBody>
-      </p:sp>
-      <p:sp>
-        <p:nvSpPr>
-          <p:cNvPr id="3" name="Content Placeholder 2">
-            <a:extLst>
-              <a:ext uri="{FF2B5EF4-FFF2-40B4-BE49-F238E27FC236}">
-                <a16:creationId xmlns:a16="http://schemas.microsoft.com/office/drawing/2014/main" id="{33821CF8-1A7E-4E75-9437-DCC2F014FF38}"/>
-              </a:ext>
-            </a:extLst>
-          </p:cNvPr>
-          <p:cNvSpPr>
-            <a:spLocks noGrp="1"/>
-          </p:cNvSpPr>
-          <p:nvPr>
-            <p:ph idx="1"/>
-          </p:nvPr>
-        </p:nvSpPr>
-        <p:spPr>
-          <a:xfrm>
-            <a:off x="838200" y="1690688"/>
-            <a:ext cx="9890760" cy="4351338"/>
-          </a:xfrm>
-        </p:spPr>
-        <p:txBody>
-          <a:bodyPr>
-            <a:normAutofit/>
-          </a:bodyPr>
-          <a:lstStyle/>
-          <a:p>
-            <a:r>
-              <a:rPr lang="en-GB" sz="2000" dirty="0">
-                <a:latin typeface="Times New Roman" panose="02020603050405020304" pitchFamily="18" charset="0"/>
-                <a:cs typeface="Times New Roman" panose="02020603050405020304" pitchFamily="18" charset="0"/>
-              </a:rPr>
-              <a:t>By creating multiple doc files – each with its own topic area – and then training said file with questions relating to its assigned topic, a simple topic comparison can be created</a:t>
-            </a:r>
-          </a:p>
-          <a:p>
-            <a:r>
-              <a:rPr lang="en-GB" sz="2000" dirty="0">
-                <a:latin typeface="Times New Roman" panose="02020603050405020304" pitchFamily="18" charset="0"/>
-                <a:cs typeface="Times New Roman" panose="02020603050405020304" pitchFamily="18" charset="0"/>
-              </a:rPr>
-              <a:t>When receiving an input, each model can be polled for its similarity score. The highest similarity score can then be interpreted as the expected topic area</a:t>
-            </a:r>
-          </a:p>
-        </p:txBody>
-      </p:sp>
-      <p:sp>
-        <p:nvSpPr>
-          <p:cNvPr id="4" name="Footer Placeholder 3">
-            <a:extLst>
-              <a:ext uri="{FF2B5EF4-FFF2-40B4-BE49-F238E27FC236}">
-                <a16:creationId xmlns:a16="http://schemas.microsoft.com/office/drawing/2014/main" id="{77F46C0D-DDBF-421C-9254-A9E5042D5514}"/>
+              <a:t>Solution Development</a:t>
+            </a:r>
+          </a:p>
+        </p:txBody>
+      </p:sp>
+      <p:sp>
+        <p:nvSpPr>
+          <p:cNvPr id="7" name="Footer Placeholder 6">
+            <a:extLst>
+              <a:ext uri="{FF2B5EF4-FFF2-40B4-BE49-F238E27FC236}">
+                <a16:creationId xmlns:a16="http://schemas.microsoft.com/office/drawing/2014/main" id="{BFBBBD93-BE28-4EB0-AD63-C26CC96E7E2B}"/>
               </a:ext>
             </a:extLst>
           </p:cNvPr>
@@ -8144,53 +8874,14 @@
           <a:bodyPr/>
           <a:lstStyle/>
           <a:p>
-            <a:r>
-              <a:rPr lang="en-GB" dirty="0"/>
-              <a:t>SEC</a:t>
-            </a:r>
-          </a:p>
-        </p:txBody>
-      </p:sp>
-      <p:pic>
-        <p:nvPicPr>
-          <p:cNvPr id="8" name="Picture 7" descr="Diagram&#10;&#10;Description automatically generated">
-            <a:extLst>
-              <a:ext uri="{FF2B5EF4-FFF2-40B4-BE49-F238E27FC236}">
-                <a16:creationId xmlns:a16="http://schemas.microsoft.com/office/drawing/2014/main" id="{E5D1E160-27C3-419D-8F09-969C2A3213E4}"/>
-              </a:ext>
-            </a:extLst>
-          </p:cNvPr>
-          <p:cNvPicPr>
-            <a:picLocks noChangeAspect="1"/>
-          </p:cNvPicPr>
-          <p:nvPr/>
-        </p:nvPicPr>
-        <p:blipFill>
-          <a:blip r:embed="rId2">
-            <a:extLst>
-              <a:ext uri="{28A0092B-C50C-407E-A947-70E740481C1C}">
-                <a14:useLocalDpi xmlns:a14="http://schemas.microsoft.com/office/drawing/2010/main" val="0"/>
-              </a:ext>
-            </a:extLst>
-          </a:blip>
-          <a:stretch>
-            <a:fillRect/>
-          </a:stretch>
-        </p:blipFill>
-        <p:spPr>
-          <a:xfrm>
-            <a:off x="2659380" y="3194184"/>
-            <a:ext cx="6248400" cy="3219996"/>
-          </a:xfrm>
-          <a:prstGeom prst="rect">
-            <a:avLst/>
-          </a:prstGeom>
-        </p:spPr>
-      </p:pic>
+            <a:endParaRPr lang="en-GB" dirty="0"/>
+          </a:p>
+        </p:txBody>
+      </p:sp>
     </p:spTree>
     <p:extLst>
       <p:ext uri="{BB962C8B-B14F-4D97-AF65-F5344CB8AC3E}">
-        <p14:creationId xmlns:p14="http://schemas.microsoft.com/office/powerpoint/2010/main" val="4116481599"/>
+        <p14:creationId xmlns:p14="http://schemas.microsoft.com/office/powerpoint/2010/main" val="1121027167"/>
       </p:ext>
     </p:extLst>
   </p:cSld>
@@ -8222,7 +8913,7 @@
           <p:cNvPr id="2" name="Title 1">
             <a:extLst>
               <a:ext uri="{FF2B5EF4-FFF2-40B4-BE49-F238E27FC236}">
-                <a16:creationId xmlns:a16="http://schemas.microsoft.com/office/drawing/2014/main" id="{78C28E79-1E9E-424C-A6B7-3E3A1814FAA0}"/>
+                <a16:creationId xmlns:a16="http://schemas.microsoft.com/office/drawing/2014/main" id="{771BB030-117A-49E4-9801-43301420CF6D}"/>
               </a:ext>
             </a:extLst>
           </p:cNvPr>
@@ -8235,15 +8926,64 @@
         </p:nvSpPr>
         <p:spPr/>
         <p:txBody>
-          <a:bodyPr/>
-          <a:lstStyle/>
-          <a:p>
-            <a:r>
-              <a:rPr lang="en-GB" dirty="0">
+          <a:bodyPr>
+            <a:normAutofit/>
+          </a:bodyPr>
+          <a:lstStyle/>
+          <a:p>
+            <a:r>
+              <a:rPr lang="en-GB" sz="4000" dirty="0">
                 <a:latin typeface="Times New Roman" panose="02020603050405020304" pitchFamily="18" charset="0"/>
                 <a:cs typeface="Times New Roman" panose="02020603050405020304" pitchFamily="18" charset="0"/>
               </a:rPr>
-              <a:t>Simple Implementation</a:t>
+              <a:t>Building a Question Classifier in Spacy</a:t>
+            </a:r>
+          </a:p>
+        </p:txBody>
+      </p:sp>
+      <p:sp>
+        <p:nvSpPr>
+          <p:cNvPr id="3" name="Content Placeholder 2">
+            <a:extLst>
+              <a:ext uri="{FF2B5EF4-FFF2-40B4-BE49-F238E27FC236}">
+                <a16:creationId xmlns:a16="http://schemas.microsoft.com/office/drawing/2014/main" id="{33821CF8-1A7E-4E75-9437-DCC2F014FF38}"/>
+              </a:ext>
+            </a:extLst>
+          </p:cNvPr>
+          <p:cNvSpPr>
+            <a:spLocks noGrp="1"/>
+          </p:cNvSpPr>
+          <p:nvPr>
+            <p:ph idx="1"/>
+          </p:nvPr>
+        </p:nvSpPr>
+        <p:spPr>
+          <a:xfrm>
+            <a:off x="838200" y="1528128"/>
+            <a:ext cx="9890760" cy="4351338"/>
+          </a:xfrm>
+        </p:spPr>
+        <p:txBody>
+          <a:bodyPr>
+            <a:normAutofit/>
+          </a:bodyPr>
+          <a:lstStyle/>
+          <a:p>
+            <a:r>
+              <a:rPr lang="en-GB" sz="2000" dirty="0">
+                <a:latin typeface="Times New Roman" panose="02020603050405020304" pitchFamily="18" charset="0"/>
+                <a:cs typeface="Times New Roman" panose="02020603050405020304" pitchFamily="18" charset="0"/>
+              </a:rPr>
+              <a:t>By creating multiple doc files – each with its own topic area – and then training said file with questions relating to its assigned topic, a simple topic comparison can be created</a:t>
+            </a:r>
+          </a:p>
+          <a:p>
+            <a:r>
+              <a:rPr lang="en-GB" sz="2000" dirty="0">
+                <a:latin typeface="Times New Roman" panose="02020603050405020304" pitchFamily="18" charset="0"/>
+                <a:cs typeface="Times New Roman" panose="02020603050405020304" pitchFamily="18" charset="0"/>
+              </a:rPr>
+              <a:t>When receiving an input, each model can be polled for its similarity score. The highest similarity score can then be interpreted as the expected topic area</a:t>
             </a:r>
           </a:p>
         </p:txBody>
@@ -8253,7 +8993,7 @@
           <p:cNvPr id="4" name="Footer Placeholder 3">
             <a:extLst>
               <a:ext uri="{FF2B5EF4-FFF2-40B4-BE49-F238E27FC236}">
-                <a16:creationId xmlns:a16="http://schemas.microsoft.com/office/drawing/2014/main" id="{161C8FD0-3C47-42BD-AAEA-0D666D8F1A16}"/>
+                <a16:creationId xmlns:a16="http://schemas.microsoft.com/office/drawing/2014/main" id="{77F46C0D-DDBF-421C-9254-A9E5042D5514}"/>
               </a:ext>
             </a:extLst>
           </p:cNvPr>
@@ -8270,18 +9010,18 @@
           <a:lstStyle/>
           <a:p>
             <a:r>
-              <a:rPr lang="en-GB"/>
-              <a:t>SEC</a:t>
+              <a:rPr lang="en-GB" dirty="0"/>
+              <a:t>Solution Development</a:t>
             </a:r>
           </a:p>
         </p:txBody>
       </p:sp>
       <p:pic>
         <p:nvPicPr>
-          <p:cNvPr id="6" name="Picture 5">
-            <a:extLst>
-              <a:ext uri="{FF2B5EF4-FFF2-40B4-BE49-F238E27FC236}">
-                <a16:creationId xmlns:a16="http://schemas.microsoft.com/office/drawing/2014/main" id="{541BFD7C-4583-4596-938A-BF98284287A4}"/>
+          <p:cNvPr id="8" name="Picture 7" descr="Diagram&#10;&#10;Description automatically generated">
+            <a:extLst>
+              <a:ext uri="{FF2B5EF4-FFF2-40B4-BE49-F238E27FC236}">
+                <a16:creationId xmlns:a16="http://schemas.microsoft.com/office/drawing/2014/main" id="{E5D1E160-27C3-419D-8F09-969C2A3213E4}"/>
               </a:ext>
             </a:extLst>
           </p:cNvPr>
@@ -8291,268 +9031,21 @@
           <p:nvPr/>
         </p:nvPicPr>
         <p:blipFill>
-          <a:blip r:embed="rId3"/>
+          <a:blip r:embed="rId3">
+            <a:extLst>
+              <a:ext uri="{28A0092B-C50C-407E-A947-70E740481C1C}">
+                <a14:useLocalDpi xmlns:a14="http://schemas.microsoft.com/office/drawing/2010/main" val="0"/>
+              </a:ext>
+            </a:extLst>
+          </a:blip>
           <a:stretch>
             <a:fillRect/>
           </a:stretch>
         </p:blipFill>
         <p:spPr>
           <a:xfrm>
-            <a:off x="7764535" y="2595822"/>
-            <a:ext cx="3717154" cy="463232"/>
-          </a:xfrm>
-          <a:prstGeom prst="rect">
-            <a:avLst/>
-          </a:prstGeom>
-        </p:spPr>
-      </p:pic>
-      <p:pic>
-        <p:nvPicPr>
-          <p:cNvPr id="8" name="Picture 7">
-            <a:extLst>
-              <a:ext uri="{FF2B5EF4-FFF2-40B4-BE49-F238E27FC236}">
-                <a16:creationId xmlns:a16="http://schemas.microsoft.com/office/drawing/2014/main" id="{FF886EE7-364F-4B82-A745-21C5E6A6EB9E}"/>
-              </a:ext>
-            </a:extLst>
-          </p:cNvPr>
-          <p:cNvPicPr>
-            <a:picLocks noChangeAspect="1"/>
-          </p:cNvPicPr>
-          <p:nvPr/>
-        </p:nvPicPr>
-        <p:blipFill>
-          <a:blip r:embed="rId4"/>
-          <a:stretch>
-            <a:fillRect/>
-          </a:stretch>
-        </p:blipFill>
-        <p:spPr>
-          <a:xfrm>
-            <a:off x="7715572" y="3105750"/>
-            <a:ext cx="3815080" cy="463996"/>
-          </a:xfrm>
-          <a:prstGeom prst="rect">
-            <a:avLst/>
-          </a:prstGeom>
-        </p:spPr>
-      </p:pic>
-      <p:pic>
-        <p:nvPicPr>
-          <p:cNvPr id="10" name="Picture 9">
-            <a:extLst>
-              <a:ext uri="{FF2B5EF4-FFF2-40B4-BE49-F238E27FC236}">
-                <a16:creationId xmlns:a16="http://schemas.microsoft.com/office/drawing/2014/main" id="{B15F14E3-1221-4FB7-8992-3277E55E301F}"/>
-              </a:ext>
-            </a:extLst>
-          </p:cNvPr>
-          <p:cNvPicPr>
-            <a:picLocks noChangeAspect="1"/>
-          </p:cNvPicPr>
-          <p:nvPr/>
-        </p:nvPicPr>
-        <p:blipFill rotWithShape="1">
-          <a:blip r:embed="rId5"/>
-          <a:srcRect t="1" b="15094"/>
-          <a:stretch/>
-        </p:blipFill>
-        <p:spPr>
-          <a:xfrm>
-            <a:off x="8377877" y="4606331"/>
-            <a:ext cx="3152775" cy="428626"/>
-          </a:xfrm>
-          <a:prstGeom prst="rect">
-            <a:avLst/>
-          </a:prstGeom>
-        </p:spPr>
-      </p:pic>
-      <p:pic>
-        <p:nvPicPr>
-          <p:cNvPr id="12" name="Picture 11">
-            <a:extLst>
-              <a:ext uri="{FF2B5EF4-FFF2-40B4-BE49-F238E27FC236}">
-                <a16:creationId xmlns:a16="http://schemas.microsoft.com/office/drawing/2014/main" id="{899C8CCF-9B52-439F-BF9D-864C70F41360}"/>
-              </a:ext>
-            </a:extLst>
-          </p:cNvPr>
-          <p:cNvPicPr>
-            <a:picLocks noChangeAspect="1"/>
-          </p:cNvPicPr>
-          <p:nvPr/>
-        </p:nvPicPr>
-        <p:blipFill>
-          <a:blip r:embed="rId6"/>
-          <a:stretch>
-            <a:fillRect/>
-          </a:stretch>
-        </p:blipFill>
-        <p:spPr>
-          <a:xfrm>
-            <a:off x="7561306" y="3699154"/>
-            <a:ext cx="3969346" cy="530068"/>
-          </a:xfrm>
-          <a:prstGeom prst="rect">
-            <a:avLst/>
-          </a:prstGeom>
-        </p:spPr>
-      </p:pic>
-      <p:pic>
-        <p:nvPicPr>
-          <p:cNvPr id="14" name="Picture 13">
-            <a:extLst>
-              <a:ext uri="{FF2B5EF4-FFF2-40B4-BE49-F238E27FC236}">
-                <a16:creationId xmlns:a16="http://schemas.microsoft.com/office/drawing/2014/main" id="{407FDE1D-42DC-457A-A336-C1196488B04E}"/>
-              </a:ext>
-            </a:extLst>
-          </p:cNvPr>
-          <p:cNvPicPr>
-            <a:picLocks noChangeAspect="1"/>
-          </p:cNvPicPr>
-          <p:nvPr/>
-        </p:nvPicPr>
-        <p:blipFill>
-          <a:blip r:embed="rId7"/>
-          <a:stretch>
-            <a:fillRect/>
-          </a:stretch>
-        </p:blipFill>
-        <p:spPr>
-          <a:xfrm>
-            <a:off x="8377876" y="5178162"/>
-            <a:ext cx="3152775" cy="400050"/>
-          </a:xfrm>
-          <a:prstGeom prst="rect">
-            <a:avLst/>
-          </a:prstGeom>
-        </p:spPr>
-      </p:pic>
-      <p:pic>
-        <p:nvPicPr>
-          <p:cNvPr id="16" name="Picture 15">
-            <a:extLst>
-              <a:ext uri="{FF2B5EF4-FFF2-40B4-BE49-F238E27FC236}">
-                <a16:creationId xmlns:a16="http://schemas.microsoft.com/office/drawing/2014/main" id="{F17EF3CC-AB37-4AD4-83DE-04154ED4265A}"/>
-              </a:ext>
-            </a:extLst>
-          </p:cNvPr>
-          <p:cNvPicPr>
-            <a:picLocks noChangeAspect="1"/>
-          </p:cNvPicPr>
-          <p:nvPr/>
-        </p:nvPicPr>
-        <p:blipFill>
-          <a:blip r:embed="rId8"/>
-          <a:stretch>
-            <a:fillRect/>
-          </a:stretch>
-        </p:blipFill>
-        <p:spPr>
-          <a:xfrm>
-            <a:off x="7545729" y="5678223"/>
-            <a:ext cx="4000500" cy="428625"/>
-          </a:xfrm>
-          <a:prstGeom prst="rect">
-            <a:avLst/>
-          </a:prstGeom>
-        </p:spPr>
-      </p:pic>
-      <p:sp>
-        <p:nvSpPr>
-          <p:cNvPr id="11" name="Content Placeholder 2">
-            <a:extLst>
-              <a:ext uri="{FF2B5EF4-FFF2-40B4-BE49-F238E27FC236}">
-                <a16:creationId xmlns:a16="http://schemas.microsoft.com/office/drawing/2014/main" id="{E94E40E4-D13F-4075-BCD6-7895824B975E}"/>
-              </a:ext>
-            </a:extLst>
-          </p:cNvPr>
-          <p:cNvSpPr>
-            <a:spLocks noGrp="1"/>
-          </p:cNvSpPr>
-          <p:nvPr>
-            <p:ph idx="1"/>
-          </p:nvPr>
-        </p:nvSpPr>
-        <p:spPr>
-          <a:xfrm>
-            <a:off x="838200" y="1690688"/>
-            <a:ext cx="6243320" cy="4351338"/>
-          </a:xfrm>
-        </p:spPr>
-        <p:txBody>
-          <a:bodyPr>
-            <a:normAutofit/>
-          </a:bodyPr>
-          <a:lstStyle/>
-          <a:p>
-            <a:r>
-              <a:rPr lang="en-GB" sz="2000" dirty="0">
-                <a:latin typeface="Times New Roman" panose="02020603050405020304" pitchFamily="18" charset="0"/>
-                <a:cs typeface="Times New Roman" panose="02020603050405020304" pitchFamily="18" charset="0"/>
-              </a:rPr>
-              <a:t>For testing purposes, a model was produced using 30 questions, each categorised into “car” for purchasing a car, “maintenance” for repair questions, and “bike” for purchasing a bike</a:t>
-            </a:r>
-          </a:p>
-          <a:p>
-            <a:r>
-              <a:rPr lang="en-GB" sz="2000" dirty="0">
-                <a:latin typeface="Times New Roman" panose="02020603050405020304" pitchFamily="18" charset="0"/>
-                <a:cs typeface="Times New Roman" panose="02020603050405020304" pitchFamily="18" charset="0"/>
-              </a:rPr>
-              <a:t>Said items were split evenly – 10 questions for each.</a:t>
-            </a:r>
-          </a:p>
-          <a:p>
-            <a:r>
-              <a:rPr lang="en-GB" sz="2000" dirty="0">
-                <a:latin typeface="Times New Roman" panose="02020603050405020304" pitchFamily="18" charset="0"/>
-                <a:cs typeface="Times New Roman" panose="02020603050405020304" pitchFamily="18" charset="0"/>
-              </a:rPr>
-              <a:t>20% of the items, chosen randomly, were then selected as test data.</a:t>
-            </a:r>
-          </a:p>
-          <a:p>
-            <a:r>
-              <a:rPr lang="en-GB" sz="2000" dirty="0">
-                <a:latin typeface="Times New Roman" panose="02020603050405020304" pitchFamily="18" charset="0"/>
-                <a:cs typeface="Times New Roman" panose="02020603050405020304" pitchFamily="18" charset="0"/>
-              </a:rPr>
-              <a:t>Accuracy was varied – sometimes reaching as low as 20%, sometimes reaching 100% for the test data</a:t>
-            </a:r>
-          </a:p>
-          <a:p>
-            <a:r>
-              <a:rPr lang="en-GB" sz="2000" dirty="0">
-                <a:latin typeface="Times New Roman" panose="02020603050405020304" pitchFamily="18" charset="0"/>
-                <a:cs typeface="Times New Roman" panose="02020603050405020304" pitchFamily="18" charset="0"/>
-              </a:rPr>
-              <a:t>Tests using a simple input system proved that even in high accuracy models, the results were still inconsistent</a:t>
-            </a:r>
-          </a:p>
-        </p:txBody>
-      </p:sp>
-      <p:pic>
-        <p:nvPicPr>
-          <p:cNvPr id="5" name="Picture 4">
-            <a:extLst>
-              <a:ext uri="{FF2B5EF4-FFF2-40B4-BE49-F238E27FC236}">
-                <a16:creationId xmlns:a16="http://schemas.microsoft.com/office/drawing/2014/main" id="{F0AF9735-FC34-4E7A-A655-54AB0C297CE3}"/>
-              </a:ext>
-            </a:extLst>
-          </p:cNvPr>
-          <p:cNvPicPr>
-            <a:picLocks noChangeAspect="1"/>
-          </p:cNvPicPr>
-          <p:nvPr/>
-        </p:nvPicPr>
-        <p:blipFill>
-          <a:blip r:embed="rId9"/>
-          <a:stretch>
-            <a:fillRect/>
-          </a:stretch>
-        </p:blipFill>
-        <p:spPr>
-          <a:xfrm>
-            <a:off x="9457372" y="1634012"/>
-            <a:ext cx="2024317" cy="611664"/>
+            <a:off x="2659380" y="2990984"/>
+            <a:ext cx="6248400" cy="3219996"/>
           </a:xfrm>
           <a:prstGeom prst="rect">
             <a:avLst/>
@@ -8562,7 +9055,7 @@
     </p:spTree>
     <p:extLst>
       <p:ext uri="{BB962C8B-B14F-4D97-AF65-F5344CB8AC3E}">
-        <p14:creationId xmlns:p14="http://schemas.microsoft.com/office/powerpoint/2010/main" val="3009799540"/>
+        <p14:creationId xmlns:p14="http://schemas.microsoft.com/office/powerpoint/2010/main" val="4116481599"/>
       </p:ext>
     </p:extLst>
   </p:cSld>
@@ -8615,7 +9108,7 @@
                 <a:latin typeface="Times New Roman" panose="02020603050405020304" pitchFamily="18" charset="0"/>
                 <a:cs typeface="Times New Roman" panose="02020603050405020304" pitchFamily="18" charset="0"/>
               </a:rPr>
-              <a:t>Extended Implementation</a:t>
+              <a:t>Simple Implementation</a:t>
             </a:r>
           </a:p>
         </p:txBody>
@@ -8642,12 +9135,191 @@
           <a:lstStyle/>
           <a:p>
             <a:r>
-              <a:rPr lang="en-GB"/>
-              <a:t>SEC</a:t>
-            </a:r>
-          </a:p>
-        </p:txBody>
-      </p:sp>
+              <a:rPr lang="en-GB" dirty="0"/>
+              <a:t>Solution Development</a:t>
+            </a:r>
+          </a:p>
+        </p:txBody>
+      </p:sp>
+      <p:pic>
+        <p:nvPicPr>
+          <p:cNvPr id="6" name="Picture 5">
+            <a:extLst>
+              <a:ext uri="{FF2B5EF4-FFF2-40B4-BE49-F238E27FC236}">
+                <a16:creationId xmlns:a16="http://schemas.microsoft.com/office/drawing/2014/main" id="{541BFD7C-4583-4596-938A-BF98284287A4}"/>
+              </a:ext>
+            </a:extLst>
+          </p:cNvPr>
+          <p:cNvPicPr>
+            <a:picLocks noChangeAspect="1"/>
+          </p:cNvPicPr>
+          <p:nvPr/>
+        </p:nvPicPr>
+        <p:blipFill>
+          <a:blip r:embed="rId3"/>
+          <a:stretch>
+            <a:fillRect/>
+          </a:stretch>
+        </p:blipFill>
+        <p:spPr>
+          <a:xfrm>
+            <a:off x="7545729" y="2595822"/>
+            <a:ext cx="3935960" cy="463232"/>
+          </a:xfrm>
+          <a:prstGeom prst="rect">
+            <a:avLst/>
+          </a:prstGeom>
+        </p:spPr>
+      </p:pic>
+      <p:pic>
+        <p:nvPicPr>
+          <p:cNvPr id="8" name="Picture 7">
+            <a:extLst>
+              <a:ext uri="{FF2B5EF4-FFF2-40B4-BE49-F238E27FC236}">
+                <a16:creationId xmlns:a16="http://schemas.microsoft.com/office/drawing/2014/main" id="{FF886EE7-364F-4B82-A745-21C5E6A6EB9E}"/>
+              </a:ext>
+            </a:extLst>
+          </p:cNvPr>
+          <p:cNvPicPr>
+            <a:picLocks noChangeAspect="1"/>
+          </p:cNvPicPr>
+          <p:nvPr/>
+        </p:nvPicPr>
+        <p:blipFill>
+          <a:blip r:embed="rId4"/>
+          <a:stretch>
+            <a:fillRect/>
+          </a:stretch>
+        </p:blipFill>
+        <p:spPr>
+          <a:xfrm>
+            <a:off x="7530152" y="3105750"/>
+            <a:ext cx="4000500" cy="463996"/>
+          </a:xfrm>
+          <a:prstGeom prst="rect">
+            <a:avLst/>
+          </a:prstGeom>
+        </p:spPr>
+      </p:pic>
+      <p:pic>
+        <p:nvPicPr>
+          <p:cNvPr id="10" name="Picture 9">
+            <a:extLst>
+              <a:ext uri="{FF2B5EF4-FFF2-40B4-BE49-F238E27FC236}">
+                <a16:creationId xmlns:a16="http://schemas.microsoft.com/office/drawing/2014/main" id="{B15F14E3-1221-4FB7-8992-3277E55E301F}"/>
+              </a:ext>
+            </a:extLst>
+          </p:cNvPr>
+          <p:cNvPicPr>
+            <a:picLocks noChangeAspect="1"/>
+          </p:cNvPicPr>
+          <p:nvPr/>
+        </p:nvPicPr>
+        <p:blipFill rotWithShape="1">
+          <a:blip r:embed="rId5"/>
+          <a:srcRect t="1" b="15094"/>
+          <a:stretch/>
+        </p:blipFill>
+        <p:spPr>
+          <a:xfrm>
+            <a:off x="7969591" y="4594028"/>
+            <a:ext cx="3152775" cy="428626"/>
+          </a:xfrm>
+          <a:prstGeom prst="rect">
+            <a:avLst/>
+          </a:prstGeom>
+        </p:spPr>
+      </p:pic>
+      <p:pic>
+        <p:nvPicPr>
+          <p:cNvPr id="12" name="Picture 11">
+            <a:extLst>
+              <a:ext uri="{FF2B5EF4-FFF2-40B4-BE49-F238E27FC236}">
+                <a16:creationId xmlns:a16="http://schemas.microsoft.com/office/drawing/2014/main" id="{899C8CCF-9B52-439F-BF9D-864C70F41360}"/>
+              </a:ext>
+            </a:extLst>
+          </p:cNvPr>
+          <p:cNvPicPr>
+            <a:picLocks noChangeAspect="1"/>
+          </p:cNvPicPr>
+          <p:nvPr/>
+        </p:nvPicPr>
+        <p:blipFill>
+          <a:blip r:embed="rId6"/>
+          <a:stretch>
+            <a:fillRect/>
+          </a:stretch>
+        </p:blipFill>
+        <p:spPr>
+          <a:xfrm>
+            <a:off x="7512343" y="3598228"/>
+            <a:ext cx="3969346" cy="530068"/>
+          </a:xfrm>
+          <a:prstGeom prst="rect">
+            <a:avLst/>
+          </a:prstGeom>
+        </p:spPr>
+      </p:pic>
+      <p:pic>
+        <p:nvPicPr>
+          <p:cNvPr id="14" name="Picture 13">
+            <a:extLst>
+              <a:ext uri="{FF2B5EF4-FFF2-40B4-BE49-F238E27FC236}">
+                <a16:creationId xmlns:a16="http://schemas.microsoft.com/office/drawing/2014/main" id="{407FDE1D-42DC-457A-A336-C1196488B04E}"/>
+              </a:ext>
+            </a:extLst>
+          </p:cNvPr>
+          <p:cNvPicPr>
+            <a:picLocks noChangeAspect="1"/>
+          </p:cNvPicPr>
+          <p:nvPr/>
+        </p:nvPicPr>
+        <p:blipFill>
+          <a:blip r:embed="rId7"/>
+          <a:stretch>
+            <a:fillRect/>
+          </a:stretch>
+        </p:blipFill>
+        <p:spPr>
+          <a:xfrm>
+            <a:off x="7954013" y="5164217"/>
+            <a:ext cx="3152775" cy="400050"/>
+          </a:xfrm>
+          <a:prstGeom prst="rect">
+            <a:avLst/>
+          </a:prstGeom>
+        </p:spPr>
+      </p:pic>
+      <p:pic>
+        <p:nvPicPr>
+          <p:cNvPr id="16" name="Picture 15">
+            <a:extLst>
+              <a:ext uri="{FF2B5EF4-FFF2-40B4-BE49-F238E27FC236}">
+                <a16:creationId xmlns:a16="http://schemas.microsoft.com/office/drawing/2014/main" id="{F17EF3CC-AB37-4AD4-83DE-04154ED4265A}"/>
+              </a:ext>
+            </a:extLst>
+          </p:cNvPr>
+          <p:cNvPicPr>
+            <a:picLocks noChangeAspect="1"/>
+          </p:cNvPicPr>
+          <p:nvPr/>
+        </p:nvPicPr>
+        <p:blipFill>
+          <a:blip r:embed="rId8"/>
+          <a:stretch>
+            <a:fillRect/>
+          </a:stretch>
+        </p:blipFill>
+        <p:spPr>
+          <a:xfrm>
+            <a:off x="7545729" y="5678223"/>
+            <a:ext cx="4000500" cy="428625"/>
+          </a:xfrm>
+          <a:prstGeom prst="rect">
+            <a:avLst/>
+          </a:prstGeom>
+        </p:spPr>
+      </p:pic>
       <p:sp>
         <p:nvSpPr>
           <p:cNvPr id="11" name="Content Placeholder 2">
@@ -8667,7 +9339,7 @@
         <p:spPr>
           <a:xfrm>
             <a:off x="838200" y="1690688"/>
-            <a:ext cx="10515600" cy="4351338"/>
+            <a:ext cx="6243320" cy="4351338"/>
           </a:xfrm>
         </p:spPr>
         <p:txBody>
@@ -8681,7 +9353,7 @@
                 <a:latin typeface="Times New Roman" panose="02020603050405020304" pitchFamily="18" charset="0"/>
                 <a:cs typeface="Times New Roman" panose="02020603050405020304" pitchFamily="18" charset="0"/>
               </a:rPr>
-              <a:t>The lack of training data in the previous test provided too little insight into the strength of spacy as a question classification tool</a:t>
+              <a:t>For testing purposes, a model was produced using 30 questions, each categorised into “car” for purchasing a car, “maintenance” for repair questions, and “bike” for purchasing a bike</a:t>
             </a:r>
           </a:p>
           <a:p>
@@ -8690,7 +9362,7 @@
                 <a:latin typeface="Times New Roman" panose="02020603050405020304" pitchFamily="18" charset="0"/>
                 <a:cs typeface="Times New Roman" panose="02020603050405020304" pitchFamily="18" charset="0"/>
               </a:rPr>
-              <a:t>Using the twitter questions and answers database – trimmed to only include questions directed at @AppleSupport</a:t>
+              <a:t>Said items were split evenly – 10 questions for each.</a:t>
             </a:r>
           </a:p>
           <a:p>
@@ -8699,7 +9371,7 @@
                 <a:latin typeface="Times New Roman" panose="02020603050405020304" pitchFamily="18" charset="0"/>
                 <a:cs typeface="Times New Roman" panose="02020603050405020304" pitchFamily="18" charset="0"/>
               </a:rPr>
-              <a:t>1200 questions were manually categorised into 8 categories; questions about apps, complaints, hardware related questions, questions relating to apple accounts and services such as iCloud, operating system issues, network issues, questions about purchasing an apple product and questions that required a human response.</a:t>
+              <a:t>20% of the items, chosen randomly, were then selected as test data.</a:t>
             </a:r>
           </a:p>
           <a:p>
@@ -8708,15 +9380,54 @@
                 <a:latin typeface="Times New Roman" panose="02020603050405020304" pitchFamily="18" charset="0"/>
                 <a:cs typeface="Times New Roman" panose="02020603050405020304" pitchFamily="18" charset="0"/>
               </a:rPr>
-              <a:t>Due to this being a test of the library, little EDA or pre-processing was conducted.</a:t>
-            </a:r>
-          </a:p>
-        </p:txBody>
-      </p:sp>
+              <a:t>Accuracy was varied – sometimes reaching as low as 20%, sometimes reaching 100% for the test data</a:t>
+            </a:r>
+          </a:p>
+          <a:p>
+            <a:r>
+              <a:rPr lang="en-GB" sz="2000" dirty="0">
+                <a:latin typeface="Times New Roman" panose="02020603050405020304" pitchFamily="18" charset="0"/>
+                <a:cs typeface="Times New Roman" panose="02020603050405020304" pitchFamily="18" charset="0"/>
+              </a:rPr>
+              <a:t>Tests using a simple input system proved that even in high accuracy models, the results were still inconsistent</a:t>
+            </a:r>
+          </a:p>
+        </p:txBody>
+      </p:sp>
+      <p:pic>
+        <p:nvPicPr>
+          <p:cNvPr id="5" name="Picture 4">
+            <a:extLst>
+              <a:ext uri="{FF2B5EF4-FFF2-40B4-BE49-F238E27FC236}">
+                <a16:creationId xmlns:a16="http://schemas.microsoft.com/office/drawing/2014/main" id="{F0AF9735-FC34-4E7A-A655-54AB0C297CE3}"/>
+              </a:ext>
+            </a:extLst>
+          </p:cNvPr>
+          <p:cNvPicPr>
+            <a:picLocks noChangeAspect="1"/>
+          </p:cNvPicPr>
+          <p:nvPr/>
+        </p:nvPicPr>
+        <p:blipFill>
+          <a:blip r:embed="rId9"/>
+          <a:stretch>
+            <a:fillRect/>
+          </a:stretch>
+        </p:blipFill>
+        <p:spPr>
+          <a:xfrm>
+            <a:off x="8518243" y="1693783"/>
+            <a:ext cx="2024317" cy="611664"/>
+          </a:xfrm>
+          <a:prstGeom prst="rect">
+            <a:avLst/>
+          </a:prstGeom>
+        </p:spPr>
+      </p:pic>
     </p:spTree>
     <p:extLst>
       <p:ext uri="{BB962C8B-B14F-4D97-AF65-F5344CB8AC3E}">
-        <p14:creationId xmlns:p14="http://schemas.microsoft.com/office/powerpoint/2010/main" val="1754584055"/>
+        <p14:creationId xmlns:p14="http://schemas.microsoft.com/office/powerpoint/2010/main" val="3009799540"/>
       </p:ext>
     </p:extLst>
   </p:cSld>

</xml_diff>

<commit_message>
Added some emotions checking
</commit_message>
<xml_diff>
--- a/Documentation/100505349.pptx
+++ b/Documentation/100505349.pptx
@@ -5,10 +5,10 @@
     <p:sldMasterId id="2147483684" r:id="rId1"/>
   </p:sldMasterIdLst>
   <p:notesMasterIdLst>
-    <p:notesMasterId r:id="rId21"/>
+    <p:notesMasterId r:id="rId22"/>
   </p:notesMasterIdLst>
   <p:handoutMasterIdLst>
-    <p:handoutMasterId r:id="rId22"/>
+    <p:handoutMasterId r:id="rId23"/>
   </p:handoutMasterIdLst>
   <p:sldIdLst>
     <p:sldId id="256" r:id="rId2"/>
@@ -29,7 +29,8 @@
     <p:sldId id="277" r:id="rId17"/>
     <p:sldId id="278" r:id="rId18"/>
     <p:sldId id="280" r:id="rId19"/>
-    <p:sldId id="275" r:id="rId20"/>
+    <p:sldId id="282" r:id="rId20"/>
+    <p:sldId id="275" r:id="rId21"/>
   </p:sldIdLst>
   <p:sldSz cx="12192000" cy="6858000"/>
   <p:notesSz cx="6858000" cy="9144000"/>
@@ -151,6 +152,7 @@
             <p14:sldId id="277"/>
             <p14:sldId id="278"/>
             <p14:sldId id="280"/>
+            <p14:sldId id="282"/>
             <p14:sldId id="275"/>
           </p14:sldIdLst>
         </p14:section>
@@ -257,7 +259,7 @@
           <a:p>
             <a:fld id="{7DDF2B0D-01F9-40A6-83B8-CA688E599BFE}" type="datetimeFigureOut">
               <a:rPr lang="en-GB" smtClean="0"/>
-              <a:t>12/05/2022</a:t>
+              <a:t>13/05/2022</a:t>
             </a:fld>
             <a:endParaRPr lang="en-GB"/>
           </a:p>
@@ -435,7 +437,7 @@
           <a:p>
             <a:fld id="{5F411E22-B9AA-407B-9F29-B3EBA7D89382}" type="datetimeFigureOut">
               <a:rPr lang="en-GB" smtClean="0"/>
-              <a:t>12/05/2022</a:t>
+              <a:t>13/05/2022</a:t>
             </a:fld>
             <a:endParaRPr lang="en-GB"/>
           </a:p>
@@ -1432,6 +1434,93 @@
 </p:notes>
 </file>
 
+<file path=ppt/notesSlides/notesSlide17.xml><?xml version="1.0" encoding="utf-8"?>
+<p:notes xmlns:a="http://schemas.openxmlformats.org/drawingml/2006/main" xmlns:r="http://schemas.openxmlformats.org/officeDocument/2006/relationships" xmlns:p="http://schemas.openxmlformats.org/presentationml/2006/main">
+  <p:cSld>
+    <p:spTree>
+      <p:nvGrpSpPr>
+        <p:cNvPr id="1" name=""/>
+        <p:cNvGrpSpPr/>
+        <p:nvPr/>
+      </p:nvGrpSpPr>
+      <p:grpSpPr>
+        <a:xfrm>
+          <a:off x="0" y="0"/>
+          <a:ext cx="0" cy="0"/>
+          <a:chOff x="0" y="0"/>
+          <a:chExt cx="0" cy="0"/>
+        </a:xfrm>
+      </p:grpSpPr>
+      <p:sp>
+        <p:nvSpPr>
+          <p:cNvPr id="2" name="Slide Image Placeholder 1"/>
+          <p:cNvSpPr>
+            <a:spLocks noGrp="1" noRot="1" noChangeAspect="1"/>
+          </p:cNvSpPr>
+          <p:nvPr>
+            <p:ph type="sldImg"/>
+          </p:nvPr>
+        </p:nvSpPr>
+        <p:spPr/>
+      </p:sp>
+      <p:sp>
+        <p:nvSpPr>
+          <p:cNvPr id="3" name="Notes Placeholder 2"/>
+          <p:cNvSpPr>
+            <a:spLocks noGrp="1"/>
+          </p:cNvSpPr>
+          <p:nvPr>
+            <p:ph type="body" idx="1"/>
+          </p:nvPr>
+        </p:nvSpPr>
+        <p:spPr/>
+        <p:txBody>
+          <a:bodyPr/>
+          <a:lstStyle/>
+          <a:p>
+            <a:r>
+              <a:rPr lang="en-GB" dirty="0"/>
+              <a:t>Y = percent accuracy for this test</a:t>
+            </a:r>
+          </a:p>
+        </p:txBody>
+      </p:sp>
+      <p:sp>
+        <p:nvSpPr>
+          <p:cNvPr id="4" name="Slide Number Placeholder 3"/>
+          <p:cNvSpPr>
+            <a:spLocks noGrp="1"/>
+          </p:cNvSpPr>
+          <p:nvPr>
+            <p:ph type="sldNum" sz="quarter" idx="5"/>
+          </p:nvPr>
+        </p:nvSpPr>
+        <p:spPr/>
+        <p:txBody>
+          <a:bodyPr/>
+          <a:lstStyle/>
+          <a:p>
+            <a:fld id="{6A9D5347-B203-4D7E-8C0C-C0F523BBFB73}" type="slidenum">
+              <a:rPr lang="en-GB" smtClean="0"/>
+              <a:t>19</a:t>
+            </a:fld>
+            <a:endParaRPr lang="en-GB"/>
+          </a:p>
+        </p:txBody>
+      </p:sp>
+    </p:spTree>
+    <p:extLst>
+      <p:ext uri="{BB962C8B-B14F-4D97-AF65-F5344CB8AC3E}">
+        <p14:creationId xmlns:p14="http://schemas.microsoft.com/office/powerpoint/2010/main" val="2560235328"/>
+      </p:ext>
+    </p:extLst>
+  </p:cSld>
+  <p:clrMapOvr>
+    <a:masterClrMapping/>
+  </p:clrMapOvr>
+</p:notes>
+</file>
+
 <file path=ppt/notesSlides/notesSlide2.xml><?xml version="1.0" encoding="utf-8"?>
 <p:notes xmlns:a="http://schemas.openxmlformats.org/drawingml/2006/main" xmlns:r="http://schemas.openxmlformats.org/officeDocument/2006/relationships" xmlns:p="http://schemas.openxmlformats.org/presentationml/2006/main">
   <p:cSld>
@@ -2286,7 +2375,7 @@
           <a:p>
             <a:fld id="{AE0F6D4B-2242-4C15-9B1F-EB67BC7C3CD1}" type="datetime1">
               <a:rPr lang="en-GB" smtClean="0"/>
-              <a:t>12/05/2022</a:t>
+              <a:t>13/05/2022</a:t>
             </a:fld>
             <a:endParaRPr lang="en-GB"/>
           </a:p>
@@ -2489,7 +2578,7 @@
           <a:p>
             <a:fld id="{148F44C1-1DF0-4D73-AB6D-E462219C56CA}" type="datetime1">
               <a:rPr lang="en-GB" smtClean="0"/>
-              <a:t>12/05/2022</a:t>
+              <a:t>13/05/2022</a:t>
             </a:fld>
             <a:endParaRPr lang="en-GB"/>
           </a:p>
@@ -2702,7 +2791,7 @@
           <a:p>
             <a:fld id="{C3A31CC1-D2D6-4B4E-B0F3-499814EE3B58}" type="datetime1">
               <a:rPr lang="en-GB" smtClean="0"/>
-              <a:t>12/05/2022</a:t>
+              <a:t>13/05/2022</a:t>
             </a:fld>
             <a:endParaRPr lang="en-GB"/>
           </a:p>
@@ -2905,7 +2994,7 @@
           <a:p>
             <a:fld id="{A3FF5B57-79BA-4336-9C8C-134BE5A097AD}" type="datetime1">
               <a:rPr lang="en-GB" smtClean="0"/>
-              <a:t>12/05/2022</a:t>
+              <a:t>13/05/2022</a:t>
             </a:fld>
             <a:endParaRPr lang="en-GB"/>
           </a:p>
@@ -3184,7 +3273,7 @@
           <a:p>
             <a:fld id="{EB67FD68-3457-44CE-AA52-F874EEC85611}" type="datetime1">
               <a:rPr lang="en-GB" smtClean="0"/>
-              <a:t>12/05/2022</a:t>
+              <a:t>13/05/2022</a:t>
             </a:fld>
             <a:endParaRPr lang="en-GB"/>
           </a:p>
@@ -3455,7 +3544,7 @@
           <a:p>
             <a:fld id="{4BA8742A-D1B6-4DBA-A73E-40DBF03C5B42}" type="datetime1">
               <a:rPr lang="en-GB" smtClean="0"/>
-              <a:t>12/05/2022</a:t>
+              <a:t>13/05/2022</a:t>
             </a:fld>
             <a:endParaRPr lang="en-GB"/>
           </a:p>
@@ -3873,7 +3962,7 @@
           <a:p>
             <a:fld id="{63FD0926-F3B9-455D-8AA5-A7B7B6009E87}" type="datetime1">
               <a:rPr lang="en-GB" smtClean="0"/>
-              <a:t>12/05/2022</a:t>
+              <a:t>13/05/2022</a:t>
             </a:fld>
             <a:endParaRPr lang="en-GB"/>
           </a:p>
@@ -4018,7 +4107,7 @@
           <a:p>
             <a:fld id="{4B70B3C0-2F19-4721-874E-D7681BE64C84}" type="datetime1">
               <a:rPr lang="en-GB" smtClean="0"/>
-              <a:t>12/05/2022</a:t>
+              <a:t>13/05/2022</a:t>
             </a:fld>
             <a:endParaRPr lang="en-GB"/>
           </a:p>
@@ -4134,7 +4223,7 @@
           <a:p>
             <a:fld id="{F65B3172-13F0-475E-AEE3-58D82DD42C69}" type="datetime1">
               <a:rPr lang="en-GB" smtClean="0"/>
-              <a:t>12/05/2022</a:t>
+              <a:t>13/05/2022</a:t>
             </a:fld>
             <a:endParaRPr lang="en-GB"/>
           </a:p>
@@ -4450,7 +4539,7 @@
           <a:p>
             <a:fld id="{6C3F1D32-7E7A-4E80-AF0D-6E255F242C09}" type="datetime1">
               <a:rPr lang="en-GB" smtClean="0"/>
-              <a:t>12/05/2022</a:t>
+              <a:t>13/05/2022</a:t>
             </a:fld>
             <a:endParaRPr lang="en-GB"/>
           </a:p>
@@ -4742,7 +4831,7 @@
           <a:p>
             <a:fld id="{AD7C149D-3981-4CD0-8858-4DC0837EA971}" type="datetime1">
               <a:rPr lang="en-GB" smtClean="0"/>
-              <a:t>12/05/2022</a:t>
+              <a:t>13/05/2022</a:t>
             </a:fld>
             <a:endParaRPr lang="en-GB"/>
           </a:p>
@@ -4988,7 +5077,7 @@
           <a:p>
             <a:fld id="{974CD72A-BED1-4076-8EB6-0C606103999B}" type="datetime1">
               <a:rPr lang="en-GB" smtClean="0"/>
-              <a:t>12/05/2022</a:t>
+              <a:t>13/05/2022</a:t>
             </a:fld>
             <a:endParaRPr lang="en-GB"/>
           </a:p>
@@ -7412,7 +7501,21 @@
                 <a:latin typeface="Times New Roman" panose="02020603050405020304" pitchFamily="18" charset="0"/>
                 <a:cs typeface="Times New Roman" panose="02020603050405020304" pitchFamily="18" charset="0"/>
               </a:rPr>
-              <a:t>Pulled 500 questions relating to eight topics - bankruptcy, taxes, stocks, loans, scams, pensions, real estate and 401k.</a:t>
+              <a:t>Pulled 500 questions relating to seven topics - bankruptcy, taxes, stocks, </a:t>
+            </a:r>
+            <a:r>
+              <a:rPr lang="en-GB" sz="2000">
+                <a:latin typeface="Times New Roman" panose="02020603050405020304" pitchFamily="18" charset="0"/>
+                <a:cs typeface="Times New Roman" panose="02020603050405020304" pitchFamily="18" charset="0"/>
+              </a:rPr>
+              <a:t>loans, pensions</a:t>
+            </a:r>
+            <a:r>
+              <a:rPr lang="en-GB" sz="2000" dirty="0">
+                <a:latin typeface="Times New Roman" panose="02020603050405020304" pitchFamily="18" charset="0"/>
+                <a:cs typeface="Times New Roman" panose="02020603050405020304" pitchFamily="18" charset="0"/>
+              </a:rPr>
+              <a:t>, real estate and 401k.</a:t>
             </a:r>
           </a:p>
           <a:p>
@@ -7925,7 +8028,7 @@
           <p:cNvPr id="2" name="Title 1">
             <a:extLst>
               <a:ext uri="{FF2B5EF4-FFF2-40B4-BE49-F238E27FC236}">
-                <a16:creationId xmlns:a16="http://schemas.microsoft.com/office/drawing/2014/main" id="{770E6EE7-B050-46D5-B12B-FF8B9068E4C3}"/>
+                <a16:creationId xmlns:a16="http://schemas.microsoft.com/office/drawing/2014/main" id="{78C28E79-1E9E-424C-A6B7-3E3A1814FAA0}"/>
               </a:ext>
             </a:extLst>
           </p:cNvPr>
@@ -7936,35 +8039,27 @@
             <p:ph type="title"/>
           </p:nvPr>
         </p:nvSpPr>
-        <p:spPr>
-          <a:xfrm>
-            <a:off x="838200" y="2691765"/>
-            <a:ext cx="10515600" cy="1325563"/>
-          </a:xfrm>
-        </p:spPr>
-        <p:txBody>
-          <a:bodyPr>
-            <a:normAutofit/>
-          </a:bodyPr>
-          <a:lstStyle/>
-          <a:p>
-            <a:pPr algn="ctr"/>
+        <p:spPr/>
+        <p:txBody>
+          <a:bodyPr/>
+          <a:lstStyle/>
+          <a:p>
             <a:r>
               <a:rPr lang="en-GB" dirty="0">
                 <a:latin typeface="Times New Roman" panose="02020603050405020304" pitchFamily="18" charset="0"/>
                 <a:cs typeface="Times New Roman" panose="02020603050405020304" pitchFamily="18" charset="0"/>
               </a:rPr>
-              <a:t>Evaluation &amp; Refinement</a:t>
-            </a:r>
-          </a:p>
-        </p:txBody>
-      </p:sp>
-      <p:sp>
-        <p:nvSpPr>
-          <p:cNvPr id="7" name="Footer Placeholder 6">
-            <a:extLst>
-              <a:ext uri="{FF2B5EF4-FFF2-40B4-BE49-F238E27FC236}">
-                <a16:creationId xmlns:a16="http://schemas.microsoft.com/office/drawing/2014/main" id="{BFBBBD93-BE28-4EB0-AD63-C26CC96E7E2B}"/>
+              <a:t>Pre-processing</a:t>
+            </a:r>
+          </a:p>
+        </p:txBody>
+      </p:sp>
+      <p:sp>
+        <p:nvSpPr>
+          <p:cNvPr id="4" name="Footer Placeholder 3">
+            <a:extLst>
+              <a:ext uri="{FF2B5EF4-FFF2-40B4-BE49-F238E27FC236}">
+                <a16:creationId xmlns:a16="http://schemas.microsoft.com/office/drawing/2014/main" id="{161C8FD0-3C47-42BD-AAEA-0D666D8F1A16}"/>
               </a:ext>
             </a:extLst>
           </p:cNvPr>
@@ -7980,14 +8075,233 @@
           <a:bodyPr/>
           <a:lstStyle/>
           <a:p>
-            <a:endParaRPr lang="en-GB" dirty="0"/>
+            <a:r>
+              <a:rPr lang="en-GB" dirty="0"/>
+              <a:t>Exploratory Data Analysis &amp; Pre-processing</a:t>
+            </a:r>
+          </a:p>
+        </p:txBody>
+      </p:sp>
+      <p:sp>
+        <p:nvSpPr>
+          <p:cNvPr id="9" name="Content Placeholder 2">
+            <a:extLst>
+              <a:ext uri="{FF2B5EF4-FFF2-40B4-BE49-F238E27FC236}">
+                <a16:creationId xmlns:a16="http://schemas.microsoft.com/office/drawing/2014/main" id="{D099458A-BDF7-4D85-983B-6973AEF17098}"/>
+              </a:ext>
+            </a:extLst>
+          </p:cNvPr>
+          <p:cNvSpPr txBox="1">
+            <a:spLocks/>
+          </p:cNvSpPr>
+          <p:nvPr/>
+        </p:nvSpPr>
+        <p:spPr>
+          <a:xfrm>
+            <a:off x="838200" y="1690688"/>
+            <a:ext cx="9748520" cy="4135120"/>
+          </a:xfrm>
+          <a:prstGeom prst="rect">
+            <a:avLst/>
+          </a:prstGeom>
+        </p:spPr>
+        <p:txBody>
+          <a:bodyPr vert="horz" lIns="91440" tIns="45720" rIns="91440" bIns="45720" rtlCol="0">
+            <a:normAutofit/>
+          </a:bodyPr>
+          <a:lstStyle>
+            <a:lvl1pPr marL="228600" indent="-228600" algn="l" defTabSz="914400" rtl="0" eaLnBrk="1" latinLnBrk="0" hangingPunct="1">
+              <a:lnSpc>
+                <a:spcPct val="90000"/>
+              </a:lnSpc>
+              <a:spcBef>
+                <a:spcPts val="1000"/>
+              </a:spcBef>
+              <a:buFont typeface="Arial" panose="020B0604020202020204" pitchFamily="34" charset="0"/>
+              <a:buChar char="•"/>
+              <a:defRPr sz="2800" kern="1200">
+                <a:solidFill>
+                  <a:schemeClr val="tx1"/>
+                </a:solidFill>
+                <a:latin typeface="+mn-lt"/>
+                <a:ea typeface="+mn-ea"/>
+                <a:cs typeface="+mn-cs"/>
+              </a:defRPr>
+            </a:lvl1pPr>
+            <a:lvl2pPr marL="685800" indent="-228600" algn="l" defTabSz="914400" rtl="0" eaLnBrk="1" latinLnBrk="0" hangingPunct="1">
+              <a:lnSpc>
+                <a:spcPct val="90000"/>
+              </a:lnSpc>
+              <a:spcBef>
+                <a:spcPts val="500"/>
+              </a:spcBef>
+              <a:buFont typeface="Arial" panose="020B0604020202020204" pitchFamily="34" charset="0"/>
+              <a:buChar char="•"/>
+              <a:defRPr sz="2400" kern="1200">
+                <a:solidFill>
+                  <a:schemeClr val="tx1"/>
+                </a:solidFill>
+                <a:latin typeface="+mn-lt"/>
+                <a:ea typeface="+mn-ea"/>
+                <a:cs typeface="+mn-cs"/>
+              </a:defRPr>
+            </a:lvl2pPr>
+            <a:lvl3pPr marL="1143000" indent="-228600" algn="l" defTabSz="914400" rtl="0" eaLnBrk="1" latinLnBrk="0" hangingPunct="1">
+              <a:lnSpc>
+                <a:spcPct val="90000"/>
+              </a:lnSpc>
+              <a:spcBef>
+                <a:spcPts val="500"/>
+              </a:spcBef>
+              <a:buFont typeface="Arial" panose="020B0604020202020204" pitchFamily="34" charset="0"/>
+              <a:buChar char="•"/>
+              <a:defRPr sz="2000" kern="1200">
+                <a:solidFill>
+                  <a:schemeClr val="tx1"/>
+                </a:solidFill>
+                <a:latin typeface="+mn-lt"/>
+                <a:ea typeface="+mn-ea"/>
+                <a:cs typeface="+mn-cs"/>
+              </a:defRPr>
+            </a:lvl3pPr>
+            <a:lvl4pPr marL="1600200" indent="-228600" algn="l" defTabSz="914400" rtl="0" eaLnBrk="1" latinLnBrk="0" hangingPunct="1">
+              <a:lnSpc>
+                <a:spcPct val="90000"/>
+              </a:lnSpc>
+              <a:spcBef>
+                <a:spcPts val="500"/>
+              </a:spcBef>
+              <a:buFont typeface="Arial" panose="020B0604020202020204" pitchFamily="34" charset="0"/>
+              <a:buChar char="•"/>
+              <a:defRPr sz="1800" kern="1200">
+                <a:solidFill>
+                  <a:schemeClr val="tx1"/>
+                </a:solidFill>
+                <a:latin typeface="+mn-lt"/>
+                <a:ea typeface="+mn-ea"/>
+                <a:cs typeface="+mn-cs"/>
+              </a:defRPr>
+            </a:lvl4pPr>
+            <a:lvl5pPr marL="2057400" indent="-228600" algn="l" defTabSz="914400" rtl="0" eaLnBrk="1" latinLnBrk="0" hangingPunct="1">
+              <a:lnSpc>
+                <a:spcPct val="90000"/>
+              </a:lnSpc>
+              <a:spcBef>
+                <a:spcPts val="500"/>
+              </a:spcBef>
+              <a:buFont typeface="Arial" panose="020B0604020202020204" pitchFamily="34" charset="0"/>
+              <a:buChar char="•"/>
+              <a:defRPr sz="1800" kern="1200">
+                <a:solidFill>
+                  <a:schemeClr val="tx1"/>
+                </a:solidFill>
+                <a:latin typeface="+mn-lt"/>
+                <a:ea typeface="+mn-ea"/>
+                <a:cs typeface="+mn-cs"/>
+              </a:defRPr>
+            </a:lvl5pPr>
+            <a:lvl6pPr marL="2514600" indent="-228600" algn="l" defTabSz="914400" rtl="0" eaLnBrk="1" latinLnBrk="0" hangingPunct="1">
+              <a:lnSpc>
+                <a:spcPct val="90000"/>
+              </a:lnSpc>
+              <a:spcBef>
+                <a:spcPts val="500"/>
+              </a:spcBef>
+              <a:buFont typeface="Arial" panose="020B0604020202020204" pitchFamily="34" charset="0"/>
+              <a:buChar char="•"/>
+              <a:defRPr sz="1800" kern="1200">
+                <a:solidFill>
+                  <a:schemeClr val="tx1"/>
+                </a:solidFill>
+                <a:latin typeface="+mn-lt"/>
+                <a:ea typeface="+mn-ea"/>
+                <a:cs typeface="+mn-cs"/>
+              </a:defRPr>
+            </a:lvl6pPr>
+            <a:lvl7pPr marL="2971800" indent="-228600" algn="l" defTabSz="914400" rtl="0" eaLnBrk="1" latinLnBrk="0" hangingPunct="1">
+              <a:lnSpc>
+                <a:spcPct val="90000"/>
+              </a:lnSpc>
+              <a:spcBef>
+                <a:spcPts val="500"/>
+              </a:spcBef>
+              <a:buFont typeface="Arial" panose="020B0604020202020204" pitchFamily="34" charset="0"/>
+              <a:buChar char="•"/>
+              <a:defRPr sz="1800" kern="1200">
+                <a:solidFill>
+                  <a:schemeClr val="tx1"/>
+                </a:solidFill>
+                <a:latin typeface="+mn-lt"/>
+                <a:ea typeface="+mn-ea"/>
+                <a:cs typeface="+mn-cs"/>
+              </a:defRPr>
+            </a:lvl7pPr>
+            <a:lvl8pPr marL="3429000" indent="-228600" algn="l" defTabSz="914400" rtl="0" eaLnBrk="1" latinLnBrk="0" hangingPunct="1">
+              <a:lnSpc>
+                <a:spcPct val="90000"/>
+              </a:lnSpc>
+              <a:spcBef>
+                <a:spcPts val="500"/>
+              </a:spcBef>
+              <a:buFont typeface="Arial" panose="020B0604020202020204" pitchFamily="34" charset="0"/>
+              <a:buChar char="•"/>
+              <a:defRPr sz="1800" kern="1200">
+                <a:solidFill>
+                  <a:schemeClr val="tx1"/>
+                </a:solidFill>
+                <a:latin typeface="+mn-lt"/>
+                <a:ea typeface="+mn-ea"/>
+                <a:cs typeface="+mn-cs"/>
+              </a:defRPr>
+            </a:lvl8pPr>
+            <a:lvl9pPr marL="3886200" indent="-228600" algn="l" defTabSz="914400" rtl="0" eaLnBrk="1" latinLnBrk="0" hangingPunct="1">
+              <a:lnSpc>
+                <a:spcPct val="90000"/>
+              </a:lnSpc>
+              <a:spcBef>
+                <a:spcPts val="500"/>
+              </a:spcBef>
+              <a:buFont typeface="Arial" panose="020B0604020202020204" pitchFamily="34" charset="0"/>
+              <a:buChar char="•"/>
+              <a:defRPr sz="1800" kern="1200">
+                <a:solidFill>
+                  <a:schemeClr val="tx1"/>
+                </a:solidFill>
+                <a:latin typeface="+mn-lt"/>
+                <a:ea typeface="+mn-ea"/>
+                <a:cs typeface="+mn-cs"/>
+              </a:defRPr>
+            </a:lvl9pPr>
+          </a:lstStyle>
+          <a:p>
+            <a:r>
+              <a:rPr lang="en-GB" sz="2400" dirty="0">
+                <a:latin typeface="Times New Roman" panose="02020603050405020304" pitchFamily="18" charset="0"/>
+                <a:cs typeface="Times New Roman" panose="02020603050405020304" pitchFamily="18" charset="0"/>
+              </a:rPr>
+              <a:t>Removed all non-ascii characters from the set (</a:t>
+            </a:r>
+            <a:r>
+              <a:rPr lang="en-GB" sz="2400" dirty="0" err="1">
+                <a:latin typeface="Times New Roman" panose="02020603050405020304" pitchFamily="18" charset="0"/>
+                <a:cs typeface="Times New Roman" panose="02020603050405020304" pitchFamily="18" charset="0"/>
+              </a:rPr>
+              <a:t>i.e</a:t>
+            </a:r>
+            <a:r>
+              <a:rPr lang="en-GB" sz="2400" dirty="0">
+                <a:latin typeface="Times New Roman" panose="02020603050405020304" pitchFamily="18" charset="0"/>
+                <a:cs typeface="Times New Roman" panose="02020603050405020304" pitchFamily="18" charset="0"/>
+              </a:rPr>
+              <a:t> &amp;#39;) </a:t>
+            </a:r>
           </a:p>
         </p:txBody>
       </p:sp>
     </p:spTree>
     <p:extLst>
       <p:ext uri="{BB962C8B-B14F-4D97-AF65-F5344CB8AC3E}">
-        <p14:creationId xmlns:p14="http://schemas.microsoft.com/office/powerpoint/2010/main" val="1542807836"/>
+        <p14:creationId xmlns:p14="http://schemas.microsoft.com/office/powerpoint/2010/main" val="3161193370"/>
       </p:ext>
     </p:extLst>
   </p:cSld>
@@ -8082,6 +8396,100 @@
     <p:extLst>
       <p:ext uri="{BB962C8B-B14F-4D97-AF65-F5344CB8AC3E}">
         <p14:creationId xmlns:p14="http://schemas.microsoft.com/office/powerpoint/2010/main" val="1914334089"/>
+      </p:ext>
+    </p:extLst>
+  </p:cSld>
+  <p:clrMapOvr>
+    <a:masterClrMapping/>
+  </p:clrMapOvr>
+</p:sld>
+</file>
+
+<file path=ppt/slides/slide20.xml><?xml version="1.0" encoding="utf-8"?>
+<p:sld xmlns:a="http://schemas.openxmlformats.org/drawingml/2006/main" xmlns:r="http://schemas.openxmlformats.org/officeDocument/2006/relationships" xmlns:p="http://schemas.openxmlformats.org/presentationml/2006/main">
+  <p:cSld>
+    <p:spTree>
+      <p:nvGrpSpPr>
+        <p:cNvPr id="1" name=""/>
+        <p:cNvGrpSpPr/>
+        <p:nvPr/>
+      </p:nvGrpSpPr>
+      <p:grpSpPr>
+        <a:xfrm>
+          <a:off x="0" y="0"/>
+          <a:ext cx="0" cy="0"/>
+          <a:chOff x="0" y="0"/>
+          <a:chExt cx="0" cy="0"/>
+        </a:xfrm>
+      </p:grpSpPr>
+      <p:sp>
+        <p:nvSpPr>
+          <p:cNvPr id="2" name="Title 1">
+            <a:extLst>
+              <a:ext uri="{FF2B5EF4-FFF2-40B4-BE49-F238E27FC236}">
+                <a16:creationId xmlns:a16="http://schemas.microsoft.com/office/drawing/2014/main" id="{770E6EE7-B050-46D5-B12B-FF8B9068E4C3}"/>
+              </a:ext>
+            </a:extLst>
+          </p:cNvPr>
+          <p:cNvSpPr>
+            <a:spLocks noGrp="1"/>
+          </p:cNvSpPr>
+          <p:nvPr>
+            <p:ph type="title"/>
+          </p:nvPr>
+        </p:nvSpPr>
+        <p:spPr>
+          <a:xfrm>
+            <a:off x="838200" y="2691765"/>
+            <a:ext cx="10515600" cy="1325563"/>
+          </a:xfrm>
+        </p:spPr>
+        <p:txBody>
+          <a:bodyPr>
+            <a:normAutofit/>
+          </a:bodyPr>
+          <a:lstStyle/>
+          <a:p>
+            <a:pPr algn="ctr"/>
+            <a:r>
+              <a:rPr lang="en-GB" dirty="0">
+                <a:latin typeface="Times New Roman" panose="02020603050405020304" pitchFamily="18" charset="0"/>
+                <a:cs typeface="Times New Roman" panose="02020603050405020304" pitchFamily="18" charset="0"/>
+              </a:rPr>
+              <a:t>Evaluation &amp; Refinement</a:t>
+            </a:r>
+          </a:p>
+        </p:txBody>
+      </p:sp>
+      <p:sp>
+        <p:nvSpPr>
+          <p:cNvPr id="7" name="Footer Placeholder 6">
+            <a:extLst>
+              <a:ext uri="{FF2B5EF4-FFF2-40B4-BE49-F238E27FC236}">
+                <a16:creationId xmlns:a16="http://schemas.microsoft.com/office/drawing/2014/main" id="{BFBBBD93-BE28-4EB0-AD63-C26CC96E7E2B}"/>
+              </a:ext>
+            </a:extLst>
+          </p:cNvPr>
+          <p:cNvSpPr>
+            <a:spLocks noGrp="1"/>
+          </p:cNvSpPr>
+          <p:nvPr>
+            <p:ph type="ftr" sz="quarter" idx="11"/>
+          </p:nvPr>
+        </p:nvSpPr>
+        <p:spPr/>
+        <p:txBody>
+          <a:bodyPr/>
+          <a:lstStyle/>
+          <a:p>
+            <a:endParaRPr lang="en-GB" dirty="0"/>
+          </a:p>
+        </p:txBody>
+      </p:sp>
+    </p:spTree>
+    <p:extLst>
+      <p:ext uri="{BB962C8B-B14F-4D97-AF65-F5344CB8AC3E}">
+        <p14:creationId xmlns:p14="http://schemas.microsoft.com/office/powerpoint/2010/main" val="1542807836"/>
       </p:ext>
     </p:extLst>
   </p:cSld>

</xml_diff>

<commit_message>
Added some more evaluation details
</commit_message>
<xml_diff>
--- a/Documentation/100505349.pptx
+++ b/Documentation/100505349.pptx
@@ -6623,7 +6623,7 @@
                 <a:latin typeface="Times New Roman" panose="02020603050405020304" pitchFamily="18" charset="0"/>
                 <a:cs typeface="Times New Roman" panose="02020603050405020304" pitchFamily="18" charset="0"/>
               </a:rPr>
-              <a:t>Critical Analysis – Averages Problem</a:t>
+              <a:t>Critical Analysis – Averages Hypothesis</a:t>
             </a:r>
           </a:p>
         </p:txBody>
@@ -6978,7 +6978,7 @@
                 <a:latin typeface="Times New Roman" panose="02020603050405020304" pitchFamily="18" charset="0"/>
                 <a:cs typeface="Times New Roman" panose="02020603050405020304" pitchFamily="18" charset="0"/>
               </a:rPr>
-              <a:t>Critical Analysis – Testing Averages</a:t>
+              <a:t>Critical Analysis – Testing the Hypothesis</a:t>
             </a:r>
           </a:p>
         </p:txBody>
@@ -7062,17 +7062,55 @@
                 <a:latin typeface="Times New Roman" panose="02020603050405020304" pitchFamily="18" charset="0"/>
                 <a:cs typeface="Times New Roman" panose="02020603050405020304" pitchFamily="18" charset="0"/>
               </a:rPr>
-              <a:t>The results of said test alleviated concerns as the accuracy of the model seemed to correlate with the amount of training data – disproving the hypothesis entirely</a:t>
+              <a:t>The results of said test alleviated concerns as the accuracy of the model seemed to correlate with the amount of training data – disproving the hypothesis entirely.</a:t>
+            </a:r>
+          </a:p>
+        </p:txBody>
+      </p:sp>
+      <p:sp>
+        <p:nvSpPr>
+          <p:cNvPr id="8" name="TextBox 7">
+            <a:extLst>
+              <a:ext uri="{FF2B5EF4-FFF2-40B4-BE49-F238E27FC236}">
+                <a16:creationId xmlns:a16="http://schemas.microsoft.com/office/drawing/2014/main" id="{55E9BF51-7823-402D-98BB-59E72C7002D5}"/>
+              </a:ext>
+            </a:extLst>
+          </p:cNvPr>
+          <p:cNvSpPr txBox="1"/>
+          <p:nvPr/>
+        </p:nvSpPr>
+        <p:spPr>
+          <a:xfrm>
+            <a:off x="8153400" y="5212417"/>
+            <a:ext cx="3703320" cy="738664"/>
+          </a:xfrm>
+          <a:prstGeom prst="rect">
+            <a:avLst/>
+          </a:prstGeom>
+          <a:noFill/>
+        </p:spPr>
+        <p:txBody>
+          <a:bodyPr wrap="square" rtlCol="0">
+            <a:spAutoFit/>
+          </a:bodyPr>
+          <a:lstStyle/>
+          <a:p>
+            <a:r>
+              <a:rPr lang="en-GB" sz="1400" i="1" dirty="0">
+                <a:latin typeface="Times New Roman" panose="02020603050405020304" pitchFamily="18" charset="0"/>
+                <a:cs typeface="Times New Roman" panose="02020603050405020304" pitchFamily="18" charset="0"/>
+              </a:rPr>
+              <a:t>Percent accuracy (Y-axis) against the decimal proportion of the data given as training data (X-axis)</a:t>
             </a:r>
           </a:p>
         </p:txBody>
       </p:sp>
       <p:pic>
         <p:nvPicPr>
-          <p:cNvPr id="7" name="Picture 6">
-            <a:extLst>
-              <a:ext uri="{FF2B5EF4-FFF2-40B4-BE49-F238E27FC236}">
-                <a16:creationId xmlns:a16="http://schemas.microsoft.com/office/drawing/2014/main" id="{9BF1E2DD-C320-4064-97FB-64F7304CC1C5}"/>
+          <p:cNvPr id="6" name="Picture 5">
+            <a:extLst>
+              <a:ext uri="{FF2B5EF4-FFF2-40B4-BE49-F238E27FC236}">
+                <a16:creationId xmlns:a16="http://schemas.microsoft.com/office/drawing/2014/main" id="{73E9B1F8-C503-44E4-8DF7-3D51B0817A50}"/>
               </a:ext>
             </a:extLst>
           </p:cNvPr>
@@ -7081,59 +7119,22 @@
           </p:cNvPicPr>
           <p:nvPr/>
         </p:nvPicPr>
-        <p:blipFill rotWithShape="1">
+        <p:blipFill>
           <a:blip r:embed="rId3"/>
-          <a:srcRect l="-767" t="2449" r="767"/>
-          <a:stretch/>
+          <a:stretch>
+            <a:fillRect/>
+          </a:stretch>
         </p:blipFill>
         <p:spPr>
           <a:xfrm>
-            <a:off x="8153400" y="1825625"/>
-            <a:ext cx="3724275" cy="3289300"/>
+            <a:off x="7750089" y="2174240"/>
+            <a:ext cx="4313324" cy="3038177"/>
           </a:xfrm>
           <a:prstGeom prst="rect">
             <a:avLst/>
           </a:prstGeom>
         </p:spPr>
       </p:pic>
-      <p:sp>
-        <p:nvSpPr>
-          <p:cNvPr id="8" name="TextBox 7">
-            <a:extLst>
-              <a:ext uri="{FF2B5EF4-FFF2-40B4-BE49-F238E27FC236}">
-                <a16:creationId xmlns:a16="http://schemas.microsoft.com/office/drawing/2014/main" id="{55E9BF51-7823-402D-98BB-59E72C7002D5}"/>
-              </a:ext>
-            </a:extLst>
-          </p:cNvPr>
-          <p:cNvSpPr txBox="1"/>
-          <p:nvPr/>
-        </p:nvSpPr>
-        <p:spPr>
-          <a:xfrm>
-            <a:off x="8379777" y="5212417"/>
-            <a:ext cx="3271520" cy="738664"/>
-          </a:xfrm>
-          <a:prstGeom prst="rect">
-            <a:avLst/>
-          </a:prstGeom>
-          <a:noFill/>
-        </p:spPr>
-        <p:txBody>
-          <a:bodyPr wrap="square" rtlCol="0">
-            <a:spAutoFit/>
-          </a:bodyPr>
-          <a:lstStyle/>
-          <a:p>
-            <a:r>
-              <a:rPr lang="en-GB" sz="1400" i="1" dirty="0">
-                <a:latin typeface="Times New Roman" panose="02020603050405020304" pitchFamily="18" charset="0"/>
-                <a:cs typeface="Times New Roman" panose="02020603050405020304" pitchFamily="18" charset="0"/>
-              </a:rPr>
-              <a:t>Percent accuracy (Y-axis) against the decimal proportion of the data given as training data (X-axis)</a:t>
-            </a:r>
-          </a:p>
-        </p:txBody>
-      </p:sp>
     </p:spTree>
     <p:extLst>
       <p:ext uri="{BB962C8B-B14F-4D97-AF65-F5344CB8AC3E}">
@@ -9016,7 +9017,7 @@
                 <a:latin typeface="Times New Roman" panose="02020603050405020304" pitchFamily="18" charset="0"/>
                 <a:cs typeface="Times New Roman" panose="02020603050405020304" pitchFamily="18" charset="0"/>
               </a:rPr>
-              <a:t>Evaluation &amp; Refinement</a:t>
+              <a:t>Evaluation</a:t>
             </a:r>
           </a:p>
         </p:txBody>
@@ -9130,7 +9131,7 @@
           <a:p>
             <a:r>
               <a:rPr lang="en-GB" dirty="0"/>
-              <a:t>Evaluation &amp; Refinement</a:t>
+              <a:t>Evaluation</a:t>
             </a:r>
           </a:p>
         </p:txBody>
@@ -9332,7 +9333,7 @@
                 <a:latin typeface="Times New Roman" panose="02020603050405020304" pitchFamily="18" charset="0"/>
                 <a:cs typeface="Times New Roman" panose="02020603050405020304" pitchFamily="18" charset="0"/>
               </a:rPr>
-              <a:t>Provided with a 70/30 training/test split and tested with 30 different permutations</a:t>
+              <a:t>Provided with a 70/30 training/test split and tested with 100 different permutations</a:t>
             </a:r>
           </a:p>
           <a:p>
@@ -9341,8 +9342,19 @@
                 <a:latin typeface="Times New Roman" panose="02020603050405020304" pitchFamily="18" charset="0"/>
                 <a:cs typeface="Times New Roman" panose="02020603050405020304" pitchFamily="18" charset="0"/>
               </a:rPr>
-              <a:t>Results consistently ranged from 67-73% accuracy</a:t>
-            </a:r>
+              <a:t>Results consistently averaged 72.5</a:t>
+            </a:r>
+            <a:r>
+              <a:rPr lang="en-GB" sz="1800">
+                <a:latin typeface="Times New Roman" panose="02020603050405020304" pitchFamily="18" charset="0"/>
+                <a:cs typeface="Times New Roman" panose="02020603050405020304" pitchFamily="18" charset="0"/>
+              </a:rPr>
+              <a:t>% accuracy</a:t>
+            </a:r>
+            <a:endParaRPr lang="en-GB" sz="1800" dirty="0">
+              <a:latin typeface="Times New Roman" panose="02020603050405020304" pitchFamily="18" charset="0"/>
+              <a:cs typeface="Times New Roman" panose="02020603050405020304" pitchFamily="18" charset="0"/>
+            </a:endParaRPr>
           </a:p>
           <a:p>
             <a:r>
@@ -9355,12 +9367,50 @@
           </a:p>
         </p:txBody>
       </p:sp>
+      <p:sp>
+        <p:nvSpPr>
+          <p:cNvPr id="3" name="TextBox 2">
+            <a:extLst>
+              <a:ext uri="{FF2B5EF4-FFF2-40B4-BE49-F238E27FC236}">
+                <a16:creationId xmlns:a16="http://schemas.microsoft.com/office/drawing/2014/main" id="{29FC669D-D1D9-48B5-869A-067B002A60D0}"/>
+              </a:ext>
+            </a:extLst>
+          </p:cNvPr>
+          <p:cNvSpPr txBox="1"/>
+          <p:nvPr/>
+        </p:nvSpPr>
+        <p:spPr>
+          <a:xfrm>
+            <a:off x="8564879" y="4663459"/>
+            <a:ext cx="3271520" cy="523220"/>
+          </a:xfrm>
+          <a:prstGeom prst="rect">
+            <a:avLst/>
+          </a:prstGeom>
+          <a:noFill/>
+        </p:spPr>
+        <p:txBody>
+          <a:bodyPr wrap="square" rtlCol="0">
+            <a:spAutoFit/>
+          </a:bodyPr>
+          <a:lstStyle/>
+          <a:p>
+            <a:r>
+              <a:rPr lang="en-GB" sz="1400" i="1" dirty="0">
+                <a:latin typeface="Times New Roman" panose="02020603050405020304" pitchFamily="18" charset="0"/>
+                <a:cs typeface="Times New Roman" panose="02020603050405020304" pitchFamily="18" charset="0"/>
+              </a:rPr>
+              <a:t>Accuracy (percentage) spread across one hundred iterations of the model</a:t>
+            </a:r>
+          </a:p>
+        </p:txBody>
+      </p:sp>
       <p:pic>
         <p:nvPicPr>
-          <p:cNvPr id="11" name="Picture 10">
-            <a:extLst>
-              <a:ext uri="{FF2B5EF4-FFF2-40B4-BE49-F238E27FC236}">
-                <a16:creationId xmlns:a16="http://schemas.microsoft.com/office/drawing/2014/main" id="{2AA48E21-FC7F-4525-9167-90C95989B617}"/>
+          <p:cNvPr id="6" name="Picture 5">
+            <a:extLst>
+              <a:ext uri="{FF2B5EF4-FFF2-40B4-BE49-F238E27FC236}">
+                <a16:creationId xmlns:a16="http://schemas.microsoft.com/office/drawing/2014/main" id="{588DB62C-FE44-46D4-8051-934F0533E949}"/>
               </a:ext>
             </a:extLst>
           </p:cNvPr>
@@ -9371,74 +9421,6 @@
         </p:nvPicPr>
         <p:blipFill>
           <a:blip r:embed="rId3"/>
-          <a:stretch>
-            <a:fillRect/>
-          </a:stretch>
-        </p:blipFill>
-        <p:spPr>
-          <a:xfrm>
-            <a:off x="8236267" y="1434812"/>
-            <a:ext cx="3705225" cy="3295650"/>
-          </a:xfrm>
-          <a:prstGeom prst="rect">
-            <a:avLst/>
-          </a:prstGeom>
-        </p:spPr>
-      </p:pic>
-      <p:sp>
-        <p:nvSpPr>
-          <p:cNvPr id="3" name="TextBox 2">
-            <a:extLst>
-              <a:ext uri="{FF2B5EF4-FFF2-40B4-BE49-F238E27FC236}">
-                <a16:creationId xmlns:a16="http://schemas.microsoft.com/office/drawing/2014/main" id="{29FC669D-D1D9-48B5-869A-067B002A60D0}"/>
-              </a:ext>
-            </a:extLst>
-          </p:cNvPr>
-          <p:cNvSpPr txBox="1"/>
-          <p:nvPr/>
-        </p:nvSpPr>
-        <p:spPr>
-          <a:xfrm>
-            <a:off x="8453120" y="4730462"/>
-            <a:ext cx="3271520" cy="523220"/>
-          </a:xfrm>
-          <a:prstGeom prst="rect">
-            <a:avLst/>
-          </a:prstGeom>
-          <a:noFill/>
-        </p:spPr>
-        <p:txBody>
-          <a:bodyPr wrap="square" rtlCol="0">
-            <a:spAutoFit/>
-          </a:bodyPr>
-          <a:lstStyle/>
-          <a:p>
-            <a:r>
-              <a:rPr lang="en-GB" sz="1400" i="1" dirty="0">
-                <a:latin typeface="Times New Roman" panose="02020603050405020304" pitchFamily="18" charset="0"/>
-                <a:cs typeface="Times New Roman" panose="02020603050405020304" pitchFamily="18" charset="0"/>
-              </a:rPr>
-              <a:t>Accuracy (percentage) spread across one hundred iterations of the model</a:t>
-            </a:r>
-          </a:p>
-        </p:txBody>
-      </p:sp>
-      <p:pic>
-        <p:nvPicPr>
-          <p:cNvPr id="6" name="Picture 5">
-            <a:extLst>
-              <a:ext uri="{FF2B5EF4-FFF2-40B4-BE49-F238E27FC236}">
-                <a16:creationId xmlns:a16="http://schemas.microsoft.com/office/drawing/2014/main" id="{588DB62C-FE44-46D4-8051-934F0533E949}"/>
-              </a:ext>
-            </a:extLst>
-          </p:cNvPr>
-          <p:cNvPicPr>
-            <a:picLocks noChangeAspect="1"/>
-          </p:cNvPicPr>
-          <p:nvPr/>
-        </p:nvPicPr>
-        <p:blipFill>
-          <a:blip r:embed="rId4"/>
           <a:stretch>
             <a:fillRect/>
           </a:stretch>
@@ -9468,7 +9450,7 @@
           <p:nvPr/>
         </p:nvPicPr>
         <p:blipFill>
-          <a:blip r:embed="rId5"/>
+          <a:blip r:embed="rId4"/>
           <a:stretch>
             <a:fillRect/>
           </a:stretch>
@@ -9561,6 +9543,36 @@
           </a:p>
         </p:txBody>
       </p:sp>
+      <p:pic>
+        <p:nvPicPr>
+          <p:cNvPr id="7" name="Picture 6">
+            <a:extLst>
+              <a:ext uri="{FF2B5EF4-FFF2-40B4-BE49-F238E27FC236}">
+                <a16:creationId xmlns:a16="http://schemas.microsoft.com/office/drawing/2014/main" id="{F9522C53-0D99-4471-9E1A-EC319ADA14D9}"/>
+              </a:ext>
+            </a:extLst>
+          </p:cNvPr>
+          <p:cNvPicPr>
+            <a:picLocks noChangeAspect="1"/>
+          </p:cNvPicPr>
+          <p:nvPr/>
+        </p:nvPicPr>
+        <p:blipFill>
+          <a:blip r:embed="rId5"/>
+          <a:stretch>
+            <a:fillRect/>
+          </a:stretch>
+        </p:blipFill>
+        <p:spPr>
+          <a:xfrm>
+            <a:off x="8357552" y="1302963"/>
+            <a:ext cx="3686175" cy="3295650"/>
+          </a:xfrm>
+          <a:prstGeom prst="rect">
+            <a:avLst/>
+          </a:prstGeom>
+        </p:spPr>
+      </p:pic>
     </p:spTree>
     <p:extLst>
       <p:ext uri="{BB962C8B-B14F-4D97-AF65-F5344CB8AC3E}">
@@ -9775,7 +9787,7 @@
                 <a:latin typeface="Times New Roman" panose="02020603050405020304" pitchFamily="18" charset="0"/>
                 <a:cs typeface="Times New Roman" panose="02020603050405020304" pitchFamily="18" charset="0"/>
               </a:rPr>
-              <a:t>Spacy</a:t>
+              <a:t>Library - Spacy</a:t>
             </a:r>
           </a:p>
         </p:txBody>
@@ -9796,7 +9808,12 @@
             <p:ph idx="1"/>
           </p:nvPr>
         </p:nvSpPr>
-        <p:spPr/>
+        <p:spPr>
+          <a:xfrm>
+            <a:off x="706120" y="1690688"/>
+            <a:ext cx="10647680" cy="2332672"/>
+          </a:xfrm>
+        </p:spPr>
         <p:txBody>
           <a:bodyPr>
             <a:normAutofit/>
@@ -9808,7 +9825,7 @@
                 <a:latin typeface="Times New Roman" panose="02020603050405020304" pitchFamily="18" charset="0"/>
                 <a:cs typeface="Times New Roman" panose="02020603050405020304" pitchFamily="18" charset="0"/>
               </a:rPr>
-              <a:t>Natural Language Processing library</a:t>
+              <a:t>Natural language processing library</a:t>
             </a:r>
           </a:p>
           <a:p>
@@ -9826,17 +9843,17 @@
                 <a:latin typeface="Times New Roman" panose="02020603050405020304" pitchFamily="18" charset="0"/>
                 <a:cs typeface="Times New Roman" panose="02020603050405020304" pitchFamily="18" charset="0"/>
               </a:rPr>
-              <a:t>Distinctly not a prebuilt chatbot library. Spacy only intends to be a framework for NLP centric projects (such as chatbots) to build from</a:t>
-            </a:r>
-          </a:p>
-          <a:p>
-            <a:pPr marL="0" indent="0">
-              <a:buNone/>
-            </a:pPr>
-            <a:endParaRPr lang="en-GB" sz="2000" dirty="0">
-              <a:latin typeface="Times New Roman" panose="02020603050405020304" pitchFamily="18" charset="0"/>
-              <a:cs typeface="Times New Roman" panose="02020603050405020304" pitchFamily="18" charset="0"/>
-            </a:endParaRPr>
+              <a:t>Built as a framework to construct other projects upon, including chatbots</a:t>
+            </a:r>
+          </a:p>
+          <a:p>
+            <a:r>
+              <a:rPr lang="en-GB" sz="2000" dirty="0">
+                <a:latin typeface="Times New Roman" panose="02020603050405020304" pitchFamily="18" charset="0"/>
+                <a:cs typeface="Times New Roman" panose="02020603050405020304" pitchFamily="18" charset="0"/>
+              </a:rPr>
+              <a:t>Other chatbots and chatbot libraries (such as chatterbot) are dependent on spacy – demonstrating it is applicable for this field </a:t>
+            </a:r>
           </a:p>
         </p:txBody>
       </p:sp>
@@ -9868,6 +9885,53 @@
           </a:p>
         </p:txBody>
       </p:sp>
+      <p:pic>
+        <p:nvPicPr>
+          <p:cNvPr id="1026" name="Picture 2" descr="spaCy - Wikipedia">
+            <a:extLst>
+              <a:ext uri="{FF2B5EF4-FFF2-40B4-BE49-F238E27FC236}">
+                <a16:creationId xmlns:a16="http://schemas.microsoft.com/office/drawing/2014/main" id="{508D13BA-CB8D-4F6A-9E03-0319F367F495}"/>
+              </a:ext>
+            </a:extLst>
+          </p:cNvPr>
+          <p:cNvPicPr>
+            <a:picLocks noChangeAspect="1" noChangeArrowheads="1"/>
+          </p:cNvPicPr>
+          <p:nvPr/>
+        </p:nvPicPr>
+        <p:blipFill>
+          <a:blip r:embed="rId3">
+            <a:extLst>
+              <a:ext uri="{28A0092B-C50C-407E-A947-70E740481C1C}">
+                <a14:useLocalDpi xmlns:a14="http://schemas.microsoft.com/office/drawing/2010/main" val="0"/>
+              </a:ext>
+            </a:extLst>
+          </a:blip>
+          <a:srcRect/>
+          <a:stretch>
+            <a:fillRect/>
+          </a:stretch>
+        </p:blipFill>
+        <p:spPr bwMode="auto">
+          <a:xfrm>
+            <a:off x="6817360" y="149410"/>
+            <a:ext cx="4937760" cy="1765249"/>
+          </a:xfrm>
+          <a:prstGeom prst="rect">
+            <a:avLst/>
+          </a:prstGeom>
+          <a:noFill/>
+          <a:extLst>
+            <a:ext uri="{909E8E84-426E-40DD-AFC4-6F175D3DCCD1}">
+              <a14:hiddenFill xmlns:a14="http://schemas.microsoft.com/office/drawing/2010/main">
+                <a:solidFill>
+                  <a:srgbClr val="FFFFFF"/>
+                </a:solidFill>
+              </a14:hiddenFill>
+            </a:ext>
+          </a:extLst>
+        </p:spPr>
+      </p:pic>
     </p:spTree>
     <p:extLst>
       <p:ext uri="{BB962C8B-B14F-4D97-AF65-F5344CB8AC3E}">
@@ -10481,7 +10545,12 @@
             <p:ph type="title"/>
           </p:nvPr>
         </p:nvSpPr>
-        <p:spPr/>
+        <p:spPr>
+          <a:xfrm>
+            <a:off x="838200" y="330632"/>
+            <a:ext cx="10515600" cy="1325563"/>
+          </a:xfrm>
+        </p:spPr>
         <p:txBody>
           <a:bodyPr>
             <a:normAutofit/>
@@ -10516,7 +10585,7 @@
         </p:nvSpPr>
         <p:spPr>
           <a:xfrm>
-            <a:off x="838200" y="1528128"/>
+            <a:off x="838200" y="1416368"/>
             <a:ext cx="9890760" cy="4351338"/>
           </a:xfrm>
         </p:spPr>
@@ -10601,7 +10670,7 @@
         </p:blipFill>
         <p:spPr>
           <a:xfrm>
-            <a:off x="2659380" y="2990984"/>
+            <a:off x="2659380" y="2970664"/>
             <a:ext cx="6248400" cy="3219996"/>
           </a:xfrm>
           <a:prstGeom prst="rect">

</xml_diff>

<commit_message>
added script draft and some more comments
</commit_message>
<xml_diff>
--- a/Documentation/100505349.pptx
+++ b/Documentation/100505349.pptx
@@ -17,8 +17,8 @@
     <p:sldId id="260" r:id="rId5"/>
     <p:sldId id="261" r:id="rId6"/>
     <p:sldId id="264" r:id="rId7"/>
-    <p:sldId id="281" r:id="rId8"/>
-    <p:sldId id="262" r:id="rId9"/>
+    <p:sldId id="262" r:id="rId8"/>
+    <p:sldId id="281" r:id="rId9"/>
     <p:sldId id="263" r:id="rId10"/>
     <p:sldId id="265" r:id="rId11"/>
     <p:sldId id="266" r:id="rId12"/>
@@ -142,8 +142,8 @@
             <p14:sldId id="260"/>
             <p14:sldId id="261"/>
             <p14:sldId id="264"/>
+            <p14:sldId id="262"/>
             <p14:sldId id="281"/>
-            <p14:sldId id="262"/>
             <p14:sldId id="263"/>
             <p14:sldId id="265"/>
             <p14:sldId id="266"/>
@@ -263,7 +263,7 @@
           <a:p>
             <a:fld id="{7DDF2B0D-01F9-40A6-83B8-CA688E599BFE}" type="datetimeFigureOut">
               <a:rPr lang="en-GB" smtClean="0"/>
-              <a:t>13/05/2022</a:t>
+              <a:t>14/05/2022</a:t>
             </a:fld>
             <a:endParaRPr lang="en-GB"/>
           </a:p>
@@ -441,7 +441,7 @@
           <a:p>
             <a:fld id="{5F411E22-B9AA-407B-9F29-B3EBA7D89382}" type="datetimeFigureOut">
               <a:rPr lang="en-GB" smtClean="0"/>
-              <a:t>13/05/2022</a:t>
+              <a:t>14/05/2022</a:t>
             </a:fld>
             <a:endParaRPr lang="en-GB"/>
           </a:p>
@@ -1652,6 +1652,9 @@
               <a:t>Y = percent accuracy for this test</a:t>
             </a:r>
           </a:p>
+          <a:p>
+            <a:endParaRPr lang="en-GB" dirty="0"/>
+          </a:p>
         </p:txBody>
       </p:sp>
       <p:sp>
@@ -1745,7 +1748,16 @@
           <a:p>
             <a:r>
               <a:rPr lang="en-GB" dirty="0"/>
-              <a:t>Retrieval chatbots are less dynamic than generative chatbots but are superior when dealing with questions that require logic. </a:t>
+              <a:t>Retrieval chatbots are less dynamic than generative chatbots but are superior when dealing with questions that require logic.</a:t>
+            </a:r>
+          </a:p>
+          <a:p>
+            <a:endParaRPr lang="en-GB" dirty="0"/>
+          </a:p>
+          <a:p>
+            <a:r>
+              <a:rPr lang="en-GB" dirty="0"/>
+              <a:t>https://ijtre.com/images/scripts/2019060732.pdf </a:t>
             </a:r>
           </a:p>
         </p:txBody>
@@ -2118,7 +2130,7 @@
           <a:p>
             <a:fld id="{6A9D5347-B203-4D7E-8C0C-C0F523BBFB73}" type="slidenum">
               <a:rPr lang="en-GB" smtClean="0"/>
-              <a:t>8</a:t>
+              <a:t>7</a:t>
             </a:fld>
             <a:endParaRPr lang="en-GB"/>
           </a:p>
@@ -2544,7 +2556,7 @@
           <a:p>
             <a:fld id="{AE0F6D4B-2242-4C15-9B1F-EB67BC7C3CD1}" type="datetime1">
               <a:rPr lang="en-GB" smtClean="0"/>
-              <a:t>13/05/2022</a:t>
+              <a:t>14/05/2022</a:t>
             </a:fld>
             <a:endParaRPr lang="en-GB"/>
           </a:p>
@@ -2747,7 +2759,7 @@
           <a:p>
             <a:fld id="{148F44C1-1DF0-4D73-AB6D-E462219C56CA}" type="datetime1">
               <a:rPr lang="en-GB" smtClean="0"/>
-              <a:t>13/05/2022</a:t>
+              <a:t>14/05/2022</a:t>
             </a:fld>
             <a:endParaRPr lang="en-GB"/>
           </a:p>
@@ -2960,7 +2972,7 @@
           <a:p>
             <a:fld id="{C3A31CC1-D2D6-4B4E-B0F3-499814EE3B58}" type="datetime1">
               <a:rPr lang="en-GB" smtClean="0"/>
-              <a:t>13/05/2022</a:t>
+              <a:t>14/05/2022</a:t>
             </a:fld>
             <a:endParaRPr lang="en-GB"/>
           </a:p>
@@ -3163,7 +3175,7 @@
           <a:p>
             <a:fld id="{A3FF5B57-79BA-4336-9C8C-134BE5A097AD}" type="datetime1">
               <a:rPr lang="en-GB" smtClean="0"/>
-              <a:t>13/05/2022</a:t>
+              <a:t>14/05/2022</a:t>
             </a:fld>
             <a:endParaRPr lang="en-GB"/>
           </a:p>
@@ -3442,7 +3454,7 @@
           <a:p>
             <a:fld id="{EB67FD68-3457-44CE-AA52-F874EEC85611}" type="datetime1">
               <a:rPr lang="en-GB" smtClean="0"/>
-              <a:t>13/05/2022</a:t>
+              <a:t>14/05/2022</a:t>
             </a:fld>
             <a:endParaRPr lang="en-GB"/>
           </a:p>
@@ -3713,7 +3725,7 @@
           <a:p>
             <a:fld id="{4BA8742A-D1B6-4DBA-A73E-40DBF03C5B42}" type="datetime1">
               <a:rPr lang="en-GB" smtClean="0"/>
-              <a:t>13/05/2022</a:t>
+              <a:t>14/05/2022</a:t>
             </a:fld>
             <a:endParaRPr lang="en-GB"/>
           </a:p>
@@ -4131,7 +4143,7 @@
           <a:p>
             <a:fld id="{63FD0926-F3B9-455D-8AA5-A7B7B6009E87}" type="datetime1">
               <a:rPr lang="en-GB" smtClean="0"/>
-              <a:t>13/05/2022</a:t>
+              <a:t>14/05/2022</a:t>
             </a:fld>
             <a:endParaRPr lang="en-GB"/>
           </a:p>
@@ -4276,7 +4288,7 @@
           <a:p>
             <a:fld id="{4B70B3C0-2F19-4721-874E-D7681BE64C84}" type="datetime1">
               <a:rPr lang="en-GB" smtClean="0"/>
-              <a:t>13/05/2022</a:t>
+              <a:t>14/05/2022</a:t>
             </a:fld>
             <a:endParaRPr lang="en-GB"/>
           </a:p>
@@ -4392,7 +4404,7 @@
           <a:p>
             <a:fld id="{F65B3172-13F0-475E-AEE3-58D82DD42C69}" type="datetime1">
               <a:rPr lang="en-GB" smtClean="0"/>
-              <a:t>13/05/2022</a:t>
+              <a:t>14/05/2022</a:t>
             </a:fld>
             <a:endParaRPr lang="en-GB"/>
           </a:p>
@@ -4708,7 +4720,7 @@
           <a:p>
             <a:fld id="{6C3F1D32-7E7A-4E80-AF0D-6E255F242C09}" type="datetime1">
               <a:rPr lang="en-GB" smtClean="0"/>
-              <a:t>13/05/2022</a:t>
+              <a:t>14/05/2022</a:t>
             </a:fld>
             <a:endParaRPr lang="en-GB"/>
           </a:p>
@@ -5000,7 +5012,7 @@
           <a:p>
             <a:fld id="{AD7C149D-3981-4CD0-8858-4DC0837EA971}" type="datetime1">
               <a:rPr lang="en-GB" smtClean="0"/>
-              <a:t>13/05/2022</a:t>
+              <a:t>14/05/2022</a:t>
             </a:fld>
             <a:endParaRPr lang="en-GB"/>
           </a:p>
@@ -5246,7 +5258,7 @@
           <a:p>
             <a:fld id="{974CD72A-BED1-4076-8EB6-0C606103999B}" type="datetime1">
               <a:rPr lang="en-GB" smtClean="0"/>
-              <a:t>13/05/2022</a:t>
+              <a:t>14/05/2022</a:t>
             </a:fld>
             <a:endParaRPr lang="en-GB"/>
           </a:p>
@@ -9124,7 +9136,12 @@
             <p:ph type="ftr" sz="quarter" idx="11"/>
           </p:nvPr>
         </p:nvSpPr>
-        <p:spPr/>
+        <p:spPr>
+          <a:xfrm>
+            <a:off x="4033520" y="6318164"/>
+            <a:ext cx="4114800" cy="365125"/>
+          </a:xfrm>
+        </p:spPr>
         <p:txBody>
           <a:bodyPr/>
           <a:lstStyle/>
@@ -9152,7 +9169,7 @@
         </p:nvSpPr>
         <p:spPr>
           <a:xfrm>
-            <a:off x="838200" y="1690688"/>
+            <a:off x="838200" y="1534643"/>
             <a:ext cx="7035800" cy="1892642"/>
           </a:xfrm>
           <a:prstGeom prst="rect">
@@ -9329,7 +9346,7 @@
           </a:lstStyle>
           <a:p>
             <a:r>
-              <a:rPr lang="en-GB" sz="1800" dirty="0">
+              <a:rPr lang="en-GB" sz="1600" dirty="0">
                 <a:latin typeface="Times New Roman" panose="02020603050405020304" pitchFamily="18" charset="0"/>
                 <a:cs typeface="Times New Roman" panose="02020603050405020304" pitchFamily="18" charset="0"/>
               </a:rPr>
@@ -9338,27 +9355,16 @@
           </a:p>
           <a:p>
             <a:r>
-              <a:rPr lang="en-GB" sz="1800" dirty="0">
+              <a:rPr lang="en-GB" sz="1600" dirty="0">
                 <a:latin typeface="Times New Roman" panose="02020603050405020304" pitchFamily="18" charset="0"/>
                 <a:cs typeface="Times New Roman" panose="02020603050405020304" pitchFamily="18" charset="0"/>
               </a:rPr>
-              <a:t>Results consistently averaged 72.5</a:t>
-            </a:r>
-            <a:r>
-              <a:rPr lang="en-GB" sz="1800">
-                <a:latin typeface="Times New Roman" panose="02020603050405020304" pitchFamily="18" charset="0"/>
-                <a:cs typeface="Times New Roman" panose="02020603050405020304" pitchFamily="18" charset="0"/>
-              </a:rPr>
-              <a:t>% accuracy</a:t>
-            </a:r>
-            <a:endParaRPr lang="en-GB" sz="1800" dirty="0">
-              <a:latin typeface="Times New Roman" panose="02020603050405020304" pitchFamily="18" charset="0"/>
-              <a:cs typeface="Times New Roman" panose="02020603050405020304" pitchFamily="18" charset="0"/>
-            </a:endParaRPr>
-          </a:p>
-          <a:p>
-            <a:r>
-              <a:rPr lang="en-GB" sz="1800" dirty="0">
+              <a:t>Results consistently averaged 72.5% accuracy</a:t>
+            </a:r>
+          </a:p>
+          <a:p>
+            <a:r>
+              <a:rPr lang="en-GB" sz="1600" dirty="0">
                 <a:latin typeface="Times New Roman" panose="02020603050405020304" pitchFamily="18" charset="0"/>
                 <a:cs typeface="Times New Roman" panose="02020603050405020304" pitchFamily="18" charset="0"/>
               </a:rPr>
@@ -9381,8 +9387,8 @@
         </p:nvSpPr>
         <p:spPr>
           <a:xfrm>
-            <a:off x="8564879" y="4663459"/>
-            <a:ext cx="3271520" cy="523220"/>
+            <a:off x="8906920" y="3392810"/>
+            <a:ext cx="2929478" cy="523220"/>
           </a:xfrm>
           <a:prstGeom prst="rect">
             <a:avLst/>
@@ -9427,7 +9433,7 @@
         </p:blipFill>
         <p:spPr>
           <a:xfrm>
-            <a:off x="739934" y="3755897"/>
+            <a:off x="838200" y="3306502"/>
             <a:ext cx="7315200" cy="695836"/>
           </a:xfrm>
           <a:prstGeom prst="rect">
@@ -9457,7 +9463,7 @@
         </p:blipFill>
         <p:spPr>
           <a:xfrm>
-            <a:off x="1655759" y="4925069"/>
+            <a:off x="1754025" y="4475674"/>
             <a:ext cx="5400675" cy="657225"/>
           </a:xfrm>
           <a:prstGeom prst="rect">
@@ -9479,7 +9485,7 @@
         </p:nvSpPr>
         <p:spPr>
           <a:xfrm>
-            <a:off x="739935" y="4444725"/>
+            <a:off x="838201" y="3995330"/>
             <a:ext cx="7315199" cy="307777"/>
           </a:xfrm>
           <a:prstGeom prst="rect">
@@ -9518,7 +9524,7 @@
         </p:nvSpPr>
         <p:spPr>
           <a:xfrm>
-            <a:off x="1655759" y="5582294"/>
+            <a:off x="1754025" y="5132899"/>
             <a:ext cx="5400675" cy="523220"/>
           </a:xfrm>
           <a:prstGeom prst="rect">
@@ -9565,14 +9571,82 @@
         </p:blipFill>
         <p:spPr>
           <a:xfrm>
-            <a:off x="8357552" y="1302963"/>
-            <a:ext cx="3686175" cy="3295650"/>
+            <a:off x="8906920" y="808165"/>
+            <a:ext cx="2929478" cy="2619120"/>
           </a:xfrm>
           <a:prstGeom prst="rect">
             <a:avLst/>
           </a:prstGeom>
         </p:spPr>
       </p:pic>
+      <p:pic>
+        <p:nvPicPr>
+          <p:cNvPr id="8" name="Picture 7">
+            <a:extLst>
+              <a:ext uri="{FF2B5EF4-FFF2-40B4-BE49-F238E27FC236}">
+                <a16:creationId xmlns:a16="http://schemas.microsoft.com/office/drawing/2014/main" id="{E833F5EF-C98A-4FFD-88CC-1AB1E122E1A8}"/>
+              </a:ext>
+            </a:extLst>
+          </p:cNvPr>
+          <p:cNvPicPr>
+            <a:picLocks noChangeAspect="1"/>
+          </p:cNvPicPr>
+          <p:nvPr/>
+        </p:nvPicPr>
+        <p:blipFill>
+          <a:blip r:embed="rId6"/>
+          <a:stretch>
+            <a:fillRect/>
+          </a:stretch>
+        </p:blipFill>
+        <p:spPr>
+          <a:xfrm>
+            <a:off x="8521698" y="3995330"/>
+            <a:ext cx="3314700" cy="1809750"/>
+          </a:xfrm>
+          <a:prstGeom prst="rect">
+            <a:avLst/>
+          </a:prstGeom>
+        </p:spPr>
+      </p:pic>
+      <p:sp>
+        <p:nvSpPr>
+          <p:cNvPr id="15" name="TextBox 14">
+            <a:extLst>
+              <a:ext uri="{FF2B5EF4-FFF2-40B4-BE49-F238E27FC236}">
+                <a16:creationId xmlns:a16="http://schemas.microsoft.com/office/drawing/2014/main" id="{61D6624B-0115-4A51-846D-333AAAE52A42}"/>
+              </a:ext>
+            </a:extLst>
+          </p:cNvPr>
+          <p:cNvSpPr txBox="1"/>
+          <p:nvPr/>
+        </p:nvSpPr>
+        <p:spPr>
+          <a:xfrm>
+            <a:off x="8906920" y="5750320"/>
+            <a:ext cx="2929478" cy="523220"/>
+          </a:xfrm>
+          <a:prstGeom prst="rect">
+            <a:avLst/>
+          </a:prstGeom>
+          <a:noFill/>
+        </p:spPr>
+        <p:txBody>
+          <a:bodyPr wrap="square" rtlCol="0">
+            <a:spAutoFit/>
+          </a:bodyPr>
+          <a:lstStyle/>
+          <a:p>
+            <a:r>
+              <a:rPr lang="en-GB" sz="1400" i="1" dirty="0">
+                <a:latin typeface="Times New Roman" panose="02020603050405020304" pitchFamily="18" charset="0"/>
+                <a:cs typeface="Times New Roman" panose="02020603050405020304" pitchFamily="18" charset="0"/>
+              </a:rPr>
+              <a:t>Accuracy (Percentage) between the first and second guesses of the model</a:t>
+            </a:r>
+          </a:p>
+        </p:txBody>
+      </p:sp>
     </p:spTree>
     <p:extLst>
       <p:ext uri="{BB962C8B-B14F-4D97-AF65-F5344CB8AC3E}">
@@ -9650,7 +9724,12 @@
             <p:ph idx="1"/>
           </p:nvPr>
         </p:nvSpPr>
-        <p:spPr/>
+        <p:spPr>
+          <a:xfrm>
+            <a:off x="838200" y="1825625"/>
+            <a:ext cx="6690360" cy="4351338"/>
+          </a:xfrm>
+        </p:spPr>
         <p:txBody>
           <a:bodyPr>
             <a:normAutofit/>
@@ -9731,6 +9810,53 @@
           </a:p>
         </p:txBody>
       </p:sp>
+      <p:pic>
+        <p:nvPicPr>
+          <p:cNvPr id="1026" name="Picture 2" descr="DESIGNING SMART AGENT BASED USING RETRIEVAL MODEL">
+            <a:extLst>
+              <a:ext uri="{FF2B5EF4-FFF2-40B4-BE49-F238E27FC236}">
+                <a16:creationId xmlns:a16="http://schemas.microsoft.com/office/drawing/2014/main" id="{3AE913E6-E2C3-4B24-88FF-25872AD3FF32}"/>
+              </a:ext>
+            </a:extLst>
+          </p:cNvPr>
+          <p:cNvPicPr>
+            <a:picLocks noChangeAspect="1" noChangeArrowheads="1"/>
+          </p:cNvPicPr>
+          <p:nvPr/>
+        </p:nvPicPr>
+        <p:blipFill>
+          <a:blip r:embed="rId3">
+            <a:extLst>
+              <a:ext uri="{28A0092B-C50C-407E-A947-70E740481C1C}">
+                <a14:useLocalDpi xmlns:a14="http://schemas.microsoft.com/office/drawing/2010/main" val="0"/>
+              </a:ext>
+            </a:extLst>
+          </a:blip>
+          <a:srcRect/>
+          <a:stretch>
+            <a:fillRect/>
+          </a:stretch>
+        </p:blipFill>
+        <p:spPr bwMode="auto">
+          <a:xfrm>
+            <a:off x="8040695" y="2306321"/>
+            <a:ext cx="3838250" cy="2436336"/>
+          </a:xfrm>
+          <a:prstGeom prst="rect">
+            <a:avLst/>
+          </a:prstGeom>
+          <a:noFill/>
+          <a:extLst>
+            <a:ext uri="{909E8E84-426E-40DD-AFC4-6F175D3DCCD1}">
+              <a14:hiddenFill xmlns:a14="http://schemas.microsoft.com/office/drawing/2010/main">
+                <a:solidFill>
+                  <a:srgbClr val="FFFFFF"/>
+                </a:solidFill>
+              </a14:hiddenFill>
+            </a:ext>
+          </a:extLst>
+        </p:spPr>
+      </p:pic>
     </p:spTree>
     <p:extLst>
       <p:ext uri="{BB962C8B-B14F-4D97-AF65-F5344CB8AC3E}">
@@ -10440,100 +10566,6 @@
           <p:cNvPr id="2" name="Title 1">
             <a:extLst>
               <a:ext uri="{FF2B5EF4-FFF2-40B4-BE49-F238E27FC236}">
-                <a16:creationId xmlns:a16="http://schemas.microsoft.com/office/drawing/2014/main" id="{770E6EE7-B050-46D5-B12B-FF8B9068E4C3}"/>
-              </a:ext>
-            </a:extLst>
-          </p:cNvPr>
-          <p:cNvSpPr>
-            <a:spLocks noGrp="1"/>
-          </p:cNvSpPr>
-          <p:nvPr>
-            <p:ph type="title"/>
-          </p:nvPr>
-        </p:nvSpPr>
-        <p:spPr>
-          <a:xfrm>
-            <a:off x="838200" y="2691765"/>
-            <a:ext cx="10515600" cy="1325563"/>
-          </a:xfrm>
-        </p:spPr>
-        <p:txBody>
-          <a:bodyPr>
-            <a:normAutofit/>
-          </a:bodyPr>
-          <a:lstStyle/>
-          <a:p>
-            <a:pPr algn="ctr"/>
-            <a:r>
-              <a:rPr lang="en-GB" dirty="0">
-                <a:latin typeface="Times New Roman" panose="02020603050405020304" pitchFamily="18" charset="0"/>
-                <a:cs typeface="Times New Roman" panose="02020603050405020304" pitchFamily="18" charset="0"/>
-              </a:rPr>
-              <a:t>Solution Development</a:t>
-            </a:r>
-          </a:p>
-        </p:txBody>
-      </p:sp>
-      <p:sp>
-        <p:nvSpPr>
-          <p:cNvPr id="7" name="Footer Placeholder 6">
-            <a:extLst>
-              <a:ext uri="{FF2B5EF4-FFF2-40B4-BE49-F238E27FC236}">
-                <a16:creationId xmlns:a16="http://schemas.microsoft.com/office/drawing/2014/main" id="{BFBBBD93-BE28-4EB0-AD63-C26CC96E7E2B}"/>
-              </a:ext>
-            </a:extLst>
-          </p:cNvPr>
-          <p:cNvSpPr>
-            <a:spLocks noGrp="1"/>
-          </p:cNvSpPr>
-          <p:nvPr>
-            <p:ph type="ftr" sz="quarter" idx="11"/>
-          </p:nvPr>
-        </p:nvSpPr>
-        <p:spPr/>
-        <p:txBody>
-          <a:bodyPr/>
-          <a:lstStyle/>
-          <a:p>
-            <a:endParaRPr lang="en-GB" dirty="0"/>
-          </a:p>
-        </p:txBody>
-      </p:sp>
-    </p:spTree>
-    <p:extLst>
-      <p:ext uri="{BB962C8B-B14F-4D97-AF65-F5344CB8AC3E}">
-        <p14:creationId xmlns:p14="http://schemas.microsoft.com/office/powerpoint/2010/main" val="1121027167"/>
-      </p:ext>
-    </p:extLst>
-  </p:cSld>
-  <p:clrMapOvr>
-    <a:masterClrMapping/>
-  </p:clrMapOvr>
-</p:sld>
-</file>
-
-<file path=ppt/slides/slide8.xml><?xml version="1.0" encoding="utf-8"?>
-<p:sld xmlns:a="http://schemas.openxmlformats.org/drawingml/2006/main" xmlns:r="http://schemas.openxmlformats.org/officeDocument/2006/relationships" xmlns:p="http://schemas.openxmlformats.org/presentationml/2006/main">
-  <p:cSld>
-    <p:spTree>
-      <p:nvGrpSpPr>
-        <p:cNvPr id="1" name=""/>
-        <p:cNvGrpSpPr/>
-        <p:nvPr/>
-      </p:nvGrpSpPr>
-      <p:grpSpPr>
-        <a:xfrm>
-          <a:off x="0" y="0"/>
-          <a:ext cx="0" cy="0"/>
-          <a:chOff x="0" y="0"/>
-          <a:chExt cx="0" cy="0"/>
-        </a:xfrm>
-      </p:grpSpPr>
-      <p:sp>
-        <p:nvSpPr>
-          <p:cNvPr id="2" name="Title 1">
-            <a:extLst>
-              <a:ext uri="{FF2B5EF4-FFF2-40B4-BE49-F238E27FC236}">
                 <a16:creationId xmlns:a16="http://schemas.microsoft.com/office/drawing/2014/main" id="{771BB030-117A-49E4-9801-43301420CF6D}"/>
               </a:ext>
             </a:extLst>
@@ -10637,7 +10669,7 @@
           <a:p>
             <a:r>
               <a:rPr lang="en-GB" dirty="0"/>
-              <a:t>Solution Development</a:t>
+              <a:t>Problem Analysis</a:t>
             </a:r>
           </a:p>
         </p:txBody>
@@ -10691,6 +10723,100 @@
 </p:sld>
 </file>
 
+<file path=ppt/slides/slide8.xml><?xml version="1.0" encoding="utf-8"?>
+<p:sld xmlns:a="http://schemas.openxmlformats.org/drawingml/2006/main" xmlns:r="http://schemas.openxmlformats.org/officeDocument/2006/relationships" xmlns:p="http://schemas.openxmlformats.org/presentationml/2006/main">
+  <p:cSld>
+    <p:spTree>
+      <p:nvGrpSpPr>
+        <p:cNvPr id="1" name=""/>
+        <p:cNvGrpSpPr/>
+        <p:nvPr/>
+      </p:nvGrpSpPr>
+      <p:grpSpPr>
+        <a:xfrm>
+          <a:off x="0" y="0"/>
+          <a:ext cx="0" cy="0"/>
+          <a:chOff x="0" y="0"/>
+          <a:chExt cx="0" cy="0"/>
+        </a:xfrm>
+      </p:grpSpPr>
+      <p:sp>
+        <p:nvSpPr>
+          <p:cNvPr id="2" name="Title 1">
+            <a:extLst>
+              <a:ext uri="{FF2B5EF4-FFF2-40B4-BE49-F238E27FC236}">
+                <a16:creationId xmlns:a16="http://schemas.microsoft.com/office/drawing/2014/main" id="{770E6EE7-B050-46D5-B12B-FF8B9068E4C3}"/>
+              </a:ext>
+            </a:extLst>
+          </p:cNvPr>
+          <p:cNvSpPr>
+            <a:spLocks noGrp="1"/>
+          </p:cNvSpPr>
+          <p:nvPr>
+            <p:ph type="title"/>
+          </p:nvPr>
+        </p:nvSpPr>
+        <p:spPr>
+          <a:xfrm>
+            <a:off x="838200" y="2691765"/>
+            <a:ext cx="10515600" cy="1325563"/>
+          </a:xfrm>
+        </p:spPr>
+        <p:txBody>
+          <a:bodyPr>
+            <a:normAutofit/>
+          </a:bodyPr>
+          <a:lstStyle/>
+          <a:p>
+            <a:pPr algn="ctr"/>
+            <a:r>
+              <a:rPr lang="en-GB" dirty="0">
+                <a:latin typeface="Times New Roman" panose="02020603050405020304" pitchFamily="18" charset="0"/>
+                <a:cs typeface="Times New Roman" panose="02020603050405020304" pitchFamily="18" charset="0"/>
+              </a:rPr>
+              <a:t>Solution Development</a:t>
+            </a:r>
+          </a:p>
+        </p:txBody>
+      </p:sp>
+      <p:sp>
+        <p:nvSpPr>
+          <p:cNvPr id="7" name="Footer Placeholder 6">
+            <a:extLst>
+              <a:ext uri="{FF2B5EF4-FFF2-40B4-BE49-F238E27FC236}">
+                <a16:creationId xmlns:a16="http://schemas.microsoft.com/office/drawing/2014/main" id="{BFBBBD93-BE28-4EB0-AD63-C26CC96E7E2B}"/>
+              </a:ext>
+            </a:extLst>
+          </p:cNvPr>
+          <p:cNvSpPr>
+            <a:spLocks noGrp="1"/>
+          </p:cNvSpPr>
+          <p:nvPr>
+            <p:ph type="ftr" sz="quarter" idx="11"/>
+          </p:nvPr>
+        </p:nvSpPr>
+        <p:spPr/>
+        <p:txBody>
+          <a:bodyPr/>
+          <a:lstStyle/>
+          <a:p>
+            <a:endParaRPr lang="en-GB" dirty="0"/>
+          </a:p>
+        </p:txBody>
+      </p:sp>
+    </p:spTree>
+    <p:extLst>
+      <p:ext uri="{BB962C8B-B14F-4D97-AF65-F5344CB8AC3E}">
+        <p14:creationId xmlns:p14="http://schemas.microsoft.com/office/powerpoint/2010/main" val="1121027167"/>
+      </p:ext>
+    </p:extLst>
+  </p:cSld>
+  <p:clrMapOvr>
+    <a:masterClrMapping/>
+  </p:clrMapOvr>
+</p:sld>
+</file>
+
 <file path=ppt/slides/slide9.xml><?xml version="1.0" encoding="utf-8"?>
 <p:sld xmlns:a="http://schemas.openxmlformats.org/drawingml/2006/main" xmlns:r="http://schemas.openxmlformats.org/officeDocument/2006/relationships" xmlns:p="http://schemas.openxmlformats.org/presentationml/2006/main">
   <p:cSld>
@@ -10767,12 +10893,86 @@
           </a:p>
         </p:txBody>
       </p:sp>
+      <p:sp>
+        <p:nvSpPr>
+          <p:cNvPr id="11" name="Content Placeholder 2">
+            <a:extLst>
+              <a:ext uri="{FF2B5EF4-FFF2-40B4-BE49-F238E27FC236}">
+                <a16:creationId xmlns:a16="http://schemas.microsoft.com/office/drawing/2014/main" id="{E94E40E4-D13F-4075-BCD6-7895824B975E}"/>
+              </a:ext>
+            </a:extLst>
+          </p:cNvPr>
+          <p:cNvSpPr>
+            <a:spLocks noGrp="1"/>
+          </p:cNvSpPr>
+          <p:nvPr>
+            <p:ph idx="1"/>
+          </p:nvPr>
+        </p:nvSpPr>
+        <p:spPr>
+          <a:xfrm>
+            <a:off x="838200" y="1690688"/>
+            <a:ext cx="6243320" cy="4351338"/>
+          </a:xfrm>
+        </p:spPr>
+        <p:txBody>
+          <a:bodyPr>
+            <a:normAutofit/>
+          </a:bodyPr>
+          <a:lstStyle/>
+          <a:p>
+            <a:r>
+              <a:rPr lang="en-GB" sz="2000" dirty="0">
+                <a:latin typeface="Times New Roman" panose="02020603050405020304" pitchFamily="18" charset="0"/>
+                <a:cs typeface="Times New Roman" panose="02020603050405020304" pitchFamily="18" charset="0"/>
+              </a:rPr>
+              <a:t>For testing purposes, a model was produced using 30 questions, each categorised into “car” for purchasing a car, “maintenance” for repair questions, and “bike” for purchasing a bike</a:t>
+            </a:r>
+          </a:p>
+          <a:p>
+            <a:r>
+              <a:rPr lang="en-GB" sz="2000" dirty="0">
+                <a:latin typeface="Times New Roman" panose="02020603050405020304" pitchFamily="18" charset="0"/>
+                <a:cs typeface="Times New Roman" panose="02020603050405020304" pitchFamily="18" charset="0"/>
+              </a:rPr>
+              <a:t>Said items were split evenly – 10 questions for each.</a:t>
+            </a:r>
+          </a:p>
+          <a:p>
+            <a:r>
+              <a:rPr lang="en-GB" sz="2000" dirty="0">
+                <a:latin typeface="Times New Roman" panose="02020603050405020304" pitchFamily="18" charset="0"/>
+                <a:cs typeface="Times New Roman" panose="02020603050405020304" pitchFamily="18" charset="0"/>
+              </a:rPr>
+              <a:t>20% of the items, chosen randomly, were then selected as test data.</a:t>
+            </a:r>
+          </a:p>
+          <a:p>
+            <a:r>
+              <a:rPr lang="en-GB" sz="2000" dirty="0">
+                <a:latin typeface="Times New Roman" panose="02020603050405020304" pitchFamily="18" charset="0"/>
+                <a:cs typeface="Times New Roman" panose="02020603050405020304" pitchFamily="18" charset="0"/>
+              </a:rPr>
+              <a:t>Accuracy was varied – sometimes reaching as low as 20%, sometimes reaching 100% for the test data</a:t>
+            </a:r>
+          </a:p>
+          <a:p>
+            <a:r>
+              <a:rPr lang="en-GB" sz="2000" dirty="0">
+                <a:latin typeface="Times New Roman" panose="02020603050405020304" pitchFamily="18" charset="0"/>
+                <a:cs typeface="Times New Roman" panose="02020603050405020304" pitchFamily="18" charset="0"/>
+              </a:rPr>
+              <a:t>Tests using a simple input system proved that even in high accuracy models, the results were still inconsistent</a:t>
+            </a:r>
+          </a:p>
+        </p:txBody>
+      </p:sp>
       <p:pic>
         <p:nvPicPr>
-          <p:cNvPr id="6" name="Picture 5">
-            <a:extLst>
-              <a:ext uri="{FF2B5EF4-FFF2-40B4-BE49-F238E27FC236}">
-                <a16:creationId xmlns:a16="http://schemas.microsoft.com/office/drawing/2014/main" id="{541BFD7C-4583-4596-938A-BF98284287A4}"/>
+          <p:cNvPr id="5" name="Picture 4">
+            <a:extLst>
+              <a:ext uri="{FF2B5EF4-FFF2-40B4-BE49-F238E27FC236}">
+                <a16:creationId xmlns:a16="http://schemas.microsoft.com/office/drawing/2014/main" id="{F0AF9735-FC34-4E7A-A655-54AB0C297CE3}"/>
               </a:ext>
             </a:extLst>
           </p:cNvPr>
@@ -10789,8 +10989,8 @@
         </p:blipFill>
         <p:spPr>
           <a:xfrm>
-            <a:off x="7545729" y="2595822"/>
-            <a:ext cx="3935960" cy="463232"/>
+            <a:off x="8518243" y="1693783"/>
+            <a:ext cx="2024317" cy="611664"/>
           </a:xfrm>
           <a:prstGeom prst="rect">
             <a:avLst/>
@@ -10799,10 +10999,10 @@
       </p:pic>
       <p:pic>
         <p:nvPicPr>
-          <p:cNvPr id="8" name="Picture 7">
-            <a:extLst>
-              <a:ext uri="{FF2B5EF4-FFF2-40B4-BE49-F238E27FC236}">
-                <a16:creationId xmlns:a16="http://schemas.microsoft.com/office/drawing/2014/main" id="{FF886EE7-364F-4B82-A745-21C5E6A6EB9E}"/>
+          <p:cNvPr id="7" name="Picture 6">
+            <a:extLst>
+              <a:ext uri="{FF2B5EF4-FFF2-40B4-BE49-F238E27FC236}">
+                <a16:creationId xmlns:a16="http://schemas.microsoft.com/office/drawing/2014/main" id="{12463886-F001-4E2D-9D0D-ADEDAAA4031D}"/>
               </a:ext>
             </a:extLst>
           </p:cNvPr>
@@ -10819,8 +11019,8 @@
         </p:blipFill>
         <p:spPr>
           <a:xfrm>
-            <a:off x="7530152" y="3105750"/>
-            <a:ext cx="4000500" cy="463996"/>
+            <a:off x="7553916" y="2558295"/>
+            <a:ext cx="3886200" cy="428625"/>
           </a:xfrm>
           <a:prstGeom prst="rect">
             <a:avLst/>
@@ -10829,10 +11029,10 @@
       </p:pic>
       <p:pic>
         <p:nvPicPr>
-          <p:cNvPr id="10" name="Picture 9">
-            <a:extLst>
-              <a:ext uri="{FF2B5EF4-FFF2-40B4-BE49-F238E27FC236}">
-                <a16:creationId xmlns:a16="http://schemas.microsoft.com/office/drawing/2014/main" id="{B15F14E3-1221-4FB7-8992-3277E55E301F}"/>
+          <p:cNvPr id="13" name="Picture 12">
+            <a:extLst>
+              <a:ext uri="{FF2B5EF4-FFF2-40B4-BE49-F238E27FC236}">
+                <a16:creationId xmlns:a16="http://schemas.microsoft.com/office/drawing/2014/main" id="{A20CD9C3-BD77-401A-A566-982F84C2AE83}"/>
               </a:ext>
             </a:extLst>
           </p:cNvPr>
@@ -10841,15 +11041,16 @@
           </p:cNvPicPr>
           <p:nvPr/>
         </p:nvPicPr>
-        <p:blipFill rotWithShape="1">
+        <p:blipFill>
           <a:blip r:embed="rId5"/>
-          <a:srcRect t="1" b="15094"/>
-          <a:stretch/>
+          <a:stretch>
+            <a:fillRect/>
+          </a:stretch>
         </p:blipFill>
         <p:spPr>
           <a:xfrm>
-            <a:off x="7969591" y="4594028"/>
-            <a:ext cx="3152775" cy="428626"/>
+            <a:off x="7477716" y="3059211"/>
+            <a:ext cx="3962400" cy="466725"/>
           </a:xfrm>
           <a:prstGeom prst="rect">
             <a:avLst/>
@@ -10858,10 +11059,10 @@
       </p:pic>
       <p:pic>
         <p:nvPicPr>
-          <p:cNvPr id="12" name="Picture 11">
-            <a:extLst>
-              <a:ext uri="{FF2B5EF4-FFF2-40B4-BE49-F238E27FC236}">
-                <a16:creationId xmlns:a16="http://schemas.microsoft.com/office/drawing/2014/main" id="{899C8CCF-9B52-439F-BF9D-864C70F41360}"/>
+          <p:cNvPr id="17" name="Picture 16">
+            <a:extLst>
+              <a:ext uri="{FF2B5EF4-FFF2-40B4-BE49-F238E27FC236}">
+                <a16:creationId xmlns:a16="http://schemas.microsoft.com/office/drawing/2014/main" id="{84DFE3C0-A019-4561-9DAE-3B277EDCE8ED}"/>
               </a:ext>
             </a:extLst>
           </p:cNvPr>
@@ -10878,8 +11079,8 @@
         </p:blipFill>
         <p:spPr>
           <a:xfrm>
-            <a:off x="7512343" y="3598228"/>
-            <a:ext cx="3969346" cy="530068"/>
+            <a:off x="7969591" y="4566620"/>
+            <a:ext cx="3152775" cy="419100"/>
           </a:xfrm>
           <a:prstGeom prst="rect">
             <a:avLst/>
@@ -10888,10 +11089,10 @@
       </p:pic>
       <p:pic>
         <p:nvPicPr>
-          <p:cNvPr id="14" name="Picture 13">
-            <a:extLst>
-              <a:ext uri="{FF2B5EF4-FFF2-40B4-BE49-F238E27FC236}">
-                <a16:creationId xmlns:a16="http://schemas.microsoft.com/office/drawing/2014/main" id="{407FDE1D-42DC-457A-A336-C1196488B04E}"/>
+          <p:cNvPr id="21" name="Picture 20">
+            <a:extLst>
+              <a:ext uri="{FF2B5EF4-FFF2-40B4-BE49-F238E27FC236}">
+                <a16:creationId xmlns:a16="http://schemas.microsoft.com/office/drawing/2014/main" id="{6DF5DFF3-273B-4DD0-A72C-8AA1FFE66132}"/>
               </a:ext>
             </a:extLst>
           </p:cNvPr>
@@ -10908,8 +11109,8 @@
         </p:blipFill>
         <p:spPr>
           <a:xfrm>
-            <a:off x="7954013" y="5164217"/>
-            <a:ext cx="3152775" cy="400050"/>
+            <a:off x="7969591" y="5087651"/>
+            <a:ext cx="3200400" cy="400050"/>
           </a:xfrm>
           <a:prstGeom prst="rect">
             <a:avLst/>
@@ -10918,10 +11119,10 @@
       </p:pic>
       <p:pic>
         <p:nvPicPr>
-          <p:cNvPr id="16" name="Picture 15">
-            <a:extLst>
-              <a:ext uri="{FF2B5EF4-FFF2-40B4-BE49-F238E27FC236}">
-                <a16:creationId xmlns:a16="http://schemas.microsoft.com/office/drawing/2014/main" id="{F17EF3CC-AB37-4AD4-83DE-04154ED4265A}"/>
+          <p:cNvPr id="23" name="Picture 22">
+            <a:extLst>
+              <a:ext uri="{FF2B5EF4-FFF2-40B4-BE49-F238E27FC236}">
+                <a16:creationId xmlns:a16="http://schemas.microsoft.com/office/drawing/2014/main" id="{3EC7D40F-78BD-4A38-9EB3-3EE0DB5CB353}"/>
               </a:ext>
             </a:extLst>
           </p:cNvPr>
@@ -10938,112 +11139,8 @@
         </p:blipFill>
         <p:spPr>
           <a:xfrm>
-            <a:off x="7545729" y="5678223"/>
-            <a:ext cx="4000500" cy="428625"/>
-          </a:xfrm>
-          <a:prstGeom prst="rect">
-            <a:avLst/>
-          </a:prstGeom>
-        </p:spPr>
-      </p:pic>
-      <p:sp>
-        <p:nvSpPr>
-          <p:cNvPr id="11" name="Content Placeholder 2">
-            <a:extLst>
-              <a:ext uri="{FF2B5EF4-FFF2-40B4-BE49-F238E27FC236}">
-                <a16:creationId xmlns:a16="http://schemas.microsoft.com/office/drawing/2014/main" id="{E94E40E4-D13F-4075-BCD6-7895824B975E}"/>
-              </a:ext>
-            </a:extLst>
-          </p:cNvPr>
-          <p:cNvSpPr>
-            <a:spLocks noGrp="1"/>
-          </p:cNvSpPr>
-          <p:nvPr>
-            <p:ph idx="1"/>
-          </p:nvPr>
-        </p:nvSpPr>
-        <p:spPr>
-          <a:xfrm>
-            <a:off x="838200" y="1690688"/>
-            <a:ext cx="6243320" cy="4351338"/>
-          </a:xfrm>
-        </p:spPr>
-        <p:txBody>
-          <a:bodyPr>
-            <a:normAutofit/>
-          </a:bodyPr>
-          <a:lstStyle/>
-          <a:p>
-            <a:r>
-              <a:rPr lang="en-GB" sz="2000" dirty="0">
-                <a:latin typeface="Times New Roman" panose="02020603050405020304" pitchFamily="18" charset="0"/>
-                <a:cs typeface="Times New Roman" panose="02020603050405020304" pitchFamily="18" charset="0"/>
-              </a:rPr>
-              <a:t>For testing purposes, a model was produced using 30 questions, each categorised into “car” for purchasing a car, “maintenance” for repair questions, and “bike” for purchasing a bike</a:t>
-            </a:r>
-          </a:p>
-          <a:p>
-            <a:r>
-              <a:rPr lang="en-GB" sz="2000" dirty="0">
-                <a:latin typeface="Times New Roman" panose="02020603050405020304" pitchFamily="18" charset="0"/>
-                <a:cs typeface="Times New Roman" panose="02020603050405020304" pitchFamily="18" charset="0"/>
-              </a:rPr>
-              <a:t>Said items were split evenly – 10 questions for each.</a:t>
-            </a:r>
-          </a:p>
-          <a:p>
-            <a:r>
-              <a:rPr lang="en-GB" sz="2000" dirty="0">
-                <a:latin typeface="Times New Roman" panose="02020603050405020304" pitchFamily="18" charset="0"/>
-                <a:cs typeface="Times New Roman" panose="02020603050405020304" pitchFamily="18" charset="0"/>
-              </a:rPr>
-              <a:t>20% of the items, chosen randomly, were then selected as test data.</a:t>
-            </a:r>
-          </a:p>
-          <a:p>
-            <a:r>
-              <a:rPr lang="en-GB" sz="2000" dirty="0">
-                <a:latin typeface="Times New Roman" panose="02020603050405020304" pitchFamily="18" charset="0"/>
-                <a:cs typeface="Times New Roman" panose="02020603050405020304" pitchFamily="18" charset="0"/>
-              </a:rPr>
-              <a:t>Accuracy was varied – sometimes reaching as low as 20%, sometimes reaching 100% for the test data</a:t>
-            </a:r>
-          </a:p>
-          <a:p>
-            <a:r>
-              <a:rPr lang="en-GB" sz="2000" dirty="0">
-                <a:latin typeface="Times New Roman" panose="02020603050405020304" pitchFamily="18" charset="0"/>
-                <a:cs typeface="Times New Roman" panose="02020603050405020304" pitchFamily="18" charset="0"/>
-              </a:rPr>
-              <a:t>Tests using a simple input system proved that even in high accuracy models, the results were still inconsistent</a:t>
-            </a:r>
-          </a:p>
-        </p:txBody>
-      </p:sp>
-      <p:pic>
-        <p:nvPicPr>
-          <p:cNvPr id="5" name="Picture 4">
-            <a:extLst>
-              <a:ext uri="{FF2B5EF4-FFF2-40B4-BE49-F238E27FC236}">
-                <a16:creationId xmlns:a16="http://schemas.microsoft.com/office/drawing/2014/main" id="{F0AF9735-FC34-4E7A-A655-54AB0C297CE3}"/>
-              </a:ext>
-            </a:extLst>
-          </p:cNvPr>
-          <p:cNvPicPr>
-            <a:picLocks noChangeAspect="1"/>
-          </p:cNvPicPr>
-          <p:nvPr/>
-        </p:nvPicPr>
-        <p:blipFill>
-          <a:blip r:embed="rId9"/>
-          <a:stretch>
-            <a:fillRect/>
-          </a:stretch>
-        </p:blipFill>
-        <p:spPr>
-          <a:xfrm>
-            <a:off x="8518243" y="1693783"/>
-            <a:ext cx="2024317" cy="611664"/>
+            <a:off x="7593353" y="5634389"/>
+            <a:ext cx="3952875" cy="400050"/>
           </a:xfrm>
           <a:prstGeom prst="rect">
             <a:avLst/>

</xml_diff>

<commit_message>
Added to script and powerpoint with other methods of similarity
</commit_message>
<xml_diff>
--- a/Documentation/100505349.pptx
+++ b/Documentation/100505349.pptx
@@ -5,10 +5,10 @@
     <p:sldMasterId id="2147483684" r:id="rId1"/>
   </p:sldMasterIdLst>
   <p:notesMasterIdLst>
-    <p:notesMasterId r:id="rId24"/>
+    <p:notesMasterId r:id="rId26"/>
   </p:notesMasterIdLst>
   <p:handoutMasterIdLst>
-    <p:handoutMasterId r:id="rId25"/>
+    <p:handoutMasterId r:id="rId27"/>
   </p:handoutMasterIdLst>
   <p:sldIdLst>
     <p:sldId id="256" r:id="rId2"/>
@@ -33,6 +33,8 @@
     <p:sldId id="285" r:id="rId21"/>
     <p:sldId id="275" r:id="rId22"/>
     <p:sldId id="280" r:id="rId23"/>
+    <p:sldId id="286" r:id="rId24"/>
+    <p:sldId id="287" r:id="rId25"/>
   </p:sldIdLst>
   <p:sldSz cx="12192000" cy="6858000"/>
   <p:notesSz cx="6858000" cy="9144000"/>
@@ -158,6 +160,8 @@
             <p14:sldId id="285"/>
             <p14:sldId id="275"/>
             <p14:sldId id="280"/>
+            <p14:sldId id="286"/>
+            <p14:sldId id="287"/>
           </p14:sldIdLst>
         </p14:section>
       </p14:sectionLst>
@@ -1789,6 +1793,90 @@
     <p:extLst>
       <p:ext uri="{BB962C8B-B14F-4D97-AF65-F5344CB8AC3E}">
         <p14:creationId xmlns:p14="http://schemas.microsoft.com/office/powerpoint/2010/main" val="4006503464"/>
+      </p:ext>
+    </p:extLst>
+  </p:cSld>
+  <p:clrMapOvr>
+    <a:masterClrMapping/>
+  </p:clrMapOvr>
+</p:notes>
+</file>
+
+<file path=ppt/notesSlides/notesSlide20.xml><?xml version="1.0" encoding="utf-8"?>
+<p:notes xmlns:a="http://schemas.openxmlformats.org/drawingml/2006/main" xmlns:r="http://schemas.openxmlformats.org/officeDocument/2006/relationships" xmlns:p="http://schemas.openxmlformats.org/presentationml/2006/main">
+  <p:cSld>
+    <p:spTree>
+      <p:nvGrpSpPr>
+        <p:cNvPr id="1" name=""/>
+        <p:cNvGrpSpPr/>
+        <p:nvPr/>
+      </p:nvGrpSpPr>
+      <p:grpSpPr>
+        <a:xfrm>
+          <a:off x="0" y="0"/>
+          <a:ext cx="0" cy="0"/>
+          <a:chOff x="0" y="0"/>
+          <a:chExt cx="0" cy="0"/>
+        </a:xfrm>
+      </p:grpSpPr>
+      <p:sp>
+        <p:nvSpPr>
+          <p:cNvPr id="2" name="Slide Image Placeholder 1"/>
+          <p:cNvSpPr>
+            <a:spLocks noGrp="1" noRot="1" noChangeAspect="1"/>
+          </p:cNvSpPr>
+          <p:nvPr>
+            <p:ph type="sldImg"/>
+          </p:nvPr>
+        </p:nvSpPr>
+        <p:spPr/>
+      </p:sp>
+      <p:sp>
+        <p:nvSpPr>
+          <p:cNvPr id="3" name="Notes Placeholder 2"/>
+          <p:cNvSpPr>
+            <a:spLocks noGrp="1"/>
+          </p:cNvSpPr>
+          <p:nvPr>
+            <p:ph type="body" idx="1"/>
+          </p:nvPr>
+        </p:nvSpPr>
+        <p:spPr/>
+        <p:txBody>
+          <a:bodyPr/>
+          <a:lstStyle/>
+          <a:p>
+            <a:endParaRPr lang="en-GB" dirty="0"/>
+          </a:p>
+        </p:txBody>
+      </p:sp>
+      <p:sp>
+        <p:nvSpPr>
+          <p:cNvPr id="4" name="Slide Number Placeholder 3"/>
+          <p:cNvSpPr>
+            <a:spLocks noGrp="1"/>
+          </p:cNvSpPr>
+          <p:nvPr>
+            <p:ph type="sldNum" sz="quarter" idx="5"/>
+          </p:nvPr>
+        </p:nvSpPr>
+        <p:spPr/>
+        <p:txBody>
+          <a:bodyPr/>
+          <a:lstStyle/>
+          <a:p>
+            <a:fld id="{6A9D5347-B203-4D7E-8C0C-C0F523BBFB73}" type="slidenum">
+              <a:rPr lang="en-GB" smtClean="0"/>
+              <a:t>23</a:t>
+            </a:fld>
+            <a:endParaRPr lang="en-GB"/>
+          </a:p>
+        </p:txBody>
+      </p:sp>
+    </p:spTree>
+    <p:extLst>
+      <p:ext uri="{BB962C8B-B14F-4D97-AF65-F5344CB8AC3E}">
+        <p14:creationId xmlns:p14="http://schemas.microsoft.com/office/powerpoint/2010/main" val="3064322447"/>
       </p:ext>
     </p:extLst>
   </p:cSld>
@@ -9593,16 +9681,15 @@
           </p:cNvPicPr>
           <p:nvPr/>
         </p:nvPicPr>
-        <p:blipFill>
+        <p:blipFill rotWithShape="1">
           <a:blip r:embed="rId6"/>
-          <a:stretch>
-            <a:fillRect/>
-          </a:stretch>
+          <a:srcRect t="387" b="1"/>
+          <a:stretch/>
         </p:blipFill>
         <p:spPr>
           <a:xfrm>
-            <a:off x="8521698" y="3995330"/>
-            <a:ext cx="3314700" cy="1809750"/>
+            <a:off x="8521698" y="4002338"/>
+            <a:ext cx="3314700" cy="1802742"/>
           </a:xfrm>
           <a:prstGeom prst="rect">
             <a:avLst/>
@@ -9651,6 +9738,322 @@
     <p:extLst>
       <p:ext uri="{BB962C8B-B14F-4D97-AF65-F5344CB8AC3E}">
         <p14:creationId xmlns:p14="http://schemas.microsoft.com/office/powerpoint/2010/main" val="4146135374"/>
+      </p:ext>
+    </p:extLst>
+  </p:cSld>
+  <p:clrMapOvr>
+    <a:masterClrMapping/>
+  </p:clrMapOvr>
+</p:sld>
+</file>
+
+<file path=ppt/slides/slide23.xml><?xml version="1.0" encoding="utf-8"?>
+<p:sld xmlns:a="http://schemas.openxmlformats.org/drawingml/2006/main" xmlns:r="http://schemas.openxmlformats.org/officeDocument/2006/relationships" xmlns:p="http://schemas.openxmlformats.org/presentationml/2006/main">
+  <p:cSld>
+    <p:spTree>
+      <p:nvGrpSpPr>
+        <p:cNvPr id="1" name=""/>
+        <p:cNvGrpSpPr/>
+        <p:nvPr/>
+      </p:nvGrpSpPr>
+      <p:grpSpPr>
+        <a:xfrm>
+          <a:off x="0" y="0"/>
+          <a:ext cx="0" cy="0"/>
+          <a:chOff x="0" y="0"/>
+          <a:chExt cx="0" cy="0"/>
+        </a:xfrm>
+      </p:grpSpPr>
+      <p:sp>
+        <p:nvSpPr>
+          <p:cNvPr id="2" name="Title 1">
+            <a:extLst>
+              <a:ext uri="{FF2B5EF4-FFF2-40B4-BE49-F238E27FC236}">
+                <a16:creationId xmlns:a16="http://schemas.microsoft.com/office/drawing/2014/main" id="{BAF89A68-3BA2-470F-9E49-157E55C01634}"/>
+              </a:ext>
+            </a:extLst>
+          </p:cNvPr>
+          <p:cNvSpPr>
+            <a:spLocks noGrp="1"/>
+          </p:cNvSpPr>
+          <p:nvPr>
+            <p:ph type="title"/>
+          </p:nvPr>
+        </p:nvSpPr>
+        <p:spPr/>
+        <p:txBody>
+          <a:bodyPr/>
+          <a:lstStyle/>
+          <a:p>
+            <a:r>
+              <a:rPr lang="en-GB" dirty="0">
+                <a:latin typeface="Times New Roman" panose="02020603050405020304" pitchFamily="18" charset="0"/>
+                <a:cs typeface="Times New Roman" panose="02020603050405020304" pitchFamily="18" charset="0"/>
+              </a:rPr>
+              <a:t>Similarity Methods</a:t>
+            </a:r>
+          </a:p>
+        </p:txBody>
+      </p:sp>
+      <p:sp>
+        <p:nvSpPr>
+          <p:cNvPr id="3" name="Content Placeholder 2">
+            <a:extLst>
+              <a:ext uri="{FF2B5EF4-FFF2-40B4-BE49-F238E27FC236}">
+                <a16:creationId xmlns:a16="http://schemas.microsoft.com/office/drawing/2014/main" id="{3CF7E30B-6FAD-46D3-92E4-63B8C2A31982}"/>
+              </a:ext>
+            </a:extLst>
+          </p:cNvPr>
+          <p:cNvSpPr>
+            <a:spLocks noGrp="1"/>
+          </p:cNvSpPr>
+          <p:nvPr>
+            <p:ph idx="1"/>
+          </p:nvPr>
+        </p:nvSpPr>
+        <p:spPr>
+          <a:xfrm>
+            <a:off x="838200" y="1690688"/>
+            <a:ext cx="6629400" cy="4344352"/>
+          </a:xfrm>
+        </p:spPr>
+        <p:txBody>
+          <a:bodyPr>
+            <a:normAutofit/>
+          </a:bodyPr>
+          <a:lstStyle/>
+          <a:p>
+            <a:r>
+              <a:rPr lang="en-GB" sz="2000" dirty="0">
+                <a:latin typeface="Times New Roman" panose="02020603050405020304" pitchFamily="18" charset="0"/>
+                <a:cs typeface="Times New Roman" panose="02020603050405020304" pitchFamily="18" charset="0"/>
+              </a:rPr>
+              <a:t>Spacy uses cosine similarity as its default similarity scoring metric, but there are other ways to compute similarity</a:t>
+            </a:r>
+          </a:p>
+          <a:p>
+            <a:r>
+              <a:rPr lang="en-GB" sz="2000" dirty="0">
+                <a:latin typeface="Times New Roman" panose="02020603050405020304" pitchFamily="18" charset="0"/>
+                <a:cs typeface="Times New Roman" panose="02020603050405020304" pitchFamily="18" charset="0"/>
+              </a:rPr>
+              <a:t>Two other significant metrics of similarity are Euclidean distance and Pearson Coefficient. </a:t>
+            </a:r>
+          </a:p>
+          <a:p>
+            <a:r>
+              <a:rPr lang="en-GB" sz="2000" dirty="0">
+                <a:latin typeface="Times New Roman" panose="02020603050405020304" pitchFamily="18" charset="0"/>
+                <a:cs typeface="Times New Roman" panose="02020603050405020304" pitchFamily="18" charset="0"/>
+              </a:rPr>
+              <a:t>By implementing each method, we can see the changes in accuracy and determine which similarity algorithm is best suited for this task</a:t>
+            </a:r>
+          </a:p>
+          <a:p>
+            <a:r>
+              <a:rPr lang="en-GB" sz="2000" dirty="0">
+                <a:latin typeface="Times New Roman" panose="02020603050405020304" pitchFamily="18" charset="0"/>
+                <a:cs typeface="Times New Roman" panose="02020603050405020304" pitchFamily="18" charset="0"/>
+              </a:rPr>
+              <a:t>After testing each algorithm 10 times, checking both their percent accuracy and time to compute in milliseconds, there were no significant differences between the algorithms in either field. </a:t>
+            </a:r>
+          </a:p>
+        </p:txBody>
+      </p:sp>
+      <p:sp>
+        <p:nvSpPr>
+          <p:cNvPr id="4" name="Footer Placeholder 3">
+            <a:extLst>
+              <a:ext uri="{FF2B5EF4-FFF2-40B4-BE49-F238E27FC236}">
+                <a16:creationId xmlns:a16="http://schemas.microsoft.com/office/drawing/2014/main" id="{C6133F4D-BAB6-4492-A3BA-BFC433570E64}"/>
+              </a:ext>
+            </a:extLst>
+          </p:cNvPr>
+          <p:cNvSpPr>
+            <a:spLocks noGrp="1"/>
+          </p:cNvSpPr>
+          <p:nvPr>
+            <p:ph type="ftr" sz="quarter" idx="11"/>
+          </p:nvPr>
+        </p:nvSpPr>
+        <p:spPr/>
+        <p:txBody>
+          <a:bodyPr/>
+          <a:lstStyle/>
+          <a:p>
+            <a:r>
+              <a:rPr lang="en-GB" dirty="0"/>
+              <a:t>Evaluation</a:t>
+            </a:r>
+          </a:p>
+        </p:txBody>
+      </p:sp>
+      <p:pic>
+        <p:nvPicPr>
+          <p:cNvPr id="8" name="Picture 7">
+            <a:extLst>
+              <a:ext uri="{FF2B5EF4-FFF2-40B4-BE49-F238E27FC236}">
+                <a16:creationId xmlns:a16="http://schemas.microsoft.com/office/drawing/2014/main" id="{380B8E27-67A0-4422-9143-F5ECD3F99CF5}"/>
+              </a:ext>
+            </a:extLst>
+          </p:cNvPr>
+          <p:cNvPicPr>
+            <a:picLocks noChangeAspect="1"/>
+          </p:cNvPicPr>
+          <p:nvPr/>
+        </p:nvPicPr>
+        <p:blipFill>
+          <a:blip r:embed="rId3"/>
+          <a:stretch>
+            <a:fillRect/>
+          </a:stretch>
+        </p:blipFill>
+        <p:spPr>
+          <a:xfrm>
+            <a:off x="7467600" y="2096294"/>
+            <a:ext cx="4567357" cy="2894966"/>
+          </a:xfrm>
+          <a:prstGeom prst="rect">
+            <a:avLst/>
+          </a:prstGeom>
+        </p:spPr>
+      </p:pic>
+      <p:sp>
+        <p:nvSpPr>
+          <p:cNvPr id="12" name="TextBox 11">
+            <a:extLst>
+              <a:ext uri="{FF2B5EF4-FFF2-40B4-BE49-F238E27FC236}">
+                <a16:creationId xmlns:a16="http://schemas.microsoft.com/office/drawing/2014/main" id="{75DA13C3-1AE7-4BB5-848C-0D61B4AD82FE}"/>
+              </a:ext>
+            </a:extLst>
+          </p:cNvPr>
+          <p:cNvSpPr txBox="1"/>
+          <p:nvPr/>
+        </p:nvSpPr>
+        <p:spPr>
+          <a:xfrm>
+            <a:off x="7747000" y="4989930"/>
+            <a:ext cx="3911599" cy="738664"/>
+          </a:xfrm>
+          <a:prstGeom prst="rect">
+            <a:avLst/>
+          </a:prstGeom>
+          <a:noFill/>
+        </p:spPr>
+        <p:txBody>
+          <a:bodyPr wrap="square" rtlCol="0">
+            <a:spAutoFit/>
+          </a:bodyPr>
+          <a:lstStyle/>
+          <a:p>
+            <a:r>
+              <a:rPr lang="en-GB" sz="1400" i="1" dirty="0">
+                <a:latin typeface="Times New Roman" panose="02020603050405020304" pitchFamily="18" charset="0"/>
+                <a:cs typeface="Times New Roman" panose="02020603050405020304" pitchFamily="18" charset="0"/>
+              </a:rPr>
+              <a:t>Comparison between algorithms, with the time in milliseconds taken to compute on the x-axis and the percentage accuracy of the iteration on the y-axis</a:t>
+            </a:r>
+          </a:p>
+        </p:txBody>
+      </p:sp>
+    </p:spTree>
+    <p:extLst>
+      <p:ext uri="{BB962C8B-B14F-4D97-AF65-F5344CB8AC3E}">
+        <p14:creationId xmlns:p14="http://schemas.microsoft.com/office/powerpoint/2010/main" val="3881144115"/>
+      </p:ext>
+    </p:extLst>
+  </p:cSld>
+  <p:clrMapOvr>
+    <a:masterClrMapping/>
+  </p:clrMapOvr>
+</p:sld>
+</file>
+
+<file path=ppt/slides/slide24.xml><?xml version="1.0" encoding="utf-8"?>
+<p:sld xmlns:a="http://schemas.openxmlformats.org/drawingml/2006/main" xmlns:r="http://schemas.openxmlformats.org/officeDocument/2006/relationships" xmlns:p="http://schemas.openxmlformats.org/presentationml/2006/main">
+  <p:cSld>
+    <p:spTree>
+      <p:nvGrpSpPr>
+        <p:cNvPr id="1" name=""/>
+        <p:cNvGrpSpPr/>
+        <p:nvPr/>
+      </p:nvGrpSpPr>
+      <p:grpSpPr>
+        <a:xfrm>
+          <a:off x="0" y="0"/>
+          <a:ext cx="0" cy="0"/>
+          <a:chOff x="0" y="0"/>
+          <a:chExt cx="0" cy="0"/>
+        </a:xfrm>
+      </p:grpSpPr>
+      <p:sp>
+        <p:nvSpPr>
+          <p:cNvPr id="2" name="Title 1">
+            <a:extLst>
+              <a:ext uri="{FF2B5EF4-FFF2-40B4-BE49-F238E27FC236}">
+                <a16:creationId xmlns:a16="http://schemas.microsoft.com/office/drawing/2014/main" id="{770E6EE7-B050-46D5-B12B-FF8B9068E4C3}"/>
+              </a:ext>
+            </a:extLst>
+          </p:cNvPr>
+          <p:cNvSpPr>
+            <a:spLocks noGrp="1"/>
+          </p:cNvSpPr>
+          <p:nvPr>
+            <p:ph type="title"/>
+          </p:nvPr>
+        </p:nvSpPr>
+        <p:spPr>
+          <a:xfrm>
+            <a:off x="838200" y="2691765"/>
+            <a:ext cx="10515600" cy="1325563"/>
+          </a:xfrm>
+        </p:spPr>
+        <p:txBody>
+          <a:bodyPr>
+            <a:normAutofit/>
+          </a:bodyPr>
+          <a:lstStyle/>
+          <a:p>
+            <a:pPr algn="ctr"/>
+            <a:r>
+              <a:rPr lang="en-GB" dirty="0">
+                <a:latin typeface="Times New Roman" panose="02020603050405020304" pitchFamily="18" charset="0"/>
+                <a:cs typeface="Times New Roman" panose="02020603050405020304" pitchFamily="18" charset="0"/>
+              </a:rPr>
+              <a:t>Thank you for your time</a:t>
+            </a:r>
+          </a:p>
+        </p:txBody>
+      </p:sp>
+      <p:sp>
+        <p:nvSpPr>
+          <p:cNvPr id="7" name="Footer Placeholder 6">
+            <a:extLst>
+              <a:ext uri="{FF2B5EF4-FFF2-40B4-BE49-F238E27FC236}">
+                <a16:creationId xmlns:a16="http://schemas.microsoft.com/office/drawing/2014/main" id="{BFBBBD93-BE28-4EB0-AD63-C26CC96E7E2B}"/>
+              </a:ext>
+            </a:extLst>
+          </p:cNvPr>
+          <p:cNvSpPr>
+            <a:spLocks noGrp="1"/>
+          </p:cNvSpPr>
+          <p:nvPr>
+            <p:ph type="ftr" sz="quarter" idx="11"/>
+          </p:nvPr>
+        </p:nvSpPr>
+        <p:spPr/>
+        <p:txBody>
+          <a:bodyPr/>
+          <a:lstStyle/>
+          <a:p>
+            <a:endParaRPr lang="en-GB" dirty="0"/>
+          </a:p>
+        </p:txBody>
+      </p:sp>
+    </p:spTree>
+    <p:extLst>
+      <p:ext uri="{BB962C8B-B14F-4D97-AF65-F5344CB8AC3E}">
+        <p14:creationId xmlns:p14="http://schemas.microsoft.com/office/powerpoint/2010/main" val="2320366708"/>
       </p:ext>
     </p:extLst>
   </p:cSld>
@@ -9857,6 +10260,41 @@
           </a:extLst>
         </p:spPr>
       </p:pic>
+      <p:sp>
+        <p:nvSpPr>
+          <p:cNvPr id="6" name="TextBox 5">
+            <a:extLst>
+              <a:ext uri="{FF2B5EF4-FFF2-40B4-BE49-F238E27FC236}">
+                <a16:creationId xmlns:a16="http://schemas.microsoft.com/office/drawing/2014/main" id="{5D90BA25-5B7E-4578-9486-80EB5CFAC811}"/>
+              </a:ext>
+            </a:extLst>
+          </p:cNvPr>
+          <p:cNvSpPr txBox="1"/>
+          <p:nvPr/>
+        </p:nvSpPr>
+        <p:spPr>
+          <a:xfrm>
+            <a:off x="8607425" y="4900245"/>
+            <a:ext cx="3271520" cy="215444"/>
+          </a:xfrm>
+          <a:prstGeom prst="rect">
+            <a:avLst/>
+          </a:prstGeom>
+          <a:noFill/>
+        </p:spPr>
+        <p:txBody>
+          <a:bodyPr wrap="square" rtlCol="0">
+            <a:spAutoFit/>
+          </a:bodyPr>
+          <a:lstStyle/>
+          <a:p>
+            <a:r>
+              <a:rPr lang="en-GB" sz="800" dirty="0"/>
+              <a:t>https://ijtre.com/images/scripts/2019060732.pdf </a:t>
+            </a:r>
+          </a:p>
+        </p:txBody>
+      </p:sp>
     </p:spTree>
     <p:extLst>
       <p:ext uri="{BB962C8B-B14F-4D97-AF65-F5344CB8AC3E}">
@@ -10240,6 +10678,41 @@
             <a:r>
               <a:rPr lang="en-GB" dirty="0"/>
               <a:t>Problem Analysis</a:t>
+            </a:r>
+          </a:p>
+        </p:txBody>
+      </p:sp>
+      <p:sp>
+        <p:nvSpPr>
+          <p:cNvPr id="6" name="TextBox 5">
+            <a:extLst>
+              <a:ext uri="{FF2B5EF4-FFF2-40B4-BE49-F238E27FC236}">
+                <a16:creationId xmlns:a16="http://schemas.microsoft.com/office/drawing/2014/main" id="{97CBD0CA-5A1D-460E-8CA6-51ECA2A2F7A2}"/>
+              </a:ext>
+            </a:extLst>
+          </p:cNvPr>
+          <p:cNvSpPr txBox="1"/>
+          <p:nvPr/>
+        </p:nvSpPr>
+        <p:spPr>
+          <a:xfrm>
+            <a:off x="7668260" y="5672405"/>
+            <a:ext cx="3271520" cy="215444"/>
+          </a:xfrm>
+          <a:prstGeom prst="rect">
+            <a:avLst/>
+          </a:prstGeom>
+          <a:noFill/>
+        </p:spPr>
+        <p:txBody>
+          <a:bodyPr wrap="square" rtlCol="0">
+            <a:spAutoFit/>
+          </a:bodyPr>
+          <a:lstStyle/>
+          <a:p>
+            <a:r>
+              <a:rPr lang="en-GB" sz="800" dirty="0"/>
+              <a:t>https://spacy.io/usage/visualizers</a:t>
             </a:r>
           </a:p>
         </p:txBody>

</xml_diff>